<commit_message>
[feat] add all files
</commit_message>
<xml_diff>
--- a/Dart Avançado.pptx
+++ b/Dart Avançado.pptx
@@ -42,6 +42,19 @@
     <p:sldId id="286" r:id="rId36"/>
     <p:sldId id="293" r:id="rId37"/>
     <p:sldId id="296" r:id="rId38"/>
+    <p:sldId id="297" r:id="rId39"/>
+    <p:sldId id="302" r:id="rId40"/>
+    <p:sldId id="298" r:id="rId41"/>
+    <p:sldId id="300" r:id="rId42"/>
+    <p:sldId id="301" r:id="rId43"/>
+    <p:sldId id="309" r:id="rId44"/>
+    <p:sldId id="303" r:id="rId45"/>
+    <p:sldId id="304" r:id="rId46"/>
+    <p:sldId id="305" r:id="rId47"/>
+    <p:sldId id="306" r:id="rId48"/>
+    <p:sldId id="307" r:id="rId49"/>
+    <p:sldId id="310" r:id="rId50"/>
+    <p:sldId id="311" r:id="rId51"/>
   </p:sldIdLst>
   <p:sldSz cx="12192000" cy="6858000"/>
   <p:notesSz cx="6858000" cy="12192000"/>
@@ -291,7 +304,7 @@
             <a:spLocks noGrp="1" noChangeArrowheads="1"/>
             <a:extLst>
               <a:ext uri="smNativeData">
-                <pr:smNativeData xmlns:mc="http://schemas.openxmlformats.org/markup-compatibility/2006" xmlns:p14="http://schemas.microsoft.com/office/powerpoint/2010/main" xmlns:p15="http://schemas.microsoft.com/office/powerpoint/2012/main" xmlns:pr="smNativeData" xmlns="smNativeData" val="SMDATA_15_l3DXYhMAAAAlAAAAZAAAAA8BAAAAkAAAAEgAAACQAAAASAAAAAAAAAABAAAAAAAAAAEAAABQAAAAAAAAAAAA4D8AAAAAAADgPwAAAAAAAOA/AAAAAAAA4D8AAAAAAADgPwAAAAAAAOA/AAAAAAAA4D8AAAAAAADgPwAAAAAAAOA/AAAAAAAA4D8CAAAAjAAAAAAAAAAAAAAAADOZDCYmJggAAAAAAAAAAAAAAAAAAAAAAAAAAAAAAAAAAAAAZAAAAAEAAABAAAAAAAAAAAAAAAAAAAAAAAAAAAAAAAAAAAAAAAAAAAAAAAAAAAAAAAAAAAAAAAAAAAAAAAAAAAAAAAAAAAAAAAAAAAAAAAAAAAAAAAAAAAAAAAAAAAAAFAAAADwAAAAAAAAAAAAAAP///wkUAAAAAQAAABQAAAAUAAAAFAAAAAEAAAAAAAAAZAAAAGQAAAAAAAAAZAAAAGQAAAAVAAAAYAAAAAAAAAAAAAAADwAAACADAAAAAAAAAAAAAAEAAACgMgAAVgcAAKr4//8BAAAAf39/AAEAAABkAAAAAAAAABQAAABAHwAAAAAAACYAAAAAAAAAwOD//wAAAAAmAAAAZAAAABYAAABMAAAAAAAAAAAAAAAEAAAAAAAAAAEAAAAzZpkKAAAAACgAAAAoAAAAZAAAAGQAAAAAAAAAzMzMAAAAAABQAAAAUAAAAGQAAABkAAAAAAAAABcAAAAUAAAAAAAAAAAAAAD/fwAA/38AAAAAAAAJAAAABAAAAAAAAAAeAAAAaAAAAAAAAAAAAAAAAAAAAAAAAAAAAAAAECcAABAnAAAAAAAAAAAAAAAAAAAAAAAAAAAAAAAAAAAAAAAAAAAAABQAAAAAAAAAwMD/AAAAAABkAAAAMgAAAAAAAABkAAAAAAAAAH9/fwAKAAAAIgAAABgAAAAAAAAAAAAAAAAAAAAAAAAAAAAAAAAAAAAkAAAAJAAAAAAAAAAHAAAAAAAAAAAAAAAAAAAAAAAAAAAAAAAAAAAAf39/ACUAAABYAAAAAAAAAAAAAAAAAAAAAAAAAAAAAAAAAAAAAAAAAAAAAAAAAAAAAAAAAAAAAAA/AAAAAAAAAKCGAQAAAAAAAAAAAAAAAAAMAAAAAQAAAAAAAAAAAAAAAAAAAB8AAABUAAAAAAAABQAAAAEAAAAAAAAAAAAAAAAAAAAAAAAAAAAAAAAAAAAAAAAAAAAAAAJ/f38AAAAAA8zMzADAwP8Af39/AAAAAAAAAAAAAAAAAAAAAAAAAAAAIQAAABgAAAAUAAAAoAUAABoNAABgRQAAJhYAABAAAAAmAAAACAAAAAEAAAAAAAAA"/>
+                <pr:smNativeData xmlns="smNativeData" xmlns:pr="smNativeData" xmlns:p15="http://schemas.microsoft.com/office/powerpoint/2012/main" xmlns:p14="http://schemas.microsoft.com/office/powerpoint/2010/main" xmlns:mc="http://schemas.openxmlformats.org/markup-compatibility/2006" val="SMDATA_15_l3DXYhMAAAAlAAAAZAAAAA8BAAAAkAAAAEgAAACQAAAASAAAAAAAAAABAAAAAAAAAAEAAABQAAAAAAAAAAAA4D8AAAAAAADgPwAAAAAAAOA/AAAAAAAA4D8AAAAAAADgPwAAAAAAAOA/AAAAAAAA4D8AAAAAAADgPwAAAAAAAOA/AAAAAAAA4D8CAAAAjAAAAAAAAAAAAAAAADOZDCYmJggAAAAAAAAAAAAAAAAAAAAAAAAAAAAAAAAAAAAAZAAAAAEAAABAAAAAAAAAAAAAAAAAAAAAAAAAAAAAAAAAAAAAAAAAAAAAAAAAAAAAAAAAAAAAAAAAAAAAAAAAAAAAAAAAAAAAAAAAAAAAAAAAAAAAAAAAAAAAAAAAAAAAFAAAADwAAAAAAAAAAAAAAP///wkUAAAAAQAAABQAAAAUAAAAFAAAAAEAAAAAAAAAZAAAAGQAAAAAAAAAZAAAAGQAAAAVAAAAYAAAAAAAAAAAAAAADwAAACADAAAAAAAAAAAAAAEAAACgMgAAVgcAAKr4//8BAAAAf39/AAEAAABkAAAAAAAAABQAAABAHwAAAAAAACYAAAAAAAAAwOD//wAAAAAmAAAAZAAAABYAAABMAAAAAAAAAAAAAAAEAAAAAAAAAAEAAAAzZpkKAAAAACgAAAAoAAAAZAAAAGQAAAAAAAAAzMzMAAAAAABQAAAAUAAAAGQAAABkAAAAAAAAABcAAAAUAAAAAAAAAAAAAAD/fwAA/38AAAAAAAAJAAAABAAAAAAAAAAeAAAAaAAAAAAAAAAAAAAAAAAAAAAAAAAAAAAAECcAABAnAAAAAAAAAAAAAAAAAAAAAAAAAAAAAAAAAAAAAAAAAAAAABQAAAAAAAAAwMD/AAAAAABkAAAAMgAAAAAAAABkAAAAAAAAAH9/fwAKAAAAIgAAABgAAAAAAAAAAAAAAAAAAAAAAAAAAAAAAAAAAAAkAAAAJAAAAAAAAAAHAAAAAAAAAAAAAAAAAAAAAAAAAAAAAAAAAAAAf39/ACUAAABYAAAAAAAAAAAAAAAAAAAAAAAAAAAAAAAAAAAAAAAAAAAAAAAAAAAAAAAAAAAAAAA/AAAAAAAAAKCGAQAAAAAAAAAAAAAAAAAMAAAAAQAAAAAAAAAAAAAAAAAAAB8AAABUAAAAAAAABQAAAAEAAAAAAAAAAAAAAAAAAAAAAAAAAAAAAAAAAAAAAAAAAAAAAAJ/f38AAAAAA8zMzADAwP8Af39/AAAAAAAAAAAAAAAAAAAAAAAAAAAAIQAAABgAAAAUAAAAoAUAABoNAABgRQAAJhYAABAAAAAmAAAACAAAAAEAAAAAAAAA"/>
               </a:ext>
             </a:extLst>
           </p:cNvSpPr>
@@ -322,7 +335,7 @@
             <a:spLocks noGrp="1" noChangeArrowheads="1"/>
             <a:extLst>
               <a:ext uri="smNativeData">
-                <pr:smNativeData xmlns:mc="http://schemas.openxmlformats.org/markup-compatibility/2006" xmlns:p14="http://schemas.microsoft.com/office/powerpoint/2010/main" xmlns:p15="http://schemas.microsoft.com/office/powerpoint/2012/main" xmlns:pr="smNativeData" xmlns="smNativeData" val="SMDATA_15_l3DXYhMAAAAlAAAAZAAAAA8BAAAAkAAAAEgAAACQAAAASAAAAAAAAAAAAAAAAAAAAAEAAABQAAAAAAAAAAAA4D8AAAAAAADgPwAAAAAAAOA/AAAAAAAA4D8AAAAAAADgPwAAAAAAAOA/AAAAAAAA4D8AAAAAAADgPwAAAAAAAOA/AAAAAAAA4D8CAAAAjAAAAAAAAAAAAAAAADOZDCYmJggAAAAAAAAAAAAAAAAAAAAAAAAAAAAAAAAAAAAAZAAAAAEAAABAAAAAAAAAAAAAAAAAAAAAAAAAAAAAAAAAAAAAAAAAAAAAAAAAAAAAAAAAAAAAAAAAAAAAAAAAAAAAAAAAAAAAAAAAAAAAAAAAAAAAAAAAAAAAAAAAAAAAFAAAADwAAAAAAAAAAAAAAP///wkUAAAAAQAAABQAAAAUAAAAFAAAAAEAAAAAAAAAZAAAAGQAAAAAAAAAZAAAAGQAAAAVAAAAYAAAAAAAAAAAAAAADwAAACADAAAAAAAAAAAAAAEAAACgMgAAVgcAAKr4//8BAAAAf39/AAEAAABkAAAAAAAAABQAAABAHwAAAAAAACYAAAAAAAAAwOD//wAAAAAmAAAAZAAAABYAAABMAAAAAAAAAAAAAAAEAAAAAAAAAAEAAAAzZpkKAAAAACgAAAAoAAAAZAAAAGQAAAAAAAAAzMzMAAAAAABQAAAAUAAAAGQAAABkAAAAAAAAABcAAAAUAAAAAAAAAAAAAAD/fwAA/38AAAAAAAAJAAAABAAAAAAAAAAeAAAAaAAAAAAAAAAAAAAAAAAAAAAAAAAAAAAAECcAABAnAAAAAAAAAAAAAAAAAAAAAAAAAAAAAAAAAAAAAAAAAAAAABQAAAAAAAAAwMD/AAAAAABkAAAAMgAAAAAAAABkAAAAAAAAAH9/fwAKAAAAIgAAABgAAAAAAAAAAAAAAAAAAAAAAAAAAAAAAAAAAAAkAAAAJAAAAAAAAAAHAAAAAAAAAAAAAAAAAAAAAAAAAAAAAAAAAAAAf39/ACUAAABYAAAAAAAAAAAAAAAAAAAAAAAAAAAAAAAAAAAAAAAAAAAAAAAAAAAAAAAAAAAAAAA/AAAAAAAAAKCGAQAAAAAAAAAAAAAAAAAMAAAAAQAAAAAAAAAAAAAAAAAAAB8AAABUAAAAAAAABQAAAAEAAAAAAAAAAAAAAAAAAAAAAAAAAAAAAAAAAAAAAAAAAAAAAAJ/f38AAAAAA8zMzADAwP8Af39/AAAAAAAAAAAAAAAAAAAAAAAAAAAAIQAAABgAAAAUAAAAQAsAAOgXAADAPwAAsCIAABAAAAAmAAAACAAAAAGAAAAAAAAA"/>
+                <pr:smNativeData xmlns="smNativeData" xmlns:pr="smNativeData" xmlns:p15="http://schemas.microsoft.com/office/powerpoint/2012/main" xmlns:p14="http://schemas.microsoft.com/office/powerpoint/2010/main" xmlns:mc="http://schemas.openxmlformats.org/markup-compatibility/2006" val="SMDATA_15_l3DXYhMAAAAlAAAAZAAAAA8BAAAAkAAAAEgAAACQAAAASAAAAAAAAAAAAAAAAAAAAAEAAABQAAAAAAAAAAAA4D8AAAAAAADgPwAAAAAAAOA/AAAAAAAA4D8AAAAAAADgPwAAAAAAAOA/AAAAAAAA4D8AAAAAAADgPwAAAAAAAOA/AAAAAAAA4D8CAAAAjAAAAAAAAAAAAAAAADOZDCYmJggAAAAAAAAAAAAAAAAAAAAAAAAAAAAAAAAAAAAAZAAAAAEAAABAAAAAAAAAAAAAAAAAAAAAAAAAAAAAAAAAAAAAAAAAAAAAAAAAAAAAAAAAAAAAAAAAAAAAAAAAAAAAAAAAAAAAAAAAAAAAAAAAAAAAAAAAAAAAAAAAAAAAFAAAADwAAAAAAAAAAAAAAP///wkUAAAAAQAAABQAAAAUAAAAFAAAAAEAAAAAAAAAZAAAAGQAAAAAAAAAZAAAAGQAAAAVAAAAYAAAAAAAAAAAAAAADwAAACADAAAAAAAAAAAAAAEAAACgMgAAVgcAAKr4//8BAAAAf39/AAEAAABkAAAAAAAAABQAAABAHwAAAAAAACYAAAAAAAAAwOD//wAAAAAmAAAAZAAAABYAAABMAAAAAAAAAAAAAAAEAAAAAAAAAAEAAAAzZpkKAAAAACgAAAAoAAAAZAAAAGQAAAAAAAAAzMzMAAAAAABQAAAAUAAAAGQAAABkAAAAAAAAABcAAAAUAAAAAAAAAAAAAAD/fwAA/38AAAAAAAAJAAAABAAAAAAAAAAeAAAAaAAAAAAAAAAAAAAAAAAAAAAAAAAAAAAAECcAABAnAAAAAAAAAAAAAAAAAAAAAAAAAAAAAAAAAAAAAAAAAAAAABQAAAAAAAAAwMD/AAAAAABkAAAAMgAAAAAAAABkAAAAAAAAAH9/fwAKAAAAIgAAABgAAAAAAAAAAAAAAAAAAAAAAAAAAAAAAAAAAAAkAAAAJAAAAAAAAAAHAAAAAAAAAAAAAAAAAAAAAAAAAAAAAAAAAAAAf39/ACUAAABYAAAAAAAAAAAAAAAAAAAAAAAAAAAAAAAAAAAAAAAAAAAAAAAAAAAAAAAAAAAAAAA/AAAAAAAAAKCGAQAAAAAAAAAAAAAAAAAMAAAAAQAAAAAAAAAAAAAAAAAAAB8AAABUAAAAAAAABQAAAAEAAAAAAAAAAAAAAAAAAAAAAAAAAAAAAAAAAAAAAAAAAAAAAAJ/f38AAAAAA8zMzADAwP8Af39/AAAAAAAAAAAAAAAAAAAAAAAAAAAAIQAAABgAAAAUAAAAQAsAAOgXAADAPwAAsCIAABAAAAAmAAAACAAAAAGAAAAAAAAA"/>
               </a:ext>
             </a:extLst>
           </p:cNvSpPr>
@@ -381,7 +394,7 @@
             <a:spLocks noGrp="1" noChangeArrowheads="1"/>
             <a:extLst>
               <a:ext uri="smNativeData">
-                <pr:smNativeData xmlns:mc="http://schemas.openxmlformats.org/markup-compatibility/2006" xmlns:p14="http://schemas.microsoft.com/office/powerpoint/2010/main" xmlns:p15="http://schemas.microsoft.com/office/powerpoint/2012/main" xmlns:pr="smNativeData" xmlns="smNativeData" val="SMDATA_15_l3DXYhMAAAAlAAAAZAAAAA8BAAAAkAAAAEgAAACQAAAASAAAAAAAAAABAAAAAAAAAAEAAABQAAAAAAAAAAAA4D8AAAAAAADgPwAAAAAAAOA/AAAAAAAA4D8AAAAAAADgPwAAAAAAAOA/AAAAAAAA4D8AAAAAAADgPwAAAAAAAOA/AAAAAAAA4D8CAAAAjAAAAAAAAAAAAAAAADOZDCYmJggAAAAAAAAAAAAAAAAAAAAAAAAAAAAAAAAAAAAAZAAAAAEAAABAAAAAAAAAAAAAAAAAAAAAAAAAAAAAAAAAAAAAAAAAAAAAAAAAAAAAAAAAAAAAAAAAAAAAAAAAAAAAAAAAAAAAAAAAAAAAAAAAAAAAAAAAAAAAAAAAAAAAFAAAADwAAAAAAAAAAAAAAP///wkUAAAAAQAAABQAAAAUAAAAFAAAAAEAAAAAAAAAZAAAAGQAAAAAAAAAZAAAAGQAAAAVAAAAYAAAAAAAAAAAAAAADwAAACADAAAAAAAAAAAAAAEAAACgMgAAVgcAAKr4//8BAAAAf39/AAEAAABkAAAAAAAAABQAAABAHwAAAAAAACYAAAAAAAAAwOD//wAAAAAmAAAAZAAAABYAAABMAAAAAAAAAAAAAAAEAAAAAAAAAAEAAAAzZpkKAAAAACgAAAAoAAAAZAAAAGQAAAAAAAAAzMzMAAAAAABQAAAAUAAAAGQAAABkAAAAAAAAABcAAAAUAAAAAAAAAAAAAAD/fwAA/38AAAAAAAAJAAAABAAAAAAAAAAeAAAAaAAAAAAAAAAAAAAAAAAAAAAAAAAAAAAAECcAABAnAAAAAAAAAAAAAAAAAAAAAAAAAAAAAAAAAAAAAAAAAAAAABQAAAAAAAAAwMD/AAAAAABkAAAAMgAAAAAAAABkAAAAAAAAAH9/fwAKAAAAIgAAABgAAAAAAAAAAAAAAAAAAAAAAAAAAAAAAAAAAAAkAAAAJAAAAAAAAAAHAAAAAAAAAAAAAAAAAAAAAAAAAAAAAAAAAAAAf39/ACUAAABYAAAAAAAAAAAAAAAAAAAAAAAAAAAAAAAAAAAAAAAAAAAAAAAAAAAAAAAAAAAAAAA/AAAAAAAAAKCGAQAAAAAAAAAAAAAAAAAMAAAAAQAAAAAAAAAAAAAAAAAAAB8AAABUAAAAAAAABQAAAAEAAAAAAAAAAAAAAAAAAAAAAAAAAAAAAAAAAAAAAAAAAAAAAAJ/f38AAAAAA8zMzADAwP8Af39/AAAAAAAAAAAAAAAAAAAAAAAAAAAAIQAAABgAAAAUAAAAwAMAABsnAAA/FQAAWSkAABAAAAAmAAAACAAAAAAAAAAAAAAA"/>
+                <pr:smNativeData xmlns="smNativeData" xmlns:pr="smNativeData" xmlns:p15="http://schemas.microsoft.com/office/powerpoint/2012/main" xmlns:p14="http://schemas.microsoft.com/office/powerpoint/2010/main" xmlns:mc="http://schemas.openxmlformats.org/markup-compatibility/2006" val="SMDATA_15_l3DXYhMAAAAlAAAAZAAAAA8BAAAAkAAAAEgAAACQAAAASAAAAAAAAAABAAAAAAAAAAEAAABQAAAAAAAAAAAA4D8AAAAAAADgPwAAAAAAAOA/AAAAAAAA4D8AAAAAAADgPwAAAAAAAOA/AAAAAAAA4D8AAAAAAADgPwAAAAAAAOA/AAAAAAAA4D8CAAAAjAAAAAAAAAAAAAAAADOZDCYmJggAAAAAAAAAAAAAAAAAAAAAAAAAAAAAAAAAAAAAZAAAAAEAAABAAAAAAAAAAAAAAAAAAAAAAAAAAAAAAAAAAAAAAAAAAAAAAAAAAAAAAAAAAAAAAAAAAAAAAAAAAAAAAAAAAAAAAAAAAAAAAAAAAAAAAAAAAAAAAAAAAAAAFAAAADwAAAAAAAAAAAAAAP///wkUAAAAAQAAABQAAAAUAAAAFAAAAAEAAAAAAAAAZAAAAGQAAAAAAAAAZAAAAGQAAAAVAAAAYAAAAAAAAAAAAAAADwAAACADAAAAAAAAAAAAAAEAAACgMgAAVgcAAKr4//8BAAAAf39/AAEAAABkAAAAAAAAABQAAABAHwAAAAAAACYAAAAAAAAAwOD//wAAAAAmAAAAZAAAABYAAABMAAAAAAAAAAAAAAAEAAAAAAAAAAEAAAAzZpkKAAAAACgAAAAoAAAAZAAAAGQAAAAAAAAAzMzMAAAAAABQAAAAUAAAAGQAAABkAAAAAAAAABcAAAAUAAAAAAAAAAAAAAD/fwAA/38AAAAAAAAJAAAABAAAAAAAAAAeAAAAaAAAAAAAAAAAAAAAAAAAAAAAAAAAAAAAECcAABAnAAAAAAAAAAAAAAAAAAAAAAAAAAAAAAAAAAAAAAAAAAAAABQAAAAAAAAAwMD/AAAAAABkAAAAMgAAAAAAAABkAAAAAAAAAH9/fwAKAAAAIgAAABgAAAAAAAAAAAAAAAAAAAAAAAAAAAAAAAAAAAAkAAAAJAAAAAAAAAAHAAAAAAAAAAAAAAAAAAAAAAAAAAAAAAAAAAAAf39/ACUAAABYAAAAAAAAAAAAAAAAAAAAAAAAAAAAAAAAAAAAAAAAAAAAAAAAAAAAAAAAAAAAAAA/AAAAAAAAAKCGAQAAAAAAAAAAAAAAAAAMAAAAAQAAAAAAAAAAAAAAAAAAAB8AAABUAAAAAAAABQAAAAEAAAAAAAAAAAAAAAAAAAAAAAAAAAAAAAAAAAAAAAAAAAAAAAJ/f38AAAAAA8zMzADAwP8Af39/AAAAAAAAAAAAAAAAAAAAAAAAAAAAIQAAABgAAAAUAAAAwAMAABsnAAA/FQAAWSkAABAAAAAmAAAACAAAAAAAAAAAAAAA"/>
               </a:ext>
             </a:extLst>
           </p:cNvSpPr>
@@ -395,7 +408,7 @@
           <a:lstStyle/>
           <a:p>
             <a:fld id="{2B84A060-2EC6-D156-883C-D803EE727E8D}" type="datetime1">
-              <a:t>21/07/2022</a:t>
+              <a:t>26/07/2022</a:t>
             </a:fld>
             <a:endParaRPr/>
           </a:p>
@@ -408,7 +421,7 @@
             <a:spLocks noGrp="1" noChangeArrowheads="1"/>
             <a:extLst>
               <a:ext uri="smNativeData">
-                <pr:smNativeData xmlns:mc="http://schemas.openxmlformats.org/markup-compatibility/2006" xmlns:p14="http://schemas.microsoft.com/office/powerpoint/2010/main" xmlns:p15="http://schemas.microsoft.com/office/powerpoint/2012/main" xmlns:pr="smNativeData" xmlns="smNativeData" val="SMDATA_15_l3DXYhMAAAAlAAAAZAAAAA8BAAAAkAAAAEgAAACQAAAASAAAAAAAAAABAAAAAAAAAAEAAABQAAAAAAAAAAAA4D8AAAAAAADgPwAAAAAAAOA/AAAAAAAA4D8AAAAAAADgPwAAAAAAAOA/AAAAAAAA4D8AAAAAAADgPwAAAAAAAOA/AAAAAAAA4D8CAAAAjAAAAAAAAAAAAAAAADOZDCYmJggAAAAAAAAAAAAAAAAAAAAAAAAAAAAAAAAAAAAAZAAAAAEAAABAAAAAAAAAAAAAAAAAAAAAAAAAAAAAAAAAAAAAAAAAAAAAAAAAAAAAAAAAAAAAAAAAAAAAAAAAAAAAAAAAAAAAAAAAAAAAAAAAAAAAAAAAAAAAAAAAAAAAFAAAADwAAAAAAAAAAAAAAP///wkUAAAAAQAAABQAAAAUAAAAFAAAAAEAAAAAAAAAZAAAAGQAAAAAAAAAZAAAAGQAAAAVAAAAYAAAAAAAAAAAAAAADwAAACADAAAAAAAAAAAAAAEAAACgMgAAVgcAAKr4//8BAAAAf39/AAEAAABkAAAAAAAAABQAAABAHwAAAAAAACYAAAAAAAAAwOD//wAAAAAmAAAAZAAAABYAAABMAAAAAAAAAAAAAAAEAAAAAAAAAAEAAAAzZpkKAAAAACgAAAAoAAAAZAAAAGQAAAAAAAAAzMzMAAAAAABQAAAAUAAAAGQAAABkAAAAAAAAABcAAAAUAAAAAAAAAAAAAAD/fwAA/38AAAAAAAAJAAAABAAAAAAAAAAeAAAAaAAAAAAAAAAAAAAAAAAAAAAAAAAAAAAAECcAABAnAAAAAAAAAAAAAAAAAAAAAAAAAAAAAAAAAAAAAAAAAAAAABQAAAAAAAAAwMD/AAAAAABkAAAAMgAAAAAAAABkAAAAAAAAAH9/fwAKAAAAIgAAABgAAAAAAAAAAAAAAAAAAAAAAAAAAAAAAAAAAAAkAAAAJAAAAAAAAAAHAAAAAAAAAAAAAAAAAAAAAAAAAAAAAAAAAAAAf39/ACUAAABYAAAAAAAAAAAAAAAAAAAAAAAAAAAAAAAAAAAAAAAAAAAAAAAAAAAAAAAAAAAAAAA/AAAAAAAAAKCGAQAAAAAAAAAAAAAAAAAMAAAAAQAAAAAAAAAAAAAAAAAAAB8AAABUAAAAAAAABQAAAAEAAAAAAAAAAAAAAAAAAAAAAAAAAAAAAAAAAAAAAAAAAAAAAAJ/f38AAAAAA8zMzADAwP8Af39/AAAAAAAAAAAAAAAAAAAAAAAAAAAAIQAAABgAAAAUAAAAoRkAABsnAABfMQAAWSkAABAAAAAmAAAACAAAAAAAAAAAAAAA"/>
+                <pr:smNativeData xmlns="smNativeData" xmlns:pr="smNativeData" xmlns:p15="http://schemas.microsoft.com/office/powerpoint/2012/main" xmlns:p14="http://schemas.microsoft.com/office/powerpoint/2010/main" xmlns:mc="http://schemas.openxmlformats.org/markup-compatibility/2006" val="SMDATA_15_l3DXYhMAAAAlAAAAZAAAAA8BAAAAkAAAAEgAAACQAAAASAAAAAAAAAABAAAAAAAAAAEAAABQAAAAAAAAAAAA4D8AAAAAAADgPwAAAAAAAOA/AAAAAAAA4D8AAAAAAADgPwAAAAAAAOA/AAAAAAAA4D8AAAAAAADgPwAAAAAAAOA/AAAAAAAA4D8CAAAAjAAAAAAAAAAAAAAAADOZDCYmJggAAAAAAAAAAAAAAAAAAAAAAAAAAAAAAAAAAAAAZAAAAAEAAABAAAAAAAAAAAAAAAAAAAAAAAAAAAAAAAAAAAAAAAAAAAAAAAAAAAAAAAAAAAAAAAAAAAAAAAAAAAAAAAAAAAAAAAAAAAAAAAAAAAAAAAAAAAAAAAAAAAAAFAAAADwAAAAAAAAAAAAAAP///wkUAAAAAQAAABQAAAAUAAAAFAAAAAEAAAAAAAAAZAAAAGQAAAAAAAAAZAAAAGQAAAAVAAAAYAAAAAAAAAAAAAAADwAAACADAAAAAAAAAAAAAAEAAACgMgAAVgcAAKr4//8BAAAAf39/AAEAAABkAAAAAAAAABQAAABAHwAAAAAAACYAAAAAAAAAwOD//wAAAAAmAAAAZAAAABYAAABMAAAAAAAAAAAAAAAEAAAAAAAAAAEAAAAzZpkKAAAAACgAAAAoAAAAZAAAAGQAAAAAAAAAzMzMAAAAAABQAAAAUAAAAGQAAABkAAAAAAAAABcAAAAUAAAAAAAAAAAAAAD/fwAA/38AAAAAAAAJAAAABAAAAAAAAAAeAAAAaAAAAAAAAAAAAAAAAAAAAAAAAAAAAAAAECcAABAnAAAAAAAAAAAAAAAAAAAAAAAAAAAAAAAAAAAAAAAAAAAAABQAAAAAAAAAwMD/AAAAAABkAAAAMgAAAAAAAABkAAAAAAAAAH9/fwAKAAAAIgAAABgAAAAAAAAAAAAAAAAAAAAAAAAAAAAAAAAAAAAkAAAAJAAAAAAAAAAHAAAAAAAAAAAAAAAAAAAAAAAAAAAAAAAAAAAAf39/ACUAAABYAAAAAAAAAAAAAAAAAAAAAAAAAAAAAAAAAAAAAAAAAAAAAAAAAAAAAAAAAAAAAAA/AAAAAAAAAKCGAQAAAAAAAAAAAAAAAAAMAAAAAQAAAAAAAAAAAAAAAAAAAB8AAABUAAAAAAAABQAAAAEAAAAAAAAAAAAAAAAAAAAAAAAAAAAAAAAAAAAAAAAAAAAAAAJ/f38AAAAAA8zMzADAwP8Af39/AAAAAAAAAAAAAAAAAAAAAAAAAAAAIQAAABgAAAAUAAAAoRkAABsnAABfMQAAWSkAABAAAAAmAAAACAAAAAAAAAAAAAAA"/>
               </a:ext>
             </a:extLst>
           </p:cNvSpPr>
@@ -432,7 +445,7 @@
             <a:spLocks noGrp="1" noChangeArrowheads="1"/>
             <a:extLst>
               <a:ext uri="smNativeData">
-                <pr:smNativeData xmlns:mc="http://schemas.openxmlformats.org/markup-compatibility/2006" xmlns:p14="http://schemas.microsoft.com/office/powerpoint/2010/main" xmlns:p15="http://schemas.microsoft.com/office/powerpoint/2012/main" xmlns:pr="smNativeData" xmlns="smNativeData" val="SMDATA_15_l3DXYhMAAAAlAAAAZAAAAA8BAAAAkAAAAEgAAACQAAAASAAAAAAAAAABAAAAAAAAAAEAAABQAAAAAAAAAAAA4D8AAAAAAADgPwAAAAAAAOA/AAAAAAAA4D8AAAAAAADgPwAAAAAAAOA/AAAAAAAA4D8AAAAAAADgPwAAAAAAAOA/AAAAAAAA4D8CAAAAjAAAAAAAAAAAAAAAADOZDCYmJggAAAAAAAAAAAAAAAAAAAAAAAAAAAAAAAAAAAAAZAAAAAEAAABAAAAAAAAAAAAAAAAAAAAAAAAAAAAAAAAAAAAAAAAAAAAAAAAAAAAAAAAAAAAAAAAAAAAAAAAAAAAAAAAAAAAAAAAAAAAAAAAAAAAAAAAAAAAAAAAAAAAAFAAAADwAAAAAAAAAAAAAAP///wkUAAAAAQAAABQAAAAUAAAAFAAAAAEAAAAAAAAAZAAAAGQAAAAAAAAAZAAAAGQAAAAVAAAAYAAAAAAAAAAAAAAADwAAACADAAAAAAAAAAAAAAEAAACgMgAAVgcAAKr4//8BAAAAf39/AAEAAABkAAAAAAAAABQAAABAHwAAAAAAACYAAAAAAAAAwOD//wAAAAAmAAAAZAAAABYAAABMAAAAAAAAAAAAAAAEAAAAAAAAAAEAAAAzZpkKAAAAACgAAAAoAAAAZAAAAGQAAAAAAAAAzMzMAAAAAABQAAAAUAAAAGQAAABkAAAAAAAAABcAAAAUAAAAAAAAAAAAAAD/fwAA/38AAAAAAAAJAAAABAAAAHsAfAAeAAAAaAAAAAAAAAAAAAAAAAAAAAAAAAAAAAAAECcAABAnAAAAAAAAAAAAAAAAAAAAAAAAAAAAAAAAAAAAAAAAAAAAABQAAAAAAAAAwMD/AAAAAABkAAAAMgAAAAAAAABkAAAAAAAAAH9/fwAKAAAAIgAAABgAAAAAAAAAAAAAAAAAAAAAAAAAAAAAAAAAAAAkAAAAJAAAAAAAAAAHAAAAAAAAAAAAAAAAAAAAAAAAAAAAAAAAAAAAf39/ACUAAABYAAAAAAAAAAAAAAAAAAAAAAAAAAAAAAAAAAAAAAAAAAAAAAAAAAAAAAAAAAAAAAA/AAAAAAAAAKCGAQAAAAAAAAAAAAAAAAAMAAAAAQAAAAAAAAAAAAAAAAAAAB8AAABUAAAAAAAABQAAAAEAAAAAAAAAAAAAAAAAAAAAAAAAAAAAAAAAAAAAAAAAAAAAAAJ/f38AAAAAA8zMzADAwP8Af39/AAAAAAAAAAAAAAAAAAAAAAAAAAAAIQAAABgAAAAUAAAAwTUAABsnAABARwAAWSkAABAAAAAmAAAACAAAAAAAAAAAAAAA"/>
+                <pr:smNativeData xmlns="smNativeData" xmlns:pr="smNativeData" xmlns:p15="http://schemas.microsoft.com/office/powerpoint/2012/main" xmlns:p14="http://schemas.microsoft.com/office/powerpoint/2010/main" xmlns:mc="http://schemas.openxmlformats.org/markup-compatibility/2006" val="SMDATA_15_l3DXYhMAAAAlAAAAZAAAAA8BAAAAkAAAAEgAAACQAAAASAAAAAAAAAABAAAAAAAAAAEAAABQAAAAAAAAAAAA4D8AAAAAAADgPwAAAAAAAOA/AAAAAAAA4D8AAAAAAADgPwAAAAAAAOA/AAAAAAAA4D8AAAAAAADgPwAAAAAAAOA/AAAAAAAA4D8CAAAAjAAAAAAAAAAAAAAAADOZDCYmJggAAAAAAAAAAAAAAAAAAAAAAAAAAAAAAAAAAAAAZAAAAAEAAABAAAAAAAAAAAAAAAAAAAAAAAAAAAAAAAAAAAAAAAAAAAAAAAAAAAAAAAAAAAAAAAAAAAAAAAAAAAAAAAAAAAAAAAAAAAAAAAAAAAAAAAAAAAAAAAAAAAAAFAAAADwAAAAAAAAAAAAAAP///wkUAAAAAQAAABQAAAAUAAAAFAAAAAEAAAAAAAAAZAAAAGQAAAAAAAAAZAAAAGQAAAAVAAAAYAAAAAAAAAAAAAAADwAAACADAAAAAAAAAAAAAAEAAACgMgAAVgcAAKr4//8BAAAAf39/AAEAAABkAAAAAAAAABQAAABAHwAAAAAAACYAAAAAAAAAwOD//wAAAAAmAAAAZAAAABYAAABMAAAAAAAAAAAAAAAEAAAAAAAAAAEAAAAzZpkKAAAAACgAAAAoAAAAZAAAAGQAAAAAAAAAzMzMAAAAAABQAAAAUAAAAGQAAABkAAAAAAAAABcAAAAUAAAAAAAAAAAAAAD/fwAA/38AAAAAAAAJAAAABAAAAHsAfAAeAAAAaAAAAAAAAAAAAAAAAAAAAAAAAAAAAAAAECcAABAnAAAAAAAAAAAAAAAAAAAAAAAAAAAAAAAAAAAAAAAAAAAAABQAAAAAAAAAwMD/AAAAAABkAAAAMgAAAAAAAABkAAAAAAAAAH9/fwAKAAAAIgAAABgAAAAAAAAAAAAAAAAAAAAAAAAAAAAAAAAAAAAkAAAAJAAAAAAAAAAHAAAAAAAAAAAAAAAAAAAAAAAAAAAAAAAAAAAAf39/ACUAAABYAAAAAAAAAAAAAAAAAAAAAAAAAAAAAAAAAAAAAAAAAAAAAAAAAAAAAAAAAAAAAAA/AAAAAAAAAKCGAQAAAAAAAAAAAAAAAAAMAAAAAQAAAAAAAAAAAAAAAAAAAB8AAABUAAAAAAAABQAAAAEAAAAAAAAAAAAAAAAAAAAAAAAAAAAAAAAAAAAAAAAAAAAAAAJ/f38AAAAAA8zMzADAwP8Af39/AAAAAAAAAAAAAAAAAAAAAAAAAAAAIQAAABgAAAAUAAAAwTUAABsnAABARwAAWSkAABAAAAAmAAAACAAAAAAAAAAAAAAA"/>
               </a:ext>
             </a:extLst>
           </p:cNvSpPr>
@@ -485,7 +498,7 @@
             <a:spLocks noGrp="1" noChangeArrowheads="1"/>
             <a:extLst>
               <a:ext uri="smNativeData">
-                <pr:smNativeData xmlns:mc="http://schemas.openxmlformats.org/markup-compatibility/2006" xmlns:p14="http://schemas.microsoft.com/office/powerpoint/2010/main" xmlns:p15="http://schemas.microsoft.com/office/powerpoint/2012/main" xmlns:pr="smNativeData" xmlns="smNativeData" val="SMDATA_15_l3DXYhMAAAAlAAAAZAAAAA8BAAAAkAAAAEgAAACQAAAASAAAAAAAAAABAAAAAAAAAAEAAABQAAAAAAAAAAAA4D8AAAAAAADgPwAAAAAAAOA/AAAAAAAA4D8AAAAAAADgPwAAAAAAAOA/AAAAAAAA4D8AAAAAAADgPwAAAAAAAOA/AAAAAAAA4D8CAAAAjAAAAAAAAAAAAAAAADOZDCYmJggAAAAAAAAAAAAAAAAAAAAAAAAAAAAAAAAAAAAAZAAAAAEAAABAAAAAAAAAAAAAAAAAAAAAAAAAAAAAAAAAAAAAAAAAAAAAAAAAAAAAAAAAAAAAAAAAAAAAAAAAAAAAAAAAAAAAAAAAAAAAAAAAAAAAAAAAAAAAAAAAAAAAFAAAADwAAAAAAAAAAAAAAP///wkUAAAAAQAAABQAAAAUAAAAFAAAAAEAAAAAAAAAZAAAAGQAAAAAAAAAZAAAAGQAAAAVAAAAYAAAAAAAAAAAAAAADwAAACADAAAAAAAAAAAAAAEAAACgMgAAVgcAAKr4//8BAAAAf39/AAEAAABkAAAAAAAAABQAAABAHwAAAAAAACYAAAAAAAAAwOD//wAAAAAmAAAAZAAAABYAAABMAAAAAAAAAAAAAAAEAAAAAAAAAAEAAAAzZpkKAAAAACgAAAAoAAAAZAAAAGQAAAAAAAAAzMzMAAAAAABQAAAAUAAAAGQAAABkAAAAAAAAABcAAAAUAAAAAAAAAAAAAAD/fwAA/38AAAAAAAAJAAAABAAAAG49IjEeAAAAaAAAAAAAAAAAAAAAAAAAAAAAAAAAAAAAECcAABAnAAAAAAAAAAAAAAAAAAAAAAAAAAAAAAAAAAAAAAAAAAAAABQAAAAAAAAAwMD/AAAAAABkAAAAMgAAAAAAAABkAAAAAAAAAH9/fwAKAAAAIgAAABgAAAAAAAAAAAAAAAAAAAAAAAAAAAAAAAAAAAAkAAAAJAAAAAAAAAAHAAAAAAAAAAAAAAAAAAAAAAAAAAAAAAAAAAAAf39/ACUAAABYAAAAAAAAAAAAAAAAAAAAAAAAAAAAAAAAAAAAAAAAAAAAAAAAAAAAAAAAAAAAAAA/AAAAAAAAAKCGAQAAAAAAAAAAAAAAAAAMAAAAAQAAAAAAAAAAAAAAAAAAAB8AAABUAAAAAAAABQAAAAEAAAAAAAAAAAAAAAAAAAAAAAAAAAAAAAAAAAAAAAAAAAAAAAJ/f38AAAAAA8zMzADAwP8Af39/AAAAAAAAAAAAAAAAAAAAAAAAAAAAIQAAABgAAAAUAAAAwAMAALABAABARwAAuAgAABAAAAAmAAAACAAAAAAAAAAAAAAA"/>
+                <pr:smNativeData xmlns="smNativeData" xmlns:pr="smNativeData" xmlns:p15="http://schemas.microsoft.com/office/powerpoint/2012/main" xmlns:p14="http://schemas.microsoft.com/office/powerpoint/2010/main" xmlns:mc="http://schemas.openxmlformats.org/markup-compatibility/2006" val="SMDATA_15_l3DXYhMAAAAlAAAAZAAAAA8BAAAAkAAAAEgAAACQAAAASAAAAAAAAAABAAAAAAAAAAEAAABQAAAAAAAAAAAA4D8AAAAAAADgPwAAAAAAAOA/AAAAAAAA4D8AAAAAAADgPwAAAAAAAOA/AAAAAAAA4D8AAAAAAADgPwAAAAAAAOA/AAAAAAAA4D8CAAAAjAAAAAAAAAAAAAAAADOZDCYmJggAAAAAAAAAAAAAAAAAAAAAAAAAAAAAAAAAAAAAZAAAAAEAAABAAAAAAAAAAAAAAAAAAAAAAAAAAAAAAAAAAAAAAAAAAAAAAAAAAAAAAAAAAAAAAAAAAAAAAAAAAAAAAAAAAAAAAAAAAAAAAAAAAAAAAAAAAAAAAAAAAAAAFAAAADwAAAAAAAAAAAAAAP///wkUAAAAAQAAABQAAAAUAAAAFAAAAAEAAAAAAAAAZAAAAGQAAAAAAAAAZAAAAGQAAAAVAAAAYAAAAAAAAAAAAAAADwAAACADAAAAAAAAAAAAAAEAAACgMgAAVgcAAKr4//8BAAAAf39/AAEAAABkAAAAAAAAABQAAABAHwAAAAAAACYAAAAAAAAAwOD//wAAAAAmAAAAZAAAABYAAABMAAAAAAAAAAAAAAAEAAAAAAAAAAEAAAAzZpkKAAAAACgAAAAoAAAAZAAAAGQAAAAAAAAAzMzMAAAAAABQAAAAUAAAAGQAAABkAAAAAAAAABcAAAAUAAAAAAAAAAAAAAD/fwAA/38AAAAAAAAJAAAABAAAAG49IjEeAAAAaAAAAAAAAAAAAAAAAAAAAAAAAAAAAAAAECcAABAnAAAAAAAAAAAAAAAAAAAAAAAAAAAAAAAAAAAAAAAAAAAAABQAAAAAAAAAwMD/AAAAAABkAAAAMgAAAAAAAABkAAAAAAAAAH9/fwAKAAAAIgAAABgAAAAAAAAAAAAAAAAAAAAAAAAAAAAAAAAAAAAkAAAAJAAAAAAAAAAHAAAAAAAAAAAAAAAAAAAAAAAAAAAAAAAAAAAAf39/ACUAAABYAAAAAAAAAAAAAAAAAAAAAAAAAAAAAAAAAAAAAAAAAAAAAAAAAAAAAAAAAAAAAAA/AAAAAAAAAKCGAQAAAAAAAAAAAAAAAAAMAAAAAQAAAAAAAAAAAAAAAAAAAB8AAABUAAAAAAAABQAAAAEAAAAAAAAAAAAAAAAAAAAAAAAAAAAAAAAAAAAAAAAAAAAAAAJ/f38AAAAAA8zMzADAwP8Af39/AAAAAAAAAAAAAAAAAAAAAAAAAAAAIQAAABgAAAAUAAAAwAMAALABAABARwAAuAgAABAAAAAmAAAACAAAAAAAAAAAAAAA"/>
               </a:ext>
             </a:extLst>
           </p:cNvSpPr>
@@ -511,7 +524,7 @@
             <a:spLocks noGrp="1" noChangeArrowheads="1"/>
             <a:extLst>
               <a:ext uri="smNativeData">
-                <pr:smNativeData xmlns:mc="http://schemas.openxmlformats.org/markup-compatibility/2006" xmlns:p14="http://schemas.microsoft.com/office/powerpoint/2010/main" xmlns:p15="http://schemas.microsoft.com/office/powerpoint/2012/main" xmlns:pr="smNativeData" xmlns="smNativeData" val="SMDATA_15_l3DXYhMAAAAlAAAAZAAAAA8BAAAAkAAAAEgAAACQAAAASAAAAAAAAAAAAAAAAQAAAAEAAABQAAAAAAAAAAAA4D8AAAAAAADgPwAAAAAAAOA/AAAAAAAA4D8AAAAAAADgPwAAAAAAAOA/AAAAAAAA4D8AAAAAAADgPwAAAAAAAOA/AAAAAAAA4D8CAAAAjAAAAAAAAAAAAAAAADOZDCYmJggAAAAAAAAAAAAAAAAAAAAAAAAAAAAAAAAAAAAAZAAAAAEAAABAAAAAAAAAAAAAAAAAAAAAAAAAAAAAAAAAAAAAAAAAAAAAAAAAAAAAAAAAAAAAAAAAAAAAAAAAAAAAAAAAAAAAAAAAAAAAAAAAAAAAAAAAAAAAAAAAAAAAFAAAADwAAAAAAAAAAAAAAP///wkUAAAAAQAAABQAAAAUAAAAFAAAAAEAAAAAAAAAZAAAAGQAAAAAAAAAZAAAAGQAAAAVAAAAYAAAAAAAAAAAAAAADwAAACADAAAAAAAAAAAAAAEAAACgMgAAVgcAAKr4//8BAAAAf39/AAEAAABkAAAAAAAAABQAAABAHwAAAAAAACYAAAAAAAAAwOD//wAAAAAmAAAAZAAAABYAAABMAAAAAAAAAAAAAAAEAAAAAAAAAAEAAAAzZpkKAAAAACgAAAAoAAAAZAAAAGQAAAAAAAAAzMzMAAAAAABQAAAAUAAAAGQAAABkAAAAAAAAABcAAAAUAAAAAAAAAAAAAAD/fwAA/38AAAAAAAAJAAAABAAAAAAAAAAeAAAAaAAAAAAAAAAAAAAAAAAAAAAAAAAAAAAAECcAABAnAAAAAAAAAAAAAAAAAAAAAAAAAAAAAAAAAAAAAAAAAAAAABQAAAAAAAAAwMD/AAAAAABkAAAAMgAAAAAAAABkAAAAAAAAAH9/fwAKAAAAIgAAABgAAAAAAAAAAAAAAAAAAAAAAAAAAAAAAAAAAAAkAAAAJAAAAAAAAAAHAAAAAAAAAAAAAAAAAAAAAAAAAAAAAAAAAAAAf39/ACUAAABYAAAAAAAAAAAAAAAAAAAAAAAAAAAAAAAAAAAAAAAAAAAAAAAAAAAAAAAAAAAAAAA/AAAAAAAAAKCGAQAAAAAAAAAAAAAAAAAMAAAAAQAAAAAAAAAAAAAAAAAAAB8AAABUAAAAAAAABQAAAAEAAAAAAAAAAAAAAAAAAAAAAAAAAAAAAAAAAAAAAAAAAAAAAAJ/f38AAAAAA8zMzADAwP8Af39/AAAAAAAAAAAAAAAAAAAAAAAAAAAAIQAAABgAAAAUAAAAwAMAANgJAABARwAAsCUAABAAAAAmAAAACAAAAAIAAAAAAAAA"/>
+                <pr:smNativeData xmlns="smNativeData" xmlns:pr="smNativeData" xmlns:p15="http://schemas.microsoft.com/office/powerpoint/2012/main" xmlns:p14="http://schemas.microsoft.com/office/powerpoint/2010/main" xmlns:mc="http://schemas.openxmlformats.org/markup-compatibility/2006" val="SMDATA_15_l3DXYhMAAAAlAAAAZAAAAA8BAAAAkAAAAEgAAACQAAAASAAAAAAAAAAAAAAAAQAAAAEAAABQAAAAAAAAAAAA4D8AAAAAAADgPwAAAAAAAOA/AAAAAAAA4D8AAAAAAADgPwAAAAAAAOA/AAAAAAAA4D8AAAAAAADgPwAAAAAAAOA/AAAAAAAA4D8CAAAAjAAAAAAAAAAAAAAAADOZDCYmJggAAAAAAAAAAAAAAAAAAAAAAAAAAAAAAAAAAAAAZAAAAAEAAABAAAAAAAAAAAAAAAAAAAAAAAAAAAAAAAAAAAAAAAAAAAAAAAAAAAAAAAAAAAAAAAAAAAAAAAAAAAAAAAAAAAAAAAAAAAAAAAAAAAAAAAAAAAAAAAAAAAAAFAAAADwAAAAAAAAAAAAAAP///wkUAAAAAQAAABQAAAAUAAAAFAAAAAEAAAAAAAAAZAAAAGQAAAAAAAAAZAAAAGQAAAAVAAAAYAAAAAAAAAAAAAAADwAAACADAAAAAAAAAAAAAAEAAACgMgAAVgcAAKr4//8BAAAAf39/AAEAAABkAAAAAAAAABQAAABAHwAAAAAAACYAAAAAAAAAwOD//wAAAAAmAAAAZAAAABYAAABMAAAAAAAAAAAAAAAEAAAAAAAAAAEAAAAzZpkKAAAAACgAAAAoAAAAZAAAAGQAAAAAAAAAzMzMAAAAAABQAAAAUAAAAGQAAABkAAAAAAAAABcAAAAUAAAAAAAAAAAAAAD/fwAA/38AAAAAAAAJAAAABAAAAAAAAAAeAAAAaAAAAAAAAAAAAAAAAAAAAAAAAAAAAAAAECcAABAnAAAAAAAAAAAAAAAAAAAAAAAAAAAAAAAAAAAAAAAAAAAAABQAAAAAAAAAwMD/AAAAAABkAAAAMgAAAAAAAABkAAAAAAAAAH9/fwAKAAAAIgAAABgAAAAAAAAAAAAAAAAAAAAAAAAAAAAAAAAAAAAkAAAAJAAAAAAAAAAHAAAAAAAAAAAAAAAAAAAAAAAAAAAAAAAAAAAAf39/ACUAAABYAAAAAAAAAAAAAAAAAAAAAAAAAAAAAAAAAAAAAAAAAAAAAAAAAAAAAAAAAAAAAAA/AAAAAAAAAKCGAQAAAAAAAAAAAAAAAAAMAAAAAQAAAAAAAAAAAAAAAAAAAB8AAABUAAAAAAAABQAAAAEAAAAAAAAAAAAAAAAAAAAAAAAAAAAAAAAAAAAAAAAAAAAAAAJ/f38AAAAAA8zMzADAwP8Af39/AAAAAAAAAAAAAAAAAAAAAAAAAAAAIQAAABgAAAAUAAAAwAMAANgJAABARwAAsCUAABAAAAAmAAAACAAAAAIAAAAAAAAA"/>
               </a:ext>
             </a:extLst>
           </p:cNvSpPr>
@@ -565,7 +578,7 @@
             <a:spLocks noGrp="1" noChangeArrowheads="1"/>
             <a:extLst>
               <a:ext uri="smNativeData">
-                <pr:smNativeData xmlns:mc="http://schemas.openxmlformats.org/markup-compatibility/2006" xmlns:p14="http://schemas.microsoft.com/office/powerpoint/2010/main" xmlns:p15="http://schemas.microsoft.com/office/powerpoint/2012/main" xmlns:pr="smNativeData" xmlns="smNativeData" val="SMDATA_15_l3DXYhMAAAAlAAAAZAAAAA8BAAAAkAAAAEgAAACQAAAASAAAAAAAAAABAAAAAAAAAAEAAABQAAAAAAAAAAAA4D8AAAAAAADgPwAAAAAAAOA/AAAAAAAA4D8AAAAAAADgPwAAAAAAAOA/AAAAAAAA4D8AAAAAAADgPwAAAAAAAOA/AAAAAAAA4D8CAAAAjAAAAAAAAAAAAAAAADOZDCYmJggAAAAAAAAAAAAAAAAAAAAAAAAAAAAAAAAAAAAAZAAAAAEAAABAAAAAAAAAAAAAAAAAAAAAAAAAAAAAAAAAAAAAAAAAAAAAAAAAAAAAAAAAAAAAAAAAAAAAAAAAAAAAAAAAAAAAAAAAAAAAAAAAAAAAAAAAAAAAAAAAAAAAFAAAADwAAAAAAAAAAAAAAP///wkUAAAAAQAAABQAAAAUAAAAFAAAAAEAAAAAAAAAZAAAAGQAAAAAAAAAZAAAAGQAAAAVAAAAYAAAAAAAAAAAAAAADwAAACADAAAAAAAAAAAAAAEAAACgMgAAVgcAAKr4//8BAAAAf39/AAEAAABkAAAAAAAAABQAAABAHwAAAAAAACYAAAAAAAAAwOD//wAAAAAmAAAAZAAAABYAAABMAAAAAAAAAAAAAAAEAAAAAAAAAAEAAAAzZpkKAAAAACgAAAAoAAAAZAAAAGQAAAAAAAAAzMzMAAAAAABQAAAAUAAAAGQAAABkAAAAAAAAABcAAAAUAAAAAAAAAAAAAAD/fwAA/38AAAAAAAAJAAAABAAAAAAAAAAeAAAAaAAAAAAAAAAAAAAAAAAAAAAAAAAAAAAAECcAABAnAAAAAAAAAAAAAAAAAAAAAAAAAAAAAAAAAAAAAAAAAAAAABQAAAAAAAAAwMD/AAAAAABkAAAAMgAAAAAAAABkAAAAAAAAAH9/fwAKAAAAIgAAABgAAAAAAAAAAAAAAAAAAAAAAAAAAAAAAAAAAAAkAAAAJAAAAAAAAAAHAAAAAAAAAAAAAAAAAAAAAAAAAAAAAAAAAAAAf39/ACUAAABYAAAAAAAAAAAAAAAAAAAAAAAAAAAAAAAAAAAAAAAAAAAAAAAAAAAAAAAAAAAAAAA/AAAAAAAAAKCGAQAAAAAAAAAAAAAAAAAMAAAAAQAAAAAAAAAAAAAAAAAAAB8AAABUAAAAAAAABQAAAAEAAAAAAAAAAAAAAAAAAAAAAAAAAAAAAAAAAAAAAAAAAAAAAAJ/f38AAAAAA8zMzADAwP8Af39/AAAAAAAAAAAAAAAAAAAAAAAAAAAAIQAAABgAAAAUAAAAwAMAABsnAAA/FQAAWSkAABAAAAAmAAAACAAAAAAAAAAAAAAA"/>
+                <pr:smNativeData xmlns="smNativeData" xmlns:pr="smNativeData" xmlns:p15="http://schemas.microsoft.com/office/powerpoint/2012/main" xmlns:p14="http://schemas.microsoft.com/office/powerpoint/2010/main" xmlns:mc="http://schemas.openxmlformats.org/markup-compatibility/2006" val="SMDATA_15_l3DXYhMAAAAlAAAAZAAAAA8BAAAAkAAAAEgAAACQAAAASAAAAAAAAAABAAAAAAAAAAEAAABQAAAAAAAAAAAA4D8AAAAAAADgPwAAAAAAAOA/AAAAAAAA4D8AAAAAAADgPwAAAAAAAOA/AAAAAAAA4D8AAAAAAADgPwAAAAAAAOA/AAAAAAAA4D8CAAAAjAAAAAAAAAAAAAAAADOZDCYmJggAAAAAAAAAAAAAAAAAAAAAAAAAAAAAAAAAAAAAZAAAAAEAAABAAAAAAAAAAAAAAAAAAAAAAAAAAAAAAAAAAAAAAAAAAAAAAAAAAAAAAAAAAAAAAAAAAAAAAAAAAAAAAAAAAAAAAAAAAAAAAAAAAAAAAAAAAAAAAAAAAAAAFAAAADwAAAAAAAAAAAAAAP///wkUAAAAAQAAABQAAAAUAAAAFAAAAAEAAAAAAAAAZAAAAGQAAAAAAAAAZAAAAGQAAAAVAAAAYAAAAAAAAAAAAAAADwAAACADAAAAAAAAAAAAAAEAAACgMgAAVgcAAKr4//8BAAAAf39/AAEAAABkAAAAAAAAABQAAABAHwAAAAAAACYAAAAAAAAAwOD//wAAAAAmAAAAZAAAABYAAABMAAAAAAAAAAAAAAAEAAAAAAAAAAEAAAAzZpkKAAAAACgAAAAoAAAAZAAAAGQAAAAAAAAAzMzMAAAAAABQAAAAUAAAAGQAAABkAAAAAAAAABcAAAAUAAAAAAAAAAAAAAD/fwAA/38AAAAAAAAJAAAABAAAAAAAAAAeAAAAaAAAAAAAAAAAAAAAAAAAAAAAAAAAAAAAECcAABAnAAAAAAAAAAAAAAAAAAAAAAAAAAAAAAAAAAAAAAAAAAAAABQAAAAAAAAAwMD/AAAAAABkAAAAMgAAAAAAAABkAAAAAAAAAH9/fwAKAAAAIgAAABgAAAAAAAAAAAAAAAAAAAAAAAAAAAAAAAAAAAAkAAAAJAAAAAAAAAAHAAAAAAAAAAAAAAAAAAAAAAAAAAAAAAAAAAAAf39/ACUAAABYAAAAAAAAAAAAAAAAAAAAAAAAAAAAAAAAAAAAAAAAAAAAAAAAAAAAAAAAAAAAAAA/AAAAAAAAAKCGAQAAAAAAAAAAAAAAAAAMAAAAAQAAAAAAAAAAAAAAAAAAAB8AAABUAAAAAAAABQAAAAEAAAAAAAAAAAAAAAAAAAAAAAAAAAAAAAAAAAAAAAAAAAAAAAJ/f38AAAAAA8zMzADAwP8Af39/AAAAAAAAAAAAAAAAAAAAAAAAAAAAIQAAABgAAAAUAAAAwAMAABsnAAA/FQAAWSkAABAAAAAmAAAACAAAAAAAAAAAAAAA"/>
               </a:ext>
             </a:extLst>
           </p:cNvSpPr>
@@ -579,7 +592,7 @@
           <a:lstStyle/>
           <a:p>
             <a:fld id="{2B84CD17-59C6-D13B-883C-AF6E83727EFA}" type="datetime1">
-              <a:t>21/07/2022</a:t>
+              <a:t>26/07/2022</a:t>
             </a:fld>
             <a:endParaRPr/>
           </a:p>
@@ -592,7 +605,7 @@
             <a:spLocks noGrp="1" noChangeArrowheads="1"/>
             <a:extLst>
               <a:ext uri="smNativeData">
-                <pr:smNativeData xmlns:mc="http://schemas.openxmlformats.org/markup-compatibility/2006" xmlns:p14="http://schemas.microsoft.com/office/powerpoint/2010/main" xmlns:p15="http://schemas.microsoft.com/office/powerpoint/2012/main" xmlns:pr="smNativeData" xmlns="smNativeData" val="SMDATA_15_l3DXYhMAAAAlAAAAZAAAAA8BAAAAkAAAAEgAAACQAAAASAAAAAAAAAABAAAAAAAAAAEAAABQAAAAAAAAAAAA4D8AAAAAAADgPwAAAAAAAOA/AAAAAAAA4D8AAAAAAADgPwAAAAAAAOA/AAAAAAAA4D8AAAAAAADgPwAAAAAAAOA/AAAAAAAA4D8CAAAAjAAAAAAAAAAAAAAAADOZDCYmJggAAAAAAAAAAAAAAAAAAAAAAAAAAAAAAAAAAAAAZAAAAAEAAABAAAAAAAAAAAAAAAAAAAAAAAAAAAAAAAAAAAAAAAAAAAAAAAAAAAAAAAAAAAAAAAAAAAAAAAAAAAAAAAAAAAAAAAAAAAAAAAAAAAAAAAAAAAAAAAAAAAAAFAAAADwAAAAAAAAAAAAAAP///wkUAAAAAQAAABQAAAAUAAAAFAAAAAEAAAAAAAAAZAAAAGQAAAAAAAAAZAAAAGQAAAAVAAAAYAAAAAAAAAAAAAAADwAAACADAAAAAAAAAAAAAAEAAACgMgAAVgcAAKr4//8BAAAAf39/AAEAAABkAAAAAAAAABQAAABAHwAAAAAAACYAAAAAAAAAwOD//wAAAAAmAAAAZAAAABYAAABMAAAAAAAAAAAAAAAEAAAAAAAAAAEAAAAzZpkKAAAAACgAAAAoAAAAZAAAAGQAAAAAAAAAzMzMAAAAAABQAAAAUAAAAGQAAABkAAAAAAAAABcAAAAUAAAAAAAAAAAAAAD/fwAA/38AAAAAAAAJAAAABAAAAGE6c3AeAAAAaAAAAAAAAAAAAAAAAAAAAAAAAAAAAAAAECcAABAnAAAAAAAAAAAAAAAAAAAAAAAAAAAAAAAAAAAAAAAAAAAAABQAAAAAAAAAwMD/AAAAAABkAAAAMgAAAAAAAABkAAAAAAAAAH9/fwAKAAAAIgAAABgAAAAAAAAAAAAAAAAAAAAAAAAAAAAAAAAAAAAkAAAAJAAAAAAAAAAHAAAAAAAAAAAAAAAAAAAAAAAAAAAAAAAAAAAAf39/ACUAAABYAAAAAAAAAAAAAAAAAAAAAAAAAAAAAAAAAAAAAAAAAAAAAAAAAAAAAAAAAAAAAAA/AAAAAAAAAKCGAQAAAAAAAAAAAAAAAAAMAAAAAQAAAAAAAAAAAAAAAAAAAB8AAABUAAAAAAAABQAAAAEAAAAAAAAAAAAAAAAAAAAAAAAAAAAAAAAAAAAAAAAAAAAAAAJ/f38AAAAAA8zMzADAwP8Af39/AAAAAAAAAAAAAAAAAAAAAAAAAAAAIQAAABgAAAAUAAAAoRkAABsnAABfMQAAWSkAABAAAAAmAAAACAAAAAAAAAAAAAAA"/>
+                <pr:smNativeData xmlns="smNativeData" xmlns:pr="smNativeData" xmlns:p15="http://schemas.microsoft.com/office/powerpoint/2012/main" xmlns:p14="http://schemas.microsoft.com/office/powerpoint/2010/main" xmlns:mc="http://schemas.openxmlformats.org/markup-compatibility/2006" val="SMDATA_15_l3DXYhMAAAAlAAAAZAAAAA8BAAAAkAAAAEgAAACQAAAASAAAAAAAAAABAAAAAAAAAAEAAABQAAAAAAAAAAAA4D8AAAAAAADgPwAAAAAAAOA/AAAAAAAA4D8AAAAAAADgPwAAAAAAAOA/AAAAAAAA4D8AAAAAAADgPwAAAAAAAOA/AAAAAAAA4D8CAAAAjAAAAAAAAAAAAAAAADOZDCYmJggAAAAAAAAAAAAAAAAAAAAAAAAAAAAAAAAAAAAAZAAAAAEAAABAAAAAAAAAAAAAAAAAAAAAAAAAAAAAAAAAAAAAAAAAAAAAAAAAAAAAAAAAAAAAAAAAAAAAAAAAAAAAAAAAAAAAAAAAAAAAAAAAAAAAAAAAAAAAAAAAAAAAFAAAADwAAAAAAAAAAAAAAP///wkUAAAAAQAAABQAAAAUAAAAFAAAAAEAAAAAAAAAZAAAAGQAAAAAAAAAZAAAAGQAAAAVAAAAYAAAAAAAAAAAAAAADwAAACADAAAAAAAAAAAAAAEAAACgMgAAVgcAAKr4//8BAAAAf39/AAEAAABkAAAAAAAAABQAAABAHwAAAAAAACYAAAAAAAAAwOD//wAAAAAmAAAAZAAAABYAAABMAAAAAAAAAAAAAAAEAAAAAAAAAAEAAAAzZpkKAAAAACgAAAAoAAAAZAAAAGQAAAAAAAAAzMzMAAAAAABQAAAAUAAAAGQAAABkAAAAAAAAABcAAAAUAAAAAAAAAAAAAAD/fwAA/38AAAAAAAAJAAAABAAAAGE6c3AeAAAAaAAAAAAAAAAAAAAAAAAAAAAAAAAAAAAAECcAABAnAAAAAAAAAAAAAAAAAAAAAAAAAAAAAAAAAAAAAAAAAAAAABQAAAAAAAAAwMD/AAAAAABkAAAAMgAAAAAAAABkAAAAAAAAAH9/fwAKAAAAIgAAABgAAAAAAAAAAAAAAAAAAAAAAAAAAAAAAAAAAAAkAAAAJAAAAAAAAAAHAAAAAAAAAAAAAAAAAAAAAAAAAAAAAAAAAAAAf39/ACUAAABYAAAAAAAAAAAAAAAAAAAAAAAAAAAAAAAAAAAAAAAAAAAAAAAAAAAAAAAAAAAAAAA/AAAAAAAAAKCGAQAAAAAAAAAAAAAAAAAMAAAAAQAAAAAAAAAAAAAAAAAAAB8AAABUAAAAAAAABQAAAAEAAAAAAAAAAAAAAAAAAAAAAAAAAAAAAAAAAAAAAAAAAAAAAAJ/f38AAAAAA8zMzADAwP8Af39/AAAAAAAAAAAAAAAAAAAAAAAAAAAAIQAAABgAAAAUAAAAoRkAABsnAABfMQAAWSkAABAAAAAmAAAACAAAAAAAAAAAAAAA"/>
               </a:ext>
             </a:extLst>
           </p:cNvSpPr>
@@ -616,7 +629,7 @@
             <a:spLocks noGrp="1" noChangeArrowheads="1"/>
             <a:extLst>
               <a:ext uri="smNativeData">
-                <pr:smNativeData xmlns:mc="http://schemas.openxmlformats.org/markup-compatibility/2006" xmlns:p14="http://schemas.microsoft.com/office/powerpoint/2010/main" xmlns:p15="http://schemas.microsoft.com/office/powerpoint/2012/main" xmlns:pr="smNativeData" xmlns="smNativeData" val="SMDATA_15_l3DXYhMAAAAlAAAAZAAAAA8BAAAAkAAAAEgAAACQAAAASAAAAAAAAAABAAAAAAAAAAEAAABQAAAAAAAAAAAA4D8AAAAAAADgPwAAAAAAAOA/AAAAAAAA4D8AAAAAAADgPwAAAAAAAOA/AAAAAAAA4D8AAAAAAADgPwAAAAAAAOA/AAAAAAAA4D8CAAAAjAAAAAAAAAAAAAAAADOZDCYmJggAAAAAAAAAAAAAAAAAAAAAAAAAAAAAAAAAAAAAZAAAAAEAAABAAAAAAAAAAAAAAAAAAAAAAAAAAAAAAAAAAAAAAAAAAAAAAAAAAAAAAAAAAAAAAAAAAAAAAAAAAAAAAAAAAAAAAAAAAAAAAAAAAAAAAAAAAAAAAAAAAAAAFAAAADwAAAAAAAAAAAAAAP///wkUAAAAAQAAABQAAAAUAAAAFAAAAAEAAAAAAAAAZAAAAGQAAAAAAAAAZAAAAGQAAAAVAAAAYAAAAAAAAAAAAAAADwAAACADAAAAAAAAAAAAAAEAAACgMgAAVgcAAKr4//8BAAAAf39/AAEAAABkAAAAAAAAABQAAABAHwAAAAAAACYAAAAAAAAAwOD//wAAAAAmAAAAZAAAABYAAABMAAAAAAAAAAAAAAAEAAAAAAAAAAEAAAAzZpkKAAAAACgAAAAoAAAAZAAAAGQAAAAAAAAAzMzMAAAAAABQAAAAUAAAAGQAAABkAAAAAAAAABcAAAAUAAAAAAAAAAAAAAD/fwAA/38AAAAAAAAJAAAABAAAAAAAAAAeAAAAaAAAAAAAAAAAAAAAAAAAAAAAAAAAAAAAECcAABAnAAAAAAAAAAAAAAAAAAAAAAAAAAAAAAAAAAAAAAAAAAAAABQAAAAAAAAAwMD/AAAAAABkAAAAMgAAAAAAAABkAAAAAAAAAH9/fwAKAAAAIgAAABgAAAAAAAAAAAAAAAAAAAAAAAAAAAAAAAAAAAAkAAAAJAAAAAAAAAAHAAAAAAAAAAAAAAAAAAAAAAAAAAAAAAAAAAAAf39/ACUAAABYAAAAAAAAAAAAAAAAAAAAAAAAAAAAAAAAAAAAAAAAAAAAAAAAAAAAAAAAAAAAAAA/AAAAAAAAAKCGAQAAAAAAAAAAAAAAAAAMAAAAAQAAAAAAAAAAAAAAAAAAAB8AAABUAAAAAAAABQAAAAEAAAAAAAAAAAAAAAAAAAAAAAAAAAAAAAAAAAAAAAAAAAAAAAJ/f38AAAAAA8zMzADAwP8Af39/AAAAAAAAAAAAAAAAAAAAAAAAAAAAIQAAABgAAAAUAAAAwTUAABsnAABARwAAWSkAABAAAAAmAAAACAAAAAAAAAAAAAAA"/>
+                <pr:smNativeData xmlns="smNativeData" xmlns:pr="smNativeData" xmlns:p15="http://schemas.microsoft.com/office/powerpoint/2012/main" xmlns:p14="http://schemas.microsoft.com/office/powerpoint/2010/main" xmlns:mc="http://schemas.openxmlformats.org/markup-compatibility/2006" val="SMDATA_15_l3DXYhMAAAAlAAAAZAAAAA8BAAAAkAAAAEgAAACQAAAASAAAAAAAAAABAAAAAAAAAAEAAABQAAAAAAAAAAAA4D8AAAAAAADgPwAAAAAAAOA/AAAAAAAA4D8AAAAAAADgPwAAAAAAAOA/AAAAAAAA4D8AAAAAAADgPwAAAAAAAOA/AAAAAAAA4D8CAAAAjAAAAAAAAAAAAAAAADOZDCYmJggAAAAAAAAAAAAAAAAAAAAAAAAAAAAAAAAAAAAAZAAAAAEAAABAAAAAAAAAAAAAAAAAAAAAAAAAAAAAAAAAAAAAAAAAAAAAAAAAAAAAAAAAAAAAAAAAAAAAAAAAAAAAAAAAAAAAAAAAAAAAAAAAAAAAAAAAAAAAAAAAAAAAFAAAADwAAAAAAAAAAAAAAP///wkUAAAAAQAAABQAAAAUAAAAFAAAAAEAAAAAAAAAZAAAAGQAAAAAAAAAZAAAAGQAAAAVAAAAYAAAAAAAAAAAAAAADwAAACADAAAAAAAAAAAAAAEAAACgMgAAVgcAAKr4//8BAAAAf39/AAEAAABkAAAAAAAAABQAAABAHwAAAAAAACYAAAAAAAAAwOD//wAAAAAmAAAAZAAAABYAAABMAAAAAAAAAAAAAAAEAAAAAAAAAAEAAAAzZpkKAAAAACgAAAAoAAAAZAAAAGQAAAAAAAAAzMzMAAAAAABQAAAAUAAAAGQAAABkAAAAAAAAABcAAAAUAAAAAAAAAAAAAAD/fwAA/38AAAAAAAAJAAAABAAAAAAAAAAeAAAAaAAAAAAAAAAAAAAAAAAAAAAAAAAAAAAAECcAABAnAAAAAAAAAAAAAAAAAAAAAAAAAAAAAAAAAAAAAAAAAAAAABQAAAAAAAAAwMD/AAAAAABkAAAAMgAAAAAAAABkAAAAAAAAAH9/fwAKAAAAIgAAABgAAAAAAAAAAAAAAAAAAAAAAAAAAAAAAAAAAAAkAAAAJAAAAAAAAAAHAAAAAAAAAAAAAAAAAAAAAAAAAAAAAAAAAAAAf39/ACUAAABYAAAAAAAAAAAAAAAAAAAAAAAAAAAAAAAAAAAAAAAAAAAAAAAAAAAAAAAAAAAAAAA/AAAAAAAAAKCGAQAAAAAAAAAAAAAAAAAMAAAAAQAAAAAAAAAAAAAAAAAAAB8AAABUAAAAAAAABQAAAAEAAAAAAAAAAAAAAAAAAAAAAAAAAAAAAAAAAAAAAAAAAAAAAAJ/f38AAAAAA8zMzADAwP8Af39/AAAAAAAAAAAAAAAAAAAAAAAAAAAAIQAAABgAAAAUAAAAwTUAABsnAABARwAAWSkAABAAAAAmAAAACAAAAAAAAAAAAAAA"/>
               </a:ext>
             </a:extLst>
           </p:cNvSpPr>
@@ -669,7 +682,7 @@
             <a:spLocks noGrp="1" noChangeArrowheads="1"/>
             <a:extLst>
               <a:ext uri="smNativeData">
-                <pr:smNativeData xmlns:mc="http://schemas.openxmlformats.org/markup-compatibility/2006" xmlns:p14="http://schemas.microsoft.com/office/powerpoint/2010/main" xmlns:p15="http://schemas.microsoft.com/office/powerpoint/2012/main" xmlns:pr="smNativeData" xmlns="smNativeData" val="SMDATA_15_l3DXYhMAAAAlAAAAZAAAAA8BAAAAkAAAAEgAAACQAAAASAAAAAAAAAACAAAAAQAAAAEAAABQAAAAAAAAAAAA4D8AAAAAAADgPwAAAAAAAOA/AAAAAAAA4D8AAAAAAADgPwAAAAAAAOA/AAAAAAAA4D8AAAAAAADgPwAAAAAAAOA/AAAAAAAA4D8CAAAAjAAAAAAAAAAAAAAAADOZDCYmJggAAAAAAAAAAAAAAAAAAAAAAAAAAAAAAAAAAAAAZAAAAAEAAABAAAAAAAAAAAAAAAAAAAAAAAAAAAAAAAAAAAAAAAAAAAAAAAAAAAAAAAAAAAAAAAAAAAAAAAAAAAAAAAAAAAAAAAAAAAAAAAAAAAAAAAAAAAAAAAAAAAAAFAAAADwAAAAAAAAAAAAAAP///wkUAAAAAQAAABQAAAAUAAAAFAAAAAEAAAAAAAAAZAAAAGQAAAAAAAAAZAAAAGQAAAAVAAAAYAAAAAAAAAAAAAAADwAAACADAAAAAAAAAAAAAAEAAACgMgAAVgcAAKr4//8BAAAAf39/AAEAAABkAAAAAAAAABQAAABAHwAAAAAAACYAAAAAAAAAwOD//wAAAAAmAAAAZAAAABYAAABMAAAAAAAAAAAAAAAEAAAAAAAAAAEAAAAzZpkKAAAAACgAAAAoAAAAZAAAAGQAAAAAAAAAzMzMAAAAAABQAAAAUAAAAGQAAABkAAAAAAAAABcAAAAUAAAAAAAAAAAAAAD/fwAA/38AAAAAAAAJAAAABAAAAAAAAAAeAAAAaAAAAAAAAAAAAAAAAAAAAAAAAAAAAAAAECcAABAnAAAAAAAAAAAAAAAAAAAAAAAAAAAAAAAAAAAAAAAAAAAAABQAAAAAAAAAwMD/AAAAAABkAAAAMgAAAAAAAABkAAAAAAAAAH9/fwAKAAAAIgAAABgAAAAAAAAAAAAAAAAAAAAAAAAAAAAAAAAAAAAkAAAAJAAAAAAAAAAHAAAAAAAAAAAAAAAAAAAAAAAAAAAAAAAAAAAAf39/ACUAAABYAAAAAAAAAAAAAAAAAAAAAAAAAAAAAAAAAAAAAAAAAAAAAAAAAAAAAAAAAAAAAAA/AAAAAAAAAKCGAQAAAAAAAAAAAAAAAAAMAAAAAQAAAAAAAAAAAAAAAAAAAB8AAABUAAAAAAAABQAAAAEAAAAAAAAAAAAAAAAAAAAAAAAAAAAAAAAAAAAAAAAAAAAAAAJ/f38AAAAAA8zMzADAwP8Af39/AAAAAAAAAAAAAAAAAAAAAAAAAAAAIQAAABgAAAAUAAAAYDYAALABAABARwAAsCUAABAAAAAmAAAACAAAAIMAAAAAAAAA"/>
+                <pr:smNativeData xmlns="smNativeData" xmlns:pr="smNativeData" xmlns:p15="http://schemas.microsoft.com/office/powerpoint/2012/main" xmlns:p14="http://schemas.microsoft.com/office/powerpoint/2010/main" xmlns:mc="http://schemas.openxmlformats.org/markup-compatibility/2006" val="SMDATA_15_l3DXYhMAAAAlAAAAZAAAAA8BAAAAkAAAAEgAAACQAAAASAAAAAAAAAACAAAAAQAAAAEAAABQAAAAAAAAAAAA4D8AAAAAAADgPwAAAAAAAOA/AAAAAAAA4D8AAAAAAADgPwAAAAAAAOA/AAAAAAAA4D8AAAAAAADgPwAAAAAAAOA/AAAAAAAA4D8CAAAAjAAAAAAAAAAAAAAAADOZDCYmJggAAAAAAAAAAAAAAAAAAAAAAAAAAAAAAAAAAAAAZAAAAAEAAABAAAAAAAAAAAAAAAAAAAAAAAAAAAAAAAAAAAAAAAAAAAAAAAAAAAAAAAAAAAAAAAAAAAAAAAAAAAAAAAAAAAAAAAAAAAAAAAAAAAAAAAAAAAAAAAAAAAAAFAAAADwAAAAAAAAAAAAAAP///wkUAAAAAQAAABQAAAAUAAAAFAAAAAEAAAAAAAAAZAAAAGQAAAAAAAAAZAAAAGQAAAAVAAAAYAAAAAAAAAAAAAAADwAAACADAAAAAAAAAAAAAAEAAACgMgAAVgcAAKr4//8BAAAAf39/AAEAAABkAAAAAAAAABQAAABAHwAAAAAAACYAAAAAAAAAwOD//wAAAAAmAAAAZAAAABYAAABMAAAAAAAAAAAAAAAEAAAAAAAAAAEAAAAzZpkKAAAAACgAAAAoAAAAZAAAAGQAAAAAAAAAzMzMAAAAAABQAAAAUAAAAGQAAABkAAAAAAAAABcAAAAUAAAAAAAAAAAAAAD/fwAA/38AAAAAAAAJAAAABAAAAAAAAAAeAAAAaAAAAAAAAAAAAAAAAAAAAAAAAAAAAAAAECcAABAnAAAAAAAAAAAAAAAAAAAAAAAAAAAAAAAAAAAAAAAAAAAAABQAAAAAAAAAwMD/AAAAAABkAAAAMgAAAAAAAABkAAAAAAAAAH9/fwAKAAAAIgAAABgAAAAAAAAAAAAAAAAAAAAAAAAAAAAAAAAAAAAkAAAAJAAAAAAAAAAHAAAAAAAAAAAAAAAAAAAAAAAAAAAAAAAAAAAAf39/ACUAAABYAAAAAAAAAAAAAAAAAAAAAAAAAAAAAAAAAAAAAAAAAAAAAAAAAAAAAAAAAAAAAAA/AAAAAAAAAKCGAQAAAAAAAAAAAAAAAAAMAAAAAQAAAAAAAAAAAAAAAAAAAB8AAABUAAAAAAAABQAAAAEAAAAAAAAAAAAAAAAAAAAAAAAAAAAAAAAAAAAAAAAAAAAAAAJ/f38AAAAAA8zMzADAwP8Af39/AAAAAAAAAAAAAAAAAAAAAAAAAAAAIQAAABgAAAAUAAAAYDYAALABAABARwAAsCUAABAAAAAmAAAACAAAAIMAAAAAAAAA"/>
               </a:ext>
             </a:extLst>
           </p:cNvSpPr>
@@ -704,7 +717,7 @@
             <a:spLocks noGrp="1" noChangeArrowheads="1"/>
             <a:extLst>
               <a:ext uri="smNativeData">
-                <pr:smNativeData xmlns:mc="http://schemas.openxmlformats.org/markup-compatibility/2006" xmlns:p14="http://schemas.microsoft.com/office/powerpoint/2010/main" xmlns:p15="http://schemas.microsoft.com/office/powerpoint/2012/main" xmlns:pr="smNativeData" xmlns="smNativeData" val="SMDATA_15_l3DXYhMAAAAlAAAAZAAAAA8BAAAAkAAAAEgAAACQAAAASAAAAAAAAAAAAAAAAQAAAAEAAABQAAAAAAAAAAAA4D8AAAAAAADgPwAAAAAAAOA/AAAAAAAA4D8AAAAAAADgPwAAAAAAAOA/AAAAAAAA4D8AAAAAAADgPwAAAAAAAOA/AAAAAAAA4D8CAAAAjAAAAAAAAAAAAAAAADOZDCYmJggAAAAAAAAAAAAAAAAAAAAAAAAAAAAAAAAAAAAAZAAAAAEAAABAAAAAAAAAAAAAAAAAAAAAAAAAAAAAAAAAAAAAAAAAAAAAAAAAAAAAAAAAAAAAAAAAAAAAAAAAAAAAAAAAAAAAAAAAAAAAAAAAAAAAAAAAAAAAAAAAAAAAFAAAADwAAAAAAAAAAAAAAP///wkUAAAAAQAAABQAAAAUAAAAFAAAAAEAAAAAAAAAZAAAAGQAAAAAAAAAZAAAAGQAAAAVAAAAYAAAAAAAAAAAAAAADwAAACADAAAAAAAAAAAAAAEAAACgMgAAVgcAAKr4//8BAAAAf39/AAEAAABkAAAAAAAAABQAAABAHwAAAAAAACYAAAAAAAAAwOD//wAAAAAmAAAAZAAAABYAAABMAAAAAAAAAAAAAAAEAAAAAAAAAAEAAAAzZpkKAAAAACgAAAAoAAAAZAAAAGQAAAAAAAAAzMzMAAAAAABQAAAAUAAAAGQAAABkAAAAAAAAABcAAAAUAAAAAAAAAAAAAAD/fwAA/38AAAAAAAAJAAAABAAAAAAAAAAeAAAAaAAAAAAAAAAAAAAAAAAAAAAAAAAAAAAAECcAABAnAAAAAAAAAAAAAAAAAAAAAAAAAAAAAAAAAAAAAAAAAAAAABQAAAAAAAAAwMD/AAAAAABkAAAAMgAAAAAAAABkAAAAAAAAAH9/fwAKAAAAIgAAABgAAAAAAAAAAAAAAAAAAAAAAAAAAAAAAAAAAAAkAAAAJAAAAAAAAAAHAAAAAAAAAAAAAAAAAAAAAAAAAAAAAAAAAAAAf39/ACUAAABYAAAAAAAAAAAAAAAAAAAAAAAAAAAAAAAAAAAAAAAAAAAAAAAAAAAAAAAAAAAAAAA/AAAAAAAAAKCGAQAAAAAAAAAAAAAAAAAMAAAAAQAAAAAAAAAAAAAAAAAAAB8AAABUAAAAAAAABQAAAAEAAAAAAAAAAAAAAAAAAAAAAAAAAAAAAAAAAAAAAAAAAAAAAAJ/f38AAAAAA8zMzADAwP8Af39/AAAAAAAAAAAAAAAAAAAAAAAAAAAAIQAAABgAAAAUAAAAwAMAALABAAAfNQAAsCUAABAAAAAmAAAACAAAAAMAAAAAAAAA"/>
+                <pr:smNativeData xmlns="smNativeData" xmlns:pr="smNativeData" xmlns:p15="http://schemas.microsoft.com/office/powerpoint/2012/main" xmlns:p14="http://schemas.microsoft.com/office/powerpoint/2010/main" xmlns:mc="http://schemas.openxmlformats.org/markup-compatibility/2006" val="SMDATA_15_l3DXYhMAAAAlAAAAZAAAAA8BAAAAkAAAAEgAAACQAAAASAAAAAAAAAAAAAAAAQAAAAEAAABQAAAAAAAAAAAA4D8AAAAAAADgPwAAAAAAAOA/AAAAAAAA4D8AAAAAAADgPwAAAAAAAOA/AAAAAAAA4D8AAAAAAADgPwAAAAAAAOA/AAAAAAAA4D8CAAAAjAAAAAAAAAAAAAAAADOZDCYmJggAAAAAAAAAAAAAAAAAAAAAAAAAAAAAAAAAAAAAZAAAAAEAAABAAAAAAAAAAAAAAAAAAAAAAAAAAAAAAAAAAAAAAAAAAAAAAAAAAAAAAAAAAAAAAAAAAAAAAAAAAAAAAAAAAAAAAAAAAAAAAAAAAAAAAAAAAAAAAAAAAAAAFAAAADwAAAAAAAAAAAAAAP///wkUAAAAAQAAABQAAAAUAAAAFAAAAAEAAAAAAAAAZAAAAGQAAAAAAAAAZAAAAGQAAAAVAAAAYAAAAAAAAAAAAAAADwAAACADAAAAAAAAAAAAAAEAAACgMgAAVgcAAKr4//8BAAAAf39/AAEAAABkAAAAAAAAABQAAABAHwAAAAAAACYAAAAAAAAAwOD//wAAAAAmAAAAZAAAABYAAABMAAAAAAAAAAAAAAAEAAAAAAAAAAEAAAAzZpkKAAAAACgAAAAoAAAAZAAAAGQAAAAAAAAAzMzMAAAAAABQAAAAUAAAAGQAAABkAAAAAAAAABcAAAAUAAAAAAAAAAAAAAD/fwAA/38AAAAAAAAJAAAABAAAAAAAAAAeAAAAaAAAAAAAAAAAAAAAAAAAAAAAAAAAAAAAECcAABAnAAAAAAAAAAAAAAAAAAAAAAAAAAAAAAAAAAAAAAAAAAAAABQAAAAAAAAAwMD/AAAAAABkAAAAMgAAAAAAAABkAAAAAAAAAH9/fwAKAAAAIgAAABgAAAAAAAAAAAAAAAAAAAAAAAAAAAAAAAAAAAAkAAAAJAAAAAAAAAAHAAAAAAAAAAAAAAAAAAAAAAAAAAAAAAAAAAAAf39/ACUAAABYAAAAAAAAAAAAAAAAAAAAAAAAAAAAAAAAAAAAAAAAAAAAAAAAAAAAAAAAAAAAAAA/AAAAAAAAAKCGAQAAAAAAAAAAAAAAAAAMAAAAAQAAAAAAAAAAAAAAAAAAAB8AAABUAAAAAAAABQAAAAEAAAAAAAAAAAAAAAAAAAAAAAAAAAAAAAAAAAAAAAAAAAAAAAJ/f38AAAAAA8zMzADAwP8Af39/AAAAAAAAAAAAAAAAAAAAAAAAAAAAIQAAABgAAAAUAAAAwAMAALABAAAfNQAAsCUAABAAAAAmAAAACAAAAAMAAAAAAAAA"/>
               </a:ext>
             </a:extLst>
           </p:cNvSpPr>
@@ -763,7 +776,7 @@
             <a:spLocks noGrp="1" noChangeArrowheads="1"/>
             <a:extLst>
               <a:ext uri="smNativeData">
-                <pr:smNativeData xmlns:mc="http://schemas.openxmlformats.org/markup-compatibility/2006" xmlns:p14="http://schemas.microsoft.com/office/powerpoint/2010/main" xmlns:p15="http://schemas.microsoft.com/office/powerpoint/2012/main" xmlns:pr="smNativeData" xmlns="smNativeData" val="SMDATA_15_l3DXYhMAAAAlAAAAZAAAAA8BAAAAkAAAAEgAAACQAAAASAAAAAAAAAABAAAAAAAAAAEAAABQAAAAAAAAAAAA4D8AAAAAAADgPwAAAAAAAOA/AAAAAAAA4D8AAAAAAADgPwAAAAAAAOA/AAAAAAAA4D8AAAAAAADgPwAAAAAAAOA/AAAAAAAA4D8CAAAAjAAAAAAAAAAAAAAAADOZDCYmJggAAAAAAAAAAAAAAAAAAAAAAAAAAAAAAAAAAAAAZAAAAAEAAABAAAAAAAAAAAAAAAAAAAAAAAAAAAAAAAAAAAAAAAAAAAAAAAAAAAAAAAAAAAAAAAAAAAAAAAAAAAAAAAAAAAAAAAAAAAAAAAAAAAAAAAAAAAAAAAAAAAAAFAAAADwAAAAAAAAAAAAAAP///wkUAAAAAQAAABQAAAAUAAAAFAAAAAEAAAAAAAAAZAAAAGQAAAAAAAAAZAAAAGQAAAAVAAAAYAAAAAAAAAAAAAAADwAAACADAAAAAAAAAAAAAAEAAACgMgAAVgcAAKr4//8BAAAAf39/AAEAAABkAAAAAAAAABQAAABAHwAAAAAAACYAAAAAAAAAwOD//wAAAAAmAAAAZAAAABYAAABMAAAAAAAAAAAAAAAEAAAAAAAAAAEAAAAzZpkKAAAAACgAAAAoAAAAZAAAAGQAAAAAAAAAzMzMAAAAAABQAAAAUAAAAGQAAABkAAAAAAAAABcAAAAUAAAAAAAAAAAAAAD/fwAA/38AAAAAAAAJAAAABAAAAAAAAAAeAAAAaAAAAAAAAAAAAAAAAAAAAAAAAAAAAAAAECcAABAnAAAAAAAAAAAAAAAAAAAAAAAAAAAAAAAAAAAAAAAAAAAAABQAAAAAAAAAwMD/AAAAAABkAAAAMgAAAAAAAABkAAAAAAAAAH9/fwAKAAAAIgAAABgAAAAAAAAAAAAAAAAAAAAAAAAAAAAAAAAAAAAkAAAAJAAAAAAAAAAHAAAAAAAAAAAAAAAAAAAAAAAAAAAAAAAAAAAAf39/ACUAAABYAAAAAAAAAAAAAAAAAAAAAAAAAAAAAAAAAAAAAAAAAAAAAAAAAAAAAAAAAAAAAAA/AAAAAAAAAKCGAQAAAAAAAAAAAAAAAAAMAAAAAQAAAAAAAAAAAAAAAAAAAB8AAABUAAAAAAAABQAAAAEAAAAAAAAAAAAAAAAAAAAAAAAAAAAAAAAAAAAAAAAAAAAAAAJ/f38AAAAAA8zMzADAwP8Af39/AAAAAAAAAAAAAAAAAAAAAAAAAAAAIQAAABgAAAAUAAAAwAMAABsnAAA/FQAAWSkAABAAAAAmAAAACAAAAAAAAAAAAAAA"/>
+                <pr:smNativeData xmlns="smNativeData" xmlns:pr="smNativeData" xmlns:p15="http://schemas.microsoft.com/office/powerpoint/2012/main" xmlns:p14="http://schemas.microsoft.com/office/powerpoint/2010/main" xmlns:mc="http://schemas.openxmlformats.org/markup-compatibility/2006" val="SMDATA_15_l3DXYhMAAAAlAAAAZAAAAA8BAAAAkAAAAEgAAACQAAAASAAAAAAAAAABAAAAAAAAAAEAAABQAAAAAAAAAAAA4D8AAAAAAADgPwAAAAAAAOA/AAAAAAAA4D8AAAAAAADgPwAAAAAAAOA/AAAAAAAA4D8AAAAAAADgPwAAAAAAAOA/AAAAAAAA4D8CAAAAjAAAAAAAAAAAAAAAADOZDCYmJggAAAAAAAAAAAAAAAAAAAAAAAAAAAAAAAAAAAAAZAAAAAEAAABAAAAAAAAAAAAAAAAAAAAAAAAAAAAAAAAAAAAAAAAAAAAAAAAAAAAAAAAAAAAAAAAAAAAAAAAAAAAAAAAAAAAAAAAAAAAAAAAAAAAAAAAAAAAAAAAAAAAAFAAAADwAAAAAAAAAAAAAAP///wkUAAAAAQAAABQAAAAUAAAAFAAAAAEAAAAAAAAAZAAAAGQAAAAAAAAAZAAAAGQAAAAVAAAAYAAAAAAAAAAAAAAADwAAACADAAAAAAAAAAAAAAEAAACgMgAAVgcAAKr4//8BAAAAf39/AAEAAABkAAAAAAAAABQAAABAHwAAAAAAACYAAAAAAAAAwOD//wAAAAAmAAAAZAAAABYAAABMAAAAAAAAAAAAAAAEAAAAAAAAAAEAAAAzZpkKAAAAACgAAAAoAAAAZAAAAGQAAAAAAAAAzMzMAAAAAABQAAAAUAAAAGQAAABkAAAAAAAAABcAAAAUAAAAAAAAAAAAAAD/fwAA/38AAAAAAAAJAAAABAAAAAAAAAAeAAAAaAAAAAAAAAAAAAAAAAAAAAAAAAAAAAAAECcAABAnAAAAAAAAAAAAAAAAAAAAAAAAAAAAAAAAAAAAAAAAAAAAABQAAAAAAAAAwMD/AAAAAABkAAAAMgAAAAAAAABkAAAAAAAAAH9/fwAKAAAAIgAAABgAAAAAAAAAAAAAAAAAAAAAAAAAAAAAAAAAAAAkAAAAJAAAAAAAAAAHAAAAAAAAAAAAAAAAAAAAAAAAAAAAAAAAAAAAf39/ACUAAABYAAAAAAAAAAAAAAAAAAAAAAAAAAAAAAAAAAAAAAAAAAAAAAAAAAAAAAAAAAAAAAA/AAAAAAAAAKCGAQAAAAAAAAAAAAAAAAAMAAAAAQAAAAAAAAAAAAAAAAAAAB8AAABUAAAAAAAABQAAAAEAAAAAAAAAAAAAAAAAAAAAAAAAAAAAAAAAAAAAAAAAAAAAAAJ/f38AAAAAA8zMzADAwP8Af39/AAAAAAAAAAAAAAAAAAAAAAAAAAAAIQAAABgAAAAUAAAAwAMAABsnAAA/FQAAWSkAABAAAAAmAAAACAAAAAAAAAAAAAAA"/>
               </a:ext>
             </a:extLst>
           </p:cNvSpPr>
@@ -777,7 +790,7 @@
           <a:lstStyle/>
           <a:p>
             <a:fld id="{2B84C8A5-EBC6-D13E-883C-1D6B86727E48}" type="datetime1">
-              <a:t>21/07/2022</a:t>
+              <a:t>26/07/2022</a:t>
             </a:fld>
             <a:endParaRPr/>
           </a:p>
@@ -790,7 +803,7 @@
             <a:spLocks noGrp="1" noChangeArrowheads="1"/>
             <a:extLst>
               <a:ext uri="smNativeData">
-                <pr:smNativeData xmlns:mc="http://schemas.openxmlformats.org/markup-compatibility/2006" xmlns:p14="http://schemas.microsoft.com/office/powerpoint/2010/main" xmlns:p15="http://schemas.microsoft.com/office/powerpoint/2012/main" xmlns:pr="smNativeData" xmlns="smNativeData" val="SMDATA_15_l3DXYhMAAAAlAAAAZAAAAA8BAAAAkAAAAEgAAACQAAAASAAAAAAAAAABAAAAAAAAAAEAAABQAAAAAAAAAAAA4D8AAAAAAADgPwAAAAAAAOA/AAAAAAAA4D8AAAAAAADgPwAAAAAAAOA/AAAAAAAA4D8AAAAAAADgPwAAAAAAAOA/AAAAAAAA4D8CAAAAjAAAAAAAAAAAAAAAADOZDCYmJggAAAAAAAAAAAAAAAAAAAAAAAAAAAAAAAAAAAAAZAAAAAEAAABAAAAAAAAAAAAAAAAAAAAAAAAAAAAAAAAAAAAAAAAAAAAAAAAAAAAAAAAAAAAAAAAAAAAAAAAAAAAAAAAAAAAAAAAAAAAAAAAAAAAAAAAAAAAAAAAAAAAAFAAAADwAAAAAAAAAAAAAAP///wkUAAAAAQAAABQAAAAUAAAAFAAAAAEAAAAAAAAAZAAAAGQAAAAAAAAAZAAAAGQAAAAVAAAAYAAAAAAAAAAAAAAADwAAACADAAAAAAAAAAAAAAEAAACgMgAAVgcAAKr4//8BAAAAf39/AAEAAABkAAAAAAAAABQAAABAHwAAAAAAACYAAAAAAAAAwOD//wAAAAAmAAAAZAAAABYAAABMAAAAAAAAAAAAAAAEAAAAAAAAAAEAAAAzZpkKAAAAACgAAAAoAAAAZAAAAGQAAAAAAAAAzMzMAAAAAABQAAAAUAAAAGQAAABkAAAAAAAAABcAAAAUAAAAAAAAAAAAAAD/fwAA/38AAAAAAAAJAAAABAAAAAAAAAAeAAAAaAAAAAAAAAAAAAAAAAAAAAAAAAAAAAAAECcAABAnAAAAAAAAAAAAAAAAAAAAAAAAAAAAAAAAAAAAAAAAAAAAABQAAAAAAAAAwMD/AAAAAABkAAAAMgAAAAAAAABkAAAAAAAAAH9/fwAKAAAAIgAAABgAAAAAAAAAAAAAAAAAAAAAAAAAAAAAAAAAAAAkAAAAJAAAAAAAAAAHAAAAAAAAAAAAAAAAAAAAAAAAAAAAAAAAAAAAf39/ACUAAABYAAAAAAAAAAAAAAAAAAAAAAAAAAAAAAAAAAAAAAAAAAAAAAAAAAAAAAAAAAAAAAA/AAAAAAAAAKCGAQAAAAAAAAAAAAAAAAAMAAAAAQAAAAAAAAAAAAAAAAAAAB8AAABUAAAAAAAABQAAAAEAAAAAAAAAAAAAAAAAAAAAAAAAAAAAAAAAAAAAAAAAAAAAAAJ/f38AAAAAA8zMzADAwP8Af39/AAAAAAAAAAAAAAAAAAAAAAAAAAAAIQAAABgAAAAUAAAAoRkAABsnAABfMQAAWSkAABAAAAAmAAAACAAAAAAAAAAAAAAA"/>
+                <pr:smNativeData xmlns="smNativeData" xmlns:pr="smNativeData" xmlns:p15="http://schemas.microsoft.com/office/powerpoint/2012/main" xmlns:p14="http://schemas.microsoft.com/office/powerpoint/2010/main" xmlns:mc="http://schemas.openxmlformats.org/markup-compatibility/2006" val="SMDATA_15_l3DXYhMAAAAlAAAAZAAAAA8BAAAAkAAAAEgAAACQAAAASAAAAAAAAAABAAAAAAAAAAEAAABQAAAAAAAAAAAA4D8AAAAAAADgPwAAAAAAAOA/AAAAAAAA4D8AAAAAAADgPwAAAAAAAOA/AAAAAAAA4D8AAAAAAADgPwAAAAAAAOA/AAAAAAAA4D8CAAAAjAAAAAAAAAAAAAAAADOZDCYmJggAAAAAAAAAAAAAAAAAAAAAAAAAAAAAAAAAAAAAZAAAAAEAAABAAAAAAAAAAAAAAAAAAAAAAAAAAAAAAAAAAAAAAAAAAAAAAAAAAAAAAAAAAAAAAAAAAAAAAAAAAAAAAAAAAAAAAAAAAAAAAAAAAAAAAAAAAAAAAAAAAAAAFAAAADwAAAAAAAAAAAAAAP///wkUAAAAAQAAABQAAAAUAAAAFAAAAAEAAAAAAAAAZAAAAGQAAAAAAAAAZAAAAGQAAAAVAAAAYAAAAAAAAAAAAAAADwAAACADAAAAAAAAAAAAAAEAAACgMgAAVgcAAKr4//8BAAAAf39/AAEAAABkAAAAAAAAABQAAABAHwAAAAAAACYAAAAAAAAAwOD//wAAAAAmAAAAZAAAABYAAABMAAAAAAAAAAAAAAAEAAAAAAAAAAEAAAAzZpkKAAAAACgAAAAoAAAAZAAAAGQAAAAAAAAAzMzMAAAAAABQAAAAUAAAAGQAAABkAAAAAAAAABcAAAAUAAAAAAAAAAAAAAD/fwAA/38AAAAAAAAJAAAABAAAAAAAAAAeAAAAaAAAAAAAAAAAAAAAAAAAAAAAAAAAAAAAECcAABAnAAAAAAAAAAAAAAAAAAAAAAAAAAAAAAAAAAAAAAAAAAAAABQAAAAAAAAAwMD/AAAAAABkAAAAMgAAAAAAAABkAAAAAAAAAH9/fwAKAAAAIgAAABgAAAAAAAAAAAAAAAAAAAAAAAAAAAAAAAAAAAAkAAAAJAAAAAAAAAAHAAAAAAAAAAAAAAAAAAAAAAAAAAAAAAAAAAAAf39/ACUAAABYAAAAAAAAAAAAAAAAAAAAAAAAAAAAAAAAAAAAAAAAAAAAAAAAAAAAAAAAAAAAAAA/AAAAAAAAAKCGAQAAAAAAAAAAAAAAAAAMAAAAAQAAAAAAAAAAAAAAAAAAAB8AAABUAAAAAAAABQAAAAEAAAAAAAAAAAAAAAAAAAAAAAAAAAAAAAAAAAAAAAAAAAAAAAJ/f38AAAAAA8zMzADAwP8Af39/AAAAAAAAAAAAAAAAAAAAAAAAAAAAIQAAABgAAAAUAAAAoRkAABsnAABfMQAAWSkAABAAAAAmAAAACAAAAAAAAAAAAAAA"/>
               </a:ext>
             </a:extLst>
           </p:cNvSpPr>
@@ -814,7 +827,7 @@
             <a:spLocks noGrp="1" noChangeArrowheads="1"/>
             <a:extLst>
               <a:ext uri="smNativeData">
-                <pr:smNativeData xmlns:mc="http://schemas.openxmlformats.org/markup-compatibility/2006" xmlns:p14="http://schemas.microsoft.com/office/powerpoint/2010/main" xmlns:p15="http://schemas.microsoft.com/office/powerpoint/2012/main" xmlns:pr="smNativeData" xmlns="smNativeData" val="SMDATA_15_l3DXYhMAAAAlAAAAZAAAAA8BAAAAkAAAAEgAAACQAAAASAAAAAAAAAABAAAAAAAAAAEAAABQAAAAAAAAAAAA4D8AAAAAAADgPwAAAAAAAOA/AAAAAAAA4D8AAAAAAADgPwAAAAAAAOA/AAAAAAAA4D8AAAAAAADgPwAAAAAAAOA/AAAAAAAA4D8CAAAAjAAAAAAAAAAAAAAAADOZDCYmJggAAAAAAAAAAAAAAAAAAAAAAAAAAAAAAAAAAAAAZAAAAAEAAABAAAAAAAAAAAAAAAAAAAAAAAAAAAAAAAAAAAAAAAAAAAAAAAAAAAAAAAAAAAAAAAAAAAAAAAAAAAAAAAAAAAAAAAAAAAAAAAAAAAAAAAAAAAAAAAAAAAAAFAAAADwAAAAAAAAAAAAAAP///wkUAAAAAQAAABQAAAAUAAAAFAAAAAEAAAAAAAAAZAAAAGQAAAAAAAAAZAAAAGQAAAAVAAAAYAAAAAAAAAAAAAAADwAAACADAAAAAAAAAAAAAAEAAACgMgAAVgcAAKr4//8BAAAAf39/AAEAAABkAAAAAAAAABQAAABAHwAAAAAAACYAAAAAAAAAwOD//wAAAAAmAAAAZAAAABYAAABMAAAAAAAAAAAAAAAEAAAAAAAAAAEAAAAzZpkKAAAAACgAAAAoAAAAZAAAAGQAAAAAAAAAzMzMAAAAAABQAAAAUAAAAGQAAABkAAAAAAAAABcAAAAUAAAAAAAAAAAAAAD/fwAA/38AAAAAAAAJAAAABAAAAAAAAAAeAAAAaAAAAAAAAAAAAAAAAAAAAAAAAAAAAAAAECcAABAnAAAAAAAAAAAAAAAAAAAAAAAAAAAAAAAAAAAAAAAAAAAAABQAAAAAAAAAwMD/AAAAAABkAAAAMgAAAAAAAABkAAAAAAAAAH9/fwAKAAAAIgAAABgAAAAAAAAAAAAAAAAAAAAAAAAAAAAAAAAAAAAkAAAAJAAAAAAAAAAHAAAAAAAAAAAAAAAAAAAAAAAAAAAAAAAAAAAAf39/ACUAAABYAAAAAAAAAAAAAAAAAAAAAAAAAAAAAAAAAAAAAAAAAAAAAAAAAAAAAAAAAAAAAAA/AAAAAAAAAKCGAQAAAAAAAAAAAAAAAAAMAAAAAQAAAAAAAAAAAAAAAAAAAB8AAABUAAAAAAAABQAAAAEAAAAAAAAAAAAAAAAAAAAAAAAAAAAAAAAAAAAAAAAAAAAAAAJ/f38AAAAAA8zMzADAwP8Af39/AAAAAAAAAAAAAAAAAAAAAAAAAAAAIQAAABgAAAAUAAAAwTUAABsnAABARwAAWSkAABAAAAAmAAAACAAAAAAAAAAAAAAA"/>
+                <pr:smNativeData xmlns="smNativeData" xmlns:pr="smNativeData" xmlns:p15="http://schemas.microsoft.com/office/powerpoint/2012/main" xmlns:p14="http://schemas.microsoft.com/office/powerpoint/2010/main" xmlns:mc="http://schemas.openxmlformats.org/markup-compatibility/2006" val="SMDATA_15_l3DXYhMAAAAlAAAAZAAAAA8BAAAAkAAAAEgAAACQAAAASAAAAAAAAAABAAAAAAAAAAEAAABQAAAAAAAAAAAA4D8AAAAAAADgPwAAAAAAAOA/AAAAAAAA4D8AAAAAAADgPwAAAAAAAOA/AAAAAAAA4D8AAAAAAADgPwAAAAAAAOA/AAAAAAAA4D8CAAAAjAAAAAAAAAAAAAAAADOZDCYmJggAAAAAAAAAAAAAAAAAAAAAAAAAAAAAAAAAAAAAZAAAAAEAAABAAAAAAAAAAAAAAAAAAAAAAAAAAAAAAAAAAAAAAAAAAAAAAAAAAAAAAAAAAAAAAAAAAAAAAAAAAAAAAAAAAAAAAAAAAAAAAAAAAAAAAAAAAAAAAAAAAAAAFAAAADwAAAAAAAAAAAAAAP///wkUAAAAAQAAABQAAAAUAAAAFAAAAAEAAAAAAAAAZAAAAGQAAAAAAAAAZAAAAGQAAAAVAAAAYAAAAAAAAAAAAAAADwAAACADAAAAAAAAAAAAAAEAAACgMgAAVgcAAKr4//8BAAAAf39/AAEAAABkAAAAAAAAABQAAABAHwAAAAAAACYAAAAAAAAAwOD//wAAAAAmAAAAZAAAABYAAABMAAAAAAAAAAAAAAAEAAAAAAAAAAEAAAAzZpkKAAAAACgAAAAoAAAAZAAAAGQAAAAAAAAAzMzMAAAAAABQAAAAUAAAAGQAAABkAAAAAAAAABcAAAAUAAAAAAAAAAAAAAD/fwAA/38AAAAAAAAJAAAABAAAAAAAAAAeAAAAaAAAAAAAAAAAAAAAAAAAAAAAAAAAAAAAECcAABAnAAAAAAAAAAAAAAAAAAAAAAAAAAAAAAAAAAAAAAAAAAAAABQAAAAAAAAAwMD/AAAAAABkAAAAMgAAAAAAAABkAAAAAAAAAH9/fwAKAAAAIgAAABgAAAAAAAAAAAAAAAAAAAAAAAAAAAAAAAAAAAAkAAAAJAAAAAAAAAAHAAAAAAAAAAAAAAAAAAAAAAAAAAAAAAAAAAAAf39/ACUAAABYAAAAAAAAAAAAAAAAAAAAAAAAAAAAAAAAAAAAAAAAAAAAAAAAAAAAAAAAAAAAAAA/AAAAAAAAAKCGAQAAAAAAAAAAAAAAAAAMAAAAAQAAAAAAAAAAAAAAAAAAAB8AAABUAAAAAAAABQAAAAEAAAAAAAAAAAAAAAAAAAAAAAAAAAAAAAAAAAAAAAAAAAAAAAJ/f38AAAAAA8zMzADAwP8Af39/AAAAAAAAAAAAAAAAAAAAAAAAAAAAIQAAABgAAAAUAAAAwTUAABsnAABARwAAWSkAABAAAAAmAAAACAAAAAAAAAAAAAAA"/>
               </a:ext>
             </a:extLst>
           </p:cNvSpPr>
@@ -867,7 +880,7 @@
             <a:spLocks noGrp="1" noChangeArrowheads="1"/>
             <a:extLst>
               <a:ext uri="smNativeData">
-                <pr:smNativeData xmlns:mc="http://schemas.openxmlformats.org/markup-compatibility/2006" xmlns:p14="http://schemas.microsoft.com/office/powerpoint/2010/main" xmlns:p15="http://schemas.microsoft.com/office/powerpoint/2012/main" xmlns:pr="smNativeData" xmlns="smNativeData" val="SMDATA_15_l3DXYhMAAAAlAAAAZAAAAA8BAAAAkAAAAEgAAACQAAAASAAAAAAAAAABAAAAAAAAAAEAAABQAAAAAAAAAAAA4D8AAAAAAADgPwAAAAAAAOA/AAAAAAAA4D8AAAAAAADgPwAAAAAAAOA/AAAAAAAA4D8AAAAAAADgPwAAAAAAAOA/AAAAAAAA4D8CAAAAjAAAAAAAAAAAAAAAADOZDCYmJggAAAAAAAAAAAAAAAAAAAAAAAAAAAAAAAAAAAAAZAAAAAEAAABAAAAAAAAAAAAAAAAAAAAAAAAAAAAAAAAAAAAAAAAAAAAAAAAAAAAAAAAAAAAAAAAAAAAAAAAAAAAAAAAAAAAAAAAAAAAAAAAAAAAAAAAAAAAAAAAAAAAAFAAAADwAAAAAAAAAAAAAAP///wkUAAAAAQAAABQAAAAUAAAAFAAAAAEAAAAAAAAAZAAAAGQAAAAAAAAAZAAAAGQAAAAVAAAAYAAAAAAAAAAAAAAADwAAACADAAAAAAAAAAAAAAEAAACgMgAAVgcAAKr4//8BAAAAf39/AAEAAABkAAAAAAAAABQAAABAHwAAAAAAACYAAAAAAAAAwOD//wAAAAAmAAAAZAAAABYAAABMAAAAAAAAAAAAAAAEAAAAAAAAAAEAAAAzZpkKAAAAACgAAAAoAAAAZAAAAGQAAAAAAAAAzMzMAAAAAABQAAAAUAAAAGQAAABkAAAAAAAAABcAAAAUAAAAAAAAAAAAAAD/fwAA/38AAAAAAAAJAAAABAAAAAAAAAAeAAAAaAAAAAAAAAAAAAAAAAAAAAAAAAAAAAAAECcAABAnAAAAAAAAAAAAAAAAAAAAAAAAAAAAAAAAAAAAAAAAAAAAABQAAAAAAAAAwMD/AAAAAABkAAAAMgAAAAAAAABkAAAAAAAAAH9/fwAKAAAAIgAAABgAAAAAAAAAAAAAAAAAAAAAAAAAAAAAAAAAAAAkAAAAJAAAAAAAAAAHAAAAAAAAAAAAAAAAAAAAAAAAAAAAAAAAAAAAf39/ACUAAABYAAAAAAAAAAAAAAAAAAAAAAAAAAAAAAAAAAAAAAAAAAAAAAAAAAAAAAAAAAAAAAA/AAAAAAAAAKCGAQAAAAAAAAAAAAAAAAAMAAAAAQAAAAAAAAAAAAAAAAAAAB8AAABUAAAAAAAABQAAAAEAAAAAAAAAAAAAAAAAAAAAAAAAAAAAAAAAAAAAAAAAAAAAAAJ/f38AAAAAA8zMzADAwP8Af39/AAAAAAAAAAAAAAAAAAAAAAAAAAAAIQAAABgAAAAUAAAAwAMAALABAABARwAAuAgAABAAAAAmAAAACAAAAAAAAAAAAAAA"/>
+                <pr:smNativeData xmlns="smNativeData" xmlns:pr="smNativeData" xmlns:p15="http://schemas.microsoft.com/office/powerpoint/2012/main" xmlns:p14="http://schemas.microsoft.com/office/powerpoint/2010/main" xmlns:mc="http://schemas.openxmlformats.org/markup-compatibility/2006" val="SMDATA_15_l3DXYhMAAAAlAAAAZAAAAA8BAAAAkAAAAEgAAACQAAAASAAAAAAAAAABAAAAAAAAAAEAAABQAAAAAAAAAAAA4D8AAAAAAADgPwAAAAAAAOA/AAAAAAAA4D8AAAAAAADgPwAAAAAAAOA/AAAAAAAA4D8AAAAAAADgPwAAAAAAAOA/AAAAAAAA4D8CAAAAjAAAAAAAAAAAAAAAADOZDCYmJggAAAAAAAAAAAAAAAAAAAAAAAAAAAAAAAAAAAAAZAAAAAEAAABAAAAAAAAAAAAAAAAAAAAAAAAAAAAAAAAAAAAAAAAAAAAAAAAAAAAAAAAAAAAAAAAAAAAAAAAAAAAAAAAAAAAAAAAAAAAAAAAAAAAAAAAAAAAAAAAAAAAAFAAAADwAAAAAAAAAAAAAAP///wkUAAAAAQAAABQAAAAUAAAAFAAAAAEAAAAAAAAAZAAAAGQAAAAAAAAAZAAAAGQAAAAVAAAAYAAAAAAAAAAAAAAADwAAACADAAAAAAAAAAAAAAEAAACgMgAAVgcAAKr4//8BAAAAf39/AAEAAABkAAAAAAAAABQAAABAHwAAAAAAACYAAAAAAAAAwOD//wAAAAAmAAAAZAAAABYAAABMAAAAAAAAAAAAAAAEAAAAAAAAAAEAAAAzZpkKAAAAACgAAAAoAAAAZAAAAGQAAAAAAAAAzMzMAAAAAABQAAAAUAAAAGQAAABkAAAAAAAAABcAAAAUAAAAAAAAAAAAAAD/fwAA/38AAAAAAAAJAAAABAAAAAAAAAAeAAAAaAAAAAAAAAAAAAAAAAAAAAAAAAAAAAAAECcAABAnAAAAAAAAAAAAAAAAAAAAAAAAAAAAAAAAAAAAAAAAAAAAABQAAAAAAAAAwMD/AAAAAABkAAAAMgAAAAAAAABkAAAAAAAAAH9/fwAKAAAAIgAAABgAAAAAAAAAAAAAAAAAAAAAAAAAAAAAAAAAAAAkAAAAJAAAAAAAAAAHAAAAAAAAAAAAAAAAAAAAAAAAAAAAAAAAAAAAf39/ACUAAABYAAAAAAAAAAAAAAAAAAAAAAAAAAAAAAAAAAAAAAAAAAAAAAAAAAAAAAAAAAAAAAA/AAAAAAAAAKCGAQAAAAAAAAAAAAAAAAAMAAAAAQAAAAAAAAAAAAAAAAAAAB8AAABUAAAAAAAABQAAAAEAAAAAAAAAAAAAAAAAAAAAAAAAAAAAAAAAAAAAAAAAAAAAAAJ/f38AAAAAA8zMzADAwP8Af39/AAAAAAAAAAAAAAAAAAAAAAAAAAAAIQAAABgAAAAUAAAAwAMAALABAABARwAAuAgAABAAAAAmAAAACAAAAAAAAAAAAAAA"/>
               </a:ext>
             </a:extLst>
           </p:cNvSpPr>
@@ -893,7 +906,7 @@
             <a:spLocks noGrp="1" noChangeArrowheads="1"/>
             <a:extLst>
               <a:ext uri="smNativeData">
-                <pr:smNativeData xmlns:mc="http://schemas.openxmlformats.org/markup-compatibility/2006" xmlns:p14="http://schemas.microsoft.com/office/powerpoint/2010/main" xmlns:p15="http://schemas.microsoft.com/office/powerpoint/2012/main" xmlns:pr="smNativeData" xmlns="smNativeData" val="SMDATA_15_l3DXYhMAAAAlAAAAZAAAAA8BAAAAkAAAAEgAAACQAAAASAAAAAAAAAAAAAAAAAAAAAEAAABQAAAAAAAAAAAA4D8AAAAAAADgPwAAAAAAAOA/AAAAAAAA4D8AAAAAAADgPwAAAAAAAOA/AAAAAAAA4D8AAAAAAADgPwAAAAAAAOA/AAAAAAAA4D8CAAAAjAAAAAAAAAAAAAAAADOZDCYmJggAAAAAAAAAAAAAAAAAAAAAAAAAAAAAAAAAAAAAZAAAAAEAAABAAAAAAAAAAAAAAAAAAAAAAAAAAAAAAAAAAAAAAAAAAAAAAAAAAAAAAAAAAAAAAAAAAAAAAAAAAAAAAAAAAAAAAAAAAAAAAAAAAAAAAAAAAAAAAAAAAAAAFAAAADwAAAAAAAAAAAAAAP///wkUAAAAAQAAABQAAAAUAAAAFAAAAAEAAAAAAAAAZAAAAGQAAAAAAAAAZAAAAGQAAAAVAAAAYAAAAAAAAAAAAAAADwAAACADAAAAAAAAAAAAAAEAAACgMgAAVgcAAKr4//8BAAAAf39/AAEAAABkAAAAAAAAABQAAABAHwAAAAAAACYAAAAAAAAAwOD//wAAAAAmAAAAZAAAABYAAABMAAAAAAAAAAAAAAAEAAAAAAAAAAEAAAAzZpkKAAAAACgAAAAoAAAAZAAAAGQAAAAAAAAAzMzMAAAAAABQAAAAUAAAAGQAAABkAAAAAAAAABcAAAAUAAAAAAAAAAAAAAD/fwAA/38AAAAAAAAJAAAABAAAAAAAAAAeAAAAaAAAAAAAAAAAAAAAAAAAAAAAAAAAAAAAECcAABAnAAAAAAAAAAAAAAAAAAAAAAAAAAAAAAAAAAAAAAAAAAAAABQAAAAAAAAAwMD/AAAAAABkAAAAMgAAAAAAAABkAAAAAAAAAH9/fwAKAAAAIgAAABgAAAAAAAAAAAAAAAAAAAAAAAAAAAAAAAAAAAAkAAAAJAAAAAAAAAAHAAAAAAAAAAAAAAAAAAAAAAAAAAAAAAAAAAAAf39/ACUAAABYAAAAAAAAAAAAAAAAAAAAAAAAAAAAAAAAAAAAAAAAAAAAAAAAAAAAAAAAAAAAAAA/AAAAAAAAAKCGAQAAAAAAAAAAAAAAAAAMAAAAAQAAAAAAAAAAAAAAAAAAAB8AAABUAAAAAAAABQAAAAEAAAAAAAAAAAAAAAAAAAAAAAAAAAAAAAAAAAAAAAAAAAAAAAJ/f38AAAAAA8zMzADAwP8Af39/AAAAAAAAAAAAAAAAAAAAAAAAAAAAIQAAABgAAAAUAAAAwAMAANgJAABARwAAsCUAABAAAAAmAAAACAAAAAAAAAAAAAAA"/>
+                <pr:smNativeData xmlns="smNativeData" xmlns:pr="smNativeData" xmlns:p15="http://schemas.microsoft.com/office/powerpoint/2012/main" xmlns:p14="http://schemas.microsoft.com/office/powerpoint/2010/main" xmlns:mc="http://schemas.openxmlformats.org/markup-compatibility/2006" val="SMDATA_15_l3DXYhMAAAAlAAAAZAAAAA8BAAAAkAAAAEgAAACQAAAASAAAAAAAAAAAAAAAAAAAAAEAAABQAAAAAAAAAAAA4D8AAAAAAADgPwAAAAAAAOA/AAAAAAAA4D8AAAAAAADgPwAAAAAAAOA/AAAAAAAA4D8AAAAAAADgPwAAAAAAAOA/AAAAAAAA4D8CAAAAjAAAAAAAAAAAAAAAADOZDCYmJggAAAAAAAAAAAAAAAAAAAAAAAAAAAAAAAAAAAAAZAAAAAEAAABAAAAAAAAAAAAAAAAAAAAAAAAAAAAAAAAAAAAAAAAAAAAAAAAAAAAAAAAAAAAAAAAAAAAAAAAAAAAAAAAAAAAAAAAAAAAAAAAAAAAAAAAAAAAAAAAAAAAAFAAAADwAAAAAAAAAAAAAAP///wkUAAAAAQAAABQAAAAUAAAAFAAAAAEAAAAAAAAAZAAAAGQAAAAAAAAAZAAAAGQAAAAVAAAAYAAAAAAAAAAAAAAADwAAACADAAAAAAAAAAAAAAEAAACgMgAAVgcAAKr4//8BAAAAf39/AAEAAABkAAAAAAAAABQAAABAHwAAAAAAACYAAAAAAAAAwOD//wAAAAAmAAAAZAAAABYAAABMAAAAAAAAAAAAAAAEAAAAAAAAAAEAAAAzZpkKAAAAACgAAAAoAAAAZAAAAGQAAAAAAAAAzMzMAAAAAABQAAAAUAAAAGQAAABkAAAAAAAAABcAAAAUAAAAAAAAAAAAAAD/fwAA/38AAAAAAAAJAAAABAAAAAAAAAAeAAAAaAAAAAAAAAAAAAAAAAAAAAAAAAAAAAAAECcAABAnAAAAAAAAAAAAAAAAAAAAAAAAAAAAAAAAAAAAAAAAAAAAABQAAAAAAAAAwMD/AAAAAABkAAAAMgAAAAAAAABkAAAAAAAAAH9/fwAKAAAAIgAAABgAAAAAAAAAAAAAAAAAAAAAAAAAAAAAAAAAAAAkAAAAJAAAAAAAAAAHAAAAAAAAAAAAAAAAAAAAAAAAAAAAAAAAAAAAf39/ACUAAABYAAAAAAAAAAAAAAAAAAAAAAAAAAAAAAAAAAAAAAAAAAAAAAAAAAAAAAAAAAAAAAA/AAAAAAAAAKCGAQAAAAAAAAAAAAAAAAAMAAAAAQAAAAAAAAAAAAAAAAAAAB8AAABUAAAAAAAABQAAAAEAAAAAAAAAAAAAAAAAAAAAAAAAAAAAAAAAAAAAAAAAAAAAAAJ/f38AAAAAA8zMzADAwP8Af39/AAAAAAAAAAAAAAAAAAAAAAAAAAAAIQAAABgAAAAUAAAAwAMAANgJAABARwAAsCUAABAAAAAmAAAACAAAAAAAAAAAAAAA"/>
               </a:ext>
             </a:extLst>
           </p:cNvSpPr>
@@ -943,7 +956,7 @@
             <a:spLocks noGrp="1" noChangeArrowheads="1"/>
             <a:extLst>
               <a:ext uri="smNativeData">
-                <pr:smNativeData xmlns:mc="http://schemas.openxmlformats.org/markup-compatibility/2006" xmlns:p14="http://schemas.microsoft.com/office/powerpoint/2010/main" xmlns:p15="http://schemas.microsoft.com/office/powerpoint/2012/main" xmlns:pr="smNativeData" xmlns="smNativeData" val="SMDATA_15_l3DXYhMAAAAlAAAAZAAAAA8BAAAAkAAAAEgAAACQAAAASAAAAAAAAAABAAAAAAAAAAEAAABQAAAAAAAAAAAA4D8AAAAAAADgPwAAAAAAAOA/AAAAAAAA4D8AAAAAAADgPwAAAAAAAOA/AAAAAAAA4D8AAAAAAADgPwAAAAAAAOA/AAAAAAAA4D8CAAAAjAAAAAAAAAAAAAAAADOZDCYmJggAAAAAAAAAAAAAAAAAAAAAAAAAAAAAAAAAAAAAZAAAAAEAAABAAAAAAAAAAAAAAAAAAAAAAAAAAAAAAAAAAAAAAAAAAAAAAAAAAAAAAAAAAAAAAAAAAAAAAAAAAAAAAAAAAAAAAAAAAAAAAAAAAAAAAAAAAAAAAAAAAAAAFAAAADwAAAAAAAAAAAAAAP///wkUAAAAAQAAABQAAAAUAAAAFAAAAAEAAAAAAAAAZAAAAGQAAAAAAAAAZAAAAGQAAAAVAAAAYAAAAAAAAAAAAAAADwAAACADAAAAAAAAAAAAAAEAAACgMgAAVgcAAKr4//8BAAAAf39/AAEAAABkAAAAAAAAABQAAABAHwAAAAAAACYAAAAAAAAAwOD//wAAAAAmAAAAZAAAABYAAABMAAAAAAAAAAAAAAAEAAAAAAAAAAEAAAAzZpkKAAAAACgAAAAoAAAAZAAAAGQAAAAAAAAAzMzMAAAAAABQAAAAUAAAAGQAAABkAAAAAAAAABcAAAAUAAAAAAAAAAAAAAD/fwAA/38AAAAAAAAJAAAABAAAANw7IAEeAAAAaAAAAAAAAAAAAAAAAAAAAAAAAAAAAAAAECcAABAnAAAAAAAAAAAAAAAAAAAAAAAAAAAAAAAAAAAAAAAAAAAAABQAAAAAAAAAwMD/AAAAAABkAAAAMgAAAAAAAABkAAAAAAAAAH9/fwAKAAAAIgAAABgAAAAAAAAAAAAAAAAAAAAAAAAAAAAAAAAAAAAkAAAAJAAAAAAAAAAHAAAAAAAAAAAAAAAAAAAAAAAAAAAAAAAAAAAAf39/ACUAAABYAAAAAAAAAAAAAAAAAAAAAAAAAAAAAAAAAAAAAAAAAAAAAAAAAAAAAAAAAAAAAAA/AAAAAAAAAKCGAQAAAAAAAAAAAAAAAAAMAAAAAQAAAAAAAAAAAAAAAAAAAB8AAABUAAAAAAAABQAAAAEAAAAAAAAAAAAAAAAAAAAAAAAAAAAAAAAAAAAAAAAAAAAAAAJ/f38AAAAAA8zMzADAwP8Af39/AAAAAAAAAAAAAAAAAAAAAAAAAAAAIQAAABgAAAAUAAAAwAMAABsnAAA/FQAAWSkAABAAAAAmAAAACAAAAAAAAAAAAAAA"/>
+                <pr:smNativeData xmlns="smNativeData" xmlns:pr="smNativeData" xmlns:p15="http://schemas.microsoft.com/office/powerpoint/2012/main" xmlns:p14="http://schemas.microsoft.com/office/powerpoint/2010/main" xmlns:mc="http://schemas.openxmlformats.org/markup-compatibility/2006" val="SMDATA_15_l3DXYhMAAAAlAAAAZAAAAA8BAAAAkAAAAEgAAACQAAAASAAAAAAAAAABAAAAAAAAAAEAAABQAAAAAAAAAAAA4D8AAAAAAADgPwAAAAAAAOA/AAAAAAAA4D8AAAAAAADgPwAAAAAAAOA/AAAAAAAA4D8AAAAAAADgPwAAAAAAAOA/AAAAAAAA4D8CAAAAjAAAAAAAAAAAAAAAADOZDCYmJggAAAAAAAAAAAAAAAAAAAAAAAAAAAAAAAAAAAAAZAAAAAEAAABAAAAAAAAAAAAAAAAAAAAAAAAAAAAAAAAAAAAAAAAAAAAAAAAAAAAAAAAAAAAAAAAAAAAAAAAAAAAAAAAAAAAAAAAAAAAAAAAAAAAAAAAAAAAAAAAAAAAAFAAAADwAAAAAAAAAAAAAAP///wkUAAAAAQAAABQAAAAUAAAAFAAAAAEAAAAAAAAAZAAAAGQAAAAAAAAAZAAAAGQAAAAVAAAAYAAAAAAAAAAAAAAADwAAACADAAAAAAAAAAAAAAEAAACgMgAAVgcAAKr4//8BAAAAf39/AAEAAABkAAAAAAAAABQAAABAHwAAAAAAACYAAAAAAAAAwOD//wAAAAAmAAAAZAAAABYAAABMAAAAAAAAAAAAAAAEAAAAAAAAAAEAAAAzZpkKAAAAACgAAAAoAAAAZAAAAGQAAAAAAAAAzMzMAAAAAABQAAAAUAAAAGQAAABkAAAAAAAAABcAAAAUAAAAAAAAAAAAAAD/fwAA/38AAAAAAAAJAAAABAAAANw7IAEeAAAAaAAAAAAAAAAAAAAAAAAAAAAAAAAAAAAAECcAABAnAAAAAAAAAAAAAAAAAAAAAAAAAAAAAAAAAAAAAAAAAAAAABQAAAAAAAAAwMD/AAAAAABkAAAAMgAAAAAAAABkAAAAAAAAAH9/fwAKAAAAIgAAABgAAAAAAAAAAAAAAAAAAAAAAAAAAAAAAAAAAAAkAAAAJAAAAAAAAAAHAAAAAAAAAAAAAAAAAAAAAAAAAAAAAAAAAAAAf39/ACUAAABYAAAAAAAAAAAAAAAAAAAAAAAAAAAAAAAAAAAAAAAAAAAAAAAAAAAAAAAAAAAAAAA/AAAAAAAAAKCGAQAAAAAAAAAAAAAAAAAMAAAAAQAAAAAAAAAAAAAAAAAAAB8AAABUAAAAAAAABQAAAAEAAAAAAAAAAAAAAAAAAAAAAAAAAAAAAAAAAAAAAAAAAAAAAAJ/f38AAAAAA8zMzADAwP8Af39/AAAAAAAAAAAAAAAAAAAAAAAAAAAAIQAAABgAAAAUAAAAwAMAABsnAAA/FQAAWSkAABAAAAAmAAAACAAAAAAAAAAAAAAA"/>
               </a:ext>
             </a:extLst>
           </p:cNvSpPr>
@@ -957,7 +970,7 @@
           <a:lstStyle/>
           <a:p>
             <a:fld id="{2B84B1DC-92C6-D147-883C-6412FF727E31}" type="datetime1">
-              <a:t>21/07/2022</a:t>
+              <a:t>26/07/2022</a:t>
             </a:fld>
             <a:endParaRPr/>
           </a:p>
@@ -970,7 +983,7 @@
             <a:spLocks noGrp="1" noChangeArrowheads="1"/>
             <a:extLst>
               <a:ext uri="smNativeData">
-                <pr:smNativeData xmlns:mc="http://schemas.openxmlformats.org/markup-compatibility/2006" xmlns:p14="http://schemas.microsoft.com/office/powerpoint/2010/main" xmlns:p15="http://schemas.microsoft.com/office/powerpoint/2012/main" xmlns:pr="smNativeData" xmlns="smNativeData" val="SMDATA_15_l3DXYhMAAAAlAAAAZAAAAA8BAAAAkAAAAEgAAACQAAAASAAAAAAAAAABAAAAAAAAAAEAAABQAAAAAAAAAAAA4D8AAAAAAADgPwAAAAAAAOA/AAAAAAAA4D8AAAAAAADgPwAAAAAAAOA/AAAAAAAA4D8AAAAAAADgPwAAAAAAAOA/AAAAAAAA4D8CAAAAjAAAAAAAAAAAAAAAADOZDCYmJggAAAAAAAAAAAAAAAAAAAAAAAAAAAAAAAAAAAAAZAAAAAEAAABAAAAAAAAAAAAAAAAAAAAAAAAAAAAAAAAAAAAAAAAAAAAAAAAAAAAAAAAAAAAAAAAAAAAAAAAAAAAAAAAAAAAAAAAAAAAAAAAAAAAAAAAAAAAAAAAAAAAAFAAAADwAAAAAAAAAAAAAAP///wkUAAAAAQAAABQAAAAUAAAAFAAAAAEAAAAAAAAAZAAAAGQAAAAAAAAAZAAAAGQAAAAVAAAAYAAAAAAAAAAAAAAADwAAACADAAAAAAAAAAAAAAEAAACgMgAAVgcAAKr4//8BAAAAf39/AAEAAABkAAAAAAAAABQAAABAHwAAAAAAACYAAAAAAAAAwOD//wAAAAAmAAAAZAAAABYAAABMAAAAAAAAAAAAAAAEAAAAAAAAAAEAAAAzZpkKAAAAACgAAAAoAAAAZAAAAGQAAAAAAAAAzMzMAAAAAABQAAAAUAAAAGQAAABkAAAAAAAAABcAAAAUAAAAAAAAAAAAAAD/fwAA/38AAAAAAAAJAAAABAAAANw7IAEeAAAAaAAAAAAAAAAAAAAAAAAAAAAAAAAAAAAAECcAABAnAAAAAAAAAAAAAAAAAAAAAAAAAAAAAAAAAAAAAAAAAAAAABQAAAAAAAAAwMD/AAAAAABkAAAAMgAAAAAAAABkAAAAAAAAAH9/fwAKAAAAIgAAABgAAAAAAAAAAAAAAAAAAAAAAAAAAAAAAAAAAAAkAAAAJAAAAAAAAAAHAAAAAAAAAAAAAAAAAAAAAAAAAAAAAAAAAAAAf39/ACUAAABYAAAAAAAAAAAAAAAAAAAAAAAAAAAAAAAAAAAAAAAAAAAAAAAAAAAAAAAAAAAAAAA/AAAAAAAAAKCGAQAAAAAAAAAAAAAAAAAMAAAAAQAAAAAAAAAAAAAAAAAAAB8AAABUAAAAAAAABQAAAAEAAAAAAAAAAAAAAAAAAAAAAAAAAAAAAAAAAAAAAAAAAAAAAAJ/f38AAAAAA8zMzADAwP8Af39/AAAAAAAAAAAAAAAAAAAAAAAAAAAAIQAAABgAAAAUAAAAoRkAABsnAABfMQAAWSkAABAAAAAmAAAACAAAAAAAAAAAAAAA"/>
+                <pr:smNativeData xmlns="smNativeData" xmlns:pr="smNativeData" xmlns:p15="http://schemas.microsoft.com/office/powerpoint/2012/main" xmlns:p14="http://schemas.microsoft.com/office/powerpoint/2010/main" xmlns:mc="http://schemas.openxmlformats.org/markup-compatibility/2006" val="SMDATA_15_l3DXYhMAAAAlAAAAZAAAAA8BAAAAkAAAAEgAAACQAAAASAAAAAAAAAABAAAAAAAAAAEAAABQAAAAAAAAAAAA4D8AAAAAAADgPwAAAAAAAOA/AAAAAAAA4D8AAAAAAADgPwAAAAAAAOA/AAAAAAAA4D8AAAAAAADgPwAAAAAAAOA/AAAAAAAA4D8CAAAAjAAAAAAAAAAAAAAAADOZDCYmJggAAAAAAAAAAAAAAAAAAAAAAAAAAAAAAAAAAAAAZAAAAAEAAABAAAAAAAAAAAAAAAAAAAAAAAAAAAAAAAAAAAAAAAAAAAAAAAAAAAAAAAAAAAAAAAAAAAAAAAAAAAAAAAAAAAAAAAAAAAAAAAAAAAAAAAAAAAAAAAAAAAAAFAAAADwAAAAAAAAAAAAAAP///wkUAAAAAQAAABQAAAAUAAAAFAAAAAEAAAAAAAAAZAAAAGQAAAAAAAAAZAAAAGQAAAAVAAAAYAAAAAAAAAAAAAAADwAAACADAAAAAAAAAAAAAAEAAACgMgAAVgcAAKr4//8BAAAAf39/AAEAAABkAAAAAAAAABQAAABAHwAAAAAAACYAAAAAAAAAwOD//wAAAAAmAAAAZAAAABYAAABMAAAAAAAAAAAAAAAEAAAAAAAAAAEAAAAzZpkKAAAAACgAAAAoAAAAZAAAAGQAAAAAAAAAzMzMAAAAAABQAAAAUAAAAGQAAABkAAAAAAAAABcAAAAUAAAAAAAAAAAAAAD/fwAA/38AAAAAAAAJAAAABAAAANw7IAEeAAAAaAAAAAAAAAAAAAAAAAAAAAAAAAAAAAAAECcAABAnAAAAAAAAAAAAAAAAAAAAAAAAAAAAAAAAAAAAAAAAAAAAABQAAAAAAAAAwMD/AAAAAABkAAAAMgAAAAAAAABkAAAAAAAAAH9/fwAKAAAAIgAAABgAAAAAAAAAAAAAAAAAAAAAAAAAAAAAAAAAAAAkAAAAJAAAAAAAAAAHAAAAAAAAAAAAAAAAAAAAAAAAAAAAAAAAAAAAf39/ACUAAABYAAAAAAAAAAAAAAAAAAAAAAAAAAAAAAAAAAAAAAAAAAAAAAAAAAAAAAAAAAAAAAA/AAAAAAAAAKCGAQAAAAAAAAAAAAAAAAAMAAAAAQAAAAAAAAAAAAAAAAAAAB8AAABUAAAAAAAABQAAAAEAAAAAAAAAAAAAAAAAAAAAAAAAAAAAAAAAAAAAAAAAAAAAAAJ/f38AAAAAA8zMzADAwP8Af39/AAAAAAAAAAAAAAAAAAAAAAAAAAAAIQAAABgAAAAUAAAAoRkAABsnAABfMQAAWSkAABAAAAAmAAAACAAAAAAAAAAAAAAA"/>
               </a:ext>
             </a:extLst>
           </p:cNvSpPr>
@@ -994,7 +1007,7 @@
             <a:spLocks noGrp="1" noChangeArrowheads="1"/>
             <a:extLst>
               <a:ext uri="smNativeData">
-                <pr:smNativeData xmlns:mc="http://schemas.openxmlformats.org/markup-compatibility/2006" xmlns:p14="http://schemas.microsoft.com/office/powerpoint/2010/main" xmlns:p15="http://schemas.microsoft.com/office/powerpoint/2012/main" xmlns:pr="smNativeData" xmlns="smNativeData" val="SMDATA_15_l3DXYhMAAAAlAAAAZAAAAA8BAAAAkAAAAEgAAACQAAAASAAAAAAAAAABAAAAAAAAAAEAAABQAAAAAAAAAAAA4D8AAAAAAADgPwAAAAAAAOA/AAAAAAAA4D8AAAAAAADgPwAAAAAAAOA/AAAAAAAA4D8AAAAAAADgPwAAAAAAAOA/AAAAAAAA4D8CAAAAjAAAAAAAAAAAAAAAADOZDCYmJggAAAAAAAAAAAAAAAAAAAAAAAAAAAAAAAAAAAAAZAAAAAEAAABAAAAAAAAAAAAAAAAAAAAAAAAAAAAAAAAAAAAAAAAAAAAAAAAAAAAAAAAAAAAAAAAAAAAAAAAAAAAAAAAAAAAAAAAAAAAAAAAAAAAAAAAAAAAAAAAAAAAAFAAAADwAAAAAAAAAAAAAAP///wkUAAAAAQAAABQAAAAUAAAAFAAAAAEAAAAAAAAAZAAAAGQAAAAAAAAAZAAAAGQAAAAVAAAAYAAAAAAAAAAAAAAADwAAACADAAAAAAAAAAAAAAEAAACgMgAAVgcAAKr4//8BAAAAf39/AAEAAABkAAAAAAAAABQAAABAHwAAAAAAACYAAAAAAAAAwOD//wAAAAAmAAAAZAAAABYAAABMAAAAAAAAAAAAAAAEAAAAAAAAAAEAAAAzZpkKAAAAACgAAAAoAAAAZAAAAGQAAAAAAAAAzMzMAAAAAABQAAAAUAAAAGQAAABkAAAAAAAAABcAAAAUAAAAAAAAAAAAAAD/fwAA/38AAAAAAAAJAAAABAAAAAAAAAAeAAAAaAAAAAAAAAAAAAAAAAAAAAAAAAAAAAAAECcAABAnAAAAAAAAAAAAAAAAAAAAAAAAAAAAAAAAAAAAAAAAAAAAABQAAAAAAAAAwMD/AAAAAABkAAAAMgAAAAAAAABkAAAAAAAAAH9/fwAKAAAAIgAAABgAAAAAAAAAAAAAAAAAAAAAAAAAAAAAAAAAAAAkAAAAJAAAAAAAAAAHAAAAAAAAAAAAAAAAAAAAAAAAAAAAAAAAAAAAf39/ACUAAABYAAAAAAAAAAAAAAAAAAAAAAAAAAAAAAAAAAAAAAAAAAAAAAAAAAAAAAAAAAAAAAA/AAAAAAAAAKCGAQAAAAAAAAAAAAAAAAAMAAAAAQAAAAAAAAAAAAAAAAAAAB8AAABUAAAAAAAABQAAAAEAAAAAAAAAAAAAAAAAAAAAAAAAAAAAAAAAAAAAAAAAAAAAAAJ/f38AAAAAA8zMzADAwP8Af39/AAAAAAAAAAAAAAAAAAAAAAAAAAAAIQAAABgAAAAUAAAAwTUAABsnAABARwAAWSkAABAAAAAmAAAACAAAAAAAAAAAAAAA"/>
+                <pr:smNativeData xmlns="smNativeData" xmlns:pr="smNativeData" xmlns:p15="http://schemas.microsoft.com/office/powerpoint/2012/main" xmlns:p14="http://schemas.microsoft.com/office/powerpoint/2010/main" xmlns:mc="http://schemas.openxmlformats.org/markup-compatibility/2006" val="SMDATA_15_l3DXYhMAAAAlAAAAZAAAAA8BAAAAkAAAAEgAAACQAAAASAAAAAAAAAABAAAAAAAAAAEAAABQAAAAAAAAAAAA4D8AAAAAAADgPwAAAAAAAOA/AAAAAAAA4D8AAAAAAADgPwAAAAAAAOA/AAAAAAAA4D8AAAAAAADgPwAAAAAAAOA/AAAAAAAA4D8CAAAAjAAAAAAAAAAAAAAAADOZDCYmJggAAAAAAAAAAAAAAAAAAAAAAAAAAAAAAAAAAAAAZAAAAAEAAABAAAAAAAAAAAAAAAAAAAAAAAAAAAAAAAAAAAAAAAAAAAAAAAAAAAAAAAAAAAAAAAAAAAAAAAAAAAAAAAAAAAAAAAAAAAAAAAAAAAAAAAAAAAAAAAAAAAAAFAAAADwAAAAAAAAAAAAAAP///wkUAAAAAQAAABQAAAAUAAAAFAAAAAEAAAAAAAAAZAAAAGQAAAAAAAAAZAAAAGQAAAAVAAAAYAAAAAAAAAAAAAAADwAAACADAAAAAAAAAAAAAAEAAACgMgAAVgcAAKr4//8BAAAAf39/AAEAAABkAAAAAAAAABQAAABAHwAAAAAAACYAAAAAAAAAwOD//wAAAAAmAAAAZAAAABYAAABMAAAAAAAAAAAAAAAEAAAAAAAAAAEAAAAzZpkKAAAAACgAAAAoAAAAZAAAAGQAAAAAAAAAzMzMAAAAAABQAAAAUAAAAGQAAABkAAAAAAAAABcAAAAUAAAAAAAAAAAAAAD/fwAA/38AAAAAAAAJAAAABAAAAAAAAAAeAAAAaAAAAAAAAAAAAAAAAAAAAAAAAAAAAAAAECcAABAnAAAAAAAAAAAAAAAAAAAAAAAAAAAAAAAAAAAAAAAAAAAAABQAAAAAAAAAwMD/AAAAAABkAAAAMgAAAAAAAABkAAAAAAAAAH9/fwAKAAAAIgAAABgAAAAAAAAAAAAAAAAAAAAAAAAAAAAAAAAAAAAkAAAAJAAAAAAAAAAHAAAAAAAAAAAAAAAAAAAAAAAAAAAAAAAAAAAAf39/ACUAAABYAAAAAAAAAAAAAAAAAAAAAAAAAAAAAAAAAAAAAAAAAAAAAAAAAAAAAAAAAAAAAAA/AAAAAAAAAKCGAQAAAAAAAAAAAAAAAAAMAAAAAQAAAAAAAAAAAAAAAAAAAB8AAABUAAAAAAAABQAAAAEAAAAAAAAAAAAAAAAAAAAAAAAAAAAAAAAAAAAAAAAAAAAAAAJ/f38AAAAAA8zMzADAwP8Af39/AAAAAAAAAAAAAAAAAAAAAAAAAAAAIQAAABgAAAAUAAAAwTUAABsnAABARwAAWSkAABAAAAAmAAAACAAAAAAAAAAAAAAA"/>
               </a:ext>
             </a:extLst>
           </p:cNvSpPr>
@@ -1047,7 +1060,7 @@
             <a:spLocks noGrp="1" noChangeArrowheads="1"/>
             <a:extLst>
               <a:ext uri="smNativeData">
-                <pr:smNativeData xmlns:mc="http://schemas.openxmlformats.org/markup-compatibility/2006" xmlns:p14="http://schemas.microsoft.com/office/powerpoint/2010/main" xmlns:p15="http://schemas.microsoft.com/office/powerpoint/2012/main" xmlns:pr="smNativeData" xmlns="smNativeData" val="SMDATA_15_l3DXYhMAAAAlAAAAZAAAAA8BAAAAkAAAAEgAAACQAAAASAAAAAAAAAAAAAAAAAAAAAEAAABQAAAAAAAAAAAA4D8AAAAAAADgPwAAAAAAAOA/AAAAAAAA4D8AAAAAAADgPwAAAAAAAOA/AAAAAAAA4D8AAAAAAADgPwAAAAAAAOA/AAAAAAAA4D8CAAAAjAAAAAAAAAAAAAAAADOZDCYmJggAAAAAAAAAAAAAAAAAAAAAAAAAAAAAAAAAAAAAZAAAAAEAAABAAAAAAAAAAAAAAAAAAAAAAAAAAAAAAAAAAAAAAAAAAAAAAAAAAAAAAAAAAAAAAAAAAAAAAAAAAAAAAAAAAAAAAAAAAAAAAAAAAAAAAAAAAAAAAAAAAAAAFAAAADwAAAAAAAAAAAAAAP///wkUAAAAAQAAABQAAAAUAAAAFAAAAAEAAAAAAAAAZAAAAGQAAAAAAAAAZAAAAGQAAAAVAAAAYAAAAAAAAAAAAAAADwAAACADAAAAAAAAAAAAAAEAAACgMgAAVgcAAKr4//8BAAAAf39/AAEAAABkAAAAAAAAABQAAABAHwAAAAAAACYAAAAAAAAAwOD//wAAAAAmAAAAZAAAABYAAABMAAAAAAAAAAAAAAAEAAAAAAAAAAEAAAAzZpkKAAAAACgAAAAoAAAAZAAAAGQAAAAAAAAAzMzMAAAAAABQAAAAUAAAAGQAAABkAAAAAAAAABcAAAAUAAAAAAAAAAAAAAD/fwAA/38AAAAAAAAJAAAABAAAANw7IAEeAAAAaAAAAAAAAAAAAAAAAAAAAAAAAAAAAAAAECcAABAnAAAAAAAAAAAAAAAAAAAAAAAAAAAAAAAAAAAAAAAAAAAAABQAAAAAAAAAwMD/AAAAAABkAAAAMgAAAAAAAABkAAAAAAAAAH9/fwAKAAAAIgAAABgAAAAAAAAAAAAAAAAAAAAAAAAAAAAAAAAAAAAkAAAAJAAAAAAAAAAHAAAAAAAAAAAAAAAAAAAAAAAAAAAAAAAAAAAAf39/ACUAAABYAAAAAAAAAAAAAAAAAAAAAAAAAAAAAAAAAAAAAAAAAAAAAAAAAAAAAAAAAAAAAAA/AAAAAAAAAKCGAQAAAAAAAAAAAAAAAAAMAAAAAQAAAAAAAAAAAAAAAAAAAB8AAABUAAAAAAAABQAAAAEAAAAAAAAAAAAAAAAAAAAAAAAAAAAAAAAAAAAAAAAAAAAAAAJ/f38AAAAAA8zMzADAwP8Af39/AAAAAAAAAAAAAAAAAAAAAAAAAAAAIQAAABgAAAAUAAAA7QUAABwbAACtRQAAfSMAABAAAAAmAAAACAAAAIGAAAAAAAAA"/>
+                <pr:smNativeData xmlns="smNativeData" xmlns:pr="smNativeData" xmlns:p15="http://schemas.microsoft.com/office/powerpoint/2012/main" xmlns:p14="http://schemas.microsoft.com/office/powerpoint/2010/main" xmlns:mc="http://schemas.openxmlformats.org/markup-compatibility/2006" val="SMDATA_15_l3DXYhMAAAAlAAAAZAAAAA8BAAAAkAAAAEgAAACQAAAASAAAAAAAAAAAAAAAAAAAAAEAAABQAAAAAAAAAAAA4D8AAAAAAADgPwAAAAAAAOA/AAAAAAAA4D8AAAAAAADgPwAAAAAAAOA/AAAAAAAA4D8AAAAAAADgPwAAAAAAAOA/AAAAAAAA4D8CAAAAjAAAAAAAAAAAAAAAADOZDCYmJggAAAAAAAAAAAAAAAAAAAAAAAAAAAAAAAAAAAAAZAAAAAEAAABAAAAAAAAAAAAAAAAAAAAAAAAAAAAAAAAAAAAAAAAAAAAAAAAAAAAAAAAAAAAAAAAAAAAAAAAAAAAAAAAAAAAAAAAAAAAAAAAAAAAAAAAAAAAAAAAAAAAAFAAAADwAAAAAAAAAAAAAAP///wkUAAAAAQAAABQAAAAUAAAAFAAAAAEAAAAAAAAAZAAAAGQAAAAAAAAAZAAAAGQAAAAVAAAAYAAAAAAAAAAAAAAADwAAACADAAAAAAAAAAAAAAEAAACgMgAAVgcAAKr4//8BAAAAf39/AAEAAABkAAAAAAAAABQAAABAHwAAAAAAACYAAAAAAAAAwOD//wAAAAAmAAAAZAAAABYAAABMAAAAAAAAAAAAAAAEAAAAAAAAAAEAAAAzZpkKAAAAACgAAAAoAAAAZAAAAGQAAAAAAAAAzMzMAAAAAABQAAAAUAAAAGQAAABkAAAAAAAAABcAAAAUAAAAAAAAAAAAAAD/fwAA/38AAAAAAAAJAAAABAAAANw7IAEeAAAAaAAAAAAAAAAAAAAAAAAAAAAAAAAAAAAAECcAABAnAAAAAAAAAAAAAAAAAAAAAAAAAAAAAAAAAAAAAAAAAAAAABQAAAAAAAAAwMD/AAAAAABkAAAAMgAAAAAAAABkAAAAAAAAAH9/fwAKAAAAIgAAABgAAAAAAAAAAAAAAAAAAAAAAAAAAAAAAAAAAAAkAAAAJAAAAAAAAAAHAAAAAAAAAAAAAAAAAAAAAAAAAAAAAAAAAAAAf39/ACUAAABYAAAAAAAAAAAAAAAAAAAAAAAAAAAAAAAAAAAAAAAAAAAAAAAAAAAAAAAAAAAAAAA/AAAAAAAAAKCGAQAAAAAAAAAAAAAAAAAMAAAAAQAAAAAAAAAAAAAAAAAAAB8AAABUAAAAAAAABQAAAAEAAAAAAAAAAAAAAAAAAAAAAAAAAAAAAAAAAAAAAAAAAAAAAAJ/f38AAAAAA8zMzADAwP8Af39/AAAAAAAAAAAAAAAAAAAAAAAAAAAAIQAAABgAAAAUAAAA7QUAABwbAACtRQAAfSMAABAAAAAmAAAACAAAAIGAAAAAAAAA"/>
               </a:ext>
             </a:extLst>
           </p:cNvSpPr>
@@ -1086,7 +1099,7 @@
             <a:spLocks noGrp="1" noChangeArrowheads="1"/>
             <a:extLst>
               <a:ext uri="smNativeData">
-                <pr:smNativeData xmlns:mc="http://schemas.openxmlformats.org/markup-compatibility/2006" xmlns:p14="http://schemas.microsoft.com/office/powerpoint/2010/main" xmlns:p15="http://schemas.microsoft.com/office/powerpoint/2012/main" xmlns:pr="smNativeData" xmlns="smNativeData" val="SMDATA_15_l3DXYhMAAAAlAAAAZAAAAA8BAAAAkAAAAEgAAACQAAAASAAAAAAAAAACAAAAAAAAAAEAAABQAAAAAAAAAAAA4D8AAAAAAADgPwAAAAAAAOA/AAAAAAAA4D8AAAAAAADgPwAAAAAAAOA/AAAAAAAA4D8AAAAAAADgPwAAAAAAAOA/AAAAAAAA4D8CAAAAjAAAAAAAAAAAAAAAADOZDCYmJggAAAAAAAAAAAAAAAAAAAAAAAAAAAAAAAAAAAAAZAAAAAEAAABAAAAAAAAAAAAAAAAAAAAAAAAAAAAAAAAAAAAAAAAAAAAAAAAAAAAAAAAAAAAAAAAAAAAAAAAAAAAAAAAAAAAAAAAAAAAAAAAAAAAAAAAAAAAAAAAAAAAAFAAAADwAAAAAAAAAAAAAAP///wkUAAAAAQAAABQAAAAUAAAAFAAAAAEAAAAAAAAAZAAAAGQAAAAAAAAAZAAAAGQAAAAVAAAAYAAAAAAAAAAAAAAADwAAACADAAAAAAAAAAAAAAEAAACgMgAAVgcAAKr4//8BAAAAf39/AAEAAABkAAAAAAAAABQAAABAHwAAAAAAACYAAAAAAAAAwOD//wAAAAAmAAAAZAAAABYAAABMAAAAAAAAAAAAAAAEAAAAAAAAAAEAAAAzZpkKAAAAACgAAAAoAAAAZAAAAGQAAAAAAAAAzMzMAAAAAABQAAAAUAAAAGQAAABkAAAAAAAAABcAAAAUAAAAAAAAAAAAAAD/fwAA/38AAAAAAAAJAAAABAAAANw7IAEeAAAAaAAAAAAAAAAAAAAAAAAAAAAAAAAAAAAAECcAABAnAAAAAAAAAAAAAAAAAAAAAAAAAAAAAAAAAAAAAAAAAAAAABQAAAAAAAAAwMD/AAAAAABkAAAAMgAAAAAAAABkAAAAAAAAAH9/fwAKAAAAIgAAABgAAAAAAAAAAAAAAAAAAAAAAAAAAAAAAAAAAAAkAAAAJAAAAAAAAAAHAAAAAAAAAAAAAAAAAAAAAAAAAAAAAAAAAAAAf39/ACUAAABYAAAAAAAAAAAAAAAAAAAAAAAAAAAAAAAAAAAAAAAAAAAAAAAAAAAAAAAAAAAAAAA/AAAAAAAAAKCGAQAAAAAAAAAAAAAAAAAMAAAAAQAAAAAAAAAAAAAAAAAAAB8AAABUAAAAAAAABQAAAAEAAAAAAAAAAAAAAAAAAAAAAAAAAAAAAAAAAAAAAAAAAAAAAAJ/f38AAAAAA8zMzADAwP8Af39/AAAAAAAAAAAAAAAAAAAAAAAAAAAAIQAAABgAAAAUAAAA7QUAAOERAACtRQAAHBsAABAAAAAmAAAACAAAAIGAAAAAAAAA"/>
+                <pr:smNativeData xmlns="smNativeData" xmlns:pr="smNativeData" xmlns:p15="http://schemas.microsoft.com/office/powerpoint/2012/main" xmlns:p14="http://schemas.microsoft.com/office/powerpoint/2010/main" xmlns:mc="http://schemas.openxmlformats.org/markup-compatibility/2006" val="SMDATA_15_l3DXYhMAAAAlAAAAZAAAAA8BAAAAkAAAAEgAAACQAAAASAAAAAAAAAACAAAAAAAAAAEAAABQAAAAAAAAAAAA4D8AAAAAAADgPwAAAAAAAOA/AAAAAAAA4D8AAAAAAADgPwAAAAAAAOA/AAAAAAAA4D8AAAAAAADgPwAAAAAAAOA/AAAAAAAA4D8CAAAAjAAAAAAAAAAAAAAAADOZDCYmJggAAAAAAAAAAAAAAAAAAAAAAAAAAAAAAAAAAAAAZAAAAAEAAABAAAAAAAAAAAAAAAAAAAAAAAAAAAAAAAAAAAAAAAAAAAAAAAAAAAAAAAAAAAAAAAAAAAAAAAAAAAAAAAAAAAAAAAAAAAAAAAAAAAAAAAAAAAAAAAAAAAAAFAAAADwAAAAAAAAAAAAAAP///wkUAAAAAQAAABQAAAAUAAAAFAAAAAEAAAAAAAAAZAAAAGQAAAAAAAAAZAAAAGQAAAAVAAAAYAAAAAAAAAAAAAAADwAAACADAAAAAAAAAAAAAAEAAACgMgAAVgcAAKr4//8BAAAAf39/AAEAAABkAAAAAAAAABQAAABAHwAAAAAAACYAAAAAAAAAwOD//wAAAAAmAAAAZAAAABYAAABMAAAAAAAAAAAAAAAEAAAAAAAAAAEAAAAzZpkKAAAAACgAAAAoAAAAZAAAAGQAAAAAAAAAzMzMAAAAAABQAAAAUAAAAGQAAABkAAAAAAAAABcAAAAUAAAAAAAAAAAAAAD/fwAA/38AAAAAAAAJAAAABAAAANw7IAEeAAAAaAAAAAAAAAAAAAAAAAAAAAAAAAAAAAAAECcAABAnAAAAAAAAAAAAAAAAAAAAAAAAAAAAAAAAAAAAAAAAAAAAABQAAAAAAAAAwMD/AAAAAABkAAAAMgAAAAAAAABkAAAAAAAAAH9/fwAKAAAAIgAAABgAAAAAAAAAAAAAAAAAAAAAAAAAAAAAAAAAAAAkAAAAJAAAAAAAAAAHAAAAAAAAAAAAAAAAAAAAAAAAAAAAAAAAAAAAf39/ACUAAABYAAAAAAAAAAAAAAAAAAAAAAAAAAAAAAAAAAAAAAAAAAAAAAAAAAAAAAAAAAAAAAA/AAAAAAAAAKCGAQAAAAAAAAAAAAAAAAAMAAAAAQAAAAAAAAAAAAAAAAAAAB8AAABUAAAAAAAABQAAAAEAAAAAAAAAAAAAAAAAAAAAAAAAAAAAAAAAAAAAAAAAAAAAAAJ/f38AAAAAA8zMzADAwP8Af39/AAAAAAAAAAAAAAAAAAAAAAAAAAAAIQAAABgAAAAUAAAA7QUAAOERAACtRQAAHBsAABAAAAAmAAAACAAAAIGAAAAAAAAA"/>
               </a:ext>
             </a:extLst>
           </p:cNvSpPr>
@@ -1158,7 +1171,7 @@
             <a:spLocks noGrp="1" noChangeArrowheads="1"/>
             <a:extLst>
               <a:ext uri="smNativeData">
-                <pr:smNativeData xmlns:mc="http://schemas.openxmlformats.org/markup-compatibility/2006" xmlns:p14="http://schemas.microsoft.com/office/powerpoint/2010/main" xmlns:p15="http://schemas.microsoft.com/office/powerpoint/2012/main" xmlns:pr="smNativeData" xmlns="smNativeData" val="SMDATA_15_l3DXYhMAAAAlAAAAZAAAAA8BAAAAkAAAAEgAAACQAAAASAAAAAAAAAABAAAAAAAAAAEAAABQAAAAAAAAAAAA4D8AAAAAAADgPwAAAAAAAOA/AAAAAAAA4D8AAAAAAADgPwAAAAAAAOA/AAAAAAAA4D8AAAAAAADgPwAAAAAAAOA/AAAAAAAA4D8CAAAAjAAAAAAAAAAAAAAAADOZDCYmJggAAAAAAAAAAAAAAAAAAAAAAAAAAAAAAAAAAAAAZAAAAAEAAABAAAAAAAAAAAAAAAAAAAAAAAAAAAAAAAAAAAAAAAAAAAAAAAAAAAAAAAAAAAAAAAAAAAAAAAAAAAAAAAAAAAAAAAAAAAAAAAAAAAAAAAAAAAAAAAAAAAAAFAAAADwAAAAAAAAAAAAAAP///wkUAAAAAQAAABQAAAAUAAAAFAAAAAEAAAAAAAAAZAAAAGQAAAAAAAAAZAAAAGQAAAAVAAAAYAAAAAAAAAAAAAAADwAAACADAAAAAAAAAAAAAAEAAACgMgAAVgcAAKr4//8BAAAAf39/AAEAAABkAAAAAAAAABQAAABAHwAAAAAAACYAAAAAAAAAwOD//wAAAAAmAAAAZAAAABYAAABMAAAAAAAAAAAAAAAEAAAAAAAAAAEAAAAzZpkKAAAAACgAAAAoAAAAZAAAAGQAAAAAAAAAzMzMAAAAAABQAAAAUAAAAGQAAABkAAAAAAAAABcAAAAUAAAAAAAAAAAAAAD/fwAA/38AAAAAAAAJAAAABAAAAAAAAAAeAAAAaAAAAAAAAAAAAAAAAAAAAAAAAAAAAAAAECcAABAnAAAAAAAAAAAAAAAAAAAAAAAAAAAAAAAAAAAAAAAAAAAAABQAAAAAAAAAwMD/AAAAAABkAAAAMgAAAAAAAABkAAAAAAAAAH9/fwAKAAAAIgAAABgAAAAAAAAAAAAAAAAAAAAAAAAAAAAAAAAAAAAkAAAAJAAAAAAAAAAHAAAAAAAAAAAAAAAAAAAAAAAAAAAAAAAAAAAAf39/ACUAAABYAAAAAAAAAAAAAAAAAAAAAAAAAAAAAAAAAAAAAAAAAAAAAAAAAAAAAAAAAAAAAAA/AAAAAAAAAKCGAQAAAAAAAAAAAAAAAAAMAAAAAQAAAAAAAAAAAAAAAAAAAB8AAABUAAAAAAAABQAAAAEAAAAAAAAAAAAAAAAAAAAAAAAAAAAAAAAAAAAAAAAAAAAAAAJ/f38AAAAAA8zMzADAwP8Af39/AAAAAAAAAAAAAAAAAAAAAAAAAAAAIQAAABgAAAAUAAAAwAMAABsnAAA/FQAAWSkAABAAAAAmAAAACAAAAAAAAAAAAAAA"/>
+                <pr:smNativeData xmlns="smNativeData" xmlns:pr="smNativeData" xmlns:p15="http://schemas.microsoft.com/office/powerpoint/2012/main" xmlns:p14="http://schemas.microsoft.com/office/powerpoint/2010/main" xmlns:mc="http://schemas.openxmlformats.org/markup-compatibility/2006" val="SMDATA_15_l3DXYhMAAAAlAAAAZAAAAA8BAAAAkAAAAEgAAACQAAAASAAAAAAAAAABAAAAAAAAAAEAAABQAAAAAAAAAAAA4D8AAAAAAADgPwAAAAAAAOA/AAAAAAAA4D8AAAAAAADgPwAAAAAAAOA/AAAAAAAA4D8AAAAAAADgPwAAAAAAAOA/AAAAAAAA4D8CAAAAjAAAAAAAAAAAAAAAADOZDCYmJggAAAAAAAAAAAAAAAAAAAAAAAAAAAAAAAAAAAAAZAAAAAEAAABAAAAAAAAAAAAAAAAAAAAAAAAAAAAAAAAAAAAAAAAAAAAAAAAAAAAAAAAAAAAAAAAAAAAAAAAAAAAAAAAAAAAAAAAAAAAAAAAAAAAAAAAAAAAAAAAAAAAAFAAAADwAAAAAAAAAAAAAAP///wkUAAAAAQAAABQAAAAUAAAAFAAAAAEAAAAAAAAAZAAAAGQAAAAAAAAAZAAAAGQAAAAVAAAAYAAAAAAAAAAAAAAADwAAACADAAAAAAAAAAAAAAEAAACgMgAAVgcAAKr4//8BAAAAf39/AAEAAABkAAAAAAAAABQAAABAHwAAAAAAACYAAAAAAAAAwOD//wAAAAAmAAAAZAAAABYAAABMAAAAAAAAAAAAAAAEAAAAAAAAAAEAAAAzZpkKAAAAACgAAAAoAAAAZAAAAGQAAAAAAAAAzMzMAAAAAABQAAAAUAAAAGQAAABkAAAAAAAAABcAAAAUAAAAAAAAAAAAAAD/fwAA/38AAAAAAAAJAAAABAAAAAAAAAAeAAAAaAAAAAAAAAAAAAAAAAAAAAAAAAAAAAAAECcAABAnAAAAAAAAAAAAAAAAAAAAAAAAAAAAAAAAAAAAAAAAAAAAABQAAAAAAAAAwMD/AAAAAABkAAAAMgAAAAAAAABkAAAAAAAAAH9/fwAKAAAAIgAAABgAAAAAAAAAAAAAAAAAAAAAAAAAAAAAAAAAAAAkAAAAJAAAAAAAAAAHAAAAAAAAAAAAAAAAAAAAAAAAAAAAAAAAAAAAf39/ACUAAABYAAAAAAAAAAAAAAAAAAAAAAAAAAAAAAAAAAAAAAAAAAAAAAAAAAAAAAAAAAAAAAA/AAAAAAAAAKCGAQAAAAAAAAAAAAAAAAAMAAAAAQAAAAAAAAAAAAAAAAAAAB8AAABUAAAAAAAABQAAAAEAAAAAAAAAAAAAAAAAAAAAAAAAAAAAAAAAAAAAAAAAAAAAAAJ/f38AAAAAA8zMzADAwP8Af39/AAAAAAAAAAAAAAAAAAAAAAAAAAAAIQAAABgAAAAUAAAAwAMAABsnAAA/FQAAWSkAABAAAAAmAAAACAAAAAAAAAAAAAAA"/>
               </a:ext>
             </a:extLst>
           </p:cNvSpPr>
@@ -1172,7 +1185,7 @@
           <a:lstStyle/>
           <a:p>
             <a:fld id="{2B84FE9E-D0C6-D108-883C-265DB0727E73}" type="datetime1">
-              <a:t>21/07/2022</a:t>
+              <a:t>26/07/2022</a:t>
             </a:fld>
             <a:endParaRPr/>
           </a:p>
@@ -1185,7 +1198,7 @@
             <a:spLocks noGrp="1" noChangeArrowheads="1"/>
             <a:extLst>
               <a:ext uri="smNativeData">
-                <pr:smNativeData xmlns:mc="http://schemas.openxmlformats.org/markup-compatibility/2006" xmlns:p14="http://schemas.microsoft.com/office/powerpoint/2010/main" xmlns:p15="http://schemas.microsoft.com/office/powerpoint/2012/main" xmlns:pr="smNativeData" xmlns="smNativeData" val="SMDATA_15_l3DXYhMAAAAlAAAAZAAAAA8BAAAAkAAAAEgAAACQAAAASAAAAAAAAAABAAAAAAAAAAEAAABQAAAAAAAAAAAA4D8AAAAAAADgPwAAAAAAAOA/AAAAAAAA4D8AAAAAAADgPwAAAAAAAOA/AAAAAAAA4D8AAAAAAADgPwAAAAAAAOA/AAAAAAAA4D8CAAAAjAAAAAAAAAAAAAAAADOZDCYmJggAAAAAAAAAAAAAAAAAAAAAAAAAAAAAAAAAAAAAZAAAAAEAAABAAAAAAAAAAAAAAAAAAAAAAAAAAAAAAAAAAAAAAAAAAAAAAAAAAAAAAAAAAAAAAAAAAAAAAAAAAAAAAAAAAAAAAAAAAAAAAAAAAAAAAAAAAAAAAAAAAAAAFAAAADwAAAAAAAAAAAAAAP///wkUAAAAAQAAABQAAAAUAAAAFAAAAAEAAAAAAAAAZAAAAGQAAAAAAAAAZAAAAGQAAAAVAAAAYAAAAAAAAAAAAAAADwAAACADAAAAAAAAAAAAAAEAAACgMgAAVgcAAKr4//8BAAAAf39/AAEAAABkAAAAAAAAABQAAABAHwAAAAAAACYAAAAAAAAAwOD//wAAAAAmAAAAZAAAABYAAABMAAAAAAAAAAAAAAAEAAAAAAAAAAEAAAAzZpkKAAAAACgAAAAoAAAAZAAAAGQAAAAAAAAAzMzMAAAAAABQAAAAUAAAAGQAAABkAAAAAAAAABcAAAAUAAAAAAAAAAAAAAD/fwAA/38AAAAAAAAJAAAABAAAANw7IAEeAAAAaAAAAAAAAAAAAAAAAAAAAAAAAAAAAAAAECcAABAnAAAAAAAAAAAAAAAAAAAAAAAAAAAAAAAAAAAAAAAAAAAAABQAAAAAAAAAwMD/AAAAAABkAAAAMgAAAAAAAABkAAAAAAAAAH9/fwAKAAAAIgAAABgAAAAAAAAAAAAAAAAAAAAAAAAAAAAAAAAAAAAkAAAAJAAAAAAAAAAHAAAAAAAAAAAAAAAAAAAAAAAAAAAAAAAAAAAAf39/ACUAAABYAAAAAAAAAAAAAAAAAAAAAAAAAAAAAAAAAAAAAAAAAAAAAAAAAAAAAAAAAAAAAAA/AAAAAAAAAKCGAQAAAAAAAAAAAAAAAAAMAAAAAQAAAAAAAAAAAAAAAAAAAB8AAABUAAAAAAAABQAAAAEAAAAAAAAAAAAAAAAAAAAAAAAAAAAAAAAAAAAAAAAAAAAAAAJ/f38AAAAAA8zMzADAwP8Af39/AAAAAAAAAAAAAAAAAAAAAAAAAAAAIQAAABgAAAAUAAAAoRkAABsnAABfMQAAWSkAABAAAAAmAAAACAAAAAAAAAAAAAAA"/>
+                <pr:smNativeData xmlns="smNativeData" xmlns:pr="smNativeData" xmlns:p15="http://schemas.microsoft.com/office/powerpoint/2012/main" xmlns:p14="http://schemas.microsoft.com/office/powerpoint/2010/main" xmlns:mc="http://schemas.openxmlformats.org/markup-compatibility/2006" val="SMDATA_15_l3DXYhMAAAAlAAAAZAAAAA8BAAAAkAAAAEgAAACQAAAASAAAAAAAAAABAAAAAAAAAAEAAABQAAAAAAAAAAAA4D8AAAAAAADgPwAAAAAAAOA/AAAAAAAA4D8AAAAAAADgPwAAAAAAAOA/AAAAAAAA4D8AAAAAAADgPwAAAAAAAOA/AAAAAAAA4D8CAAAAjAAAAAAAAAAAAAAAADOZDCYmJggAAAAAAAAAAAAAAAAAAAAAAAAAAAAAAAAAAAAAZAAAAAEAAABAAAAAAAAAAAAAAAAAAAAAAAAAAAAAAAAAAAAAAAAAAAAAAAAAAAAAAAAAAAAAAAAAAAAAAAAAAAAAAAAAAAAAAAAAAAAAAAAAAAAAAAAAAAAAAAAAAAAAFAAAADwAAAAAAAAAAAAAAP///wkUAAAAAQAAABQAAAAUAAAAFAAAAAEAAAAAAAAAZAAAAGQAAAAAAAAAZAAAAGQAAAAVAAAAYAAAAAAAAAAAAAAADwAAACADAAAAAAAAAAAAAAEAAACgMgAAVgcAAKr4//8BAAAAf39/AAEAAABkAAAAAAAAABQAAABAHwAAAAAAACYAAAAAAAAAwOD//wAAAAAmAAAAZAAAABYAAABMAAAAAAAAAAAAAAAEAAAAAAAAAAEAAAAzZpkKAAAAACgAAAAoAAAAZAAAAGQAAAAAAAAAzMzMAAAAAABQAAAAUAAAAGQAAABkAAAAAAAAABcAAAAUAAAAAAAAAAAAAAD/fwAA/38AAAAAAAAJAAAABAAAANw7IAEeAAAAaAAAAAAAAAAAAAAAAAAAAAAAAAAAAAAAECcAABAnAAAAAAAAAAAAAAAAAAAAAAAAAAAAAAAAAAAAAAAAAAAAABQAAAAAAAAAwMD/AAAAAABkAAAAMgAAAAAAAABkAAAAAAAAAH9/fwAKAAAAIgAAABgAAAAAAAAAAAAAAAAAAAAAAAAAAAAAAAAAAAAkAAAAJAAAAAAAAAAHAAAAAAAAAAAAAAAAAAAAAAAAAAAAAAAAAAAAf39/ACUAAABYAAAAAAAAAAAAAAAAAAAAAAAAAAAAAAAAAAAAAAAAAAAAAAAAAAAAAAAAAAAAAAA/AAAAAAAAAKCGAQAAAAAAAAAAAAAAAAAMAAAAAQAAAAAAAAAAAAAAAAAAAB8AAABUAAAAAAAABQAAAAEAAAAAAAAAAAAAAAAAAAAAAAAAAAAAAAAAAAAAAAAAAAAAAAJ/f38AAAAAA8zMzADAwP8Af39/AAAAAAAAAAAAAAAAAAAAAAAAAAAAIQAAABgAAAAUAAAAoRkAABsnAABfMQAAWSkAABAAAAAmAAAACAAAAAAAAAAAAAAA"/>
               </a:ext>
             </a:extLst>
           </p:cNvSpPr>
@@ -1209,7 +1222,7 @@
             <a:spLocks noGrp="1" noChangeArrowheads="1"/>
             <a:extLst>
               <a:ext uri="smNativeData">
-                <pr:smNativeData xmlns:mc="http://schemas.openxmlformats.org/markup-compatibility/2006" xmlns:p14="http://schemas.microsoft.com/office/powerpoint/2010/main" xmlns:p15="http://schemas.microsoft.com/office/powerpoint/2012/main" xmlns:pr="smNativeData" xmlns="smNativeData" val="SMDATA_15_l3DXYhMAAAAlAAAAZAAAAA8BAAAAkAAAAEgAAACQAAAASAAAAAAAAAABAAAAAAAAAAEAAABQAAAAAAAAAAAA4D8AAAAAAADgPwAAAAAAAOA/AAAAAAAA4D8AAAAAAADgPwAAAAAAAOA/AAAAAAAA4D8AAAAAAADgPwAAAAAAAOA/AAAAAAAA4D8CAAAAjAAAAAAAAAAAAAAAADOZDCYmJggAAAAAAAAAAAAAAAAAAAAAAAAAAAAAAAAAAAAAZAAAAAEAAABAAAAAAAAAAAAAAAAAAAAAAAAAAAAAAAAAAAAAAAAAAAAAAAAAAAAAAAAAAAAAAAAAAAAAAAAAAAAAAAAAAAAAAAAAAAAAAAAAAAAAAAAAAAAAAAAAAAAAFAAAADwAAAAAAAAAAAAAAP///wkUAAAAAQAAABQAAAAUAAAAFAAAAAEAAAAAAAAAZAAAAGQAAAAAAAAAZAAAAGQAAAAVAAAAYAAAAAAAAAAAAAAADwAAACADAAAAAAAAAAAAAAEAAACgMgAAVgcAAKr4//8BAAAAf39/AAEAAABkAAAAAAAAABQAAABAHwAAAAAAACYAAAAAAAAAwOD//wAAAAAmAAAAZAAAABYAAABMAAAAAAAAAAAAAAAEAAAAAAAAAAEAAAAzZpkKAAAAACgAAAAoAAAAZAAAAGQAAAAAAAAAzMzMAAAAAABQAAAAUAAAAGQAAABkAAAAAAAAABcAAAAUAAAAAAAAAAAAAAD/fwAA/38AAAAAAAAJAAAABAAAANw7IAEeAAAAaAAAAAAAAAAAAAAAAAAAAAAAAAAAAAAAECcAABAnAAAAAAAAAAAAAAAAAAAAAAAAAAAAAAAAAAAAAAAAAAAAABQAAAAAAAAAwMD/AAAAAABkAAAAMgAAAAAAAABkAAAAAAAAAH9/fwAKAAAAIgAAABgAAAAAAAAAAAAAAAAAAAAAAAAAAAAAAAAAAAAkAAAAJAAAAAAAAAAHAAAAAAAAAAAAAAAAAAAAAAAAAAAAAAAAAAAAf39/ACUAAABYAAAAAAAAAAAAAAAAAAAAAAAAAAAAAAAAAAAAAAAAAAAAAAAAAAAAAAAAAAAAAAA/AAAAAAAAAKCGAQAAAAAAAAAAAAAAAAAMAAAAAQAAAAAAAAAAAAAAAAAAAB8AAABUAAAAAAAABQAAAAEAAAAAAAAAAAAAAAAAAAAAAAAAAAAAAAAAAAAAAAAAAAAAAAJ/f38AAAAAA8zMzADAwP8Af39/AAAAAAAAAAAAAAAAAAAAAAAAAAAAIQAAABgAAAAUAAAAwTUAABsnAABARwAAWSkAABAAAAAmAAAACAAAAAAAAAAAAAAA"/>
+                <pr:smNativeData xmlns="smNativeData" xmlns:pr="smNativeData" xmlns:p15="http://schemas.microsoft.com/office/powerpoint/2012/main" xmlns:p14="http://schemas.microsoft.com/office/powerpoint/2010/main" xmlns:mc="http://schemas.openxmlformats.org/markup-compatibility/2006" val="SMDATA_15_l3DXYhMAAAAlAAAAZAAAAA8BAAAAkAAAAEgAAACQAAAASAAAAAAAAAABAAAAAAAAAAEAAABQAAAAAAAAAAAA4D8AAAAAAADgPwAAAAAAAOA/AAAAAAAA4D8AAAAAAADgPwAAAAAAAOA/AAAAAAAA4D8AAAAAAADgPwAAAAAAAOA/AAAAAAAA4D8CAAAAjAAAAAAAAAAAAAAAADOZDCYmJggAAAAAAAAAAAAAAAAAAAAAAAAAAAAAAAAAAAAAZAAAAAEAAABAAAAAAAAAAAAAAAAAAAAAAAAAAAAAAAAAAAAAAAAAAAAAAAAAAAAAAAAAAAAAAAAAAAAAAAAAAAAAAAAAAAAAAAAAAAAAAAAAAAAAAAAAAAAAAAAAAAAAFAAAADwAAAAAAAAAAAAAAP///wkUAAAAAQAAABQAAAAUAAAAFAAAAAEAAAAAAAAAZAAAAGQAAAAAAAAAZAAAAGQAAAAVAAAAYAAAAAAAAAAAAAAADwAAACADAAAAAAAAAAAAAAEAAACgMgAAVgcAAKr4//8BAAAAf39/AAEAAABkAAAAAAAAABQAAABAHwAAAAAAACYAAAAAAAAAwOD//wAAAAAmAAAAZAAAABYAAABMAAAAAAAAAAAAAAAEAAAAAAAAAAEAAAAzZpkKAAAAACgAAAAoAAAAZAAAAGQAAAAAAAAAzMzMAAAAAABQAAAAUAAAAGQAAABkAAAAAAAAABcAAAAUAAAAAAAAAAAAAAD/fwAA/38AAAAAAAAJAAAABAAAANw7IAEeAAAAaAAAAAAAAAAAAAAAAAAAAAAAAAAAAAAAECcAABAnAAAAAAAAAAAAAAAAAAAAAAAAAAAAAAAAAAAAAAAAAAAAABQAAAAAAAAAwMD/AAAAAABkAAAAMgAAAAAAAABkAAAAAAAAAH9/fwAKAAAAIgAAABgAAAAAAAAAAAAAAAAAAAAAAAAAAAAAAAAAAAAkAAAAJAAAAAAAAAAHAAAAAAAAAAAAAAAAAAAAAAAAAAAAAAAAAAAAf39/ACUAAABYAAAAAAAAAAAAAAAAAAAAAAAAAAAAAAAAAAAAAAAAAAAAAAAAAAAAAAAAAAAAAAA/AAAAAAAAAKCGAQAAAAAAAAAAAAAAAAAMAAAAAQAAAAAAAAAAAAAAAAAAAB8AAABUAAAAAAAABQAAAAEAAAAAAAAAAAAAAAAAAAAAAAAAAAAAAAAAAAAAAAAAAAAAAAJ/f38AAAAAA8zMzADAwP8Af39/AAAAAAAAAAAAAAAAAAAAAAAAAAAAIQAAABgAAAAUAAAAwTUAABsnAABARwAAWSkAABAAAAAmAAAACAAAAAAAAAAAAAAA"/>
               </a:ext>
             </a:extLst>
           </p:cNvSpPr>
@@ -1262,7 +1275,7 @@
             <a:spLocks noGrp="1" noChangeArrowheads="1"/>
             <a:extLst>
               <a:ext uri="smNativeData">
-                <pr:smNativeData xmlns:mc="http://schemas.openxmlformats.org/markup-compatibility/2006" xmlns:p14="http://schemas.microsoft.com/office/powerpoint/2010/main" xmlns:p15="http://schemas.microsoft.com/office/powerpoint/2012/main" xmlns:pr="smNativeData" xmlns="smNativeData" val="SMDATA_15_l3DXYhMAAAAlAAAAZAAAAA8BAAAAkAAAAEgAAACQAAAASAAAAAAAAAABAAAAAAAAAAEAAABQAAAAAAAAAAAA4D8AAAAAAADgPwAAAAAAAOA/AAAAAAAA4D8AAAAAAADgPwAAAAAAAOA/AAAAAAAA4D8AAAAAAADgPwAAAAAAAOA/AAAAAAAA4D8CAAAAjAAAAAAAAAAAAAAAADOZDCYmJggAAAAAAAAAAAAAAAAAAAAAAAAAAAAAAAAAAAAAZAAAAAEAAABAAAAAAAAAAAAAAAAAAAAAAAAAAAAAAAAAAAAAAAAAAAAAAAAAAAAAAAAAAAAAAAAAAAAAAAAAAAAAAAAAAAAAAAAAAAAAAAAAAAAAAAAAAAAAAAAAAAAAFAAAADwAAAAAAAAAAAAAAP///wkUAAAAAQAAABQAAAAUAAAAFAAAAAEAAAAAAAAAZAAAAGQAAAAAAAAAZAAAAGQAAAAVAAAAYAAAAAAAAAAAAAAADwAAACADAAAAAAAAAAAAAAEAAACgMgAAVgcAAKr4//8BAAAAf39/AAEAAABkAAAAAAAAABQAAABAHwAAAAAAACYAAAAAAAAAwOD//wAAAAAmAAAAZAAAABYAAABMAAAAAAAAAAAAAAAEAAAAAAAAAAEAAAAzZpkKAAAAACgAAAAoAAAAZAAAAGQAAAAAAAAAzMzMAAAAAABQAAAAUAAAAGQAAABkAAAAAAAAABcAAAAUAAAAAAAAAAAAAAD/fwAA/38AAAAAAAAJAAAABAAAANw7IAEeAAAAaAAAAAAAAAAAAAAAAAAAAAAAAAAAAAAAECcAABAnAAAAAAAAAAAAAAAAAAAAAAAAAAAAAAAAAAAAAAAAAAAAABQAAAAAAAAAwMD/AAAAAABkAAAAMgAAAAAAAABkAAAAAAAAAH9/fwAKAAAAIgAAABgAAAAAAAAAAAAAAAAAAAAAAAAAAAAAAAAAAAAkAAAAJAAAAAAAAAAHAAAAAAAAAAAAAAAAAAAAAAAAAAAAAAAAAAAAf39/ACUAAABYAAAAAAAAAAAAAAAAAAAAAAAAAAAAAAAAAAAAAAAAAAAAAAAAAAAAAAAAAAAAAAA/AAAAAAAAAKCGAQAAAAAAAAAAAAAAAAAMAAAAAQAAAAAAAAAAAAAAAAAAAB8AAABUAAAAAAAABQAAAAEAAAAAAAAAAAAAAAAAAAAAAAAAAAAAAAAAAAAAAAAAAAAAAAJ/f38AAAAAA8zMzADAwP8Af39/AAAAAAAAAAAAAAAAAAAAAAAAAAAAIQAAABgAAAAUAAAAwAMAALABAABARwAAuAgAABAAAAAmAAAACAAAAAAAAAAAAAAA"/>
+                <pr:smNativeData xmlns="smNativeData" xmlns:pr="smNativeData" xmlns:p15="http://schemas.microsoft.com/office/powerpoint/2012/main" xmlns:p14="http://schemas.microsoft.com/office/powerpoint/2010/main" xmlns:mc="http://schemas.openxmlformats.org/markup-compatibility/2006" val="SMDATA_15_l3DXYhMAAAAlAAAAZAAAAA8BAAAAkAAAAEgAAACQAAAASAAAAAAAAAABAAAAAAAAAAEAAABQAAAAAAAAAAAA4D8AAAAAAADgPwAAAAAAAOA/AAAAAAAA4D8AAAAAAADgPwAAAAAAAOA/AAAAAAAA4D8AAAAAAADgPwAAAAAAAOA/AAAAAAAA4D8CAAAAjAAAAAAAAAAAAAAAADOZDCYmJggAAAAAAAAAAAAAAAAAAAAAAAAAAAAAAAAAAAAAZAAAAAEAAABAAAAAAAAAAAAAAAAAAAAAAAAAAAAAAAAAAAAAAAAAAAAAAAAAAAAAAAAAAAAAAAAAAAAAAAAAAAAAAAAAAAAAAAAAAAAAAAAAAAAAAAAAAAAAAAAAAAAAFAAAADwAAAAAAAAAAAAAAP///wkUAAAAAQAAABQAAAAUAAAAFAAAAAEAAAAAAAAAZAAAAGQAAAAAAAAAZAAAAGQAAAAVAAAAYAAAAAAAAAAAAAAADwAAACADAAAAAAAAAAAAAAEAAACgMgAAVgcAAKr4//8BAAAAf39/AAEAAABkAAAAAAAAABQAAABAHwAAAAAAACYAAAAAAAAAwOD//wAAAAAmAAAAZAAAABYAAABMAAAAAAAAAAAAAAAEAAAAAAAAAAEAAAAzZpkKAAAAACgAAAAoAAAAZAAAAGQAAAAAAAAAzMzMAAAAAABQAAAAUAAAAGQAAABkAAAAAAAAABcAAAAUAAAAAAAAAAAAAAD/fwAA/38AAAAAAAAJAAAABAAAANw7IAEeAAAAaAAAAAAAAAAAAAAAAAAAAAAAAAAAAAAAECcAABAnAAAAAAAAAAAAAAAAAAAAAAAAAAAAAAAAAAAAAAAAAAAAABQAAAAAAAAAwMD/AAAAAABkAAAAMgAAAAAAAABkAAAAAAAAAH9/fwAKAAAAIgAAABgAAAAAAAAAAAAAAAAAAAAAAAAAAAAAAAAAAAAkAAAAJAAAAAAAAAAHAAAAAAAAAAAAAAAAAAAAAAAAAAAAAAAAAAAAf39/ACUAAABYAAAAAAAAAAAAAAAAAAAAAAAAAAAAAAAAAAAAAAAAAAAAAAAAAAAAAAAAAAAAAAA/AAAAAAAAAKCGAQAAAAAAAAAAAAAAAAAMAAAAAQAAAAAAAAAAAAAAAAAAAB8AAABUAAAAAAAABQAAAAEAAAAAAAAAAAAAAAAAAAAAAAAAAAAAAAAAAAAAAAAAAAAAAAJ/f38AAAAAA8zMzADAwP8Af39/AAAAAAAAAAAAAAAAAAAAAAAAAAAAIQAAABgAAAAUAAAAwAMAALABAABARwAAuAgAABAAAAAmAAAACAAAAAAAAAAAAAAA"/>
               </a:ext>
             </a:extLst>
           </p:cNvSpPr>
@@ -1288,7 +1301,7 @@
             <a:spLocks noGrp="1" noChangeArrowheads="1"/>
             <a:extLst>
               <a:ext uri="smNativeData">
-                <pr:smNativeData xmlns:mc="http://schemas.openxmlformats.org/markup-compatibility/2006" xmlns:p14="http://schemas.microsoft.com/office/powerpoint/2010/main" xmlns:p15="http://schemas.microsoft.com/office/powerpoint/2012/main" xmlns:pr="smNativeData" xmlns="smNativeData" val="SMDATA_15_l3DXYhMAAAAlAAAAZAAAAA8BAAAAkAAAAEgAAACQAAAASAAAAAAAAAAAAAAAAAAAAAEAAABQAAAAAAAAAAAA4D8AAAAAAADgPwAAAAAAAOA/AAAAAAAA4D8AAAAAAADgPwAAAAAAAOA/AAAAAAAA4D8AAAAAAADgPwAAAAAAAOA/AAAAAAAA4D8CAAAAjAAAAAAAAAAAAAAAADOZDCYmJggAAAAAAAAAAAAAAAAAAAAAAAAAAAAAAAAAAAAAZAAAAAEAAABAAAAAAAAAAAAAAAAAAAAAAAAAAAAAAAAAAAAAAAAAAAAAAAAAAAAAAAAAAAAAAAAAAAAAAAAAAAAAAAAAAAAAAAAAAAAAAAAAAAAAAAAAAAAAAAAAAAAAFAAAADwAAAAAAAAAAAAAAP///wkUAAAAAQAAABQAAAAUAAAAFAAAAAEAAAAAAAAAZAAAAGQAAAAAAAAAZAAAAGQAAAAVAAAAYAAAAAAAAAAAAAAADwAAACADAAAAAAAAAAAAAAEAAACgMgAAVgcAAKr4//8BAAAAf39/AAEAAABkAAAAAAAAABQAAABAHwAAAAAAACYAAAAAAAAAwOD//wAAAAAmAAAAZAAAABYAAABMAAAAAAAAAAAAAAAEAAAAAAAAAAEAAAAzZpkKAAAAACgAAAAoAAAAZAAAAGQAAAAAAAAAzMzMAAAAAABQAAAAUAAAAGQAAABkAAAAAAAAABcAAAAUAAAAAAAAAAAAAAD/fwAA/38AAAAAAAAJAAAABAAAANw7IAEeAAAAaAAAAAAAAAAAAAAAAAAAAAAAAAAAAAAAECcAABAnAAAAAAAAAAAAAAAAAAAAAAAAAAAAAAAAAAAAAAAAAAAAABQAAAAAAAAAwMD/AAAAAABkAAAAMgAAAAAAAABkAAAAAAAAAH9/fwAKAAAAIgAAABgAAAAAAAAAAAAAAAAAAAAAAAAAAAAAAAAAAAAkAAAAJAAAAAAAAAAHAAAAAAAAAAAAAAAAAAAAAAAAAAAAAAAAAAAAf39/ACUAAABYAAAAAAAAAAAAAAAAAAAAAAAAAAAAAAAAAAAAAAAAAAAAAAAAAAAAAAAAAAAAAAA/AAAAAAAAAKCGAQAAAAAAAAAAAAAAAAAMAAAAAQAAAAAAAAAAAAAAAAAAAB8AAABUAAAAAAAABQAAAAEAAAAAAAAAAAAAAAAAAAAAAAAAAAAAAAAAAAAAAAAAAAAAAAJ/f38AAAAAA8zMzADAwP8Af39/AAAAAAAAAAAAAAAAAAAAAAAAAAAAIQAAABgAAAAUAAAAwAMAANgJAADhJAAAsCUAABAAAAAmAAAACAAAAAGAAAAAAAAA"/>
+                <pr:smNativeData xmlns="smNativeData" xmlns:pr="smNativeData" xmlns:p15="http://schemas.microsoft.com/office/powerpoint/2012/main" xmlns:p14="http://schemas.microsoft.com/office/powerpoint/2010/main" xmlns:mc="http://schemas.openxmlformats.org/markup-compatibility/2006" val="SMDATA_15_l3DXYhMAAAAlAAAAZAAAAA8BAAAAkAAAAEgAAACQAAAASAAAAAAAAAAAAAAAAAAAAAEAAABQAAAAAAAAAAAA4D8AAAAAAADgPwAAAAAAAOA/AAAAAAAA4D8AAAAAAADgPwAAAAAAAOA/AAAAAAAA4D8AAAAAAADgPwAAAAAAAOA/AAAAAAAA4D8CAAAAjAAAAAAAAAAAAAAAADOZDCYmJggAAAAAAAAAAAAAAAAAAAAAAAAAAAAAAAAAAAAAZAAAAAEAAABAAAAAAAAAAAAAAAAAAAAAAAAAAAAAAAAAAAAAAAAAAAAAAAAAAAAAAAAAAAAAAAAAAAAAAAAAAAAAAAAAAAAAAAAAAAAAAAAAAAAAAAAAAAAAAAAAAAAAFAAAADwAAAAAAAAAAAAAAP///wkUAAAAAQAAABQAAAAUAAAAFAAAAAEAAAAAAAAAZAAAAGQAAAAAAAAAZAAAAGQAAAAVAAAAYAAAAAAAAAAAAAAADwAAACADAAAAAAAAAAAAAAEAAACgMgAAVgcAAKr4//8BAAAAf39/AAEAAABkAAAAAAAAABQAAABAHwAAAAAAACYAAAAAAAAAwOD//wAAAAAmAAAAZAAAABYAAABMAAAAAAAAAAAAAAAEAAAAAAAAAAEAAAAzZpkKAAAAACgAAAAoAAAAZAAAAGQAAAAAAAAAzMzMAAAAAABQAAAAUAAAAGQAAABkAAAAAAAAABcAAAAUAAAAAAAAAAAAAAD/fwAA/38AAAAAAAAJAAAABAAAANw7IAEeAAAAaAAAAAAAAAAAAAAAAAAAAAAAAAAAAAAAECcAABAnAAAAAAAAAAAAAAAAAAAAAAAAAAAAAAAAAAAAAAAAAAAAABQAAAAAAAAAwMD/AAAAAABkAAAAMgAAAAAAAABkAAAAAAAAAH9/fwAKAAAAIgAAABgAAAAAAAAAAAAAAAAAAAAAAAAAAAAAAAAAAAAkAAAAJAAAAAAAAAAHAAAAAAAAAAAAAAAAAAAAAAAAAAAAAAAAAAAAf39/ACUAAABYAAAAAAAAAAAAAAAAAAAAAAAAAAAAAAAAAAAAAAAAAAAAAAAAAAAAAAAAAAAAAAA/AAAAAAAAAKCGAQAAAAAAAAAAAAAAAAAMAAAAAQAAAAAAAAAAAAAAAAAAAB8AAABUAAAAAAAABQAAAAEAAAAAAAAAAAAAAAAAAAAAAAAAAAAAAAAAAAAAAAAAAAAAAAJ/f38AAAAAA8zMzADAwP8Af39/AAAAAAAAAAAAAAAAAAAAAAAAAAAAIQAAABgAAAAUAAAAwAMAANgJAADhJAAAsCUAABAAAAAmAAAACAAAAAGAAAAAAAAA"/>
               </a:ext>
             </a:extLst>
           </p:cNvSpPr>
@@ -1371,7 +1384,7 @@
             <a:spLocks noGrp="1" noChangeArrowheads="1"/>
             <a:extLst>
               <a:ext uri="smNativeData">
-                <pr:smNativeData xmlns:mc="http://schemas.openxmlformats.org/markup-compatibility/2006" xmlns:p14="http://schemas.microsoft.com/office/powerpoint/2010/main" xmlns:p15="http://schemas.microsoft.com/office/powerpoint/2012/main" xmlns:pr="smNativeData" xmlns="smNativeData" val="SMDATA_15_l3DXYhMAAAAlAAAAZAAAAA8BAAAAkAAAAEgAAACQAAAASAAAAAAAAAAAAAAAAAAAAAEAAABQAAAAAAAAAAAA4D8AAAAAAADgPwAAAAAAAOA/AAAAAAAA4D8AAAAAAADgPwAAAAAAAOA/AAAAAAAA4D8AAAAAAADgPwAAAAAAAOA/AAAAAAAA4D8CAAAAjAAAAAAAAAAAAAAAADOZDCYmJggAAAAAAAAAAAAAAAAAAAAAAAAAAAAAAAAAAAAAZAAAAAEAAABAAAAAAAAAAAAAAAAAAAAAAAAAAAAAAAAAAAAAAAAAAAAAAAAAAAAAAAAAAAAAAAAAAAAAAAAAAAAAAAAAAAAAAAAAAAAAAAAAAAAAAAAAAAAAAAAAAAAAFAAAADwAAAAAAAAAAAAAAP///wkUAAAAAQAAABQAAAAUAAAAFAAAAAEAAAAAAAAAZAAAAGQAAAAAAAAAZAAAAGQAAAAVAAAAYAAAAAAAAAAAAAAADwAAACADAAAAAAAAAAAAAAEAAACgMgAAVgcAAKr4//8BAAAAf39/AAEAAABkAAAAAAAAABQAAABAHwAAAAAAACYAAAAAAAAAwOD//wAAAAAmAAAAZAAAABYAAABMAAAAAAAAAAAAAAAEAAAAAAAAAAEAAAAzZpkKAAAAACgAAAAoAAAAZAAAAGQAAAAAAAAAzMzMAAAAAABQAAAAUAAAAGQAAABkAAAAAAAAABcAAAAUAAAAAAAAAAAAAAD/fwAA/38AAAAAAAAJAAAABAAAANw7IAEeAAAAaAAAAAAAAAAAAAAAAAAAAAAAAAAAAAAAECcAABAnAAAAAAAAAAAAAAAAAAAAAAAAAAAAAAAAAAAAAAAAAAAAABQAAAAAAAAAwMD/AAAAAABkAAAAMgAAAAAAAABkAAAAAAAAAH9/fwAKAAAAIgAAABgAAAAAAAAAAAAAAAAAAAAAAAAAAAAAAAAAAAAkAAAAJAAAAAAAAAAHAAAAAAAAAAAAAAAAAAAAAAAAAAAAAAAAAAAAf39/ACUAAABYAAAAAAAAAAAAAAAAAAAAAAAAAAAAAAAAAAAAAAAAAAAAAAAAAAAAAAAAAAAAAAA/AAAAAAAAAKCGAQAAAAAAAAAAAAAAAAAMAAAAAQAAAAAAAAAAAAAAAAAAAB8AAABUAAAAAAAABQAAAAEAAAAAAAAAAAAAAAAAAAAAAAAAAAAAAAAAAAAAAAAAAAAAAAJ/f38AAAAAA8zMzADAwP8Af39/AAAAAAAAAAAAAAAAAAAAAAAAAAAAIQAAABgAAAAUAAAAHyYAANgJAABARwAAsCUAABAAAAAmAAAACAAAAAGAAAAAAAAA"/>
+                <pr:smNativeData xmlns="smNativeData" xmlns:pr="smNativeData" xmlns:p15="http://schemas.microsoft.com/office/powerpoint/2012/main" xmlns:p14="http://schemas.microsoft.com/office/powerpoint/2010/main" xmlns:mc="http://schemas.openxmlformats.org/markup-compatibility/2006" val="SMDATA_15_l3DXYhMAAAAlAAAAZAAAAA8BAAAAkAAAAEgAAACQAAAASAAAAAAAAAAAAAAAAAAAAAEAAABQAAAAAAAAAAAA4D8AAAAAAADgPwAAAAAAAOA/AAAAAAAA4D8AAAAAAADgPwAAAAAAAOA/AAAAAAAA4D8AAAAAAADgPwAAAAAAAOA/AAAAAAAA4D8CAAAAjAAAAAAAAAAAAAAAADOZDCYmJggAAAAAAAAAAAAAAAAAAAAAAAAAAAAAAAAAAAAAZAAAAAEAAABAAAAAAAAAAAAAAAAAAAAAAAAAAAAAAAAAAAAAAAAAAAAAAAAAAAAAAAAAAAAAAAAAAAAAAAAAAAAAAAAAAAAAAAAAAAAAAAAAAAAAAAAAAAAAAAAAAAAAFAAAADwAAAAAAAAAAAAAAP///wkUAAAAAQAAABQAAAAUAAAAFAAAAAEAAAAAAAAAZAAAAGQAAAAAAAAAZAAAAGQAAAAVAAAAYAAAAAAAAAAAAAAADwAAACADAAAAAAAAAAAAAAEAAACgMgAAVgcAAKr4//8BAAAAf39/AAEAAABkAAAAAAAAABQAAABAHwAAAAAAACYAAAAAAAAAwOD//wAAAAAmAAAAZAAAABYAAABMAAAAAAAAAAAAAAAEAAAAAAAAAAEAAAAzZpkKAAAAACgAAAAoAAAAZAAAAGQAAAAAAAAAzMzMAAAAAABQAAAAUAAAAGQAAABkAAAAAAAAABcAAAAUAAAAAAAAAAAAAAD/fwAA/38AAAAAAAAJAAAABAAAANw7IAEeAAAAaAAAAAAAAAAAAAAAAAAAAAAAAAAAAAAAECcAABAnAAAAAAAAAAAAAAAAAAAAAAAAAAAAAAAAAAAAAAAAAAAAABQAAAAAAAAAwMD/AAAAAABkAAAAMgAAAAAAAABkAAAAAAAAAH9/fwAKAAAAIgAAABgAAAAAAAAAAAAAAAAAAAAAAAAAAAAAAAAAAAAkAAAAJAAAAAAAAAAHAAAAAAAAAAAAAAAAAAAAAAAAAAAAAAAAAAAAf39/ACUAAABYAAAAAAAAAAAAAAAAAAAAAAAAAAAAAAAAAAAAAAAAAAAAAAAAAAAAAAAAAAAAAAA/AAAAAAAAAKCGAQAAAAAAAAAAAAAAAAAMAAAAAQAAAAAAAAAAAAAAAAAAAB8AAABUAAAAAAAABQAAAAEAAAAAAAAAAAAAAAAAAAAAAAAAAAAAAAAAAAAAAAAAAAAAAAJ/f38AAAAAA8zMzADAwP8Af39/AAAAAAAAAAAAAAAAAAAAAAAAAAAAIQAAABgAAAAUAAAAHyYAANgJAABARwAAsCUAABAAAAAmAAAACAAAAAGAAAAAAAAA"/>
               </a:ext>
             </a:extLst>
           </p:cNvSpPr>
@@ -1454,7 +1467,7 @@
             <a:spLocks noGrp="1" noChangeArrowheads="1"/>
             <a:extLst>
               <a:ext uri="smNativeData">
-                <pr:smNativeData xmlns:mc="http://schemas.openxmlformats.org/markup-compatibility/2006" xmlns:p14="http://schemas.microsoft.com/office/powerpoint/2010/main" xmlns:p15="http://schemas.microsoft.com/office/powerpoint/2012/main" xmlns:pr="smNativeData" xmlns="smNativeData" val="SMDATA_15_l3DXYhMAAAAlAAAAZAAAAA8BAAAAkAAAAEgAAACQAAAASAAAAAAAAAABAAAAAAAAAAEAAABQAAAAAAAAAAAA4D8AAAAAAADgPwAAAAAAAOA/AAAAAAAA4D8AAAAAAADgPwAAAAAAAOA/AAAAAAAA4D8AAAAAAADgPwAAAAAAAOA/AAAAAAAA4D8CAAAAjAAAAAAAAAAAAAAAADOZDCYmJggAAAAAAAAAAAAAAAAAAAAAAAAAAAAAAAAAAAAAZAAAAAEAAABAAAAAAAAAAAAAAAAAAAAAAAAAAAAAAAAAAAAAAAAAAAAAAAAAAAAAAAAAAAAAAAAAAAAAAAAAAAAAAAAAAAAAAAAAAAAAAAAAAAAAAAAAAAAAAAAAAAAAFAAAADwAAAAAAAAAAAAAAP///wkUAAAAAQAAABQAAAAUAAAAFAAAAAEAAAAAAAAAZAAAAGQAAAAAAAAAZAAAAGQAAAAVAAAAYAAAAAAAAAAAAAAADwAAACADAAAAAAAAAAAAAAEAAACgMgAAVgcAAKr4//8BAAAAf39/AAEAAABkAAAAAAAAABQAAABAHwAAAAAAACYAAAAAAAAAwOD//wAAAAAmAAAAZAAAABYAAABMAAAAAAAAAAAAAAAEAAAAAAAAAAEAAAAzZpkKAAAAACgAAAAoAAAAZAAAAGQAAAAAAAAAzMzMAAAAAABQAAAAUAAAAGQAAABkAAAAAAAAABcAAAAUAAAAAAAAAAAAAAD/fwAA/38AAAAAAAAJAAAABAAAANw7IAEeAAAAaAAAAAAAAAAAAAAAAAAAAAAAAAAAAAAAECcAABAnAAAAAAAAAAAAAAAAAAAAAAAAAAAAAAAAAAAAAAAAAAAAABQAAAAAAAAAwMD/AAAAAABkAAAAMgAAAAAAAABkAAAAAAAAAH9/fwAKAAAAIgAAABgAAAAAAAAAAAAAAAAAAAAAAAAAAAAAAAAAAAAkAAAAJAAAAAAAAAAHAAAAAAAAAAAAAAAAAAAAAAAAAAAAAAAAAAAAf39/ACUAAABYAAAAAAAAAAAAAAAAAAAAAAAAAAAAAAAAAAAAAAAAAAAAAAAAAAAAAAAAAAAAAAA/AAAAAAAAAKCGAQAAAAAAAAAAAAAAAAAMAAAAAQAAAAAAAAAAAAAAAAAAAB8AAABUAAAAAAAABQAAAAEAAAAAAAAAAAAAAAAAAAAAAAAAAAAAAAAAAAAAAAAAAAAAAAJ/f38AAAAAA8zMzADAwP8Af39/AAAAAAAAAAAAAAAAAAAAAAAAAAAAIQAAABgAAAAUAAAAwAMAABsnAAA/FQAAWSkAABAAAAAmAAAACAAAAAAAAAAAAAAA"/>
+                <pr:smNativeData xmlns="smNativeData" xmlns:pr="smNativeData" xmlns:p15="http://schemas.microsoft.com/office/powerpoint/2012/main" xmlns:p14="http://schemas.microsoft.com/office/powerpoint/2010/main" xmlns:mc="http://schemas.openxmlformats.org/markup-compatibility/2006" val="SMDATA_15_l3DXYhMAAAAlAAAAZAAAAA8BAAAAkAAAAEgAAACQAAAASAAAAAAAAAABAAAAAAAAAAEAAABQAAAAAAAAAAAA4D8AAAAAAADgPwAAAAAAAOA/AAAAAAAA4D8AAAAAAADgPwAAAAAAAOA/AAAAAAAA4D8AAAAAAADgPwAAAAAAAOA/AAAAAAAA4D8CAAAAjAAAAAAAAAAAAAAAADOZDCYmJggAAAAAAAAAAAAAAAAAAAAAAAAAAAAAAAAAAAAAZAAAAAEAAABAAAAAAAAAAAAAAAAAAAAAAAAAAAAAAAAAAAAAAAAAAAAAAAAAAAAAAAAAAAAAAAAAAAAAAAAAAAAAAAAAAAAAAAAAAAAAAAAAAAAAAAAAAAAAAAAAAAAAFAAAADwAAAAAAAAAAAAAAP///wkUAAAAAQAAABQAAAAUAAAAFAAAAAEAAAAAAAAAZAAAAGQAAAAAAAAAZAAAAGQAAAAVAAAAYAAAAAAAAAAAAAAADwAAACADAAAAAAAAAAAAAAEAAACgMgAAVgcAAKr4//8BAAAAf39/AAEAAABkAAAAAAAAABQAAABAHwAAAAAAACYAAAAAAAAAwOD//wAAAAAmAAAAZAAAABYAAABMAAAAAAAAAAAAAAAEAAAAAAAAAAEAAAAzZpkKAAAAACgAAAAoAAAAZAAAAGQAAAAAAAAAzMzMAAAAAABQAAAAUAAAAGQAAABkAAAAAAAAABcAAAAUAAAAAAAAAAAAAAD/fwAA/38AAAAAAAAJAAAABAAAANw7IAEeAAAAaAAAAAAAAAAAAAAAAAAAAAAAAAAAAAAAECcAABAnAAAAAAAAAAAAAAAAAAAAAAAAAAAAAAAAAAAAAAAAAAAAABQAAAAAAAAAwMD/AAAAAABkAAAAMgAAAAAAAABkAAAAAAAAAH9/fwAKAAAAIgAAABgAAAAAAAAAAAAAAAAAAAAAAAAAAAAAAAAAAAAkAAAAJAAAAAAAAAAHAAAAAAAAAAAAAAAAAAAAAAAAAAAAAAAAAAAAf39/ACUAAABYAAAAAAAAAAAAAAAAAAAAAAAAAAAAAAAAAAAAAAAAAAAAAAAAAAAAAAAAAAAAAAA/AAAAAAAAAKCGAQAAAAAAAAAAAAAAAAAMAAAAAQAAAAAAAAAAAAAAAAAAAB8AAABUAAAAAAAABQAAAAEAAAAAAAAAAAAAAAAAAAAAAAAAAAAAAAAAAAAAAAAAAAAAAAJ/f38AAAAAA8zMzADAwP8Af39/AAAAAAAAAAAAAAAAAAAAAAAAAAAAIQAAABgAAAAUAAAAwAMAABsnAAA/FQAAWSkAABAAAAAmAAAACAAAAAAAAAAAAAAA"/>
               </a:ext>
             </a:extLst>
           </p:cNvSpPr>
@@ -1468,7 +1481,7 @@
           <a:lstStyle/>
           <a:p>
             <a:fld id="{2B849FBA-F4C6-D169-883C-023CD1727E57}" type="datetime1">
-              <a:t>21/07/2022</a:t>
+              <a:t>26/07/2022</a:t>
             </a:fld>
             <a:endParaRPr/>
           </a:p>
@@ -1481,7 +1494,7 @@
             <a:spLocks noGrp="1" noChangeArrowheads="1"/>
             <a:extLst>
               <a:ext uri="smNativeData">
-                <pr:smNativeData xmlns:mc="http://schemas.openxmlformats.org/markup-compatibility/2006" xmlns:p14="http://schemas.microsoft.com/office/powerpoint/2010/main" xmlns:p15="http://schemas.microsoft.com/office/powerpoint/2012/main" xmlns:pr="smNativeData" xmlns="smNativeData" val="SMDATA_15_l3DXYhMAAAAlAAAAZAAAAA8BAAAAkAAAAEgAAACQAAAASAAAAAAAAAABAAAAAAAAAAEAAABQAAAAAAAAAAAA4D8AAAAAAADgPwAAAAAAAOA/AAAAAAAA4D8AAAAAAADgPwAAAAAAAOA/AAAAAAAA4D8AAAAAAADgPwAAAAAAAOA/AAAAAAAA4D8CAAAAjAAAAAAAAAAAAAAAADOZDCYmJggAAAAAAAAAAAAAAAAAAAAAAAAAAAAAAAAAAAAAZAAAAAEAAABAAAAAAAAAAAAAAAAAAAAAAAAAAAAAAAAAAAAAAAAAAAAAAAAAAAAAAAAAAAAAAAAAAAAAAAAAAAAAAAAAAAAAAAAAAAAAAAAAAAAAAAAAAAAAAAAAAAAAFAAAADwAAAAAAAAAAAAAAP///wkUAAAAAQAAABQAAAAUAAAAFAAAAAEAAAAAAAAAZAAAAGQAAAAAAAAAZAAAAGQAAAAVAAAAYAAAAAAAAAAAAAAADwAAACADAAAAAAAAAAAAAAEAAACgMgAAVgcAAKr4//8BAAAAf39/AAEAAABkAAAAAAAAABQAAABAHwAAAAAAACYAAAAAAAAAwOD//wAAAAAmAAAAZAAAABYAAABMAAAAAAAAAAAAAAAEAAAAAAAAAAEAAAAzZpkKAAAAACgAAAAoAAAAZAAAAGQAAAAAAAAAzMzMAAAAAABQAAAAUAAAAGQAAABkAAAAAAAAABcAAAAUAAAAAAAAAAAAAAD/fwAA/38AAAAAAAAJAAAABAAAANw7IAEeAAAAaAAAAAAAAAAAAAAAAAAAAAAAAAAAAAAAECcAABAnAAAAAAAAAAAAAAAAAAAAAAAAAAAAAAAAAAAAAAAAAAAAABQAAAAAAAAAwMD/AAAAAABkAAAAMgAAAAAAAABkAAAAAAAAAH9/fwAKAAAAIgAAABgAAAAAAAAAAAAAAAAAAAAAAAAAAAAAAAAAAAAkAAAAJAAAAAAAAAAHAAAAAAAAAAAAAAAAAAAAAAAAAAAAAAAAAAAAf39/ACUAAABYAAAAAAAAAAAAAAAAAAAAAAAAAAAAAAAAAAAAAAAAAAAAAAAAAAAAAAAAAAAAAAA/AAAAAAAAAKCGAQAAAAAAAAAAAAAAAAAMAAAAAQAAAAAAAAAAAAAAAAAAAB8AAABUAAAAAAAABQAAAAEAAAAAAAAAAAAAAAAAAAAAAAAAAAAAAAAAAAAAAAAAAAAAAAJ/f38AAAAAA8zMzADAwP8Af39/AAAAAAAAAAAAAAAAAAAAAAAAAAAAIQAAABgAAAAUAAAAoRkAABsnAABfMQAAWSkAABAAAAAmAAAACAAAAAAAAAAAAAAA"/>
+                <pr:smNativeData xmlns="smNativeData" xmlns:pr="smNativeData" xmlns:p15="http://schemas.microsoft.com/office/powerpoint/2012/main" xmlns:p14="http://schemas.microsoft.com/office/powerpoint/2010/main" xmlns:mc="http://schemas.openxmlformats.org/markup-compatibility/2006" val="SMDATA_15_l3DXYhMAAAAlAAAAZAAAAA8BAAAAkAAAAEgAAACQAAAASAAAAAAAAAABAAAAAAAAAAEAAABQAAAAAAAAAAAA4D8AAAAAAADgPwAAAAAAAOA/AAAAAAAA4D8AAAAAAADgPwAAAAAAAOA/AAAAAAAA4D8AAAAAAADgPwAAAAAAAOA/AAAAAAAA4D8CAAAAjAAAAAAAAAAAAAAAADOZDCYmJggAAAAAAAAAAAAAAAAAAAAAAAAAAAAAAAAAAAAAZAAAAAEAAABAAAAAAAAAAAAAAAAAAAAAAAAAAAAAAAAAAAAAAAAAAAAAAAAAAAAAAAAAAAAAAAAAAAAAAAAAAAAAAAAAAAAAAAAAAAAAAAAAAAAAAAAAAAAAAAAAAAAAFAAAADwAAAAAAAAAAAAAAP///wkUAAAAAQAAABQAAAAUAAAAFAAAAAEAAAAAAAAAZAAAAGQAAAAAAAAAZAAAAGQAAAAVAAAAYAAAAAAAAAAAAAAADwAAACADAAAAAAAAAAAAAAEAAACgMgAAVgcAAKr4//8BAAAAf39/AAEAAABkAAAAAAAAABQAAABAHwAAAAAAACYAAAAAAAAAwOD//wAAAAAmAAAAZAAAABYAAABMAAAAAAAAAAAAAAAEAAAAAAAAAAEAAAAzZpkKAAAAACgAAAAoAAAAZAAAAGQAAAAAAAAAzMzMAAAAAABQAAAAUAAAAGQAAABkAAAAAAAAABcAAAAUAAAAAAAAAAAAAAD/fwAA/38AAAAAAAAJAAAABAAAANw7IAEeAAAAaAAAAAAAAAAAAAAAAAAAAAAAAAAAAAAAECcAABAnAAAAAAAAAAAAAAAAAAAAAAAAAAAAAAAAAAAAAAAAAAAAABQAAAAAAAAAwMD/AAAAAABkAAAAMgAAAAAAAABkAAAAAAAAAH9/fwAKAAAAIgAAABgAAAAAAAAAAAAAAAAAAAAAAAAAAAAAAAAAAAAkAAAAJAAAAAAAAAAHAAAAAAAAAAAAAAAAAAAAAAAAAAAAAAAAAAAAf39/ACUAAABYAAAAAAAAAAAAAAAAAAAAAAAAAAAAAAAAAAAAAAAAAAAAAAAAAAAAAAAAAAAAAAA/AAAAAAAAAKCGAQAAAAAAAAAAAAAAAAAMAAAAAQAAAAAAAAAAAAAAAAAAAB8AAABUAAAAAAAABQAAAAEAAAAAAAAAAAAAAAAAAAAAAAAAAAAAAAAAAAAAAAAAAAAAAAJ/f38AAAAAA8zMzADAwP8Af39/AAAAAAAAAAAAAAAAAAAAAAAAAAAAIQAAABgAAAAUAAAAoRkAABsnAABfMQAAWSkAABAAAAAmAAAACAAAAAAAAAAAAAAA"/>
               </a:ext>
             </a:extLst>
           </p:cNvSpPr>
@@ -1505,7 +1518,7 @@
             <a:spLocks noGrp="1" noChangeArrowheads="1"/>
             <a:extLst>
               <a:ext uri="smNativeData">
-                <pr:smNativeData xmlns:mc="http://schemas.openxmlformats.org/markup-compatibility/2006" xmlns:p14="http://schemas.microsoft.com/office/powerpoint/2010/main" xmlns:p15="http://schemas.microsoft.com/office/powerpoint/2012/main" xmlns:pr="smNativeData" xmlns="smNativeData" val="SMDATA_15_l3DXYhMAAAAlAAAAZAAAAA8BAAAAkAAAAEgAAACQAAAASAAAAAAAAAABAAAAAAAAAAEAAABQAAAAAAAAAAAA4D8AAAAAAADgPwAAAAAAAOA/AAAAAAAA4D8AAAAAAADgPwAAAAAAAOA/AAAAAAAA4D8AAAAAAADgPwAAAAAAAOA/AAAAAAAA4D8CAAAAjAAAAAAAAAAAAAAAADOZDCYmJggAAAAAAAAAAAAAAAAAAAAAAAAAAAAAAAAAAAAAZAAAAAEAAABAAAAAAAAAAAAAAAAAAAAAAAAAAAAAAAAAAAAAAAAAAAAAAAAAAAAAAAAAAAAAAAAAAAAAAAAAAAAAAAAAAAAAAAAAAAAAAAAAAAAAAAAAAAAAAAAAAAAAFAAAADwAAAAAAAAAAAAAAP///wkUAAAAAQAAABQAAAAUAAAAFAAAAAEAAAAAAAAAZAAAAGQAAAAAAAAAZAAAAGQAAAAVAAAAYAAAAAAAAAAAAAAADwAAACADAAAAAAAAAAAAAAEAAACgMgAAVgcAAKr4//8BAAAAf39/AAEAAABkAAAAAAAAABQAAABAHwAAAAAAACYAAAAAAAAAwOD//wAAAAAmAAAAZAAAABYAAABMAAAAAAAAAAAAAAAEAAAAAAAAAAEAAAAzZpkKAAAAACgAAAAoAAAAZAAAAGQAAAAAAAAAzMzMAAAAAABQAAAAUAAAAGQAAABkAAAAAAAAABcAAAAUAAAAAAAAAAAAAAD/fwAA/38AAAAAAAAJAAAABAAAANw7IAEeAAAAaAAAAAAAAAAAAAAAAAAAAAAAAAAAAAAAECcAABAnAAAAAAAAAAAAAAAAAAAAAAAAAAAAAAAAAAAAAAAAAAAAABQAAAAAAAAAwMD/AAAAAABkAAAAMgAAAAAAAABkAAAAAAAAAH9/fwAKAAAAIgAAABgAAAAAAAAAAAAAAAAAAAAAAAAAAAAAAAAAAAAkAAAAJAAAAAAAAAAHAAAAAAAAAAAAAAAAAAAAAAAAAAAAAAAAAAAAf39/ACUAAABYAAAAAAAAAAAAAAAAAAAAAAAAAAAAAAAAAAAAAAAAAAAAAAAAAAAAAAAAAAAAAAA/AAAAAAAAAKCGAQAAAAAAAAAAAAAAAAAMAAAAAQAAAAAAAAAAAAAAAAAAAB8AAABUAAAAAAAABQAAAAEAAAAAAAAAAAAAAAAAAAAAAAAAAAAAAAAAAAAAAAAAAAAAAAJ/f38AAAAAA8zMzADAwP8Af39/AAAAAAAAAAAAAAAAAAAAAAAAAAAAIQAAABgAAAAUAAAAwTUAABsnAABARwAAWSkAABAAAAAmAAAACAAAAAAAAAAAAAAA"/>
+                <pr:smNativeData xmlns="smNativeData" xmlns:pr="smNativeData" xmlns:p15="http://schemas.microsoft.com/office/powerpoint/2012/main" xmlns:p14="http://schemas.microsoft.com/office/powerpoint/2010/main" xmlns:mc="http://schemas.openxmlformats.org/markup-compatibility/2006" val="SMDATA_15_l3DXYhMAAAAlAAAAZAAAAA8BAAAAkAAAAEgAAACQAAAASAAAAAAAAAABAAAAAAAAAAEAAABQAAAAAAAAAAAA4D8AAAAAAADgPwAAAAAAAOA/AAAAAAAA4D8AAAAAAADgPwAAAAAAAOA/AAAAAAAA4D8AAAAAAADgPwAAAAAAAOA/AAAAAAAA4D8CAAAAjAAAAAAAAAAAAAAAADOZDCYmJggAAAAAAAAAAAAAAAAAAAAAAAAAAAAAAAAAAAAAZAAAAAEAAABAAAAAAAAAAAAAAAAAAAAAAAAAAAAAAAAAAAAAAAAAAAAAAAAAAAAAAAAAAAAAAAAAAAAAAAAAAAAAAAAAAAAAAAAAAAAAAAAAAAAAAAAAAAAAAAAAAAAAFAAAADwAAAAAAAAAAAAAAP///wkUAAAAAQAAABQAAAAUAAAAFAAAAAEAAAAAAAAAZAAAAGQAAAAAAAAAZAAAAGQAAAAVAAAAYAAAAAAAAAAAAAAADwAAACADAAAAAAAAAAAAAAEAAACgMgAAVgcAAKr4//8BAAAAf39/AAEAAABkAAAAAAAAABQAAABAHwAAAAAAACYAAAAAAAAAwOD//wAAAAAmAAAAZAAAABYAAABMAAAAAAAAAAAAAAAEAAAAAAAAAAEAAAAzZpkKAAAAACgAAAAoAAAAZAAAAGQAAAAAAAAAzMzMAAAAAABQAAAAUAAAAGQAAABkAAAAAAAAABcAAAAUAAAAAAAAAAAAAAD/fwAA/38AAAAAAAAJAAAABAAAANw7IAEeAAAAaAAAAAAAAAAAAAAAAAAAAAAAAAAAAAAAECcAABAnAAAAAAAAAAAAAAAAAAAAAAAAAAAAAAAAAAAAAAAAAAAAABQAAAAAAAAAwMD/AAAAAABkAAAAMgAAAAAAAABkAAAAAAAAAH9/fwAKAAAAIgAAABgAAAAAAAAAAAAAAAAAAAAAAAAAAAAAAAAAAAAkAAAAJAAAAAAAAAAHAAAAAAAAAAAAAAAAAAAAAAAAAAAAAAAAAAAAf39/ACUAAABYAAAAAAAAAAAAAAAAAAAAAAAAAAAAAAAAAAAAAAAAAAAAAAAAAAAAAAAAAAAAAAA/AAAAAAAAAKCGAQAAAAAAAAAAAAAAAAAMAAAAAQAAAAAAAAAAAAAAAAAAAB8AAABUAAAAAAAABQAAAAEAAAAAAAAAAAAAAAAAAAAAAAAAAAAAAAAAAAAAAAAAAAAAAAJ/f38AAAAAA8zMzADAwP8Af39/AAAAAAAAAAAAAAAAAAAAAAAAAAAAIQAAABgAAAAUAAAAwTUAABsnAABARwAAWSkAABAAAAAmAAAACAAAAAAAAAAAAAAA"/>
               </a:ext>
             </a:extLst>
           </p:cNvSpPr>
@@ -1558,7 +1571,7 @@
             <a:spLocks noGrp="1" noChangeArrowheads="1"/>
             <a:extLst>
               <a:ext uri="smNativeData">
-                <pr:smNativeData xmlns:mc="http://schemas.openxmlformats.org/markup-compatibility/2006" xmlns:p14="http://schemas.microsoft.com/office/powerpoint/2010/main" xmlns:p15="http://schemas.microsoft.com/office/powerpoint/2012/main" xmlns:pr="smNativeData" xmlns="smNativeData" val="SMDATA_15_l3DXYhMAAAAlAAAAZAAAAA8BAAAAkAAAAEgAAACQAAAASAAAAAAAAAABAAAAAAAAAAEAAABQAAAAAAAAAAAA4D8AAAAAAADgPwAAAAAAAOA/AAAAAAAA4D8AAAAAAADgPwAAAAAAAOA/AAAAAAAA4D8AAAAAAADgPwAAAAAAAOA/AAAAAAAA4D8CAAAAjAAAAAAAAAAAAAAAADOZDCYmJggAAAAAAAAAAAAAAAAAAAAAAAAAAAAAAAAAAAAAZAAAAAEAAABAAAAAAAAAAAAAAAAAAAAAAAAAAAAAAAAAAAAAAAAAAAAAAAAAAAAAAAAAAAAAAAAAAAAAAAAAAAAAAAAAAAAAAAAAAAAAAAAAAAAAAAAAAAAAAAAAAAAAFAAAADwAAAAAAAAAAAAAAP///wkUAAAAAQAAABQAAAAUAAAAFAAAAAEAAAAAAAAAZAAAAGQAAAAAAAAAZAAAAGQAAAAVAAAAYAAAAAAAAAAAAAAADwAAACADAAAAAAAAAAAAAAEAAACgMgAAVgcAAKr4//8BAAAAf39/AAEAAABkAAAAAAAAABQAAABAHwAAAAAAACYAAAAAAAAAwOD//wAAAAAmAAAAZAAAABYAAABMAAAAAAAAAAAAAAAEAAAAAAAAAAEAAAAzZpkKAAAAACgAAAAoAAAAZAAAAGQAAAAAAAAAzMzMAAAAAABQAAAAUAAAAGQAAABkAAAAAAAAABcAAAAUAAAAAAAAAAAAAAD/fwAA/38AAAAAAAAJAAAABAAAANw7IAEeAAAAaAAAAAAAAAAAAAAAAAAAAAAAAAAAAAAAECcAABAnAAAAAAAAAAAAAAAAAAAAAAAAAAAAAAAAAAAAAAAAAAAAABQAAAAAAAAAwMD/AAAAAABkAAAAMgAAAAAAAABkAAAAAAAAAH9/fwAKAAAAIgAAABgAAAAAAAAAAAAAAAAAAAAAAAAAAAAAAAAAAAAkAAAAJAAAAAAAAAAHAAAAAAAAAAAAAAAAAAAAAAAAAAAAAAAAAAAAf39/ACUAAABYAAAAAAAAAAAAAAAAAAAAAAAAAAAAAAAAAAAAAAAAAAAAAAAAAAAAAAAAAAAAAAA/AAAAAAAAAKCGAQAAAAAAAAAAAAAAAAAMAAAAAQAAAAAAAAAAAAAAAAAAAB8AAABUAAAAAAAABQAAAAEAAAAAAAAAAAAAAAAAAAAAAAAAAAAAAAAAAAAAAAAAAAAAAAJ/f38AAAAAA8zMzADAwP8Af39/AAAAAAAAAAAAAAAAAAAAAAAAAAAAIQAAABgAAAAUAAAAwAMAALABAABARwAAuAgAABAAAAAmAAAACAAAAAAAAAAAAAAA"/>
+                <pr:smNativeData xmlns="smNativeData" xmlns:pr="smNativeData" xmlns:p15="http://schemas.microsoft.com/office/powerpoint/2012/main" xmlns:p14="http://schemas.microsoft.com/office/powerpoint/2010/main" xmlns:mc="http://schemas.openxmlformats.org/markup-compatibility/2006" val="SMDATA_15_l3DXYhMAAAAlAAAAZAAAAA8BAAAAkAAAAEgAAACQAAAASAAAAAAAAAABAAAAAAAAAAEAAABQAAAAAAAAAAAA4D8AAAAAAADgPwAAAAAAAOA/AAAAAAAA4D8AAAAAAADgPwAAAAAAAOA/AAAAAAAA4D8AAAAAAADgPwAAAAAAAOA/AAAAAAAA4D8CAAAAjAAAAAAAAAAAAAAAADOZDCYmJggAAAAAAAAAAAAAAAAAAAAAAAAAAAAAAAAAAAAAZAAAAAEAAABAAAAAAAAAAAAAAAAAAAAAAAAAAAAAAAAAAAAAAAAAAAAAAAAAAAAAAAAAAAAAAAAAAAAAAAAAAAAAAAAAAAAAAAAAAAAAAAAAAAAAAAAAAAAAAAAAAAAAFAAAADwAAAAAAAAAAAAAAP///wkUAAAAAQAAABQAAAAUAAAAFAAAAAEAAAAAAAAAZAAAAGQAAAAAAAAAZAAAAGQAAAAVAAAAYAAAAAAAAAAAAAAADwAAACADAAAAAAAAAAAAAAEAAACgMgAAVgcAAKr4//8BAAAAf39/AAEAAABkAAAAAAAAABQAAABAHwAAAAAAACYAAAAAAAAAwOD//wAAAAAmAAAAZAAAABYAAABMAAAAAAAAAAAAAAAEAAAAAAAAAAEAAAAzZpkKAAAAACgAAAAoAAAAZAAAAGQAAAAAAAAAzMzMAAAAAABQAAAAUAAAAGQAAABkAAAAAAAAABcAAAAUAAAAAAAAAAAAAAD/fwAA/38AAAAAAAAJAAAABAAAANw7IAEeAAAAaAAAAAAAAAAAAAAAAAAAAAAAAAAAAAAAECcAABAnAAAAAAAAAAAAAAAAAAAAAAAAAAAAAAAAAAAAAAAAAAAAABQAAAAAAAAAwMD/AAAAAABkAAAAMgAAAAAAAABkAAAAAAAAAH9/fwAKAAAAIgAAABgAAAAAAAAAAAAAAAAAAAAAAAAAAAAAAAAAAAAkAAAAJAAAAAAAAAAHAAAAAAAAAAAAAAAAAAAAAAAAAAAAAAAAAAAAf39/ACUAAABYAAAAAAAAAAAAAAAAAAAAAAAAAAAAAAAAAAAAAAAAAAAAAAAAAAAAAAAAAAAAAAA/AAAAAAAAAKCGAQAAAAAAAAAAAAAAAAAMAAAAAQAAAAAAAAAAAAAAAAAAAB8AAABUAAAAAAAABQAAAAEAAAAAAAAAAAAAAAAAAAAAAAAAAAAAAAAAAAAAAAAAAAAAAAJ/f38AAAAAA8zMzADAwP8Af39/AAAAAAAAAAAAAAAAAAAAAAAAAAAAIQAAABgAAAAUAAAAwAMAALABAABARwAAuAgAABAAAAAmAAAACAAAAAAAAAAAAAAA"/>
               </a:ext>
             </a:extLst>
           </p:cNvSpPr>
@@ -1584,7 +1597,7 @@
             <a:spLocks noGrp="1" noChangeArrowheads="1"/>
             <a:extLst>
               <a:ext uri="smNativeData">
-                <pr:smNativeData xmlns:mc="http://schemas.openxmlformats.org/markup-compatibility/2006" xmlns:p14="http://schemas.microsoft.com/office/powerpoint/2010/main" xmlns:p15="http://schemas.microsoft.com/office/powerpoint/2012/main" xmlns:pr="smNativeData" xmlns="smNativeData" val="SMDATA_15_l3DXYhMAAAAlAAAAZAAAAA8BAAAAkAAAAEgAAACQAAAASAAAAAAAAAACAAAAAAAAAAEAAABQAAAAAAAAAAAA4D8AAAAAAADgPwAAAAAAAOA/AAAAAAAA4D8AAAAAAADgPwAAAAAAAOA/AAAAAAAA4D8AAAAAAADgPwAAAAAAAOA/AAAAAAAA4D8CAAAAjAAAAAAAAAAAAAAAADOZDCYmJggAAAAAAAAAAAAAAAAAAAAAAAAAAAAAAAAAAAAAZAAAAAEAAABAAAAAAAAAAAAAAAAAAAAAAAAAAAAAAAAAAAAAAAAAAAAAAAAAAAAAAAAAAAAAAAAAAAAAAAAAAAAAAAAAAAAAAAAAAAAAAAAAAAAAAAAAAAAAAAAAAAAAFAAAADwAAAAAAAAAAAAAAP///wkUAAAAAQAAABQAAAAUAAAAFAAAAAEAAAAAAAAAZAAAAGQAAAAAAAAAZAAAAGQAAAAVAAAAYAAAAAAAAAAAAAAADwAAACADAAAAAAAAAAAAAAEAAACgMgAAVgcAAKr4//8BAAAAf39/AAEAAABkAAAAAAAAABQAAABAHwAAAAAAACYAAAAAAAAAwOD//wAAAAAmAAAAZAAAABYAAABMAAAAAAAAAAAAAAAEAAAAAAAAAAEAAAAzZpkKAAAAACgAAAAoAAAAZAAAAGQAAAAAAAAAzMzMAAAAAABQAAAAUAAAAGQAAABkAAAAAAAAABcAAAAUAAAAAAAAAAAAAAD/fwAA/38AAAAAAAAJAAAABAAAANw7IAEeAAAAaAAAAAAAAAAAAAAAAAAAAAAAAAAAAAAAECcAABAnAAAAAAAAAAAAAAAAAAAAAAAAAAAAAAAAAAAAAAAAAAAAABQAAAAAAAAAwMD/AAAAAABkAAAAMgAAAAAAAABkAAAAAAAAAH9/fwAKAAAAIgAAABgAAAAAAAAAAAAAAAAAAAAAAAAAAAAAAAAAAAAkAAAAJAAAAAAAAAAHAAAAAAAAAAAAAAAAAAAAAAAAAAAAAAAAAAAAf39/ACUAAABYAAAAAAAAAAAAAAAAAAAAAAAAAAAAAAAAAAAAAAAAAAAAAAAAAAAAAAAAAAAAAAA/AAAAAAAAAKCGAQAAAAAAAAAAAAAAAAAMAAAAAQAAAAAAAAAAAAAAAAAAAB8AAABUAAAAAAAABQAAAAEAAAAAAAAAAAAAAAAAAAAAAAAAAAAAAAAAAAAAAAAAAAAAAAJ/f38AAAAAA8zMzADAwP8Af39/AAAAAAAAAAAAAAAAAAAAAAAAAAAAIQAAABgAAAAUAAAAwAMAAHEJAADjJAAAYQ0AABAAAAAmAAAACAAAAIGAAAAAAAAA"/>
+                <pr:smNativeData xmlns="smNativeData" xmlns:pr="smNativeData" xmlns:p15="http://schemas.microsoft.com/office/powerpoint/2012/main" xmlns:p14="http://schemas.microsoft.com/office/powerpoint/2010/main" xmlns:mc="http://schemas.openxmlformats.org/markup-compatibility/2006" val="SMDATA_15_l3DXYhMAAAAlAAAAZAAAAA8BAAAAkAAAAEgAAACQAAAASAAAAAAAAAACAAAAAAAAAAEAAABQAAAAAAAAAAAA4D8AAAAAAADgPwAAAAAAAOA/AAAAAAAA4D8AAAAAAADgPwAAAAAAAOA/AAAAAAAA4D8AAAAAAADgPwAAAAAAAOA/AAAAAAAA4D8CAAAAjAAAAAAAAAAAAAAAADOZDCYmJggAAAAAAAAAAAAAAAAAAAAAAAAAAAAAAAAAAAAAZAAAAAEAAABAAAAAAAAAAAAAAAAAAAAAAAAAAAAAAAAAAAAAAAAAAAAAAAAAAAAAAAAAAAAAAAAAAAAAAAAAAAAAAAAAAAAAAAAAAAAAAAAAAAAAAAAAAAAAAAAAAAAAFAAAADwAAAAAAAAAAAAAAP///wkUAAAAAQAAABQAAAAUAAAAFAAAAAEAAAAAAAAAZAAAAGQAAAAAAAAAZAAAAGQAAAAVAAAAYAAAAAAAAAAAAAAADwAAACADAAAAAAAAAAAAAAEAAACgMgAAVgcAAKr4//8BAAAAf39/AAEAAABkAAAAAAAAABQAAABAHwAAAAAAACYAAAAAAAAAwOD//wAAAAAmAAAAZAAAABYAAABMAAAAAAAAAAAAAAAEAAAAAAAAAAEAAAAzZpkKAAAAACgAAAAoAAAAZAAAAGQAAAAAAAAAzMzMAAAAAABQAAAAUAAAAGQAAABkAAAAAAAAABcAAAAUAAAAAAAAAAAAAAD/fwAA/38AAAAAAAAJAAAABAAAANw7IAEeAAAAaAAAAAAAAAAAAAAAAAAAAAAAAAAAAAAAECcAABAnAAAAAAAAAAAAAAAAAAAAAAAAAAAAAAAAAAAAAAAAAAAAABQAAAAAAAAAwMD/AAAAAABkAAAAMgAAAAAAAABkAAAAAAAAAH9/fwAKAAAAIgAAABgAAAAAAAAAAAAAAAAAAAAAAAAAAAAAAAAAAAAkAAAAJAAAAAAAAAAHAAAAAAAAAAAAAAAAAAAAAAAAAAAAAAAAAAAAf39/ACUAAABYAAAAAAAAAAAAAAAAAAAAAAAAAAAAAAAAAAAAAAAAAAAAAAAAAAAAAAAAAAAAAAA/AAAAAAAAAKCGAQAAAAAAAAAAAAAAAAAMAAAAAQAAAAAAAAAAAAAAAAAAAB8AAABUAAAAAAAABQAAAAEAAAAAAAAAAAAAAAAAAAAAAAAAAAAAAAAAAAAAAAAAAAAAAAJ/f38AAAAAA8zMzADAwP8Af39/AAAAAAAAAAAAAAAAAAAAAAAAAAAAIQAAABgAAAAUAAAAwAMAAHEJAADjJAAAYQ0AABAAAAAmAAAACAAAAIGAAAAAAAAA"/>
               </a:ext>
             </a:extLst>
           </p:cNvSpPr>
@@ -1656,7 +1669,7 @@
             <a:spLocks noGrp="1" noChangeArrowheads="1"/>
             <a:extLst>
               <a:ext uri="smNativeData">
-                <pr:smNativeData xmlns:mc="http://schemas.openxmlformats.org/markup-compatibility/2006" xmlns:p14="http://schemas.microsoft.com/office/powerpoint/2010/main" xmlns:p15="http://schemas.microsoft.com/office/powerpoint/2012/main" xmlns:pr="smNativeData" xmlns="smNativeData" val="SMDATA_15_l3DXYhMAAAAlAAAAZAAAAA8BAAAAkAAAAEgAAACQAAAASAAAAAAAAAAAAAAAAAAAAAEAAABQAAAAAAAAAAAA4D8AAAAAAADgPwAAAAAAAOA/AAAAAAAA4D8AAAAAAADgPwAAAAAAAOA/AAAAAAAA4D8AAAAAAADgPwAAAAAAAOA/AAAAAAAA4D8CAAAAjAAAAAAAAAAAAAAAADOZDCYmJggAAAAAAAAAAAAAAAAAAAAAAAAAAAAAAAAAAAAAZAAAAAEAAABAAAAAAAAAAAAAAAAAAAAAAAAAAAAAAAAAAAAAAAAAAAAAAAAAAAAAAAAAAAAAAAAAAAAAAAAAAAAAAAAAAAAAAAAAAAAAAAAAAAAAAAAAAAAAAAAAAAAAFAAAADwAAAAAAAAAAAAAAP///wkUAAAAAQAAABQAAAAUAAAAFAAAAAEAAAAAAAAAZAAAAGQAAAAAAAAAZAAAAGQAAAAVAAAAYAAAAAAAAAAAAAAADwAAACADAAAAAAAAAAAAAAEAAACgMgAAVgcAAKr4//8BAAAAf39/AAEAAABkAAAAAAAAABQAAABAHwAAAAAAACYAAAAAAAAAwOD//wAAAAAmAAAAZAAAABYAAABMAAAAAAAAAAAAAAAEAAAAAAAAAAEAAAAzZpkKAAAAACgAAAAoAAAAZAAAAGQAAAAAAAAAzMzMAAAAAABQAAAAUAAAAGQAAABkAAAAAAAAABcAAAAUAAAAAAAAAAAAAAD/fwAA/38AAAAAAAAJAAAABAAAANw7IAEeAAAAaAAAAAAAAAAAAAAAAAAAAAAAAAAAAAAAECcAABAnAAAAAAAAAAAAAAAAAAAAAAAAAAAAAAAAAAAAAAAAAAAAABQAAAAAAAAAwMD/AAAAAABkAAAAMgAAAAAAAABkAAAAAAAAAH9/fwAKAAAAIgAAABgAAAAAAAAAAAAAAAAAAAAAAAAAAAAAAAAAAAAkAAAAJAAAAAAAAAAHAAAAAAAAAAAAAAAAAAAAAAAAAAAAAAAAAAAAf39/ACUAAABYAAAAAAAAAAAAAAAAAAAAAAAAAAAAAAAAAAAAAAAAAAAAAAAAAAAAAAAAAAAAAAA/AAAAAAAAAKCGAQAAAAAAAAAAAAAAAAAMAAAAAQAAAAAAAAAAAAAAAAAAAB8AAABUAAAAAAAABQAAAAEAAAAAAAAAAAAAAAAAAAAAAAAAAAAAAAAAAAAAAAAAAAAAAAJ/f38AAAAAA8zMzADAwP8Af39/AAAAAAAAAAAAAAAAAAAAAAAAAAAAIQAAABgAAAAUAAAAwAMAAGENAADjJAAAsCUAABAAAAAmAAAACAAAAAGAAAAAAAAA"/>
+                <pr:smNativeData xmlns="smNativeData" xmlns:pr="smNativeData" xmlns:p15="http://schemas.microsoft.com/office/powerpoint/2012/main" xmlns:p14="http://schemas.microsoft.com/office/powerpoint/2010/main" xmlns:mc="http://schemas.openxmlformats.org/markup-compatibility/2006" val="SMDATA_15_l3DXYhMAAAAlAAAAZAAAAA8BAAAAkAAAAEgAAACQAAAASAAAAAAAAAAAAAAAAAAAAAEAAABQAAAAAAAAAAAA4D8AAAAAAADgPwAAAAAAAOA/AAAAAAAA4D8AAAAAAADgPwAAAAAAAOA/AAAAAAAA4D8AAAAAAADgPwAAAAAAAOA/AAAAAAAA4D8CAAAAjAAAAAAAAAAAAAAAADOZDCYmJggAAAAAAAAAAAAAAAAAAAAAAAAAAAAAAAAAAAAAZAAAAAEAAABAAAAAAAAAAAAAAAAAAAAAAAAAAAAAAAAAAAAAAAAAAAAAAAAAAAAAAAAAAAAAAAAAAAAAAAAAAAAAAAAAAAAAAAAAAAAAAAAAAAAAAAAAAAAAAAAAAAAAFAAAADwAAAAAAAAAAAAAAP///wkUAAAAAQAAABQAAAAUAAAAFAAAAAEAAAAAAAAAZAAAAGQAAAAAAAAAZAAAAGQAAAAVAAAAYAAAAAAAAAAAAAAADwAAACADAAAAAAAAAAAAAAEAAACgMgAAVgcAAKr4//8BAAAAf39/AAEAAABkAAAAAAAAABQAAABAHwAAAAAAACYAAAAAAAAAwOD//wAAAAAmAAAAZAAAABYAAABMAAAAAAAAAAAAAAAEAAAAAAAAAAEAAAAzZpkKAAAAACgAAAAoAAAAZAAAAGQAAAAAAAAAzMzMAAAAAABQAAAAUAAAAGQAAABkAAAAAAAAABcAAAAUAAAAAAAAAAAAAAD/fwAA/38AAAAAAAAJAAAABAAAANw7IAEeAAAAaAAAAAAAAAAAAAAAAAAAAAAAAAAAAAAAECcAABAnAAAAAAAAAAAAAAAAAAAAAAAAAAAAAAAAAAAAAAAAAAAAABQAAAAAAAAAwMD/AAAAAABkAAAAMgAAAAAAAABkAAAAAAAAAH9/fwAKAAAAIgAAABgAAAAAAAAAAAAAAAAAAAAAAAAAAAAAAAAAAAAkAAAAJAAAAAAAAAAHAAAAAAAAAAAAAAAAAAAAAAAAAAAAAAAAAAAAf39/ACUAAABYAAAAAAAAAAAAAAAAAAAAAAAAAAAAAAAAAAAAAAAAAAAAAAAAAAAAAAAAAAAAAAA/AAAAAAAAAKCGAQAAAAAAAAAAAAAAAAAMAAAAAQAAAAAAAAAAAAAAAAAAAB8AAABUAAAAAAAABQAAAAEAAAAAAAAAAAAAAAAAAAAAAAAAAAAAAAAAAAAAAAAAAAAAAAJ/f38AAAAAA8zMzADAwP8Af39/AAAAAAAAAAAAAAAAAAAAAAAAAAAAIQAAABgAAAAUAAAAwAMAAGENAADjJAAAsCUAABAAAAAmAAAACAAAAAGAAAAAAAAA"/>
               </a:ext>
             </a:extLst>
           </p:cNvSpPr>
@@ -1739,7 +1752,7 @@
             <a:spLocks noGrp="1" noChangeArrowheads="1"/>
             <a:extLst>
               <a:ext uri="smNativeData">
-                <pr:smNativeData xmlns:mc="http://schemas.openxmlformats.org/markup-compatibility/2006" xmlns:p14="http://schemas.microsoft.com/office/powerpoint/2010/main" xmlns:p15="http://schemas.microsoft.com/office/powerpoint/2012/main" xmlns:pr="smNativeData" xmlns="smNativeData" val="SMDATA_15_l3DXYhMAAAAlAAAAZAAAAA8BAAAAkAAAAEgAAACQAAAASAAAAAAAAAACAAAAAAAAAAEAAABQAAAAAAAAAAAA4D8AAAAAAADgPwAAAAAAAOA/AAAAAAAA4D8AAAAAAADgPwAAAAAAAOA/AAAAAAAA4D8AAAAAAADgPwAAAAAAAOA/AAAAAAAA4D8CAAAAjAAAAAAAAAAAAAAAADOZDCYmJggAAAAAAAAAAAAAAAAAAAAAAAAAAAAAAAAAAAAAZAAAAAEAAABAAAAAAAAAAAAAAAAAAAAAAAAAAAAAAAAAAAAAAAAAAAAAAAAAAAAAAAAAAAAAAAAAAAAAAAAAAAAAAAAAAAAAAAAAAAAAAAAAAAAAAAAAAAAAAAAAAAAAFAAAADwAAAAAAAAAAAAAAP///wkUAAAAAQAAABQAAAAUAAAAFAAAAAEAAAAAAAAAZAAAAGQAAAAAAAAAZAAAAGQAAAAVAAAAYAAAAAAAAAAAAAAADwAAACADAAAAAAAAAAAAAAEAAACgMgAAVgcAAKr4//8BAAAAf39/AAEAAABkAAAAAAAAABQAAABAHwAAAAAAACYAAAAAAAAAwOD//wAAAAAmAAAAZAAAABYAAABMAAAAAAAAAAAAAAAEAAAAAAAAAAEAAAAzZpkKAAAAACgAAAAoAAAAZAAAAGQAAAAAAAAAzMzMAAAAAABQAAAAUAAAAGQAAABkAAAAAAAAABcAAAAUAAAAAAAAAAAAAAD/fwAA/38AAAAAAAAJAAAABAAAANw7IAEeAAAAaAAAAAAAAAAAAAAAAAAAAAAAAAAAAAAAECcAABAnAAAAAAAAAAAAAAAAAAAAAAAAAAAAAAAAAAAAAAAAAAAAABQAAAAAAAAAwMD/AAAAAABkAAAAMgAAAAAAAABkAAAAAAAAAH9/fwAKAAAAIgAAABgAAAAAAAAAAAAAAAAAAAAAAAAAAAAAAAAAAAAkAAAAJAAAAAAAAAAHAAAAAAAAAAAAAAAAAAAAAAAAAAAAAAAAAAAAf39/ACUAAABYAAAAAAAAAAAAAAAAAAAAAAAAAAAAAAAAAAAAAAAAAAAAAAAAAAAAAAAAAAAAAAA/AAAAAAAAAKCGAQAAAAAAAAAAAAAAAAAMAAAAAQAAAAAAAAAAAAAAAAAAAB8AAABUAAAAAAAABQAAAAEAAAAAAAAAAAAAAAAAAAAAAAAAAAAAAAAAAAAAAAAAAAAAAAJ/f38AAAAAA8zMzADAwP8Af39/AAAAAAAAAAAAAAAAAAAAAAAAAAAAIQAAABgAAAAUAAAAHSYAAHEJAABARwAAYQ0AABAAAAAmAAAACAAAAIGAAAAAAAAA"/>
+                <pr:smNativeData xmlns="smNativeData" xmlns:pr="smNativeData" xmlns:p15="http://schemas.microsoft.com/office/powerpoint/2012/main" xmlns:p14="http://schemas.microsoft.com/office/powerpoint/2010/main" xmlns:mc="http://schemas.openxmlformats.org/markup-compatibility/2006" val="SMDATA_15_l3DXYhMAAAAlAAAAZAAAAA8BAAAAkAAAAEgAAACQAAAASAAAAAAAAAACAAAAAAAAAAEAAABQAAAAAAAAAAAA4D8AAAAAAADgPwAAAAAAAOA/AAAAAAAA4D8AAAAAAADgPwAAAAAAAOA/AAAAAAAA4D8AAAAAAADgPwAAAAAAAOA/AAAAAAAA4D8CAAAAjAAAAAAAAAAAAAAAADOZDCYmJggAAAAAAAAAAAAAAAAAAAAAAAAAAAAAAAAAAAAAZAAAAAEAAABAAAAAAAAAAAAAAAAAAAAAAAAAAAAAAAAAAAAAAAAAAAAAAAAAAAAAAAAAAAAAAAAAAAAAAAAAAAAAAAAAAAAAAAAAAAAAAAAAAAAAAAAAAAAAAAAAAAAAFAAAADwAAAAAAAAAAAAAAP///wkUAAAAAQAAABQAAAAUAAAAFAAAAAEAAAAAAAAAZAAAAGQAAAAAAAAAZAAAAGQAAAAVAAAAYAAAAAAAAAAAAAAADwAAACADAAAAAAAAAAAAAAEAAACgMgAAVgcAAKr4//8BAAAAf39/AAEAAABkAAAAAAAAABQAAABAHwAAAAAAACYAAAAAAAAAwOD//wAAAAAmAAAAZAAAABYAAABMAAAAAAAAAAAAAAAEAAAAAAAAAAEAAAAzZpkKAAAAACgAAAAoAAAAZAAAAGQAAAAAAAAAzMzMAAAAAABQAAAAUAAAAGQAAABkAAAAAAAAABcAAAAUAAAAAAAAAAAAAAD/fwAA/38AAAAAAAAJAAAABAAAANw7IAEeAAAAaAAAAAAAAAAAAAAAAAAAAAAAAAAAAAAAECcAABAnAAAAAAAAAAAAAAAAAAAAAAAAAAAAAAAAAAAAAAAAAAAAABQAAAAAAAAAwMD/AAAAAABkAAAAMgAAAAAAAABkAAAAAAAAAH9/fwAKAAAAIgAAABgAAAAAAAAAAAAAAAAAAAAAAAAAAAAAAAAAAAAkAAAAJAAAAAAAAAAHAAAAAAAAAAAAAAAAAAAAAAAAAAAAAAAAAAAAf39/ACUAAABYAAAAAAAAAAAAAAAAAAAAAAAAAAAAAAAAAAAAAAAAAAAAAAAAAAAAAAAAAAAAAAA/AAAAAAAAAKCGAQAAAAAAAAAAAAAAAAAMAAAAAQAAAAAAAAAAAAAAAAAAAB8AAABUAAAAAAAABQAAAAEAAAAAAAAAAAAAAAAAAAAAAAAAAAAAAAAAAAAAAAAAAAAAAAJ/f38AAAAAA8zMzADAwP8Af39/AAAAAAAAAAAAAAAAAAAAAAAAAAAAIQAAABgAAAAUAAAAHSYAAHEJAABARwAAYQ0AABAAAAAmAAAACAAAAIGAAAAAAAAA"/>
               </a:ext>
             </a:extLst>
           </p:cNvSpPr>
@@ -1811,7 +1824,7 @@
             <a:spLocks noGrp="1" noChangeArrowheads="1"/>
             <a:extLst>
               <a:ext uri="smNativeData">
-                <pr:smNativeData xmlns:mc="http://schemas.openxmlformats.org/markup-compatibility/2006" xmlns:p14="http://schemas.microsoft.com/office/powerpoint/2010/main" xmlns:p15="http://schemas.microsoft.com/office/powerpoint/2012/main" xmlns:pr="smNativeData" xmlns="smNativeData" val="SMDATA_15_l3DXYhMAAAAlAAAAZAAAAA8BAAAAkAAAAEgAAACQAAAASAAAAAAAAAAAAAAAAAAAAAEAAABQAAAAAAAAAAAA4D8AAAAAAADgPwAAAAAAAOA/AAAAAAAA4D8AAAAAAADgPwAAAAAAAOA/AAAAAAAA4D8AAAAAAADgPwAAAAAAAOA/AAAAAAAA4D8CAAAAjAAAAAAAAAAAAAAAADOZDCYmJggAAAAAAAAAAAAAAAAAAAAAAAAAAAAAAAAAAAAAZAAAAAEAAABAAAAAAAAAAAAAAAAAAAAAAAAAAAAAAAAAAAAAAAAAAAAAAAAAAAAAAAAAAAAAAAAAAAAAAAAAAAAAAAAAAAAAAAAAAAAAAAAAAAAAAAAAAAAAAAAAAAAAFAAAADwAAAAAAAAAAAAAAP///wkUAAAAAQAAABQAAAAUAAAAFAAAAAEAAAAAAAAAZAAAAGQAAAAAAAAAZAAAAGQAAAAVAAAAYAAAAAAAAAAAAAAADwAAACADAAAAAAAAAAAAAAEAAACgMgAAVgcAAKr4//8BAAAAf39/AAEAAABkAAAAAAAAABQAAABAHwAAAAAAACYAAAAAAAAAwOD//wAAAAAmAAAAZAAAABYAAABMAAAAAAAAAAAAAAAEAAAAAAAAAAEAAAAzZpkKAAAAACgAAAAoAAAAZAAAAGQAAAAAAAAAzMzMAAAAAABQAAAAUAAAAGQAAABkAAAAAAAAABcAAAAUAAAAAAAAAAAAAAD/fwAA/38AAAAAAAAJAAAABAAAANw7IAEeAAAAaAAAAAAAAAAAAAAAAAAAAAAAAAAAAAAAECcAABAnAAAAAAAAAAAAAAAAAAAAAAAAAAAAAAAAAAAAAAAAAAAAABQAAAAAAAAAwMD/AAAAAABkAAAAMgAAAAAAAABkAAAAAAAAAH9/fwAKAAAAIgAAABgAAAAAAAAAAAAAAAAAAAAAAAAAAAAAAAAAAAAkAAAAJAAAAAAAAAAHAAAAAAAAAAAAAAAAAAAAAAAAAAAAAAAAAAAAf39/ACUAAABYAAAAAAAAAAAAAAAAAAAAAAAAAAAAAAAAAAAAAAAAAAAAAAAAAAAAAAAAAAAAAAA/AAAAAAAAAKCGAQAAAAAAAAAAAAAAAAAMAAAAAQAAAAAAAAAAAAAAAAAAAB8AAABUAAAAAAAABQAAAAEAAAAAAAAAAAAAAAAAAAAAAAAAAAAAAAAAAAAAAAAAAAAAAAJ/f38AAAAAA8zMzADAwP8Af39/AAAAAAAAAAAAAAAAAAAAAAAAAAAAIQAAABgAAAAUAAAAHSYAAGENAABARwAAsCUAABAAAAAmAAAACAAAAAGAAAAAAAAA"/>
+                <pr:smNativeData xmlns="smNativeData" xmlns:pr="smNativeData" xmlns:p15="http://schemas.microsoft.com/office/powerpoint/2012/main" xmlns:p14="http://schemas.microsoft.com/office/powerpoint/2010/main" xmlns:mc="http://schemas.openxmlformats.org/markup-compatibility/2006" val="SMDATA_15_l3DXYhMAAAAlAAAAZAAAAA8BAAAAkAAAAEgAAACQAAAASAAAAAAAAAAAAAAAAAAAAAEAAABQAAAAAAAAAAAA4D8AAAAAAADgPwAAAAAAAOA/AAAAAAAA4D8AAAAAAADgPwAAAAAAAOA/AAAAAAAA4D8AAAAAAADgPwAAAAAAAOA/AAAAAAAA4D8CAAAAjAAAAAAAAAAAAAAAADOZDCYmJggAAAAAAAAAAAAAAAAAAAAAAAAAAAAAAAAAAAAAZAAAAAEAAABAAAAAAAAAAAAAAAAAAAAAAAAAAAAAAAAAAAAAAAAAAAAAAAAAAAAAAAAAAAAAAAAAAAAAAAAAAAAAAAAAAAAAAAAAAAAAAAAAAAAAAAAAAAAAAAAAAAAAFAAAADwAAAAAAAAAAAAAAP///wkUAAAAAQAAABQAAAAUAAAAFAAAAAEAAAAAAAAAZAAAAGQAAAAAAAAAZAAAAGQAAAAVAAAAYAAAAAAAAAAAAAAADwAAACADAAAAAAAAAAAAAAEAAACgMgAAVgcAAKr4//8BAAAAf39/AAEAAABkAAAAAAAAABQAAABAHwAAAAAAACYAAAAAAAAAwOD//wAAAAAmAAAAZAAAABYAAABMAAAAAAAAAAAAAAAEAAAAAAAAAAEAAAAzZpkKAAAAACgAAAAoAAAAZAAAAGQAAAAAAAAAzMzMAAAAAABQAAAAUAAAAGQAAABkAAAAAAAAABcAAAAUAAAAAAAAAAAAAAD/fwAA/38AAAAAAAAJAAAABAAAANw7IAEeAAAAaAAAAAAAAAAAAAAAAAAAAAAAAAAAAAAAECcAABAnAAAAAAAAAAAAAAAAAAAAAAAAAAAAAAAAAAAAAAAAAAAAABQAAAAAAAAAwMD/AAAAAABkAAAAMgAAAAAAAABkAAAAAAAAAH9/fwAKAAAAIgAAABgAAAAAAAAAAAAAAAAAAAAAAAAAAAAAAAAAAAAkAAAAJAAAAAAAAAAHAAAAAAAAAAAAAAAAAAAAAAAAAAAAAAAAAAAAf39/ACUAAABYAAAAAAAAAAAAAAAAAAAAAAAAAAAAAAAAAAAAAAAAAAAAAAAAAAAAAAAAAAAAAAA/AAAAAAAAAKCGAQAAAAAAAAAAAAAAAAAMAAAAAQAAAAAAAAAAAAAAAAAAAB8AAABUAAAAAAAABQAAAAEAAAAAAAAAAAAAAAAAAAAAAAAAAAAAAAAAAAAAAAAAAAAAAAJ/f38AAAAAA8zMzADAwP8Af39/AAAAAAAAAAAAAAAAAAAAAAAAAAAAIQAAABgAAAAUAAAAHSYAAGENAABARwAAsCUAABAAAAAmAAAACAAAAAGAAAAAAAAA"/>
               </a:ext>
             </a:extLst>
           </p:cNvSpPr>
@@ -1894,7 +1907,7 @@
             <a:spLocks noGrp="1" noChangeArrowheads="1"/>
             <a:extLst>
               <a:ext uri="smNativeData">
-                <pr:smNativeData xmlns:mc="http://schemas.openxmlformats.org/markup-compatibility/2006" xmlns:p14="http://schemas.microsoft.com/office/powerpoint/2010/main" xmlns:p15="http://schemas.microsoft.com/office/powerpoint/2012/main" xmlns:pr="smNativeData" xmlns="smNativeData" val="SMDATA_15_l3DXYhMAAAAlAAAAZAAAAA8BAAAAkAAAAEgAAACQAAAASAAAAAAAAAABAAAAAAAAAAEAAABQAAAAAAAAAAAA4D8AAAAAAADgPwAAAAAAAOA/AAAAAAAA4D8AAAAAAADgPwAAAAAAAOA/AAAAAAAA4D8AAAAAAADgPwAAAAAAAOA/AAAAAAAA4D8CAAAAjAAAAAAAAAAAAAAAADOZDCYmJggAAAAAAAAAAAAAAAAAAAAAAAAAAAAAAAAAAAAAZAAAAAEAAABAAAAAAAAAAAAAAAAAAAAAAAAAAAAAAAAAAAAAAAAAAAAAAAAAAAAAAAAAAAAAAAAAAAAAAAAAAAAAAAAAAAAAAAAAAAAAAAAAAAAAAAAAAAAAAAAAAAAAFAAAADwAAAAAAAAAAAAAAP///wkUAAAAAQAAABQAAAAUAAAAFAAAAAEAAAAAAAAAZAAAAGQAAAAAAAAAZAAAAGQAAAAVAAAAYAAAAAAAAAAAAAAADwAAACADAAAAAAAAAAAAAAEAAACgMgAAVgcAAKr4//8BAAAAf39/AAEAAABkAAAAAAAAABQAAABAHwAAAAAAACYAAAAAAAAAwOD//wAAAAAmAAAAZAAAABYAAABMAAAAAAAAAAAAAAAEAAAAAAAAAAEAAAAzZpkKAAAAACgAAAAoAAAAZAAAAGQAAAAAAAAAzMzMAAAAAABQAAAAUAAAAGQAAABkAAAAAAAAABcAAAAUAAAAAAAAAAAAAAD/fwAA/38AAAAAAAAJAAAABAAAANw7IAEeAAAAaAAAAAAAAAAAAAAAAAAAAAAAAAAAAAAAECcAABAnAAAAAAAAAAAAAAAAAAAAAAAAAAAAAAAAAAAAAAAAAAAAABQAAAAAAAAAwMD/AAAAAABkAAAAMgAAAAAAAABkAAAAAAAAAH9/fwAKAAAAIgAAABgAAAAAAAAAAAAAAAAAAAAAAAAAAAAAAAAAAAAkAAAAJAAAAAAAAAAHAAAAAAAAAAAAAAAAAAAAAAAAAAAAAAAAAAAAf39/ACUAAABYAAAAAAAAAAAAAAAAAAAAAAAAAAAAAAAAAAAAAAAAAAAAAAAAAAAAAAAAAAAAAAA/AAAAAAAAAKCGAQAAAAAAAAAAAAAAAAAMAAAAAQAAAAAAAAAAAAAAAAAAAB8AAABUAAAAAAAABQAAAAEAAAAAAAAAAAAAAAAAAAAAAAAAAAAAAAAAAAAAAAAAAAAAAAJ/f38AAAAAA8zMzADAwP8Af39/AAAAAAAAAAAAAAAAAAAAAAAAAAAAIQAAABgAAAAUAAAAwAMAABsnAAA/FQAAWSkAABAAAAAmAAAACAAAAAAAAAAAAAAA"/>
+                <pr:smNativeData xmlns="smNativeData" xmlns:pr="smNativeData" xmlns:p15="http://schemas.microsoft.com/office/powerpoint/2012/main" xmlns:p14="http://schemas.microsoft.com/office/powerpoint/2010/main" xmlns:mc="http://schemas.openxmlformats.org/markup-compatibility/2006" val="SMDATA_15_l3DXYhMAAAAlAAAAZAAAAA8BAAAAkAAAAEgAAACQAAAASAAAAAAAAAABAAAAAAAAAAEAAABQAAAAAAAAAAAA4D8AAAAAAADgPwAAAAAAAOA/AAAAAAAA4D8AAAAAAADgPwAAAAAAAOA/AAAAAAAA4D8AAAAAAADgPwAAAAAAAOA/AAAAAAAA4D8CAAAAjAAAAAAAAAAAAAAAADOZDCYmJggAAAAAAAAAAAAAAAAAAAAAAAAAAAAAAAAAAAAAZAAAAAEAAABAAAAAAAAAAAAAAAAAAAAAAAAAAAAAAAAAAAAAAAAAAAAAAAAAAAAAAAAAAAAAAAAAAAAAAAAAAAAAAAAAAAAAAAAAAAAAAAAAAAAAAAAAAAAAAAAAAAAAFAAAADwAAAAAAAAAAAAAAP///wkUAAAAAQAAABQAAAAUAAAAFAAAAAEAAAAAAAAAZAAAAGQAAAAAAAAAZAAAAGQAAAAVAAAAYAAAAAAAAAAAAAAADwAAACADAAAAAAAAAAAAAAEAAACgMgAAVgcAAKr4//8BAAAAf39/AAEAAABkAAAAAAAAABQAAABAHwAAAAAAACYAAAAAAAAAwOD//wAAAAAmAAAAZAAAABYAAABMAAAAAAAAAAAAAAAEAAAAAAAAAAEAAAAzZpkKAAAAACgAAAAoAAAAZAAAAGQAAAAAAAAAzMzMAAAAAABQAAAAUAAAAGQAAABkAAAAAAAAABcAAAAUAAAAAAAAAAAAAAD/fwAA/38AAAAAAAAJAAAABAAAANw7IAEeAAAAaAAAAAAAAAAAAAAAAAAAAAAAAAAAAAAAECcAABAnAAAAAAAAAAAAAAAAAAAAAAAAAAAAAAAAAAAAAAAAAAAAABQAAAAAAAAAwMD/AAAAAABkAAAAMgAAAAAAAABkAAAAAAAAAH9/fwAKAAAAIgAAABgAAAAAAAAAAAAAAAAAAAAAAAAAAAAAAAAAAAAkAAAAJAAAAAAAAAAHAAAAAAAAAAAAAAAAAAAAAAAAAAAAAAAAAAAAf39/ACUAAABYAAAAAAAAAAAAAAAAAAAAAAAAAAAAAAAAAAAAAAAAAAAAAAAAAAAAAAAAAAAAAAA/AAAAAAAAAKCGAQAAAAAAAAAAAAAAAAAMAAAAAQAAAAAAAAAAAAAAAAAAAB8AAABUAAAAAAAABQAAAAEAAAAAAAAAAAAAAAAAAAAAAAAAAAAAAAAAAAAAAAAAAAAAAAJ/f38AAAAAA8zMzADAwP8Af39/AAAAAAAAAAAAAAAAAAAAAAAAAAAAIQAAABgAAAAUAAAAwAMAABsnAAA/FQAAWSkAABAAAAAmAAAACAAAAAAAAAAAAAAA"/>
               </a:ext>
             </a:extLst>
           </p:cNvSpPr>
@@ -1908,7 +1921,7 @@
           <a:lstStyle/>
           <a:p>
             <a:fld id="{2B84A5DD-93C6-D153-883C-6506EB727E30}" type="datetime1">
-              <a:t>21/07/2022</a:t>
+              <a:t>26/07/2022</a:t>
             </a:fld>
             <a:endParaRPr/>
           </a:p>
@@ -1921,7 +1934,7 @@
             <a:spLocks noGrp="1" noChangeArrowheads="1"/>
             <a:extLst>
               <a:ext uri="smNativeData">
-                <pr:smNativeData xmlns:mc="http://schemas.openxmlformats.org/markup-compatibility/2006" xmlns:p14="http://schemas.microsoft.com/office/powerpoint/2010/main" xmlns:p15="http://schemas.microsoft.com/office/powerpoint/2012/main" xmlns:pr="smNativeData" xmlns="smNativeData" val="SMDATA_15_l3DXYhMAAAAlAAAAZAAAAA8BAAAAkAAAAEgAAACQAAAASAAAAAAAAAABAAAAAAAAAAEAAABQAAAAAAAAAAAA4D8AAAAAAADgPwAAAAAAAOA/AAAAAAAA4D8AAAAAAADgPwAAAAAAAOA/AAAAAAAA4D8AAAAAAADgPwAAAAAAAOA/AAAAAAAA4D8CAAAAjAAAAAAAAAAAAAAAADOZDCYmJggAAAAAAAAAAAAAAAAAAAAAAAAAAAAAAAAAAAAAZAAAAAEAAABAAAAAAAAAAAAAAAAAAAAAAAAAAAAAAAAAAAAAAAAAAAAAAAAAAAAAAAAAAAAAAAAAAAAAAAAAAAAAAAAAAAAAAAAAAAAAAAAAAAAAAAAAAAAAAAAAAAAAFAAAADwAAAAAAAAAAAAAAP///wkUAAAAAQAAABQAAAAUAAAAFAAAAAEAAAAAAAAAZAAAAGQAAAAAAAAAZAAAAGQAAAAVAAAAYAAAAAAAAAAAAAAADwAAACADAAAAAAAAAAAAAAEAAACgMgAAVgcAAKr4//8BAAAAf39/AAEAAABkAAAAAAAAABQAAABAHwAAAAAAACYAAAAAAAAAwOD//wAAAAAmAAAAZAAAABYAAABMAAAAAAAAAAAAAAAEAAAAAAAAAAEAAAAzZpkKAAAAACgAAAAoAAAAZAAAAGQAAAAAAAAAzMzMAAAAAABQAAAAUAAAAGQAAABkAAAAAAAAABcAAAAUAAAAAAAAAAAAAAD/fwAA/38AAAAAAAAJAAAABAAAANw7IAEeAAAAaAAAAAAAAAAAAAAAAAAAAAAAAAAAAAAAECcAABAnAAAAAAAAAAAAAAAAAAAAAAAAAAAAAAAAAAAAAAAAAAAAABQAAAAAAAAAwMD/AAAAAABkAAAAMgAAAAAAAABkAAAAAAAAAH9/fwAKAAAAIgAAABgAAAAAAAAAAAAAAAAAAAAAAAAAAAAAAAAAAAAkAAAAJAAAAAAAAAAHAAAAAAAAAAAAAAAAAAAAAAAAAAAAAAAAAAAAf39/ACUAAABYAAAAAAAAAAAAAAAAAAAAAAAAAAAAAAAAAAAAAAAAAAAAAAAAAAAAAAAAAAAAAAA/AAAAAAAAAKCGAQAAAAAAAAAAAAAAAAAMAAAAAQAAAAAAAAAAAAAAAAAAAB8AAABUAAAAAAAABQAAAAEAAAAAAAAAAAAAAAAAAAAAAAAAAAAAAAAAAAAAAAAAAAAAAAJ/f38AAAAAA8zMzADAwP8Af39/AAAAAAAAAAAAAAAAAAAAAAAAAAAAIQAAABgAAAAUAAAAoRkAABsnAABfMQAAWSkAABAAAAAmAAAACAAAAAAAAAAAAAAA"/>
+                <pr:smNativeData xmlns="smNativeData" xmlns:pr="smNativeData" xmlns:p15="http://schemas.microsoft.com/office/powerpoint/2012/main" xmlns:p14="http://schemas.microsoft.com/office/powerpoint/2010/main" xmlns:mc="http://schemas.openxmlformats.org/markup-compatibility/2006" val="SMDATA_15_l3DXYhMAAAAlAAAAZAAAAA8BAAAAkAAAAEgAAACQAAAASAAAAAAAAAABAAAAAAAAAAEAAABQAAAAAAAAAAAA4D8AAAAAAADgPwAAAAAAAOA/AAAAAAAA4D8AAAAAAADgPwAAAAAAAOA/AAAAAAAA4D8AAAAAAADgPwAAAAAAAOA/AAAAAAAA4D8CAAAAjAAAAAAAAAAAAAAAADOZDCYmJggAAAAAAAAAAAAAAAAAAAAAAAAAAAAAAAAAAAAAZAAAAAEAAABAAAAAAAAAAAAAAAAAAAAAAAAAAAAAAAAAAAAAAAAAAAAAAAAAAAAAAAAAAAAAAAAAAAAAAAAAAAAAAAAAAAAAAAAAAAAAAAAAAAAAAAAAAAAAAAAAAAAAFAAAADwAAAAAAAAAAAAAAP///wkUAAAAAQAAABQAAAAUAAAAFAAAAAEAAAAAAAAAZAAAAGQAAAAAAAAAZAAAAGQAAAAVAAAAYAAAAAAAAAAAAAAADwAAACADAAAAAAAAAAAAAAEAAACgMgAAVgcAAKr4//8BAAAAf39/AAEAAABkAAAAAAAAABQAAABAHwAAAAAAACYAAAAAAAAAwOD//wAAAAAmAAAAZAAAABYAAABMAAAAAAAAAAAAAAAEAAAAAAAAAAEAAAAzZpkKAAAAACgAAAAoAAAAZAAAAGQAAAAAAAAAzMzMAAAAAABQAAAAUAAAAGQAAABkAAAAAAAAABcAAAAUAAAAAAAAAAAAAAD/fwAA/38AAAAAAAAJAAAABAAAANw7IAEeAAAAaAAAAAAAAAAAAAAAAAAAAAAAAAAAAAAAECcAABAnAAAAAAAAAAAAAAAAAAAAAAAAAAAAAAAAAAAAAAAAAAAAABQAAAAAAAAAwMD/AAAAAABkAAAAMgAAAAAAAABkAAAAAAAAAH9/fwAKAAAAIgAAABgAAAAAAAAAAAAAAAAAAAAAAAAAAAAAAAAAAAAkAAAAJAAAAAAAAAAHAAAAAAAAAAAAAAAAAAAAAAAAAAAAAAAAAAAAf39/ACUAAABYAAAAAAAAAAAAAAAAAAAAAAAAAAAAAAAAAAAAAAAAAAAAAAAAAAAAAAAAAAAAAAA/AAAAAAAAAKCGAQAAAAAAAAAAAAAAAAAMAAAAAQAAAAAAAAAAAAAAAAAAAB8AAABUAAAAAAAABQAAAAEAAAAAAAAAAAAAAAAAAAAAAAAAAAAAAAAAAAAAAAAAAAAAAAJ/f38AAAAAA8zMzADAwP8Af39/AAAAAAAAAAAAAAAAAAAAAAAAAAAAIQAAABgAAAAUAAAAoRkAABsnAABfMQAAWSkAABAAAAAmAAAACAAAAAAAAAAAAAAA"/>
               </a:ext>
             </a:extLst>
           </p:cNvSpPr>
@@ -1945,7 +1958,7 @@
             <a:spLocks noGrp="1" noChangeArrowheads="1"/>
             <a:extLst>
               <a:ext uri="smNativeData">
-                <pr:smNativeData xmlns:mc="http://schemas.openxmlformats.org/markup-compatibility/2006" xmlns:p14="http://schemas.microsoft.com/office/powerpoint/2010/main" xmlns:p15="http://schemas.microsoft.com/office/powerpoint/2012/main" xmlns:pr="smNativeData" xmlns="smNativeData" val="SMDATA_15_l3DXYhMAAAAlAAAAZAAAAA8BAAAAkAAAAEgAAACQAAAASAAAAAAAAAABAAAAAAAAAAEAAABQAAAAAAAAAAAA4D8AAAAAAADgPwAAAAAAAOA/AAAAAAAA4D8AAAAAAADgPwAAAAAAAOA/AAAAAAAA4D8AAAAAAADgPwAAAAAAAOA/AAAAAAAA4D8CAAAAjAAAAAAAAAAAAAAAADOZDCYmJggAAAAAAAAAAAAAAAAAAAAAAAAAAAAAAAAAAAAAZAAAAAEAAABAAAAAAAAAAAAAAAAAAAAAAAAAAAAAAAAAAAAAAAAAAAAAAAAAAAAAAAAAAAAAAAAAAAAAAAAAAAAAAAAAAAAAAAAAAAAAAAAAAAAAAAAAAAAAAAAAAAAAFAAAADwAAAAAAAAAAAAAAP///wkUAAAAAQAAABQAAAAUAAAAFAAAAAEAAAAAAAAAZAAAAGQAAAAAAAAAZAAAAGQAAAAVAAAAYAAAAAAAAAAAAAAADwAAACADAAAAAAAAAAAAAAEAAACgMgAAVgcAAKr4//8BAAAAf39/AAEAAABkAAAAAAAAABQAAABAHwAAAAAAACYAAAAAAAAAwOD//wAAAAAmAAAAZAAAABYAAABMAAAAAAAAAAAAAAAEAAAAAAAAAAEAAAAzZpkKAAAAACgAAAAoAAAAZAAAAGQAAAAAAAAAzMzMAAAAAABQAAAAUAAAAGQAAABkAAAAAAAAABcAAAAUAAAAAAAAAAAAAAD/fwAA/38AAAAAAAAJAAAABAAAANw7IAEeAAAAaAAAAAAAAAAAAAAAAAAAAAAAAAAAAAAAECcAABAnAAAAAAAAAAAAAAAAAAAAAAAAAAAAAAAAAAAAAAAAAAAAABQAAAAAAAAAwMD/AAAAAABkAAAAMgAAAAAAAABkAAAAAAAAAH9/fwAKAAAAIgAAABgAAAAAAAAAAAAAAAAAAAAAAAAAAAAAAAAAAAAkAAAAJAAAAAAAAAAHAAAAAAAAAAAAAAAAAAAAAAAAAAAAAAAAAAAAf39/ACUAAABYAAAAAAAAAAAAAAAAAAAAAAAAAAAAAAAAAAAAAAAAAAAAAAAAAAAAAAAAAAAAAAA/AAAAAAAAAKCGAQAAAAAAAAAAAAAAAAAMAAAAAQAAAAAAAAAAAAAAAAAAAB8AAABUAAAAAAAABQAAAAEAAAAAAAAAAAAAAAAAAAAAAAAAAAAAAAAAAAAAAAAAAAAAAAJ/f38AAAAAA8zMzADAwP8Af39/AAAAAAAAAAAAAAAAAAAAAAAAAAAAIQAAABgAAAAUAAAAwTUAABsnAABARwAAWSkAABAAAAAmAAAACAAAAAAAAAAAAAAA"/>
+                <pr:smNativeData xmlns="smNativeData" xmlns:pr="smNativeData" xmlns:p15="http://schemas.microsoft.com/office/powerpoint/2012/main" xmlns:p14="http://schemas.microsoft.com/office/powerpoint/2010/main" xmlns:mc="http://schemas.openxmlformats.org/markup-compatibility/2006" val="SMDATA_15_l3DXYhMAAAAlAAAAZAAAAA8BAAAAkAAAAEgAAACQAAAASAAAAAAAAAABAAAAAAAAAAEAAABQAAAAAAAAAAAA4D8AAAAAAADgPwAAAAAAAOA/AAAAAAAA4D8AAAAAAADgPwAAAAAAAOA/AAAAAAAA4D8AAAAAAADgPwAAAAAAAOA/AAAAAAAA4D8CAAAAjAAAAAAAAAAAAAAAADOZDCYmJggAAAAAAAAAAAAAAAAAAAAAAAAAAAAAAAAAAAAAZAAAAAEAAABAAAAAAAAAAAAAAAAAAAAAAAAAAAAAAAAAAAAAAAAAAAAAAAAAAAAAAAAAAAAAAAAAAAAAAAAAAAAAAAAAAAAAAAAAAAAAAAAAAAAAAAAAAAAAAAAAAAAAFAAAADwAAAAAAAAAAAAAAP///wkUAAAAAQAAABQAAAAUAAAAFAAAAAEAAAAAAAAAZAAAAGQAAAAAAAAAZAAAAGQAAAAVAAAAYAAAAAAAAAAAAAAADwAAACADAAAAAAAAAAAAAAEAAACgMgAAVgcAAKr4//8BAAAAf39/AAEAAABkAAAAAAAAABQAAABAHwAAAAAAACYAAAAAAAAAwOD//wAAAAAmAAAAZAAAABYAAABMAAAAAAAAAAAAAAAEAAAAAAAAAAEAAAAzZpkKAAAAACgAAAAoAAAAZAAAAGQAAAAAAAAAzMzMAAAAAABQAAAAUAAAAGQAAABkAAAAAAAAABcAAAAUAAAAAAAAAAAAAAD/fwAA/38AAAAAAAAJAAAABAAAANw7IAEeAAAAaAAAAAAAAAAAAAAAAAAAAAAAAAAAAAAAECcAABAnAAAAAAAAAAAAAAAAAAAAAAAAAAAAAAAAAAAAAAAAAAAAABQAAAAAAAAAwMD/AAAAAABkAAAAMgAAAAAAAABkAAAAAAAAAH9/fwAKAAAAIgAAABgAAAAAAAAAAAAAAAAAAAAAAAAAAAAAAAAAAAAkAAAAJAAAAAAAAAAHAAAAAAAAAAAAAAAAAAAAAAAAAAAAAAAAAAAAf39/ACUAAABYAAAAAAAAAAAAAAAAAAAAAAAAAAAAAAAAAAAAAAAAAAAAAAAAAAAAAAAAAAAAAAA/AAAAAAAAAKCGAQAAAAAAAAAAAAAAAAAMAAAAAQAAAAAAAAAAAAAAAAAAAB8AAABUAAAAAAAABQAAAAEAAAAAAAAAAAAAAAAAAAAAAAAAAAAAAAAAAAAAAAAAAAAAAAJ/f38AAAAAA8zMzADAwP8Af39/AAAAAAAAAAAAAAAAAAAAAAAAAAAAIQAAABgAAAAUAAAAwTUAABsnAABARwAAWSkAABAAAAAmAAAACAAAAAAAAAAAAAAA"/>
               </a:ext>
             </a:extLst>
           </p:cNvSpPr>
@@ -1998,7 +2011,7 @@
             <a:spLocks noGrp="1" noChangeArrowheads="1"/>
             <a:extLst>
               <a:ext uri="smNativeData">
-                <pr:smNativeData xmlns:mc="http://schemas.openxmlformats.org/markup-compatibility/2006" xmlns:p14="http://schemas.microsoft.com/office/powerpoint/2010/main" xmlns:p15="http://schemas.microsoft.com/office/powerpoint/2012/main" xmlns:pr="smNativeData" xmlns="smNativeData" val="SMDATA_15_l3DXYhMAAAAlAAAAZAAAAA8BAAAAkAAAAEgAAACQAAAASAAAAAAAAAABAAAAAAAAAAEAAABQAAAAAAAAAAAA4D8AAAAAAADgPwAAAAAAAOA/AAAAAAAA4D8AAAAAAADgPwAAAAAAAOA/AAAAAAAA4D8AAAAAAADgPwAAAAAAAOA/AAAAAAAA4D8CAAAAjAAAAAAAAAAAAAAAADOZDCYmJggAAAAAAAAAAAAAAAAAAAAAAAAAAAAAAAAAAAAAZAAAAAEAAABAAAAAAAAAAAAAAAAAAAAAAAAAAAAAAAAAAAAAAAAAAAAAAAAAAAAAAAAAAAAAAAAAAAAAAAAAAAAAAAAAAAAAAAAAAAAAAAAAAAAAAAAAAAAAAAAAAAAAFAAAADwAAAAAAAAAAAAAAP///wkUAAAAAQAAABQAAAAUAAAAFAAAAAEAAAAAAAAAZAAAAGQAAAAAAAAAZAAAAGQAAAAVAAAAYAAAAAAAAAAAAAAADwAAACADAAAAAAAAAAAAAAEAAACgMgAAVgcAAKr4//8BAAAAf39/AAEAAABkAAAAAAAAABQAAABAHwAAAAAAACYAAAAAAAAAwOD//wAAAAAmAAAAZAAAABYAAABMAAAAAAAAAAAAAAAEAAAAAAAAAAEAAAAzZpkKAAAAACgAAAAoAAAAZAAAAGQAAAAAAAAAzMzMAAAAAABQAAAAUAAAAGQAAABkAAAAAAAAABcAAAAUAAAAAAAAAAAAAAD/fwAA/38AAAAAAAAJAAAABAAAANw7IAEeAAAAaAAAAAAAAAAAAAAAAAAAAAAAAAAAAAAAECcAABAnAAAAAAAAAAAAAAAAAAAAAAAAAAAAAAAAAAAAAAAAAAAAABQAAAAAAAAAwMD/AAAAAABkAAAAMgAAAAAAAABkAAAAAAAAAH9/fwAKAAAAIgAAABgAAAAAAAAAAAAAAAAAAAAAAAAAAAAAAAAAAAAkAAAAJAAAAAAAAAAHAAAAAAAAAAAAAAAAAAAAAAAAAAAAAAAAAAAAf39/ACUAAABYAAAAAAAAAAAAAAAAAAAAAAAAAAAAAAAAAAAAAAAAAAAAAAAAAAAAAAAAAAAAAAA/AAAAAAAAAKCGAQAAAAAAAAAAAAAAAAAMAAAAAQAAAAAAAAAAAAAAAAAAAB8AAABUAAAAAAAABQAAAAEAAAAAAAAAAAAAAAAAAAAAAAAAAAAAAAAAAAAAAAAAAAAAAAJ/f38AAAAAA8zMzADAwP8Af39/AAAAAAAAAAAAAAAAAAAAAAAAAAAAIQAAABgAAAAUAAAAwAMAALABAABARwAAuAgAABAAAAAmAAAACAAAAAAAAAAAAAAA"/>
+                <pr:smNativeData xmlns="smNativeData" xmlns:pr="smNativeData" xmlns:p15="http://schemas.microsoft.com/office/powerpoint/2012/main" xmlns:p14="http://schemas.microsoft.com/office/powerpoint/2010/main" xmlns:mc="http://schemas.openxmlformats.org/markup-compatibility/2006" val="SMDATA_15_l3DXYhMAAAAlAAAAZAAAAA8BAAAAkAAAAEgAAACQAAAASAAAAAAAAAABAAAAAAAAAAEAAABQAAAAAAAAAAAA4D8AAAAAAADgPwAAAAAAAOA/AAAAAAAA4D8AAAAAAADgPwAAAAAAAOA/AAAAAAAA4D8AAAAAAADgPwAAAAAAAOA/AAAAAAAA4D8CAAAAjAAAAAAAAAAAAAAAADOZDCYmJggAAAAAAAAAAAAAAAAAAAAAAAAAAAAAAAAAAAAAZAAAAAEAAABAAAAAAAAAAAAAAAAAAAAAAAAAAAAAAAAAAAAAAAAAAAAAAAAAAAAAAAAAAAAAAAAAAAAAAAAAAAAAAAAAAAAAAAAAAAAAAAAAAAAAAAAAAAAAAAAAAAAAFAAAADwAAAAAAAAAAAAAAP///wkUAAAAAQAAABQAAAAUAAAAFAAAAAEAAAAAAAAAZAAAAGQAAAAAAAAAZAAAAGQAAAAVAAAAYAAAAAAAAAAAAAAADwAAACADAAAAAAAAAAAAAAEAAACgMgAAVgcAAKr4//8BAAAAf39/AAEAAABkAAAAAAAAABQAAABAHwAAAAAAACYAAAAAAAAAwOD//wAAAAAmAAAAZAAAABYAAABMAAAAAAAAAAAAAAAEAAAAAAAAAAEAAAAzZpkKAAAAACgAAAAoAAAAZAAAAGQAAAAAAAAAzMzMAAAAAABQAAAAUAAAAGQAAABkAAAAAAAAABcAAAAUAAAAAAAAAAAAAAD/fwAA/38AAAAAAAAJAAAABAAAANw7IAEeAAAAaAAAAAAAAAAAAAAAAAAAAAAAAAAAAAAAECcAABAnAAAAAAAAAAAAAAAAAAAAAAAAAAAAAAAAAAAAAAAAAAAAABQAAAAAAAAAwMD/AAAAAABkAAAAMgAAAAAAAABkAAAAAAAAAH9/fwAKAAAAIgAAABgAAAAAAAAAAAAAAAAAAAAAAAAAAAAAAAAAAAAkAAAAJAAAAAAAAAAHAAAAAAAAAAAAAAAAAAAAAAAAAAAAAAAAAAAAf39/ACUAAABYAAAAAAAAAAAAAAAAAAAAAAAAAAAAAAAAAAAAAAAAAAAAAAAAAAAAAAAAAAAAAAA/AAAAAAAAAKCGAQAAAAAAAAAAAAAAAAAMAAAAAQAAAAAAAAAAAAAAAAAAAB8AAABUAAAAAAAABQAAAAEAAAAAAAAAAAAAAAAAAAAAAAAAAAAAAAAAAAAAAAAAAAAAAAJ/f38AAAAAA8zMzADAwP8Af39/AAAAAAAAAAAAAAAAAAAAAAAAAAAAIQAAABgAAAAUAAAAwAMAALABAABARwAAuAgAABAAAAAmAAAACAAAAAAAAAAAAAAA"/>
               </a:ext>
             </a:extLst>
           </p:cNvSpPr>
@@ -2024,7 +2037,7 @@
             <a:spLocks noGrp="1" noChangeArrowheads="1"/>
             <a:extLst>
               <a:ext uri="smNativeData">
-                <pr:smNativeData xmlns:mc="http://schemas.openxmlformats.org/markup-compatibility/2006" xmlns:p14="http://schemas.microsoft.com/office/powerpoint/2010/main" xmlns:p15="http://schemas.microsoft.com/office/powerpoint/2012/main" xmlns:pr="smNativeData" xmlns="smNativeData" val="SMDATA_15_l3DXYhMAAAAlAAAAZAAAAA8BAAAAkAAAAEgAAACQAAAASAAAAAAAAAABAAAAAAAAAAEAAABQAAAAAAAAAAAA4D8AAAAAAADgPwAAAAAAAOA/AAAAAAAA4D8AAAAAAADgPwAAAAAAAOA/AAAAAAAA4D8AAAAAAADgPwAAAAAAAOA/AAAAAAAA4D8CAAAAjAAAAAAAAAAAAAAAADOZDCYmJggAAAAAAAAAAAAAAAAAAAAAAAAAAAAAAAAAAAAAZAAAAAEAAABAAAAAAAAAAAAAAAAAAAAAAAAAAAAAAAAAAAAAAAAAAAAAAAAAAAAAAAAAAAAAAAAAAAAAAAAAAAAAAAAAAAAAAAAAAAAAAAAAAAAAAAAAAAAAAAAAAAAAFAAAADwAAAAAAAAAAAAAAP///wkUAAAAAQAAABQAAAAUAAAAFAAAAAEAAAAAAAAAZAAAAGQAAAAAAAAAZAAAAGQAAAAVAAAAYAAAAAAAAAAAAAAADwAAACADAAAAAAAAAAAAAAEAAACgMgAAVgcAAKr4//8BAAAAf39/AAEAAABkAAAAAAAAABQAAABAHwAAAAAAACYAAAAAAAAAwOD//wAAAAAmAAAAZAAAABYAAABMAAAAAAAAAAAAAAAEAAAAAAAAAAEAAAAzZpkKAAAAACgAAAAoAAAAZAAAAGQAAAAAAAAAzMzMAAAAAABQAAAAUAAAAGQAAABkAAAAAAAAABcAAAAUAAAAAAAAAAAAAAD/fwAA/38AAAAAAAAJAAAABAAAANw7IAEeAAAAaAAAAAAAAAAAAAAAAAAAAAAAAAAAAAAAECcAABAnAAAAAAAAAAAAAAAAAAAAAAAAAAAAAAAAAAAAAAAAAAAAABQAAAAAAAAAwMD/AAAAAABkAAAAMgAAAAAAAABkAAAAAAAAAH9/fwAKAAAAIgAAABgAAAAAAAAAAAAAAAAAAAAAAAAAAAAAAAAAAAAkAAAAJAAAAAAAAAAHAAAAAAAAAAAAAAAAAAAAAAAAAAAAAAAAAAAAf39/ACUAAABYAAAAAAAAAAAAAAAAAAAAAAAAAAAAAAAAAAAAAAAAAAAAAAAAAAAAAAAAAAAAAAA/AAAAAAAAAKCGAQAAAAAAAAAAAAAAAAAMAAAAAQAAAAAAAAAAAAAAAAAAAB8AAABUAAAAAAAABQAAAAEAAAAAAAAAAAAAAAAAAAAAAAAAAAAAAAAAAAAAAAAAAAAAAAJ/f38AAAAAA8zMzADAwP8Af39/AAAAAAAAAAAAAAAAAAAAAAAAAAAAIQAAABgAAAAUAAAAwAMAABsnAAA/FQAAWSkAABAAAAAmAAAACAAAAAAAAAAAAAAA"/>
+                <pr:smNativeData xmlns="smNativeData" xmlns:pr="smNativeData" xmlns:p15="http://schemas.microsoft.com/office/powerpoint/2012/main" xmlns:p14="http://schemas.microsoft.com/office/powerpoint/2010/main" xmlns:mc="http://schemas.openxmlformats.org/markup-compatibility/2006" val="SMDATA_15_l3DXYhMAAAAlAAAAZAAAAA8BAAAAkAAAAEgAAACQAAAASAAAAAAAAAABAAAAAAAAAAEAAABQAAAAAAAAAAAA4D8AAAAAAADgPwAAAAAAAOA/AAAAAAAA4D8AAAAAAADgPwAAAAAAAOA/AAAAAAAA4D8AAAAAAADgPwAAAAAAAOA/AAAAAAAA4D8CAAAAjAAAAAAAAAAAAAAAADOZDCYmJggAAAAAAAAAAAAAAAAAAAAAAAAAAAAAAAAAAAAAZAAAAAEAAABAAAAAAAAAAAAAAAAAAAAAAAAAAAAAAAAAAAAAAAAAAAAAAAAAAAAAAAAAAAAAAAAAAAAAAAAAAAAAAAAAAAAAAAAAAAAAAAAAAAAAAAAAAAAAAAAAAAAAFAAAADwAAAAAAAAAAAAAAP///wkUAAAAAQAAABQAAAAUAAAAFAAAAAEAAAAAAAAAZAAAAGQAAAAAAAAAZAAAAGQAAAAVAAAAYAAAAAAAAAAAAAAADwAAACADAAAAAAAAAAAAAAEAAACgMgAAVgcAAKr4//8BAAAAf39/AAEAAABkAAAAAAAAABQAAABAHwAAAAAAACYAAAAAAAAAwOD//wAAAAAmAAAAZAAAABYAAABMAAAAAAAAAAAAAAAEAAAAAAAAAAEAAAAzZpkKAAAAACgAAAAoAAAAZAAAAGQAAAAAAAAAzMzMAAAAAABQAAAAUAAAAGQAAABkAAAAAAAAABcAAAAUAAAAAAAAAAAAAAD/fwAA/38AAAAAAAAJAAAABAAAANw7IAEeAAAAaAAAAAAAAAAAAAAAAAAAAAAAAAAAAAAAECcAABAnAAAAAAAAAAAAAAAAAAAAAAAAAAAAAAAAAAAAAAAAAAAAABQAAAAAAAAAwMD/AAAAAABkAAAAMgAAAAAAAABkAAAAAAAAAH9/fwAKAAAAIgAAABgAAAAAAAAAAAAAAAAAAAAAAAAAAAAAAAAAAAAkAAAAJAAAAAAAAAAHAAAAAAAAAAAAAAAAAAAAAAAAAAAAAAAAAAAAf39/ACUAAABYAAAAAAAAAAAAAAAAAAAAAAAAAAAAAAAAAAAAAAAAAAAAAAAAAAAAAAAAAAAAAAA/AAAAAAAAAKCGAQAAAAAAAAAAAAAAAAAMAAAAAQAAAAAAAAAAAAAAAAAAAB8AAABUAAAAAAAABQAAAAEAAAAAAAAAAAAAAAAAAAAAAAAAAAAAAAAAAAAAAAAAAAAAAAJ/f38AAAAAA8zMzADAwP8Af39/AAAAAAAAAAAAAAAAAAAAAAAAAAAAIQAAABgAAAAUAAAAwAMAABsnAAA/FQAAWSkAABAAAAAmAAAACAAAAAAAAAAAAAAA"/>
               </a:ext>
             </a:extLst>
           </p:cNvSpPr>
@@ -2038,7 +2051,7 @@
           <a:lstStyle/>
           <a:p>
             <a:fld id="{2B84B13C-72C6-D147-883C-8412FF727ED1}" type="datetime1">
-              <a:t>21/07/2022</a:t>
+              <a:t>26/07/2022</a:t>
             </a:fld>
             <a:endParaRPr/>
           </a:p>
@@ -2051,7 +2064,7 @@
             <a:spLocks noGrp="1" noChangeArrowheads="1"/>
             <a:extLst>
               <a:ext uri="smNativeData">
-                <pr:smNativeData xmlns:mc="http://schemas.openxmlformats.org/markup-compatibility/2006" xmlns:p14="http://schemas.microsoft.com/office/powerpoint/2010/main" xmlns:p15="http://schemas.microsoft.com/office/powerpoint/2012/main" xmlns:pr="smNativeData" xmlns="smNativeData" val="SMDATA_15_l3DXYhMAAAAlAAAAZAAAAA8BAAAAkAAAAEgAAACQAAAASAAAAAAAAAABAAAAAAAAAAEAAABQAAAAAAAAAAAA4D8AAAAAAADgPwAAAAAAAOA/AAAAAAAA4D8AAAAAAADgPwAAAAAAAOA/AAAAAAAA4D8AAAAAAADgPwAAAAAAAOA/AAAAAAAA4D8CAAAAjAAAAAAAAAAAAAAAADOZDCYmJggAAAAAAAAAAAAAAAAAAAAAAAAAAAAAAAAAAAAAZAAAAAEAAABAAAAAAAAAAAAAAAAAAAAAAAAAAAAAAAAAAAAAAAAAAAAAAAAAAAAAAAAAAAAAAAAAAAAAAAAAAAAAAAAAAAAAAAAAAAAAAAAAAAAAAAAAAAAAAAAAAAAAFAAAADwAAAAAAAAAAAAAAP///wkUAAAAAQAAABQAAAAUAAAAFAAAAAEAAAAAAAAAZAAAAGQAAAAAAAAAZAAAAGQAAAAVAAAAYAAAAAAAAAAAAAAADwAAACADAAAAAAAAAAAAAAEAAACgMgAAVgcAAKr4//8BAAAAf39/AAEAAABkAAAAAAAAABQAAABAHwAAAAAAACYAAAAAAAAAwOD//wAAAAAmAAAAZAAAABYAAABMAAAAAAAAAAAAAAAEAAAAAAAAAAEAAAAzZpkKAAAAACgAAAAoAAAAZAAAAGQAAAAAAAAAzMzMAAAAAABQAAAAUAAAAGQAAABkAAAAAAAAABcAAAAUAAAAAAAAAAAAAAD/fwAA/38AAAAAAAAJAAAABAAAANw7IAEeAAAAaAAAAAAAAAAAAAAAAAAAAAAAAAAAAAAAECcAABAnAAAAAAAAAAAAAAAAAAAAAAAAAAAAAAAAAAAAAAAAAAAAABQAAAAAAAAAwMD/AAAAAABkAAAAMgAAAAAAAABkAAAAAAAAAH9/fwAKAAAAIgAAABgAAAAAAAAAAAAAAAAAAAAAAAAAAAAAAAAAAAAkAAAAJAAAAAAAAAAHAAAAAAAAAAAAAAAAAAAAAAAAAAAAAAAAAAAAf39/ACUAAABYAAAAAAAAAAAAAAAAAAAAAAAAAAAAAAAAAAAAAAAAAAAAAAAAAAAAAAAAAAAAAAA/AAAAAAAAAKCGAQAAAAAAAAAAAAAAAAAMAAAAAQAAAAAAAAAAAAAAAAAAAB8AAABUAAAAAAAABQAAAAEAAAAAAAAAAAAAAAAAAAAAAAAAAAAAAAAAAAAAAAAAAAAAAAJ/f38AAAAAA8zMzADAwP8Af39/AAAAAAAAAAAAAAAAAAAAAAAAAAAAIQAAABgAAAAUAAAAoRkAABsnAABfMQAAWSkAABAAAAAmAAAACAAAAAAAAAAAAAAA"/>
+                <pr:smNativeData xmlns="smNativeData" xmlns:pr="smNativeData" xmlns:p15="http://schemas.microsoft.com/office/powerpoint/2012/main" xmlns:p14="http://schemas.microsoft.com/office/powerpoint/2010/main" xmlns:mc="http://schemas.openxmlformats.org/markup-compatibility/2006" val="SMDATA_15_l3DXYhMAAAAlAAAAZAAAAA8BAAAAkAAAAEgAAACQAAAASAAAAAAAAAABAAAAAAAAAAEAAABQAAAAAAAAAAAA4D8AAAAAAADgPwAAAAAAAOA/AAAAAAAA4D8AAAAAAADgPwAAAAAAAOA/AAAAAAAA4D8AAAAAAADgPwAAAAAAAOA/AAAAAAAA4D8CAAAAjAAAAAAAAAAAAAAAADOZDCYmJggAAAAAAAAAAAAAAAAAAAAAAAAAAAAAAAAAAAAAZAAAAAEAAABAAAAAAAAAAAAAAAAAAAAAAAAAAAAAAAAAAAAAAAAAAAAAAAAAAAAAAAAAAAAAAAAAAAAAAAAAAAAAAAAAAAAAAAAAAAAAAAAAAAAAAAAAAAAAAAAAAAAAFAAAADwAAAAAAAAAAAAAAP///wkUAAAAAQAAABQAAAAUAAAAFAAAAAEAAAAAAAAAZAAAAGQAAAAAAAAAZAAAAGQAAAAVAAAAYAAAAAAAAAAAAAAADwAAACADAAAAAAAAAAAAAAEAAACgMgAAVgcAAKr4//8BAAAAf39/AAEAAABkAAAAAAAAABQAAABAHwAAAAAAACYAAAAAAAAAwOD//wAAAAAmAAAAZAAAABYAAABMAAAAAAAAAAAAAAAEAAAAAAAAAAEAAAAzZpkKAAAAACgAAAAoAAAAZAAAAGQAAAAAAAAAzMzMAAAAAABQAAAAUAAAAGQAAABkAAAAAAAAABcAAAAUAAAAAAAAAAAAAAD/fwAA/38AAAAAAAAJAAAABAAAANw7IAEeAAAAaAAAAAAAAAAAAAAAAAAAAAAAAAAAAAAAECcAABAnAAAAAAAAAAAAAAAAAAAAAAAAAAAAAAAAAAAAAAAAAAAAABQAAAAAAAAAwMD/AAAAAABkAAAAMgAAAAAAAABkAAAAAAAAAH9/fwAKAAAAIgAAABgAAAAAAAAAAAAAAAAAAAAAAAAAAAAAAAAAAAAkAAAAJAAAAAAAAAAHAAAAAAAAAAAAAAAAAAAAAAAAAAAAAAAAAAAAf39/ACUAAABYAAAAAAAAAAAAAAAAAAAAAAAAAAAAAAAAAAAAAAAAAAAAAAAAAAAAAAAAAAAAAAA/AAAAAAAAAKCGAQAAAAAAAAAAAAAAAAAMAAAAAQAAAAAAAAAAAAAAAAAAAB8AAABUAAAAAAAABQAAAAEAAAAAAAAAAAAAAAAAAAAAAAAAAAAAAAAAAAAAAAAAAAAAAAJ/f38AAAAAA8zMzADAwP8Af39/AAAAAAAAAAAAAAAAAAAAAAAAAAAAIQAAABgAAAAUAAAAoRkAABsnAABfMQAAWSkAABAAAAAmAAAACAAAAAAAAAAAAAAA"/>
               </a:ext>
             </a:extLst>
           </p:cNvSpPr>
@@ -2075,7 +2088,7 @@
             <a:spLocks noGrp="1" noChangeArrowheads="1"/>
             <a:extLst>
               <a:ext uri="smNativeData">
-                <pr:smNativeData xmlns:mc="http://schemas.openxmlformats.org/markup-compatibility/2006" xmlns:p14="http://schemas.microsoft.com/office/powerpoint/2010/main" xmlns:p15="http://schemas.microsoft.com/office/powerpoint/2012/main" xmlns:pr="smNativeData" xmlns="smNativeData" val="SMDATA_15_l3DXYhMAAAAlAAAAZAAAAA8BAAAAkAAAAEgAAACQAAAASAAAAAAAAAABAAAAAAAAAAEAAABQAAAAAAAAAAAA4D8AAAAAAADgPwAAAAAAAOA/AAAAAAAA4D8AAAAAAADgPwAAAAAAAOA/AAAAAAAA4D8AAAAAAADgPwAAAAAAAOA/AAAAAAAA4D8CAAAAjAAAAAAAAAAAAAAAADOZDCYmJggAAAAAAAAAAAAAAAAAAAAAAAAAAAAAAAAAAAAAZAAAAAEAAABAAAAAAAAAAAAAAAAAAAAAAAAAAAAAAAAAAAAAAAAAAAAAAAAAAAAAAAAAAAAAAAAAAAAAAAAAAAAAAAAAAAAAAAAAAAAAAAAAAAAAAAAAAAAAAAAAAAAAFAAAADwAAAAAAAAAAAAAAP///wkUAAAAAQAAABQAAAAUAAAAFAAAAAEAAAAAAAAAZAAAAGQAAAAAAAAAZAAAAGQAAAAVAAAAYAAAAAAAAAAAAAAADwAAACADAAAAAAAAAAAAAAEAAACgMgAAVgcAAKr4//8BAAAAf39/AAEAAABkAAAAAAAAABQAAABAHwAAAAAAACYAAAAAAAAAwOD//wAAAAAmAAAAZAAAABYAAABMAAAAAAAAAAAAAAAEAAAAAAAAAAEAAAAzZpkKAAAAACgAAAAoAAAAZAAAAGQAAAAAAAAAzMzMAAAAAABQAAAAUAAAAGQAAABkAAAAAAAAABcAAAAUAAAAAAAAAAAAAAD/fwAA/38AAAAAAAAJAAAABAAAANw7IAEeAAAAaAAAAAAAAAAAAAAAAAAAAAAAAAAAAAAAECcAABAnAAAAAAAAAAAAAAAAAAAAAAAAAAAAAAAAAAAAAAAAAAAAABQAAAAAAAAAwMD/AAAAAABkAAAAMgAAAAAAAABkAAAAAAAAAH9/fwAKAAAAIgAAABgAAAAAAAAAAAAAAAAAAAAAAAAAAAAAAAAAAAAkAAAAJAAAAAAAAAAHAAAAAAAAAAAAAAAAAAAAAAAAAAAAAAAAAAAAf39/ACUAAABYAAAAAAAAAAAAAAAAAAAAAAAAAAAAAAAAAAAAAAAAAAAAAAAAAAAAAAAAAAAAAAA/AAAAAAAAAKCGAQAAAAAAAAAAAAAAAAAMAAAAAQAAAAAAAAAAAAAAAAAAAB8AAABUAAAAAAAABQAAAAEAAAAAAAAAAAAAAAAAAAAAAAAAAAAAAAAAAAAAAAAAAAAAAAJ/f38AAAAAA8zMzADAwP8Af39/AAAAAAAAAAAAAAAAAAAAAAAAAAAAIQAAABgAAAAUAAAAwTUAABsnAABARwAAWSkAABAAAAAmAAAACAAAAAAAAAAAAAAA"/>
+                <pr:smNativeData xmlns="smNativeData" xmlns:pr="smNativeData" xmlns:p15="http://schemas.microsoft.com/office/powerpoint/2012/main" xmlns:p14="http://schemas.microsoft.com/office/powerpoint/2010/main" xmlns:mc="http://schemas.openxmlformats.org/markup-compatibility/2006" val="SMDATA_15_l3DXYhMAAAAlAAAAZAAAAA8BAAAAkAAAAEgAAACQAAAASAAAAAAAAAABAAAAAAAAAAEAAABQAAAAAAAAAAAA4D8AAAAAAADgPwAAAAAAAOA/AAAAAAAA4D8AAAAAAADgPwAAAAAAAOA/AAAAAAAA4D8AAAAAAADgPwAAAAAAAOA/AAAAAAAA4D8CAAAAjAAAAAAAAAAAAAAAADOZDCYmJggAAAAAAAAAAAAAAAAAAAAAAAAAAAAAAAAAAAAAZAAAAAEAAABAAAAAAAAAAAAAAAAAAAAAAAAAAAAAAAAAAAAAAAAAAAAAAAAAAAAAAAAAAAAAAAAAAAAAAAAAAAAAAAAAAAAAAAAAAAAAAAAAAAAAAAAAAAAAAAAAAAAAFAAAADwAAAAAAAAAAAAAAP///wkUAAAAAQAAABQAAAAUAAAAFAAAAAEAAAAAAAAAZAAAAGQAAAAAAAAAZAAAAGQAAAAVAAAAYAAAAAAAAAAAAAAADwAAACADAAAAAAAAAAAAAAEAAACgMgAAVgcAAKr4//8BAAAAf39/AAEAAABkAAAAAAAAABQAAABAHwAAAAAAACYAAAAAAAAAwOD//wAAAAAmAAAAZAAAABYAAABMAAAAAAAAAAAAAAAEAAAAAAAAAAEAAAAzZpkKAAAAACgAAAAoAAAAZAAAAGQAAAAAAAAAzMzMAAAAAABQAAAAUAAAAGQAAABkAAAAAAAAABcAAAAUAAAAAAAAAAAAAAD/fwAA/38AAAAAAAAJAAAABAAAANw7IAEeAAAAaAAAAAAAAAAAAAAAAAAAAAAAAAAAAAAAECcAABAnAAAAAAAAAAAAAAAAAAAAAAAAAAAAAAAAAAAAAAAAAAAAABQAAAAAAAAAwMD/AAAAAABkAAAAMgAAAAAAAABkAAAAAAAAAH9/fwAKAAAAIgAAABgAAAAAAAAAAAAAAAAAAAAAAAAAAAAAAAAAAAAkAAAAJAAAAAAAAAAHAAAAAAAAAAAAAAAAAAAAAAAAAAAAAAAAAAAAf39/ACUAAABYAAAAAAAAAAAAAAAAAAAAAAAAAAAAAAAAAAAAAAAAAAAAAAAAAAAAAAAAAAAAAAA/AAAAAAAAAKCGAQAAAAAAAAAAAAAAAAAMAAAAAQAAAAAAAAAAAAAAAAAAAB8AAABUAAAAAAAABQAAAAEAAAAAAAAAAAAAAAAAAAAAAAAAAAAAAAAAAAAAAAAAAAAAAAJ/f38AAAAAA8zMzADAwP8Af39/AAAAAAAAAAAAAAAAAAAAAAAAAAAAIQAAABgAAAAUAAAAwTUAABsnAABARwAAWSkAABAAAAAmAAAACAAAAAAAAAAAAAAA"/>
               </a:ext>
             </a:extLst>
           </p:cNvSpPr>
@@ -2128,7 +2141,7 @@
             <a:spLocks noGrp="1" noChangeArrowheads="1"/>
             <a:extLst>
               <a:ext uri="smNativeData">
-                <pr:smNativeData xmlns:mc="http://schemas.openxmlformats.org/markup-compatibility/2006" xmlns:p14="http://schemas.microsoft.com/office/powerpoint/2010/main" xmlns:p15="http://schemas.microsoft.com/office/powerpoint/2012/main" xmlns:pr="smNativeData" xmlns="smNativeData" val="SMDATA_15_l3DXYhMAAAAlAAAAZAAAAA8BAAAAkAAAAEgAAACQAAAASAAAAAAAAAABAAAAAAAAAAEAAABQAAAAAAAAAAAA4D8AAAAAAADgPwAAAAAAAOA/AAAAAAAA4D8AAAAAAADgPwAAAAAAAOA/AAAAAAAA4D8AAAAAAADgPwAAAAAAAOA/AAAAAAAA4D8CAAAAjAAAAAAAAAAAAAAAADOZDCYmJggAAAAAAAAAAAAAAAAAAAAAAAAAAAAAAAAAAAAAZAAAAAEAAABAAAAAAAAAAAAAAAAAAAAAAAAAAAAAAAAAAAAAAAAAAAAAAAAAAAAAAAAAAAAAAAAAAAAAAAAAAAAAAAAAAAAAAAAAAAAAAAAAAAAAAAAAAAAAAAAAAAAAFAAAADwAAAAAAAAAAAAAAP///wkUAAAAAQAAABQAAAAUAAAAFAAAAAEAAAAAAAAAZAAAAGQAAAAAAAAAZAAAAGQAAAAVAAAAYAAAAAAAAAAAAAAADwAAACADAAAAAAAAAAAAAAEAAACgMgAAVgcAAKr4//8BAAAAf39/AAEAAABkAAAAAAAAABQAAABAHwAAAAAAACYAAAAAAAAAwOD//wAAAAAmAAAAZAAAABYAAABMAAAAAAAAAAAAAAAEAAAAAAAAAAEAAAAzZpkKAAAAACgAAAAoAAAAZAAAAGQAAAAAAAAAzMzMAAAAAABQAAAAUAAAAGQAAABkAAAAAAAAABcAAAAUAAAAAAAAAAAAAAD/fwAA/38AAAAAAAAJAAAABAAAANw7IAEeAAAAaAAAAAAAAAAAAAAAAAAAAAAAAAAAAAAAECcAABAnAAAAAAAAAAAAAAAAAAAAAAAAAAAAAAAAAAAAAAAAAAAAABQAAAAAAAAAwMD/AAAAAABkAAAAMgAAAAAAAABkAAAAAAAAAH9/fwAKAAAAIgAAABgAAAAAAAAAAAAAAAAAAAAAAAAAAAAAAAAAAAAkAAAAJAAAAAAAAAAHAAAAAAAAAAAAAAAAAAAAAAAAAAAAAAAAAAAAf39/ACUAAABYAAAAAAAAAAAAAAAAAAAAAAAAAAAAAAAAAAAAAAAAAAAAAAAAAAAAAAAAAAAAAAA/AAAAAAAAAKCGAQAAAAAAAAAAAAAAAAAMAAAAAQAAAAAAAAAAAAAAAAAAAB8AAABUAAAAAAAABQAAAAEAAAAAAAAAAAAAAAAAAAAAAAAAAAAAAAAAAAAAAAAAAAAAAAJ/f38AAAAAA8zMzADAwP8Af39/AAAAAAAAAAAAAAAAAAAAAAAAAAAAIQAAABgAAAAUAAAAwAMAABsnAAA/FQAAWSkAABAAAAAmAAAACAAAAAAAAAAAAAAA"/>
+                <pr:smNativeData xmlns="smNativeData" xmlns:pr="smNativeData" xmlns:p15="http://schemas.microsoft.com/office/powerpoint/2012/main" xmlns:p14="http://schemas.microsoft.com/office/powerpoint/2010/main" xmlns:mc="http://schemas.openxmlformats.org/markup-compatibility/2006" val="SMDATA_15_l3DXYhMAAAAlAAAAZAAAAA8BAAAAkAAAAEgAAACQAAAASAAAAAAAAAABAAAAAAAAAAEAAABQAAAAAAAAAAAA4D8AAAAAAADgPwAAAAAAAOA/AAAAAAAA4D8AAAAAAADgPwAAAAAAAOA/AAAAAAAA4D8AAAAAAADgPwAAAAAAAOA/AAAAAAAA4D8CAAAAjAAAAAAAAAAAAAAAADOZDCYmJggAAAAAAAAAAAAAAAAAAAAAAAAAAAAAAAAAAAAAZAAAAAEAAABAAAAAAAAAAAAAAAAAAAAAAAAAAAAAAAAAAAAAAAAAAAAAAAAAAAAAAAAAAAAAAAAAAAAAAAAAAAAAAAAAAAAAAAAAAAAAAAAAAAAAAAAAAAAAAAAAAAAAFAAAADwAAAAAAAAAAAAAAP///wkUAAAAAQAAABQAAAAUAAAAFAAAAAEAAAAAAAAAZAAAAGQAAAAAAAAAZAAAAGQAAAAVAAAAYAAAAAAAAAAAAAAADwAAACADAAAAAAAAAAAAAAEAAACgMgAAVgcAAKr4//8BAAAAf39/AAEAAABkAAAAAAAAABQAAABAHwAAAAAAACYAAAAAAAAAwOD//wAAAAAmAAAAZAAAABYAAABMAAAAAAAAAAAAAAAEAAAAAAAAAAEAAAAzZpkKAAAAACgAAAAoAAAAZAAAAGQAAAAAAAAAzMzMAAAAAABQAAAAUAAAAGQAAABkAAAAAAAAABcAAAAUAAAAAAAAAAAAAAD/fwAA/38AAAAAAAAJAAAABAAAANw7IAEeAAAAaAAAAAAAAAAAAAAAAAAAAAAAAAAAAAAAECcAABAnAAAAAAAAAAAAAAAAAAAAAAAAAAAAAAAAAAAAAAAAAAAAABQAAAAAAAAAwMD/AAAAAABkAAAAMgAAAAAAAABkAAAAAAAAAH9/fwAKAAAAIgAAABgAAAAAAAAAAAAAAAAAAAAAAAAAAAAAAAAAAAAkAAAAJAAAAAAAAAAHAAAAAAAAAAAAAAAAAAAAAAAAAAAAAAAAAAAAf39/ACUAAABYAAAAAAAAAAAAAAAAAAAAAAAAAAAAAAAAAAAAAAAAAAAAAAAAAAAAAAAAAAAAAAA/AAAAAAAAAKCGAQAAAAAAAAAAAAAAAAAMAAAAAQAAAAAAAAAAAAAAAAAAAB8AAABUAAAAAAAABQAAAAEAAAAAAAAAAAAAAAAAAAAAAAAAAAAAAAAAAAAAAAAAAAAAAAJ/f38AAAAAA8zMzADAwP8Af39/AAAAAAAAAAAAAAAAAAAAAAAAAAAAIQAAABgAAAAUAAAAwAMAABsnAAA/FQAAWSkAABAAAAAmAAAACAAAAAAAAAAAAAAA"/>
               </a:ext>
             </a:extLst>
           </p:cNvSpPr>
@@ -2142,7 +2155,7 @@
           <a:lstStyle/>
           <a:p>
             <a:fld id="{2B848643-0DC6-D170-883C-FB25C8727EAE}" type="datetime1">
-              <a:t>21/07/2022</a:t>
+              <a:t>26/07/2022</a:t>
             </a:fld>
             <a:endParaRPr/>
           </a:p>
@@ -2155,7 +2168,7 @@
             <a:spLocks noGrp="1" noChangeArrowheads="1"/>
             <a:extLst>
               <a:ext uri="smNativeData">
-                <pr:smNativeData xmlns:mc="http://schemas.openxmlformats.org/markup-compatibility/2006" xmlns:p14="http://schemas.microsoft.com/office/powerpoint/2010/main" xmlns:p15="http://schemas.microsoft.com/office/powerpoint/2012/main" xmlns:pr="smNativeData" xmlns="smNativeData" val="SMDATA_15_l3DXYhMAAAAlAAAAZAAAAA8BAAAAkAAAAEgAAACQAAAASAAAAAAAAAABAAAAAAAAAAEAAABQAAAAAAAAAAAA4D8AAAAAAADgPwAAAAAAAOA/AAAAAAAA4D8AAAAAAADgPwAAAAAAAOA/AAAAAAAA4D8AAAAAAADgPwAAAAAAAOA/AAAAAAAA4D8CAAAAjAAAAAAAAAAAAAAAADOZDCYmJggAAAAAAAAAAAAAAAAAAAAAAAAAAAAAAAAAAAAAZAAAAAEAAABAAAAAAAAAAAAAAAAAAAAAAAAAAAAAAAAAAAAAAAAAAAAAAAAAAAAAAAAAAAAAAAAAAAAAAAAAAAAAAAAAAAAAAAAAAAAAAAAAAAAAAAAAAAAAAAAAAAAAFAAAADwAAAAAAAAAAAAAAP///wkUAAAAAQAAABQAAAAUAAAAFAAAAAEAAAAAAAAAZAAAAGQAAAAAAAAAZAAAAGQAAAAVAAAAYAAAAAAAAAAAAAAADwAAACADAAAAAAAAAAAAAAEAAACgMgAAVgcAAKr4//8BAAAAf39/AAEAAABkAAAAAAAAABQAAABAHwAAAAAAACYAAAAAAAAAwOD//wAAAAAmAAAAZAAAABYAAABMAAAAAAAAAAAAAAAEAAAAAAAAAAEAAAAzZpkKAAAAACgAAAAoAAAAZAAAAGQAAAAAAAAAzMzMAAAAAABQAAAAUAAAAGQAAABkAAAAAAAAABcAAAAUAAAAAAAAAAAAAAD/fwAA/38AAAAAAAAJAAAABAAAAAAAAAAeAAAAaAAAAAAAAAAAAAAAAAAAAAAAAAAAAAAAECcAABAnAAAAAAAAAAAAAAAAAAAAAAAAAAAAAAAAAAAAAAAAAAAAABQAAAAAAAAAwMD/AAAAAABkAAAAMgAAAAAAAABkAAAAAAAAAH9/fwAKAAAAIgAAABgAAAAAAAAAAAAAAAAAAAAAAAAAAAAAAAAAAAAkAAAAJAAAAAAAAAAHAAAAAAAAAAAAAAAAAAAAAAAAAAAAAAAAAAAAf39/ACUAAABYAAAAAAAAAAAAAAAAAAAAAAAAAAAAAAAAAAAAAAAAAAAAAAAAAAAAAAAAAAAAAAA/AAAAAAAAAKCGAQAAAAAAAAAAAAAAAAAMAAAAAQAAAAAAAAAAAAAAAAAAAB8AAABUAAAAAAAABQAAAAEAAAAAAAAAAAAAAAAAAAAAAAAAAAAAAAAAAAAAAAAAAAAAAAJ/f38AAAAAA8zMzADAwP8Af39/AAAAAAAAAAAAAAAAAAAAAAAAAAAAIQAAABgAAAAUAAAAoRkAABsnAABfMQAAWSkAABAAAAAmAAAACAAAAAAAAAAAAAAA"/>
+                <pr:smNativeData xmlns="smNativeData" xmlns:pr="smNativeData" xmlns:p15="http://schemas.microsoft.com/office/powerpoint/2012/main" xmlns:p14="http://schemas.microsoft.com/office/powerpoint/2010/main" xmlns:mc="http://schemas.openxmlformats.org/markup-compatibility/2006" val="SMDATA_15_l3DXYhMAAAAlAAAAZAAAAA8BAAAAkAAAAEgAAACQAAAASAAAAAAAAAABAAAAAAAAAAEAAABQAAAAAAAAAAAA4D8AAAAAAADgPwAAAAAAAOA/AAAAAAAA4D8AAAAAAADgPwAAAAAAAOA/AAAAAAAA4D8AAAAAAADgPwAAAAAAAOA/AAAAAAAA4D8CAAAAjAAAAAAAAAAAAAAAADOZDCYmJggAAAAAAAAAAAAAAAAAAAAAAAAAAAAAAAAAAAAAZAAAAAEAAABAAAAAAAAAAAAAAAAAAAAAAAAAAAAAAAAAAAAAAAAAAAAAAAAAAAAAAAAAAAAAAAAAAAAAAAAAAAAAAAAAAAAAAAAAAAAAAAAAAAAAAAAAAAAAAAAAAAAAFAAAADwAAAAAAAAAAAAAAP///wkUAAAAAQAAABQAAAAUAAAAFAAAAAEAAAAAAAAAZAAAAGQAAAAAAAAAZAAAAGQAAAAVAAAAYAAAAAAAAAAAAAAADwAAACADAAAAAAAAAAAAAAEAAACgMgAAVgcAAKr4//8BAAAAf39/AAEAAABkAAAAAAAAABQAAABAHwAAAAAAACYAAAAAAAAAwOD//wAAAAAmAAAAZAAAABYAAABMAAAAAAAAAAAAAAAEAAAAAAAAAAEAAAAzZpkKAAAAACgAAAAoAAAAZAAAAGQAAAAAAAAAzMzMAAAAAABQAAAAUAAAAGQAAABkAAAAAAAAABcAAAAUAAAAAAAAAAAAAAD/fwAA/38AAAAAAAAJAAAABAAAAAAAAAAeAAAAaAAAAAAAAAAAAAAAAAAAAAAAAAAAAAAAECcAABAnAAAAAAAAAAAAAAAAAAAAAAAAAAAAAAAAAAAAAAAAAAAAABQAAAAAAAAAwMD/AAAAAABkAAAAMgAAAAAAAABkAAAAAAAAAH9/fwAKAAAAIgAAABgAAAAAAAAAAAAAAAAAAAAAAAAAAAAAAAAAAAAkAAAAJAAAAAAAAAAHAAAAAAAAAAAAAAAAAAAAAAAAAAAAAAAAAAAAf39/ACUAAABYAAAAAAAAAAAAAAAAAAAAAAAAAAAAAAAAAAAAAAAAAAAAAAAAAAAAAAAAAAAAAAA/AAAAAAAAAKCGAQAAAAAAAAAAAAAAAAAMAAAAAQAAAAAAAAAAAAAAAAAAAB8AAABUAAAAAAAABQAAAAEAAAAAAAAAAAAAAAAAAAAAAAAAAAAAAAAAAAAAAAAAAAAAAAJ/f38AAAAAA8zMzADAwP8Af39/AAAAAAAAAAAAAAAAAAAAAAAAAAAAIQAAABgAAAAUAAAAoRkAABsnAABfMQAAWSkAABAAAAAmAAAACAAAAAAAAAAAAAAA"/>
               </a:ext>
             </a:extLst>
           </p:cNvSpPr>
@@ -2179,7 +2192,7 @@
             <a:spLocks noGrp="1" noChangeArrowheads="1"/>
             <a:extLst>
               <a:ext uri="smNativeData">
-                <pr:smNativeData xmlns:mc="http://schemas.openxmlformats.org/markup-compatibility/2006" xmlns:p14="http://schemas.microsoft.com/office/powerpoint/2010/main" xmlns:p15="http://schemas.microsoft.com/office/powerpoint/2012/main" xmlns:pr="smNativeData" xmlns="smNativeData" val="SMDATA_15_l3DXYhMAAAAlAAAAZAAAAA8BAAAAkAAAAEgAAACQAAAASAAAAAAAAAABAAAAAAAAAAEAAABQAAAAAAAAAAAA4D8AAAAAAADgPwAAAAAAAOA/AAAAAAAA4D8AAAAAAADgPwAAAAAAAOA/AAAAAAAA4D8AAAAAAADgPwAAAAAAAOA/AAAAAAAA4D8CAAAAjAAAAAAAAAAAAAAAADOZDCYmJggAAAAAAAAAAAAAAAAAAAAAAAAAAAAAAAAAAAAAZAAAAAEAAABAAAAAAAAAAAAAAAAAAAAAAAAAAAAAAAAAAAAAAAAAAAAAAAAAAAAAAAAAAAAAAAAAAAAAAAAAAAAAAAAAAAAAAAAAAAAAAAAAAAAAAAAAAAAAAAAAAAAAFAAAADwAAAAAAAAAAAAAAP///wkUAAAAAQAAABQAAAAUAAAAFAAAAAEAAAAAAAAAZAAAAGQAAAAAAAAAZAAAAGQAAAAVAAAAYAAAAAAAAAAAAAAADwAAACADAAAAAAAAAAAAAAEAAACgMgAAVgcAAKr4//8BAAAAf39/AAEAAABkAAAAAAAAABQAAABAHwAAAAAAACYAAAAAAAAAwOD//wAAAAAmAAAAZAAAABYAAABMAAAAAAAAAAAAAAAEAAAAAAAAAAEAAAAzZpkKAAAAACgAAAAoAAAAZAAAAGQAAAAAAAAAzMzMAAAAAABQAAAAUAAAAGQAAABkAAAAAAAAABcAAAAUAAAAAAAAAAAAAAD/fwAA/38AAAAAAAAJAAAABAAAAAAAAAAeAAAAaAAAAAAAAAAAAAAAAAAAAAAAAAAAAAAAECcAABAnAAAAAAAAAAAAAAAAAAAAAAAAAAAAAAAAAAAAAAAAAAAAABQAAAAAAAAAwMD/AAAAAABkAAAAMgAAAAAAAABkAAAAAAAAAH9/fwAKAAAAIgAAABgAAAAAAAAAAAAAAAAAAAAAAAAAAAAAAAAAAAAkAAAAJAAAAAAAAAAHAAAAAAAAAAAAAAAAAAAAAAAAAAAAAAAAAAAAf39/ACUAAABYAAAAAAAAAAAAAAAAAAAAAAAAAAAAAAAAAAAAAAAAAAAAAAAAAAAAAAAAAAAAAAA/AAAAAAAAAKCGAQAAAAAAAAAAAAAAAAAMAAAAAQAAAAAAAAAAAAAAAAAAAB8AAABUAAAAAAAABQAAAAEAAAAAAAAAAAAAAAAAAAAAAAAAAAAAAAAAAAAAAAAAAAAAAAJ/f38AAAAAA8zMzADAwP8Af39/AAAAAAAAAAAAAAAAAAAAAAAAAAAAIQAAABgAAAAUAAAAwTUAABsnAABARwAAWSkAABAAAAAmAAAACAAAAAAAAAAAAAAA"/>
+                <pr:smNativeData xmlns="smNativeData" xmlns:pr="smNativeData" xmlns:p15="http://schemas.microsoft.com/office/powerpoint/2012/main" xmlns:p14="http://schemas.microsoft.com/office/powerpoint/2010/main" xmlns:mc="http://schemas.openxmlformats.org/markup-compatibility/2006" val="SMDATA_15_l3DXYhMAAAAlAAAAZAAAAA8BAAAAkAAAAEgAAACQAAAASAAAAAAAAAABAAAAAAAAAAEAAABQAAAAAAAAAAAA4D8AAAAAAADgPwAAAAAAAOA/AAAAAAAA4D8AAAAAAADgPwAAAAAAAOA/AAAAAAAA4D8AAAAAAADgPwAAAAAAAOA/AAAAAAAA4D8CAAAAjAAAAAAAAAAAAAAAADOZDCYmJggAAAAAAAAAAAAAAAAAAAAAAAAAAAAAAAAAAAAAZAAAAAEAAABAAAAAAAAAAAAAAAAAAAAAAAAAAAAAAAAAAAAAAAAAAAAAAAAAAAAAAAAAAAAAAAAAAAAAAAAAAAAAAAAAAAAAAAAAAAAAAAAAAAAAAAAAAAAAAAAAAAAAFAAAADwAAAAAAAAAAAAAAP///wkUAAAAAQAAABQAAAAUAAAAFAAAAAEAAAAAAAAAZAAAAGQAAAAAAAAAZAAAAGQAAAAVAAAAYAAAAAAAAAAAAAAADwAAACADAAAAAAAAAAAAAAEAAACgMgAAVgcAAKr4//8BAAAAf39/AAEAAABkAAAAAAAAABQAAABAHwAAAAAAACYAAAAAAAAAwOD//wAAAAAmAAAAZAAAABYAAABMAAAAAAAAAAAAAAAEAAAAAAAAAAEAAAAzZpkKAAAAACgAAAAoAAAAZAAAAGQAAAAAAAAAzMzMAAAAAABQAAAAUAAAAGQAAABkAAAAAAAAABcAAAAUAAAAAAAAAAAAAAD/fwAA/38AAAAAAAAJAAAABAAAAAAAAAAeAAAAaAAAAAAAAAAAAAAAAAAAAAAAAAAAAAAAECcAABAnAAAAAAAAAAAAAAAAAAAAAAAAAAAAAAAAAAAAAAAAAAAAABQAAAAAAAAAwMD/AAAAAABkAAAAMgAAAAAAAABkAAAAAAAAAH9/fwAKAAAAIgAAABgAAAAAAAAAAAAAAAAAAAAAAAAAAAAAAAAAAAAkAAAAJAAAAAAAAAAHAAAAAAAAAAAAAAAAAAAAAAAAAAAAAAAAAAAAf39/ACUAAABYAAAAAAAAAAAAAAAAAAAAAAAAAAAAAAAAAAAAAAAAAAAAAAAAAAAAAAAAAAAAAAA/AAAAAAAAAKCGAQAAAAAAAAAAAAAAAAAMAAAAAQAAAAAAAAAAAAAAAAAAAB8AAABUAAAAAAAABQAAAAEAAAAAAAAAAAAAAAAAAAAAAAAAAAAAAAAAAAAAAAAAAAAAAAJ/f38AAAAAA8zMzADAwP8Af39/AAAAAAAAAAAAAAAAAAAAAAAAAAAAIQAAABgAAAAUAAAAwTUAABsnAABARwAAWSkAABAAAAAmAAAACAAAAAAAAAAAAAAA"/>
               </a:ext>
             </a:extLst>
           </p:cNvSpPr>
@@ -2232,7 +2245,7 @@
             <a:spLocks noGrp="1" noChangeArrowheads="1"/>
             <a:extLst>
               <a:ext uri="smNativeData">
-                <pr:smNativeData xmlns:mc="http://schemas.openxmlformats.org/markup-compatibility/2006" xmlns:p14="http://schemas.microsoft.com/office/powerpoint/2010/main" xmlns:p15="http://schemas.microsoft.com/office/powerpoint/2012/main" xmlns:pr="smNativeData" xmlns="smNativeData" val="SMDATA_15_l3DXYhMAAAAlAAAAZAAAAA8BAAAAkAAAAEgAAACQAAAASAAAAAAAAAACAAAAAAAAAAEAAABQAAAAAAAAAAAA4D8AAAAAAADgPwAAAAAAAOA/AAAAAAAA4D8AAAAAAADgPwAAAAAAAOA/AAAAAAAA4D8AAAAAAADgPwAAAAAAAOA/AAAAAAAA4D8CAAAAjAAAAAAAAAAAAAAAADOZDCYmJggAAAAAAAAAAAAAAAAAAAAAAAAAAAAAAAAAAAAAZAAAAAEAAABAAAAAAAAAAAAAAAAAAAAAAAAAAAAAAAAAAAAAAAAAAAAAAAAAAAAAAAAAAAAAAAAAAAAAAAAAAAAAAAAAAAAAAAAAAAAAAAAAAAAAAAAAAAAAAAAAAAAAFAAAADwAAAAAAAAAAAAAAP///wkUAAAAAQAAABQAAAAUAAAAFAAAAAEAAAAAAAAAZAAAAGQAAAAAAAAAZAAAAGQAAAAVAAAAYAAAAAAAAAAAAAAADwAAACADAAAAAAAAAAAAAAEAAACgMgAAVgcAAKr4//8BAAAAf39/AAEAAABkAAAAAAAAABQAAABAHwAAAAAAACYAAAAAAAAAwOD//wAAAAAmAAAAZAAAABYAAABMAAAAAAAAAAAAAAAEAAAAAAAAAAEAAAAzZpkKAAAAACgAAAAoAAAAZAAAAGQAAAAAAAAAzMzMAAAAAABQAAAAUAAAAGQAAABkAAAAAAAAABcAAAAUAAAAAAAAAAAAAAD/fwAA/38AAAAAAAAJAAAABAAAAAAAAAAeAAAAaAAAAAAAAAAAAAAAAAAAAAAAAAAAAAAAECcAABAnAAAAAAAAAAAAAAAAAAAAAAAAAAAAAAAAAAAAAAAAAAAAABQAAAAAAAAAwMD/AAAAAABkAAAAMgAAAAAAAABkAAAAAAAAAH9/fwAKAAAAIgAAABgAAAAAAAAAAAAAAAAAAAAAAAAAAAAAAAAAAAAkAAAAJAAAAAAAAAAHAAAAAAAAAAAAAAAAAAAAAAAAAAAAAAAAAAAAf39/ACUAAABYAAAAAAAAAAAAAAAAAAAAAAAAAAAAAAAAAAAAAAAAAAAAAAAAAAAAAAAAAAAAAAA/AAAAAAAAAKCGAQAAAAAAAAAAAAAAAAAMAAAAAQAAAAAAAAAAAAAAAAAAAB8AAABUAAAAAAAABQAAAAEAAAAAAAAAAAAAAAAAAAAAAAAAAAAAAAAAAAAAAAAAAAAAAAJ/f38AAAAAA8zMzADAwP8Af39/AAAAAAAAAAAAAAAAAAAAAAAAAAAAIQAAABgAAAAUAAAAwAMAAK4BAABtHAAA1AgAABAAAAAmAAAACAAAAIGAAAAAAAAA"/>
+                <pr:smNativeData xmlns="smNativeData" xmlns:pr="smNativeData" xmlns:p15="http://schemas.microsoft.com/office/powerpoint/2012/main" xmlns:p14="http://schemas.microsoft.com/office/powerpoint/2010/main" xmlns:mc="http://schemas.openxmlformats.org/markup-compatibility/2006" val="SMDATA_15_l3DXYhMAAAAlAAAAZAAAAA8BAAAAkAAAAEgAAACQAAAASAAAAAAAAAACAAAAAAAAAAEAAABQAAAAAAAAAAAA4D8AAAAAAADgPwAAAAAAAOA/AAAAAAAA4D8AAAAAAADgPwAAAAAAAOA/AAAAAAAA4D8AAAAAAADgPwAAAAAAAOA/AAAAAAAA4D8CAAAAjAAAAAAAAAAAAAAAADOZDCYmJggAAAAAAAAAAAAAAAAAAAAAAAAAAAAAAAAAAAAAZAAAAAEAAABAAAAAAAAAAAAAAAAAAAAAAAAAAAAAAAAAAAAAAAAAAAAAAAAAAAAAAAAAAAAAAAAAAAAAAAAAAAAAAAAAAAAAAAAAAAAAAAAAAAAAAAAAAAAAAAAAAAAAFAAAADwAAAAAAAAAAAAAAP///wkUAAAAAQAAABQAAAAUAAAAFAAAAAEAAAAAAAAAZAAAAGQAAAAAAAAAZAAAAGQAAAAVAAAAYAAAAAAAAAAAAAAADwAAACADAAAAAAAAAAAAAAEAAACgMgAAVgcAAKr4//8BAAAAf39/AAEAAABkAAAAAAAAABQAAABAHwAAAAAAACYAAAAAAAAAwOD//wAAAAAmAAAAZAAAABYAAABMAAAAAAAAAAAAAAAEAAAAAAAAAAEAAAAzZpkKAAAAACgAAAAoAAAAZAAAAGQAAAAAAAAAzMzMAAAAAABQAAAAUAAAAGQAAABkAAAAAAAAABcAAAAUAAAAAAAAAAAAAAD/fwAA/38AAAAAAAAJAAAABAAAAAAAAAAeAAAAaAAAAAAAAAAAAAAAAAAAAAAAAAAAAAAAECcAABAnAAAAAAAAAAAAAAAAAAAAAAAAAAAAAAAAAAAAAAAAAAAAABQAAAAAAAAAwMD/AAAAAABkAAAAMgAAAAAAAABkAAAAAAAAAH9/fwAKAAAAIgAAABgAAAAAAAAAAAAAAAAAAAAAAAAAAAAAAAAAAAAkAAAAJAAAAAAAAAAHAAAAAAAAAAAAAAAAAAAAAAAAAAAAAAAAAAAAf39/ACUAAABYAAAAAAAAAAAAAAAAAAAAAAAAAAAAAAAAAAAAAAAAAAAAAAAAAAAAAAAAAAAAAAA/AAAAAAAAAKCGAQAAAAAAAAAAAAAAAAAMAAAAAQAAAAAAAAAAAAAAAAAAAB8AAABUAAAAAAAABQAAAAEAAAAAAAAAAAAAAAAAAAAAAAAAAAAAAAAAAAAAAAAAAAAAAAJ/f38AAAAAA8zMzADAwP8Af39/AAAAAAAAAAAAAAAAAAAAAAAAAAAAIQAAABgAAAAUAAAAwAMAAK4BAABtHAAA1AgAABAAAAAmAAAACAAAAIGAAAAAAAAA"/>
               </a:ext>
             </a:extLst>
           </p:cNvSpPr>
@@ -2271,7 +2284,7 @@
             <a:spLocks noGrp="1" noChangeArrowheads="1"/>
             <a:extLst>
               <a:ext uri="smNativeData">
-                <pr:smNativeData xmlns:mc="http://schemas.openxmlformats.org/markup-compatibility/2006" xmlns:p14="http://schemas.microsoft.com/office/powerpoint/2010/main" xmlns:p15="http://schemas.microsoft.com/office/powerpoint/2012/main" xmlns:pr="smNativeData" xmlns="smNativeData" val="SMDATA_15_l3DXYhMAAAAlAAAAZAAAAA8BAAAAkAAAAEgAAACQAAAASAAAAAAAAAAAAAAAAAAAAAEAAABQAAAAAAAAAAAA4D8AAAAAAADgPwAAAAAAAOA/AAAAAAAA4D8AAAAAAADgPwAAAAAAAOA/AAAAAAAA4D8AAAAAAADgPwAAAAAAAOA/AAAAAAAA4D8CAAAAjAAAAAAAAAAAAAAAADOZDCYmJggAAAAAAAAAAAAAAAAAAAAAAAAAAAAAAAAAAAAAZAAAAAEAAABAAAAAAAAAAAAAAAAAAAAAAAAAAAAAAAAAAAAAAAAAAAAAAAAAAAAAAAAAAAAAAAAAAAAAAAAAAAAAAAAAAAAAAAAAAAAAAAAAAAAAAAAAAAAAAAAAAAAAFAAAADwAAAAAAAAAAAAAAP///wkUAAAAAQAAABQAAAAUAAAAFAAAAAEAAAAAAAAAZAAAAGQAAAAAAAAAZAAAAGQAAAAVAAAAYAAAAAAAAAAAAAAADwAAACADAAAAAAAAAAAAAAEAAACgMgAAVgcAAKr4//8BAAAAf39/AAEAAABkAAAAAAAAABQAAABAHwAAAAAAACYAAAAAAAAAwOD//wAAAAAmAAAAZAAAABYAAABMAAAAAAAAAAAAAAAEAAAAAAAAAAEAAAAzZpkKAAAAACgAAAAoAAAAZAAAAGQAAAAAAAAAzMzMAAAAAABQAAAAUAAAAGQAAABkAAAAAAAAABcAAAAUAAAAAAAAAAAAAAD/fwAA/38AAAAAAAAJAAAABAAAAAAAAAAeAAAAaAAAAAAAAAAAAAAAAAAAAAAAAAAAAAAAECcAABAnAAAAAAAAAAAAAAAAAAAAAAAAAAAAAAAAAAAAAAAAAAAAABQAAAAAAAAAwMD/AAAAAABkAAAAMgAAAAAAAABkAAAAAAAAAH9/fwAKAAAAIgAAABgAAAAAAAAAAAAAAAAAAAAAAAAAAAAAAAAAAAAkAAAAJAAAAAAAAAAHAAAAAAAAAAAAAAAAAAAAAAAAAAAAAAAAAAAAf39/ACUAAABYAAAAAAAAAAAAAAAAAAAAAAAAAAAAAAAAAAAAAAAAAAAAAAAAAAAAAAAAAAAAAAA/AAAAAAAAAKCGAQAAAAAAAAAAAAAAAAAMAAAAAQAAAAAAAAAAAAAAAAAAAB8AAABUAAAAAAAABQAAAAEAAAAAAAAAAAAAAAAAAAAAAAAAAAAAAAAAAAAAAAAAAAAAAAJ/f38AAAAAA8zMzADAwP8Af39/AAAAAAAAAAAAAAAAAAAAAAAAAAAAIQAAABgAAAAUAAAAUx0AAK4BAABARwAAsCUAABAAAAAmAAAACAAAAAGAAAAAAAAA"/>
+                <pr:smNativeData xmlns="smNativeData" xmlns:pr="smNativeData" xmlns:p15="http://schemas.microsoft.com/office/powerpoint/2012/main" xmlns:p14="http://schemas.microsoft.com/office/powerpoint/2010/main" xmlns:mc="http://schemas.openxmlformats.org/markup-compatibility/2006" val="SMDATA_15_l3DXYhMAAAAlAAAAZAAAAA8BAAAAkAAAAEgAAACQAAAASAAAAAAAAAAAAAAAAAAAAAEAAABQAAAAAAAAAAAA4D8AAAAAAADgPwAAAAAAAOA/AAAAAAAA4D8AAAAAAADgPwAAAAAAAOA/AAAAAAAA4D8AAAAAAADgPwAAAAAAAOA/AAAAAAAA4D8CAAAAjAAAAAAAAAAAAAAAADOZDCYmJggAAAAAAAAAAAAAAAAAAAAAAAAAAAAAAAAAAAAAZAAAAAEAAABAAAAAAAAAAAAAAAAAAAAAAAAAAAAAAAAAAAAAAAAAAAAAAAAAAAAAAAAAAAAAAAAAAAAAAAAAAAAAAAAAAAAAAAAAAAAAAAAAAAAAAAAAAAAAAAAAAAAAFAAAADwAAAAAAAAAAAAAAP///wkUAAAAAQAAABQAAAAUAAAAFAAAAAEAAAAAAAAAZAAAAGQAAAAAAAAAZAAAAGQAAAAVAAAAYAAAAAAAAAAAAAAADwAAACADAAAAAAAAAAAAAAEAAACgMgAAVgcAAKr4//8BAAAAf39/AAEAAABkAAAAAAAAABQAAABAHwAAAAAAACYAAAAAAAAAwOD//wAAAAAmAAAAZAAAABYAAABMAAAAAAAAAAAAAAAEAAAAAAAAAAEAAAAzZpkKAAAAACgAAAAoAAAAZAAAAGQAAAAAAAAAzMzMAAAAAABQAAAAUAAAAGQAAABkAAAAAAAAABcAAAAUAAAAAAAAAAAAAAD/fwAA/38AAAAAAAAJAAAABAAAAAAAAAAeAAAAaAAAAAAAAAAAAAAAAAAAAAAAAAAAAAAAECcAABAnAAAAAAAAAAAAAAAAAAAAAAAAAAAAAAAAAAAAAAAAAAAAABQAAAAAAAAAwMD/AAAAAABkAAAAMgAAAAAAAABkAAAAAAAAAH9/fwAKAAAAIgAAABgAAAAAAAAAAAAAAAAAAAAAAAAAAAAAAAAAAAAkAAAAJAAAAAAAAAAHAAAAAAAAAAAAAAAAAAAAAAAAAAAAAAAAAAAAf39/ACUAAABYAAAAAAAAAAAAAAAAAAAAAAAAAAAAAAAAAAAAAAAAAAAAAAAAAAAAAAAAAAAAAAA/AAAAAAAAAKCGAQAAAAAAAAAAAAAAAAAMAAAAAQAAAAAAAAAAAAAAAAAAAB8AAABUAAAAAAAABQAAAAEAAAAAAAAAAAAAAAAAAAAAAAAAAAAAAAAAAAAAAAAAAAAAAAJ/f38AAAAAA8zMzADAwP8Af39/AAAAAAAAAAAAAAAAAAAAAAAAAAAAIQAAABgAAAAUAAAAUx0AAK4BAABARwAAsCUAABAAAAAmAAAACAAAAAGAAAAAAAAA"/>
               </a:ext>
             </a:extLst>
           </p:cNvSpPr>
@@ -2354,7 +2367,7 @@
             <a:spLocks noGrp="1" noChangeArrowheads="1"/>
             <a:extLst>
               <a:ext uri="smNativeData">
-                <pr:smNativeData xmlns:mc="http://schemas.openxmlformats.org/markup-compatibility/2006" xmlns:p14="http://schemas.microsoft.com/office/powerpoint/2010/main" xmlns:p15="http://schemas.microsoft.com/office/powerpoint/2012/main" xmlns:pr="smNativeData" xmlns="smNativeData" val="SMDATA_15_l3DXYhMAAAAlAAAAZAAAAA8BAAAAkAAAAEgAAACQAAAASAAAAAAAAAAAAAAAAAAAAAEAAABQAAAAAAAAAAAA4D8AAAAAAADgPwAAAAAAAOA/AAAAAAAA4D8AAAAAAADgPwAAAAAAAOA/AAAAAAAA4D8AAAAAAADgPwAAAAAAAOA/AAAAAAAA4D8CAAAAjAAAAAAAAAAAAAAAADOZDCYmJggAAAAAAAAAAAAAAAAAAAAAAAAAAAAAAAAAAAAAZAAAAAEAAABAAAAAAAAAAAAAAAAAAAAAAAAAAAAAAAAAAAAAAAAAAAAAAAAAAAAAAAAAAAAAAAAAAAAAAAAAAAAAAAAAAAAAAAAAAAAAAAAAAAAAAAAAAAAAAAAAAAAAFAAAADwAAAAAAAAAAAAAAP///wkUAAAAAQAAABQAAAAUAAAAFAAAAAEAAAAAAAAAZAAAAGQAAAAAAAAAZAAAAGQAAAAVAAAAYAAAAAAAAAAAAAAADwAAACADAAAAAAAAAAAAAAEAAACgMgAAVgcAAKr4//8BAAAAf39/AAEAAABkAAAAAAAAABQAAABAHwAAAAAAACYAAAAAAAAAwOD//wAAAAAmAAAAZAAAABYAAABMAAAAAAAAAAAAAAAEAAAAAAAAAAEAAAAzZpkKAAAAACgAAAAoAAAAZAAAAGQAAAAAAAAAzMzMAAAAAABQAAAAUAAAAGQAAABkAAAAAAAAABcAAAAUAAAAAAAAAAAAAAD/fwAA/38AAAAAAAAJAAAABAAAAAAAAAAeAAAAaAAAAAAAAAAAAAAAAAAAAAAAAAAAAAAAECcAABAnAAAAAAAAAAAAAAAAAAAAAAAAAAAAAAAAAAAAAAAAAAAAABQAAAAAAAAAwMD/AAAAAABkAAAAMgAAAAAAAABkAAAAAAAAAH9/fwAKAAAAIgAAABgAAAAAAAAAAAAAAAAAAAAAAAAAAAAAAAAAAAAkAAAAJAAAAAAAAAAHAAAAAAAAAAAAAAAAAAAAAAAAAAAAAAAAAAAAf39/ACUAAABYAAAAAAAAAAAAAAAAAAAAAAAAAAAAAAAAAAAAAAAAAAAAAAAAAAAAAAAAAAAAAAA/AAAAAAAAAKCGAQAAAAAAAAAAAAAAAAAMAAAAAQAAAAAAAAAAAAAAAAAAAB8AAABUAAAAAAAABQAAAAEAAAAAAAAAAAAAAAAAAAAAAAAAAAAAAAAAAAAAAAAAAAAAAAJ/f38AAAAAA8zMzADAwP8Af39/AAAAAAAAAAAAAAAAAAAAAAAAAAAAIQAAABgAAAAUAAAAwAMAANQIAABtHAAAsCUAABAAAAAmAAAACAAAAAGAAAAAAAAA"/>
+                <pr:smNativeData xmlns="smNativeData" xmlns:pr="smNativeData" xmlns:p15="http://schemas.microsoft.com/office/powerpoint/2012/main" xmlns:p14="http://schemas.microsoft.com/office/powerpoint/2010/main" xmlns:mc="http://schemas.openxmlformats.org/markup-compatibility/2006" val="SMDATA_15_l3DXYhMAAAAlAAAAZAAAAA8BAAAAkAAAAEgAAACQAAAASAAAAAAAAAAAAAAAAAAAAAEAAABQAAAAAAAAAAAA4D8AAAAAAADgPwAAAAAAAOA/AAAAAAAA4D8AAAAAAADgPwAAAAAAAOA/AAAAAAAA4D8AAAAAAADgPwAAAAAAAOA/AAAAAAAA4D8CAAAAjAAAAAAAAAAAAAAAADOZDCYmJggAAAAAAAAAAAAAAAAAAAAAAAAAAAAAAAAAAAAAZAAAAAEAAABAAAAAAAAAAAAAAAAAAAAAAAAAAAAAAAAAAAAAAAAAAAAAAAAAAAAAAAAAAAAAAAAAAAAAAAAAAAAAAAAAAAAAAAAAAAAAAAAAAAAAAAAAAAAAAAAAAAAAFAAAADwAAAAAAAAAAAAAAP///wkUAAAAAQAAABQAAAAUAAAAFAAAAAEAAAAAAAAAZAAAAGQAAAAAAAAAZAAAAGQAAAAVAAAAYAAAAAAAAAAAAAAADwAAACADAAAAAAAAAAAAAAEAAACgMgAAVgcAAKr4//8BAAAAf39/AAEAAABkAAAAAAAAABQAAABAHwAAAAAAACYAAAAAAAAAwOD//wAAAAAmAAAAZAAAABYAAABMAAAAAAAAAAAAAAAEAAAAAAAAAAEAAAAzZpkKAAAAACgAAAAoAAAAZAAAAGQAAAAAAAAAzMzMAAAAAABQAAAAUAAAAGQAAABkAAAAAAAAABcAAAAUAAAAAAAAAAAAAAD/fwAA/38AAAAAAAAJAAAABAAAAAAAAAAeAAAAaAAAAAAAAAAAAAAAAAAAAAAAAAAAAAAAECcAABAnAAAAAAAAAAAAAAAAAAAAAAAAAAAAAAAAAAAAAAAAAAAAABQAAAAAAAAAwMD/AAAAAABkAAAAMgAAAAAAAABkAAAAAAAAAH9/fwAKAAAAIgAAABgAAAAAAAAAAAAAAAAAAAAAAAAAAAAAAAAAAAAkAAAAJAAAAAAAAAAHAAAAAAAAAAAAAAAAAAAAAAAAAAAAAAAAAAAAf39/ACUAAABYAAAAAAAAAAAAAAAAAAAAAAAAAAAAAAAAAAAAAAAAAAAAAAAAAAAAAAAAAAAAAAA/AAAAAAAAAKCGAQAAAAAAAAAAAAAAAAAMAAAAAQAAAAAAAAAAAAAAAAAAAB8AAABUAAAAAAAABQAAAAEAAAAAAAAAAAAAAAAAAAAAAAAAAAAAAAAAAAAAAAAAAAAAAAJ/f38AAAAAA8zMzADAwP8Af39/AAAAAAAAAAAAAAAAAAAAAAAAAAAAIQAAABgAAAAUAAAAwAMAANQIAABtHAAAsCUAABAAAAAmAAAACAAAAAGAAAAAAAAA"/>
               </a:ext>
             </a:extLst>
           </p:cNvSpPr>
@@ -2422,7 +2435,7 @@
             <a:spLocks noGrp="1" noChangeArrowheads="1"/>
             <a:extLst>
               <a:ext uri="smNativeData">
-                <pr:smNativeData xmlns:mc="http://schemas.openxmlformats.org/markup-compatibility/2006" xmlns:p14="http://schemas.microsoft.com/office/powerpoint/2010/main" xmlns:p15="http://schemas.microsoft.com/office/powerpoint/2012/main" xmlns:pr="smNativeData" xmlns="smNativeData" val="SMDATA_15_l3DXYhMAAAAlAAAAZAAAAA8BAAAAkAAAAEgAAACQAAAASAAAAAAAAAABAAAAAAAAAAEAAABQAAAAAAAAAAAA4D8AAAAAAADgPwAAAAAAAOA/AAAAAAAA4D8AAAAAAADgPwAAAAAAAOA/AAAAAAAA4D8AAAAAAADgPwAAAAAAAOA/AAAAAAAA4D8CAAAAjAAAAAAAAAAAAAAAADOZDCYmJggAAAAAAAAAAAAAAAAAAAAAAAAAAAAAAAAAAAAAZAAAAAEAAABAAAAAAAAAAAAAAAAAAAAAAAAAAAAAAAAAAAAAAAAAAAAAAAAAAAAAAAAAAAAAAAAAAAAAAAAAAAAAAAAAAAAAAAAAAAAAAAAAAAAAAAAAAAAAAAAAAAAAFAAAADwAAAAAAAAAAAAAAP///wkUAAAAAQAAABQAAAAUAAAAFAAAAAEAAAAAAAAAZAAAAGQAAAAAAAAAZAAAAGQAAAAVAAAAYAAAAAAAAAAAAAAADwAAACADAAAAAAAAAAAAAAEAAACgMgAAVgcAAKr4//8BAAAAf39/AAEAAABkAAAAAAAAABQAAABAHwAAAAAAACYAAAAAAAAAwOD//wAAAAAmAAAAZAAAABYAAABMAAAAAAAAAAAAAAAEAAAAAAAAAAEAAAAzZpkKAAAAACgAAAAoAAAAZAAAAGQAAAAAAAAAzMzMAAAAAABQAAAAUAAAAGQAAABkAAAAAAAAABcAAAAUAAAAAAAAAAAAAAD/fwAA/38AAAAAAAAJAAAABAAAAAAAAAAeAAAAaAAAAAAAAAAAAAAAAAAAAAAAAAAAAAAAECcAABAnAAAAAAAAAAAAAAAAAAAAAAAAAAAAAAAAAAAAAAAAAAAAABQAAAAAAAAAwMD/AAAAAABkAAAAMgAAAAAAAABkAAAAAAAAAH9/fwAKAAAAIgAAABgAAAAAAAAAAAAAAAAAAAAAAAAAAAAAAAAAAAAkAAAAJAAAAAAAAAAHAAAAAAAAAAAAAAAAAAAAAAAAAAAAAAAAAAAAf39/ACUAAABYAAAAAAAAAAAAAAAAAAAAAAAAAAAAAAAAAAAAAAAAAAAAAAAAAAAAAAAAAAAAAAA/AAAAAAAAAKCGAQAAAAAAAAAAAAAAAAAMAAAAAQAAAAAAAAAAAAAAAAAAAB8AAABUAAAAAAAABQAAAAEAAAAAAAAAAAAAAAAAAAAAAAAAAAAAAAAAAAAAAAAAAAAAAAJ/f38AAAAAA8zMzADAwP8Af39/AAAAAAAAAAAAAAAAAAAAAAAAAAAAIQAAABgAAAAUAAAAwAMAABsnAAA/FQAAWSkAABAAAAAmAAAACAAAAAAAAAAAAAAA"/>
+                <pr:smNativeData xmlns="smNativeData" xmlns:pr="smNativeData" xmlns:p15="http://schemas.microsoft.com/office/powerpoint/2012/main" xmlns:p14="http://schemas.microsoft.com/office/powerpoint/2010/main" xmlns:mc="http://schemas.openxmlformats.org/markup-compatibility/2006" val="SMDATA_15_l3DXYhMAAAAlAAAAZAAAAA8BAAAAkAAAAEgAAACQAAAASAAAAAAAAAABAAAAAAAAAAEAAABQAAAAAAAAAAAA4D8AAAAAAADgPwAAAAAAAOA/AAAAAAAA4D8AAAAAAADgPwAAAAAAAOA/AAAAAAAA4D8AAAAAAADgPwAAAAAAAOA/AAAAAAAA4D8CAAAAjAAAAAAAAAAAAAAAADOZDCYmJggAAAAAAAAAAAAAAAAAAAAAAAAAAAAAAAAAAAAAZAAAAAEAAABAAAAAAAAAAAAAAAAAAAAAAAAAAAAAAAAAAAAAAAAAAAAAAAAAAAAAAAAAAAAAAAAAAAAAAAAAAAAAAAAAAAAAAAAAAAAAAAAAAAAAAAAAAAAAAAAAAAAAFAAAADwAAAAAAAAAAAAAAP///wkUAAAAAQAAABQAAAAUAAAAFAAAAAEAAAAAAAAAZAAAAGQAAAAAAAAAZAAAAGQAAAAVAAAAYAAAAAAAAAAAAAAADwAAACADAAAAAAAAAAAAAAEAAACgMgAAVgcAAKr4//8BAAAAf39/AAEAAABkAAAAAAAAABQAAABAHwAAAAAAACYAAAAAAAAAwOD//wAAAAAmAAAAZAAAABYAAABMAAAAAAAAAAAAAAAEAAAAAAAAAAEAAAAzZpkKAAAAACgAAAAoAAAAZAAAAGQAAAAAAAAAzMzMAAAAAABQAAAAUAAAAGQAAABkAAAAAAAAABcAAAAUAAAAAAAAAAAAAAD/fwAA/38AAAAAAAAJAAAABAAAAAAAAAAeAAAAaAAAAAAAAAAAAAAAAAAAAAAAAAAAAAAAECcAABAnAAAAAAAAAAAAAAAAAAAAAAAAAAAAAAAAAAAAAAAAAAAAABQAAAAAAAAAwMD/AAAAAABkAAAAMgAAAAAAAABkAAAAAAAAAH9/fwAKAAAAIgAAABgAAAAAAAAAAAAAAAAAAAAAAAAAAAAAAAAAAAAkAAAAJAAAAAAAAAAHAAAAAAAAAAAAAAAAAAAAAAAAAAAAAAAAAAAAf39/ACUAAABYAAAAAAAAAAAAAAAAAAAAAAAAAAAAAAAAAAAAAAAAAAAAAAAAAAAAAAAAAAAAAAA/AAAAAAAAAKCGAQAAAAAAAAAAAAAAAAAMAAAAAQAAAAAAAAAAAAAAAAAAAB8AAABUAAAAAAAABQAAAAEAAAAAAAAAAAAAAAAAAAAAAAAAAAAAAAAAAAAAAAAAAAAAAAJ/f38AAAAAA8zMzADAwP8Af39/AAAAAAAAAAAAAAAAAAAAAAAAAAAAIQAAABgAAAAUAAAAwAMAABsnAAA/FQAAWSkAABAAAAAmAAAACAAAAAAAAAAAAAAA"/>
               </a:ext>
             </a:extLst>
           </p:cNvSpPr>
@@ -2436,7 +2449,7 @@
           <a:lstStyle/>
           <a:p>
             <a:fld id="{2B84E688-C6C6-D110-883C-3045A8727E65}" type="datetime1">
-              <a:t>21/07/2022</a:t>
+              <a:t>26/07/2022</a:t>
             </a:fld>
             <a:endParaRPr/>
           </a:p>
@@ -2449,7 +2462,7 @@
             <a:spLocks noGrp="1" noChangeArrowheads="1"/>
             <a:extLst>
               <a:ext uri="smNativeData">
-                <pr:smNativeData xmlns:mc="http://schemas.openxmlformats.org/markup-compatibility/2006" xmlns:p14="http://schemas.microsoft.com/office/powerpoint/2010/main" xmlns:p15="http://schemas.microsoft.com/office/powerpoint/2012/main" xmlns:pr="smNativeData" xmlns="smNativeData" val="SMDATA_15_l3DXYhMAAAAlAAAAZAAAAA8BAAAAkAAAAEgAAACQAAAASAAAAAAAAAABAAAAAAAAAAEAAABQAAAAAAAAAAAA4D8AAAAAAADgPwAAAAAAAOA/AAAAAAAA4D8AAAAAAADgPwAAAAAAAOA/AAAAAAAA4D8AAAAAAADgPwAAAAAAAOA/AAAAAAAA4D8CAAAAjAAAAAAAAAAAAAAAADOZDCYmJggAAAAAAAAAAAAAAAAAAAAAAAAAAAAAAAAAAAAAZAAAAAEAAABAAAAAAAAAAAAAAAAAAAAAAAAAAAAAAAAAAAAAAAAAAAAAAAAAAAAAAAAAAAAAAAAAAAAAAAAAAAAAAAAAAAAAAAAAAAAAAAAAAAAAAAAAAAAAAAAAAAAAFAAAADwAAAAAAAAAAAAAAP///wkUAAAAAQAAABQAAAAUAAAAFAAAAAEAAAAAAAAAZAAAAGQAAAAAAAAAZAAAAGQAAAAVAAAAYAAAAAAAAAAAAAAADwAAACADAAAAAAAAAAAAAAEAAACgMgAAVgcAAKr4//8BAAAAf39/AAEAAABkAAAAAAAAABQAAABAHwAAAAAAACYAAAAAAAAAwOD//wAAAAAmAAAAZAAAABYAAABMAAAAAAAAAAAAAAAEAAAAAAAAAAEAAAAzZpkKAAAAACgAAAAoAAAAZAAAAGQAAAAAAAAAzMzMAAAAAABQAAAAUAAAAGQAAABkAAAAAAAAABcAAAAUAAAAAAAAAAAAAAD/fwAA/38AAAAAAAAJAAAABAAAAHNwY0IeAAAAaAAAAAAAAAAAAAAAAAAAAAAAAAAAAAAAECcAABAnAAAAAAAAAAAAAAAAAAAAAAAAAAAAAAAAAAAAAAAAAAAAABQAAAAAAAAAwMD/AAAAAABkAAAAMgAAAAAAAABkAAAAAAAAAH9/fwAKAAAAIgAAABgAAAAAAAAAAAAAAAAAAAAAAAAAAAAAAAAAAAAkAAAAJAAAAAAAAAAHAAAAAAAAAAAAAAAAAAAAAAAAAAAAAAAAAAAAf39/ACUAAABYAAAAAAAAAAAAAAAAAAAAAAAAAAAAAAAAAAAAAAAAAAAAAAAAAAAAAAAAAAAAAAA/AAAAAAAAAKCGAQAAAAAAAAAAAAAAAAAMAAAAAQAAAAAAAAAAAAAAAAAAAB8AAABUAAAAAAAABQAAAAEAAAAAAAAAAAAAAAAAAAAAAAAAAAAAAAAAAAAAAAAAAAAAAAJ/f38AAAAAA8zMzADAwP8Af39/AAAAAAAAAAAAAAAAAAAAAAAAAAAAIQAAABgAAAAUAAAAoRkAABsnAABfMQAAWSkAABAAAAAmAAAACAAAAAAAAAAAAAAA"/>
+                <pr:smNativeData xmlns="smNativeData" xmlns:pr="smNativeData" xmlns:p15="http://schemas.microsoft.com/office/powerpoint/2012/main" xmlns:p14="http://schemas.microsoft.com/office/powerpoint/2010/main" xmlns:mc="http://schemas.openxmlformats.org/markup-compatibility/2006" val="SMDATA_15_l3DXYhMAAAAlAAAAZAAAAA8BAAAAkAAAAEgAAACQAAAASAAAAAAAAAABAAAAAAAAAAEAAABQAAAAAAAAAAAA4D8AAAAAAADgPwAAAAAAAOA/AAAAAAAA4D8AAAAAAADgPwAAAAAAAOA/AAAAAAAA4D8AAAAAAADgPwAAAAAAAOA/AAAAAAAA4D8CAAAAjAAAAAAAAAAAAAAAADOZDCYmJggAAAAAAAAAAAAAAAAAAAAAAAAAAAAAAAAAAAAAZAAAAAEAAABAAAAAAAAAAAAAAAAAAAAAAAAAAAAAAAAAAAAAAAAAAAAAAAAAAAAAAAAAAAAAAAAAAAAAAAAAAAAAAAAAAAAAAAAAAAAAAAAAAAAAAAAAAAAAAAAAAAAAFAAAADwAAAAAAAAAAAAAAP///wkUAAAAAQAAABQAAAAUAAAAFAAAAAEAAAAAAAAAZAAAAGQAAAAAAAAAZAAAAGQAAAAVAAAAYAAAAAAAAAAAAAAADwAAACADAAAAAAAAAAAAAAEAAACgMgAAVgcAAKr4//8BAAAAf39/AAEAAABkAAAAAAAAABQAAABAHwAAAAAAACYAAAAAAAAAwOD//wAAAAAmAAAAZAAAABYAAABMAAAAAAAAAAAAAAAEAAAAAAAAAAEAAAAzZpkKAAAAACgAAAAoAAAAZAAAAGQAAAAAAAAAzMzMAAAAAABQAAAAUAAAAGQAAABkAAAAAAAAABcAAAAUAAAAAAAAAAAAAAD/fwAA/38AAAAAAAAJAAAABAAAAHNwY0IeAAAAaAAAAAAAAAAAAAAAAAAAAAAAAAAAAAAAECcAABAnAAAAAAAAAAAAAAAAAAAAAAAAAAAAAAAAAAAAAAAAAAAAABQAAAAAAAAAwMD/AAAAAABkAAAAMgAAAAAAAABkAAAAAAAAAH9/fwAKAAAAIgAAABgAAAAAAAAAAAAAAAAAAAAAAAAAAAAAAAAAAAAkAAAAJAAAAAAAAAAHAAAAAAAAAAAAAAAAAAAAAAAAAAAAAAAAAAAAf39/ACUAAABYAAAAAAAAAAAAAAAAAAAAAAAAAAAAAAAAAAAAAAAAAAAAAAAAAAAAAAAAAAAAAAA/AAAAAAAAAKCGAQAAAAAAAAAAAAAAAAAMAAAAAQAAAAAAAAAAAAAAAAAAAB8AAABUAAAAAAAABQAAAAEAAAAAAAAAAAAAAAAAAAAAAAAAAAAAAAAAAAAAAAAAAAAAAAJ/f38AAAAAA8zMzADAwP8Af39/AAAAAAAAAAAAAAAAAAAAAAAAAAAAIQAAABgAAAAUAAAAoRkAABsnAABfMQAAWSkAABAAAAAmAAAACAAAAAAAAAAAAAAA"/>
               </a:ext>
             </a:extLst>
           </p:cNvSpPr>
@@ -2473,7 +2486,7 @@
             <a:spLocks noGrp="1" noChangeArrowheads="1"/>
             <a:extLst>
               <a:ext uri="smNativeData">
-                <pr:smNativeData xmlns:mc="http://schemas.openxmlformats.org/markup-compatibility/2006" xmlns:p14="http://schemas.microsoft.com/office/powerpoint/2010/main" xmlns:p15="http://schemas.microsoft.com/office/powerpoint/2012/main" xmlns:pr="smNativeData" xmlns="smNativeData" val="SMDATA_15_l3DXYhMAAAAlAAAAZAAAAA8BAAAAkAAAAEgAAACQAAAASAAAAAAAAAABAAAAAAAAAAEAAABQAAAAAAAAAAAA4D8AAAAAAADgPwAAAAAAAOA/AAAAAAAA4D8AAAAAAADgPwAAAAAAAOA/AAAAAAAA4D8AAAAAAADgPwAAAAAAAOA/AAAAAAAA4D8CAAAAjAAAAAAAAAAAAAAAADOZDCYmJggAAAAAAAAAAAAAAAAAAAAAAAAAAAAAAAAAAAAAZAAAAAEAAABAAAAAAAAAAAAAAAAAAAAAAAAAAAAAAAAAAAAAAAAAAAAAAAAAAAAAAAAAAAAAAAAAAAAAAAAAAAAAAAAAAAAAAAAAAAAAAAAAAAAAAAAAAAAAAAAAAAAAFAAAADwAAAAAAAAAAAAAAP///wkUAAAAAQAAABQAAAAUAAAAFAAAAAEAAAAAAAAAZAAAAGQAAAAAAAAAZAAAAGQAAAAVAAAAYAAAAAAAAAAAAAAADwAAACADAAAAAAAAAAAAAAEAAACgMgAAVgcAAKr4//8BAAAAf39/AAEAAABkAAAAAAAAABQAAABAHwAAAAAAACYAAAAAAAAAwOD//wAAAAAmAAAAZAAAABYAAABMAAAAAAAAAAAAAAAEAAAAAAAAAAEAAAAzZpkKAAAAACgAAAAoAAAAZAAAAGQAAAAAAAAAzMzMAAAAAABQAAAAUAAAAGQAAABkAAAAAAAAABcAAAAUAAAAAAAAAAAAAAD/fwAA/38AAAAAAAAJAAAABAAAAAAAAAAeAAAAaAAAAAAAAAAAAAAAAAAAAAAAAAAAAAAAECcAABAnAAAAAAAAAAAAAAAAAAAAAAAAAAAAAAAAAAAAAAAAAAAAABQAAAAAAAAAwMD/AAAAAABkAAAAMgAAAAAAAABkAAAAAAAAAH9/fwAKAAAAIgAAABgAAAAAAAAAAAAAAAAAAAAAAAAAAAAAAAAAAAAkAAAAJAAAAAAAAAAHAAAAAAAAAAAAAAAAAAAAAAAAAAAAAAAAAAAAf39/ACUAAABYAAAAAAAAAAAAAAAAAAAAAAAAAAAAAAAAAAAAAAAAAAAAAAAAAAAAAAAAAAAAAAA/AAAAAAAAAKCGAQAAAAAAAAAAAAAAAAAMAAAAAQAAAAAAAAAAAAAAAAAAAB8AAABUAAAAAAAABQAAAAEAAAAAAAAAAAAAAAAAAAAAAAAAAAAAAAAAAAAAAAAAAAAAAAJ/f38AAAAAA8zMzADAwP8Af39/AAAAAAAAAAAAAAAAAAAAAAAAAAAAIQAAABgAAAAUAAAAwTUAABsnAABARwAAWSkAABAAAAAmAAAACAAAAAAAAAAAAAAA"/>
+                <pr:smNativeData xmlns="smNativeData" xmlns:pr="smNativeData" xmlns:p15="http://schemas.microsoft.com/office/powerpoint/2012/main" xmlns:p14="http://schemas.microsoft.com/office/powerpoint/2010/main" xmlns:mc="http://schemas.openxmlformats.org/markup-compatibility/2006" val="SMDATA_15_l3DXYhMAAAAlAAAAZAAAAA8BAAAAkAAAAEgAAACQAAAASAAAAAAAAAABAAAAAAAAAAEAAABQAAAAAAAAAAAA4D8AAAAAAADgPwAAAAAAAOA/AAAAAAAA4D8AAAAAAADgPwAAAAAAAOA/AAAAAAAA4D8AAAAAAADgPwAAAAAAAOA/AAAAAAAA4D8CAAAAjAAAAAAAAAAAAAAAADOZDCYmJggAAAAAAAAAAAAAAAAAAAAAAAAAAAAAAAAAAAAAZAAAAAEAAABAAAAAAAAAAAAAAAAAAAAAAAAAAAAAAAAAAAAAAAAAAAAAAAAAAAAAAAAAAAAAAAAAAAAAAAAAAAAAAAAAAAAAAAAAAAAAAAAAAAAAAAAAAAAAAAAAAAAAFAAAADwAAAAAAAAAAAAAAP///wkUAAAAAQAAABQAAAAUAAAAFAAAAAEAAAAAAAAAZAAAAGQAAAAAAAAAZAAAAGQAAAAVAAAAYAAAAAAAAAAAAAAADwAAACADAAAAAAAAAAAAAAEAAACgMgAAVgcAAKr4//8BAAAAf39/AAEAAABkAAAAAAAAABQAAABAHwAAAAAAACYAAAAAAAAAwOD//wAAAAAmAAAAZAAAABYAAABMAAAAAAAAAAAAAAAEAAAAAAAAAAEAAAAzZpkKAAAAACgAAAAoAAAAZAAAAGQAAAAAAAAAzMzMAAAAAABQAAAAUAAAAGQAAABkAAAAAAAAABcAAAAUAAAAAAAAAAAAAAD/fwAA/38AAAAAAAAJAAAABAAAAAAAAAAeAAAAaAAAAAAAAAAAAAAAAAAAAAAAAAAAAAAAECcAABAnAAAAAAAAAAAAAAAAAAAAAAAAAAAAAAAAAAAAAAAAAAAAABQAAAAAAAAAwMD/AAAAAABkAAAAMgAAAAAAAABkAAAAAAAAAH9/fwAKAAAAIgAAABgAAAAAAAAAAAAAAAAAAAAAAAAAAAAAAAAAAAAkAAAAJAAAAAAAAAAHAAAAAAAAAAAAAAAAAAAAAAAAAAAAAAAAAAAAf39/ACUAAABYAAAAAAAAAAAAAAAAAAAAAAAAAAAAAAAAAAAAAAAAAAAAAAAAAAAAAAAAAAAAAAA/AAAAAAAAAKCGAQAAAAAAAAAAAAAAAAAMAAAAAQAAAAAAAAAAAAAAAAAAAB8AAABUAAAAAAAABQAAAAEAAAAAAAAAAAAAAAAAAAAAAAAAAAAAAAAAAAAAAAAAAAAAAAJ/f38AAAAAA8zMzADAwP8Af39/AAAAAAAAAAAAAAAAAAAAAAAAAAAAIQAAABgAAAAUAAAAwTUAABsnAABARwAAWSkAABAAAAAmAAAACAAAAAAAAAAAAAAA"/>
               </a:ext>
             </a:extLst>
           </p:cNvSpPr>
@@ -2526,7 +2539,7 @@
             <a:spLocks noGrp="1" noChangeArrowheads="1"/>
             <a:extLst>
               <a:ext uri="smNativeData">
-                <pr:smNativeData xmlns:mc="http://schemas.openxmlformats.org/markup-compatibility/2006" xmlns:p14="http://schemas.microsoft.com/office/powerpoint/2010/main" xmlns:p15="http://schemas.microsoft.com/office/powerpoint/2012/main" xmlns:pr="smNativeData" xmlns="smNativeData" val="SMDATA_15_l3DXYhMAAAAlAAAAZAAAAA8BAAAAkAAAAEgAAACQAAAASAAAAAAAAAACAAAAAAAAAAEAAABQAAAAAAAAAAAA4D8AAAAAAADgPwAAAAAAAOA/AAAAAAAA4D8AAAAAAADgPwAAAAAAAOA/AAAAAAAA4D8AAAAAAADgPwAAAAAAAOA/AAAAAAAA4D8CAAAAjAAAAAAAAAAAAAAAADOZDCYmJggAAAAAAAAAAAAAAAAAAAAAAAAAAAAAAAAAAAAAZAAAAAEAAABAAAAAAAAAAAAAAAAAAAAAAAAAAAAAAAAAAAAAAAAAAAAAAAAAAAAAAAAAAAAAAAAAAAAAAAAAAAAAAAAAAAAAAAAAAAAAAAAAAAAAAAAAAAAAAAAAAAAAFAAAADwAAAAAAAAAAAAAAP///wkUAAAAAQAAABQAAAAUAAAAFAAAAAEAAAAAAAAAZAAAAGQAAAAAAAAAZAAAAGQAAAAVAAAAYAAAAAAAAAAAAAAADwAAACADAAAAAAAAAAAAAAEAAACgMgAAVgcAAKr4//8BAAAAf39/AAEAAABkAAAAAAAAABQAAABAHwAAAAAAACYAAAAAAAAAwOD//wAAAAAmAAAAZAAAABYAAABMAAAAAAAAAAAAAAAEAAAAAAAAAAEAAAAzZpkKAAAAACgAAAAoAAAAZAAAAGQAAAAAAAAAzMzMAAAAAABQAAAAUAAAAGQAAABkAAAAAAAAABcAAAAUAAAAAAAAAAAAAAD/fwAA/38AAAAAAAAJAAAABAAAAAAAAAAeAAAAaAAAAAAAAAAAAAAAAAAAAAAAAAAAAAAAECcAABAnAAAAAAAAAAAAAAAAAAAAAAAAAAAAAAAAAAAAAAAAAAAAABQAAAAAAAAAwMD/AAAAAABkAAAAMgAAAAAAAABkAAAAAAAAAH9/fwAKAAAAIgAAABgAAAAAAAAAAAAAAAAAAAAAAAAAAAAAAAAAAAAkAAAAJAAAAAAAAAAHAAAAAAAAAAAAAAAAAAAAAAAAAAAAAAAAAAAAf39/ACUAAABYAAAAAAAAAAAAAAAAAAAAAAAAAAAAAAAAAAAAAAAAAAAAAAAAAAAAAAAAAAAAAAA/AAAAAAAAAKCGAQAAAAAAAAAAAAAAAAAMAAAAAQAAAAAAAAAAAAAAAAAAAB8AAABUAAAAAAAABQAAAAEAAAAAAAAAAAAAAAAAAAAAAAAAAAAAAAAAAAAAAAAAAAAAAAJ/f38AAAAAA8zMzADAwP8Af39/AAAAAAAAAAAAAAAAAAAAAAAAAAAAIQAAABgAAAAUAAAAsw4AAIgdAACzOwAABCEAABAAAAAmAAAACAAAAIGAAAAAAAAA"/>
+                <pr:smNativeData xmlns="smNativeData" xmlns:pr="smNativeData" xmlns:p15="http://schemas.microsoft.com/office/powerpoint/2012/main" xmlns:p14="http://schemas.microsoft.com/office/powerpoint/2010/main" xmlns:mc="http://schemas.openxmlformats.org/markup-compatibility/2006" val="SMDATA_15_l3DXYhMAAAAlAAAAZAAAAA8BAAAAkAAAAEgAAACQAAAASAAAAAAAAAACAAAAAAAAAAEAAABQAAAAAAAAAAAA4D8AAAAAAADgPwAAAAAAAOA/AAAAAAAA4D8AAAAAAADgPwAAAAAAAOA/AAAAAAAA4D8AAAAAAADgPwAAAAAAAOA/AAAAAAAA4D8CAAAAjAAAAAAAAAAAAAAAADOZDCYmJggAAAAAAAAAAAAAAAAAAAAAAAAAAAAAAAAAAAAAZAAAAAEAAABAAAAAAAAAAAAAAAAAAAAAAAAAAAAAAAAAAAAAAAAAAAAAAAAAAAAAAAAAAAAAAAAAAAAAAAAAAAAAAAAAAAAAAAAAAAAAAAAAAAAAAAAAAAAAAAAAAAAAFAAAADwAAAAAAAAAAAAAAP///wkUAAAAAQAAABQAAAAUAAAAFAAAAAEAAAAAAAAAZAAAAGQAAAAAAAAAZAAAAGQAAAAVAAAAYAAAAAAAAAAAAAAADwAAACADAAAAAAAAAAAAAAEAAACgMgAAVgcAAKr4//8BAAAAf39/AAEAAABkAAAAAAAAABQAAABAHwAAAAAAACYAAAAAAAAAwOD//wAAAAAmAAAAZAAAABYAAABMAAAAAAAAAAAAAAAEAAAAAAAAAAEAAAAzZpkKAAAAACgAAAAoAAAAZAAAAGQAAAAAAAAAzMzMAAAAAABQAAAAUAAAAGQAAABkAAAAAAAAABcAAAAUAAAAAAAAAAAAAAD/fwAA/38AAAAAAAAJAAAABAAAAAAAAAAeAAAAaAAAAAAAAAAAAAAAAAAAAAAAAAAAAAAAECcAABAnAAAAAAAAAAAAAAAAAAAAAAAAAAAAAAAAAAAAAAAAAAAAABQAAAAAAAAAwMD/AAAAAABkAAAAMgAAAAAAAABkAAAAAAAAAH9/fwAKAAAAIgAAABgAAAAAAAAAAAAAAAAAAAAAAAAAAAAAAAAAAAAkAAAAJAAAAAAAAAAHAAAAAAAAAAAAAAAAAAAAAAAAAAAAAAAAAAAAf39/ACUAAABYAAAAAAAAAAAAAAAAAAAAAAAAAAAAAAAAAAAAAAAAAAAAAAAAAAAAAAAAAAAAAAA/AAAAAAAAAKCGAQAAAAAAAAAAAAAAAAAMAAAAAQAAAAAAAAAAAAAAAAAAAB8AAABUAAAAAAAABQAAAAEAAAAAAAAAAAAAAAAAAAAAAAAAAAAAAAAAAAAAAAAAAAAAAAJ/f38AAAAAA8zMzADAwP8Af39/AAAAAAAAAAAAAAAAAAAAAAAAAAAAIQAAABgAAAAUAAAAsw4AAIgdAACzOwAABCEAABAAAAAmAAAACAAAAIGAAAAAAAAA"/>
               </a:ext>
             </a:extLst>
           </p:cNvSpPr>
@@ -2565,7 +2578,7 @@
             <a:spLocks noGrp="1" noChangeArrowheads="1"/>
             <a:extLst>
               <a:ext uri="smNativeData">
-                <pr:smNativeData xmlns:mc="http://schemas.openxmlformats.org/markup-compatibility/2006" xmlns:p14="http://schemas.microsoft.com/office/powerpoint/2010/main" xmlns:p15="http://schemas.microsoft.com/office/powerpoint/2012/main" xmlns:pr="smNativeData" xmlns="smNativeData" val="SMDATA_15_l3DXYhMAAAAlAAAAZAAAAA8BAAAAkAAAAEgAAACQAAAASAAAAAAAAAAAAAAAAAAAAAEAAABQAAAAAAAAAAAA4D8AAAAAAADgPwAAAAAAAOA/AAAAAAAA4D8AAAAAAADgPwAAAAAAAOA/AAAAAAAA4D8AAAAAAADgPwAAAAAAAOA/AAAAAAAA4D8CAAAAjAAAAAAAAAAAAAAAADOZDCYmJggAAAAAAAAAAAAAAAAAAAAAAAAAAAAAAAAAAAAAZAAAAAEAAABAAAAAAAAAAAAAAAAAAAAAAAAAAAAAAAAAAAAAAAAAAAAAAAAAAAAAAAAAAAAAAAAAAAAAAAAAAAAAAAAAAAAAAAAAAAAAAAAAAAAAAAAAAAAAAAAAAAAAFAAAADwAAAAAAAAAAAAAAP///wkUAAAAAQAAABQAAAAUAAAAFAAAAAEAAAAAAAAAZAAAAGQAAAAAAAAAZAAAAGQAAAAVAAAAYAAAAAAAAAAAAAAADwAAACADAAAAAAAAAAAAAAEAAACgMgAAVgcAAKr4//8BAAAAf39/AAEAAABkAAAAAAAAABQAAABAHwAAAAAAACYAAAAAAAAAwOD//wAAAAAmAAAAZAAAABYAAABMAAAAAAAAAAAAAAAEAAAAAAAAAAEAAAAzZpkKAAAAACgAAAAoAAAAZAAAAGQAAAAAAAAAzMzMAAAAAABQAAAAUAAAAGQAAABkAAAAAAAAABcAAAAUAAAAAAAAAAAAAAD/fwAA/38AAAAAAAAJAAAABAAAAAAAAAAeAAAAaAAAAAAAAAAAAAAAAAAAAAAAAAAAAAAAECcAABAnAAAAAAAAAAAAAAAAAAAAAAAAAAAAAAAAAAAAAAAAAAAAABQAAAAAAAAAwMD/AAAAAABkAAAAMgAAAAAAAABkAAAAAAAAAH9/fwAKAAAAIgAAABgAAAAAAAAAAAAAAAAAAAAAAAAAAAAAAAAAAAAkAAAAJAAAAAAAAAAHAAAAAAAAAAAAAAAAAAAAAAAAAAAAAAAAAAAAf39/ACUAAABYAAAAAAAAAAAAAAAAAAAAAAAAAAAAAAAAAAAAAAAAAAAAAAAAAAAAAAAAAAAAAAA/AAAAAAAAAKCGAQAAAAAAAAAAAAAAAAAMAAAAAQAAAAAAAAAAAAAAAAAAAB8AAABUAAAAAAAABQAAAAEAAAAAAAAAAAAAAAAAAAAAAAAAAAAAAAAAAAAAAAAAAAAAAAJ/f38AAAAAA8zMzADAwP8Af39/AAAAAAAAAAAAAAAAAAAAAAAAAAAAIQAAABgAAAAUAAAAsw4AAMYDAACzOwAAFh0AABAAAAAmAAAACAAAAAGAAAAAAAAA"/>
+                <pr:smNativeData xmlns="smNativeData" xmlns:pr="smNativeData" xmlns:p15="http://schemas.microsoft.com/office/powerpoint/2012/main" xmlns:p14="http://schemas.microsoft.com/office/powerpoint/2010/main" xmlns:mc="http://schemas.openxmlformats.org/markup-compatibility/2006" val="SMDATA_15_l3DXYhMAAAAlAAAAZAAAAA8BAAAAkAAAAEgAAACQAAAASAAAAAAAAAAAAAAAAAAAAAEAAABQAAAAAAAAAAAA4D8AAAAAAADgPwAAAAAAAOA/AAAAAAAA4D8AAAAAAADgPwAAAAAAAOA/AAAAAAAA4D8AAAAAAADgPwAAAAAAAOA/AAAAAAAA4D8CAAAAjAAAAAAAAAAAAAAAADOZDCYmJggAAAAAAAAAAAAAAAAAAAAAAAAAAAAAAAAAAAAAZAAAAAEAAABAAAAAAAAAAAAAAAAAAAAAAAAAAAAAAAAAAAAAAAAAAAAAAAAAAAAAAAAAAAAAAAAAAAAAAAAAAAAAAAAAAAAAAAAAAAAAAAAAAAAAAAAAAAAAAAAAAAAAFAAAADwAAAAAAAAAAAAAAP///wkUAAAAAQAAABQAAAAUAAAAFAAAAAEAAAAAAAAAZAAAAGQAAAAAAAAAZAAAAGQAAAAVAAAAYAAAAAAAAAAAAAAADwAAACADAAAAAAAAAAAAAAEAAACgMgAAVgcAAKr4//8BAAAAf39/AAEAAABkAAAAAAAAABQAAABAHwAAAAAAACYAAAAAAAAAwOD//wAAAAAmAAAAZAAAABYAAABMAAAAAAAAAAAAAAAEAAAAAAAAAAEAAAAzZpkKAAAAACgAAAAoAAAAZAAAAGQAAAAAAAAAzMzMAAAAAABQAAAAUAAAAGQAAABkAAAAAAAAABcAAAAUAAAAAAAAAAAAAAD/fwAA/38AAAAAAAAJAAAABAAAAAAAAAAeAAAAaAAAAAAAAAAAAAAAAAAAAAAAAAAAAAAAECcAABAnAAAAAAAAAAAAAAAAAAAAAAAAAAAAAAAAAAAAAAAAAAAAABQAAAAAAAAAwMD/AAAAAABkAAAAMgAAAAAAAABkAAAAAAAAAH9/fwAKAAAAIgAAABgAAAAAAAAAAAAAAAAAAAAAAAAAAAAAAAAAAAAkAAAAJAAAAAAAAAAHAAAAAAAAAAAAAAAAAAAAAAAAAAAAAAAAAAAAf39/ACUAAABYAAAAAAAAAAAAAAAAAAAAAAAAAAAAAAAAAAAAAAAAAAAAAAAAAAAAAAAAAAAAAAA/AAAAAAAAAKCGAQAAAAAAAAAAAAAAAAAMAAAAAQAAAAAAAAAAAAAAAAAAAB8AAABUAAAAAAAABQAAAAEAAAAAAAAAAAAAAAAAAAAAAAAAAAAAAAAAAAAAAAAAAAAAAAJ/f38AAAAAA8zMzADAwP8Af39/AAAAAAAAAAAAAAAAAAAAAAAAAAAAIQAAABgAAAAUAAAAsw4AAMYDAACzOwAAFh0AABAAAAAmAAAACAAAAAGAAAAAAAAA"/>
               </a:ext>
             </a:extLst>
           </p:cNvSpPr>
@@ -2633,7 +2646,7 @@
             <a:spLocks noGrp="1" noChangeArrowheads="1"/>
             <a:extLst>
               <a:ext uri="smNativeData">
-                <pr:smNativeData xmlns:mc="http://schemas.openxmlformats.org/markup-compatibility/2006" xmlns:p14="http://schemas.microsoft.com/office/powerpoint/2010/main" xmlns:p15="http://schemas.microsoft.com/office/powerpoint/2012/main" xmlns:pr="smNativeData" xmlns="smNativeData" val="SMDATA_15_l3DXYhMAAAAlAAAAZAAAAA8BAAAAkAAAAEgAAACQAAAASAAAAAAAAAAAAAAAAAAAAAEAAABQAAAAAAAAAAAA4D8AAAAAAADgPwAAAAAAAOA/AAAAAAAA4D8AAAAAAADgPwAAAAAAAOA/AAAAAAAA4D8AAAAAAADgPwAAAAAAAOA/AAAAAAAA4D8CAAAAjAAAAAAAAAAAAAAAADOZDCYmJggAAAAAAAAAAAAAAAAAAAAAAAAAAAAAAAAAAAAAZAAAAAEAAABAAAAAAAAAAAAAAAAAAAAAAAAAAAAAAAAAAAAAAAAAAAAAAAAAAAAAAAAAAAAAAAAAAAAAAAAAAAAAAAAAAAAAAAAAAAAAAAAAAAAAAAAAAAAAAAAAAAAAFAAAADwAAAAAAAAAAAAAAP///wkUAAAAAQAAABQAAAAUAAAAFAAAAAEAAAAAAAAAZAAAAGQAAAAAAAAAZAAAAGQAAAAVAAAAYAAAAAAAAAAAAAAADwAAACADAAAAAAAAAAAAAAEAAACgMgAAVgcAAKr4//8BAAAAf39/AAEAAABkAAAAAAAAABQAAABAHwAAAAAAACYAAAAAAAAAwOD//wAAAAAmAAAAZAAAABYAAABMAAAAAAAAAAAAAAAEAAAAAAAAAAEAAAAzZpkKAAAAACgAAAAoAAAAZAAAAGQAAAAAAAAAzMzMAAAAAABQAAAAUAAAAGQAAABkAAAAAAAAABcAAAAUAAAAAAAAAAAAAAD/fwAA/38AAAAAAAAJAAAABAAAAAAAAAAeAAAAaAAAAAAAAAAAAAAAAAAAAAAAAAAAAAAAECcAABAnAAAAAAAAAAAAAAAAAAAAAAAAAAAAAAAAAAAAAAAAAAAAABQAAAAAAAAAwMD/AAAAAABkAAAAMgAAAAAAAABkAAAAAAAAAH9/fwAKAAAAIgAAABgAAAAAAAAAAAAAAAAAAAAAAAAAAAAAAAAAAAAkAAAAJAAAAAAAAAAHAAAAAAAAAAAAAAAAAAAAAAAAAAAAAAAAAAAAf39/ACUAAABYAAAAAAAAAAAAAAAAAAAAAAAAAAAAAAAAAAAAAAAAAAAAAAAAAAAAAAAAAAAAAAA/AAAAAAAAAKCGAQAAAAAAAAAAAAAAAAAMAAAAAQAAAAAAAAAAAAAAAAAAAB8AAABUAAAAAAAABQAAAAEAAAAAAAAAAAAAAAAAAAAAAAAAAAAAAAAAAAAAAAAAAAAAAAJ/f38AAAAAA8zMzADAwP8Af39/AAAAAAAAAAAAAAAAAAAAAAAAAAAAIQAAABgAAAAUAAAAsw4AAAQhAACzOwAA+CUAABAAAAAmAAAACAAAAAGAAAAAAAAA"/>
+                <pr:smNativeData xmlns="smNativeData" xmlns:pr="smNativeData" xmlns:p15="http://schemas.microsoft.com/office/powerpoint/2012/main" xmlns:p14="http://schemas.microsoft.com/office/powerpoint/2010/main" xmlns:mc="http://schemas.openxmlformats.org/markup-compatibility/2006" val="SMDATA_15_l3DXYhMAAAAlAAAAZAAAAA8BAAAAkAAAAEgAAACQAAAASAAAAAAAAAAAAAAAAAAAAAEAAABQAAAAAAAAAAAA4D8AAAAAAADgPwAAAAAAAOA/AAAAAAAA4D8AAAAAAADgPwAAAAAAAOA/AAAAAAAA4D8AAAAAAADgPwAAAAAAAOA/AAAAAAAA4D8CAAAAjAAAAAAAAAAAAAAAADOZDCYmJggAAAAAAAAAAAAAAAAAAAAAAAAAAAAAAAAAAAAAZAAAAAEAAABAAAAAAAAAAAAAAAAAAAAAAAAAAAAAAAAAAAAAAAAAAAAAAAAAAAAAAAAAAAAAAAAAAAAAAAAAAAAAAAAAAAAAAAAAAAAAAAAAAAAAAAAAAAAAAAAAAAAAFAAAADwAAAAAAAAAAAAAAP///wkUAAAAAQAAABQAAAAUAAAAFAAAAAEAAAAAAAAAZAAAAGQAAAAAAAAAZAAAAGQAAAAVAAAAYAAAAAAAAAAAAAAADwAAACADAAAAAAAAAAAAAAEAAACgMgAAVgcAAKr4//8BAAAAf39/AAEAAABkAAAAAAAAABQAAABAHwAAAAAAACYAAAAAAAAAwOD//wAAAAAmAAAAZAAAABYAAABMAAAAAAAAAAAAAAAEAAAAAAAAAAEAAAAzZpkKAAAAACgAAAAoAAAAZAAAAGQAAAAAAAAAzMzMAAAAAABQAAAAUAAAAGQAAABkAAAAAAAAABcAAAAUAAAAAAAAAAAAAAD/fwAA/38AAAAAAAAJAAAABAAAAAAAAAAeAAAAaAAAAAAAAAAAAAAAAAAAAAAAAAAAAAAAECcAABAnAAAAAAAAAAAAAAAAAAAAAAAAAAAAAAAAAAAAAAAAAAAAABQAAAAAAAAAwMD/AAAAAABkAAAAMgAAAAAAAABkAAAAAAAAAH9/fwAKAAAAIgAAABgAAAAAAAAAAAAAAAAAAAAAAAAAAAAAAAAAAAAkAAAAJAAAAAAAAAAHAAAAAAAAAAAAAAAAAAAAAAAAAAAAAAAAAAAAf39/ACUAAABYAAAAAAAAAAAAAAAAAAAAAAAAAAAAAAAAAAAAAAAAAAAAAAAAAAAAAAAAAAAAAAA/AAAAAAAAAKCGAQAAAAAAAAAAAAAAAAAMAAAAAQAAAAAAAAAAAAAAAAAAAB8AAABUAAAAAAAABQAAAAEAAAAAAAAAAAAAAAAAAAAAAAAAAAAAAAAAAAAAAAAAAAAAAAJ/f38AAAAAA8zMzADAwP8Af39/AAAAAAAAAAAAAAAAAAAAAAAAAAAAIQAAABgAAAAUAAAAsw4AAAQhAACzOwAA+CUAABAAAAAmAAAACAAAAAGAAAAAAAAA"/>
               </a:ext>
             </a:extLst>
           </p:cNvSpPr>
@@ -2701,7 +2714,7 @@
             <a:spLocks noGrp="1" noChangeArrowheads="1"/>
             <a:extLst>
               <a:ext uri="smNativeData">
-                <pr:smNativeData xmlns:mc="http://schemas.openxmlformats.org/markup-compatibility/2006" xmlns:p14="http://schemas.microsoft.com/office/powerpoint/2010/main" xmlns:p15="http://schemas.microsoft.com/office/powerpoint/2012/main" xmlns:pr="smNativeData" xmlns="smNativeData" val="SMDATA_15_l3DXYhMAAAAlAAAAZAAAAA8BAAAAkAAAAEgAAACQAAAASAAAAAAAAAABAAAAAAAAAAEAAABQAAAAAAAAAAAA4D8AAAAAAADgPwAAAAAAAOA/AAAAAAAA4D8AAAAAAADgPwAAAAAAAOA/AAAAAAAA4D8AAAAAAADgPwAAAAAAAOA/AAAAAAAA4D8CAAAAjAAAAAAAAAAAAAAAADOZDCYmJggAAAAAAAAAAAAAAAAAAAAAAAAAAAAAAAAAAAAAZAAAAAEAAABAAAAAAAAAAAAAAAAAAAAAAAAAAAAAAAAAAAAAAAAAAAAAAAAAAAAAAAAAAAAAAAAAAAAAAAAAAAAAAAAAAAAAAAAAAAAAAAAAAAAAAAAAAAAAAAAAAAAAFAAAADwAAAAAAAAAAAAAAP///wkUAAAAAQAAABQAAAAUAAAAFAAAAAEAAAAAAAAAZAAAAGQAAAAAAAAAZAAAAGQAAAAVAAAAYAAAAAAAAAAAAAAADwAAACADAAAAAAAAAAAAAAEAAACgMgAAVgcAAKr4//8BAAAAf39/AAEAAABkAAAAAAAAABQAAABAHwAAAAAAACYAAAAAAAAAwOD//wAAAAAmAAAAZAAAABYAAABMAAAAAAAAAAAAAAAEAAAAAAAAAAEAAAAzZpkKAAAAACgAAAAoAAAAZAAAAGQAAAAAAAAAzMzMAAAAAABQAAAAUAAAAGQAAABkAAAAAAAAABcAAAAUAAAAAAAAAAAAAAD/fwAA/38AAAAAAAAJAAAABAAAAAAAAAAeAAAAaAAAAAAAAAAAAAAAAAAAAAAAAAAAAAAAECcAABAnAAAAAAAAAAAAAAAAAAAAAAAAAAAAAAAAAAAAAAAAAAAAABQAAAAAAAAAwMD/AAAAAABkAAAAMgAAAAAAAABkAAAAAAAAAH9/fwAKAAAAIgAAABgAAAAAAAAAAAAAAAAAAAAAAAAAAAAAAAAAAAAkAAAAJAAAAAAAAAAHAAAAAAAAAAAAAAAAAAAAAAAAAAAAAAAAAAAAf39/ACUAAABYAAAAAAAAAAAAAAAAAAAAAAAAAAAAAAAAAAAAAAAAAAAAAAAAAAAAAAAAAAAAAAA/AAAAAAAAAKCGAQAAAAAAAAAAAAAAAAAMAAAAAQAAAAAAAAAAAAAAAAAAAB8AAABUAAAAAAAABQAAAAEAAAAAAAAAAAAAAAAAAAAAAAAAAAAAAAAAAAAAAAAAAAAAAAJ/f38AAAAAA8zMzADAwP8Af39/AAAAAAAAAAAAAAAAAAAAAAAAAAAAIQAAABgAAAAUAAAAwAMAABsnAAA/FQAAWSkAABAAAAAmAAAACAAAAAAAAAAAAAAA"/>
+                <pr:smNativeData xmlns="smNativeData" xmlns:pr="smNativeData" xmlns:p15="http://schemas.microsoft.com/office/powerpoint/2012/main" xmlns:p14="http://schemas.microsoft.com/office/powerpoint/2010/main" xmlns:mc="http://schemas.openxmlformats.org/markup-compatibility/2006" val="SMDATA_15_l3DXYhMAAAAlAAAAZAAAAA8BAAAAkAAAAEgAAACQAAAASAAAAAAAAAABAAAAAAAAAAEAAABQAAAAAAAAAAAA4D8AAAAAAADgPwAAAAAAAOA/AAAAAAAA4D8AAAAAAADgPwAAAAAAAOA/AAAAAAAA4D8AAAAAAADgPwAAAAAAAOA/AAAAAAAA4D8CAAAAjAAAAAAAAAAAAAAAADOZDCYmJggAAAAAAAAAAAAAAAAAAAAAAAAAAAAAAAAAAAAAZAAAAAEAAABAAAAAAAAAAAAAAAAAAAAAAAAAAAAAAAAAAAAAAAAAAAAAAAAAAAAAAAAAAAAAAAAAAAAAAAAAAAAAAAAAAAAAAAAAAAAAAAAAAAAAAAAAAAAAAAAAAAAAFAAAADwAAAAAAAAAAAAAAP///wkUAAAAAQAAABQAAAAUAAAAFAAAAAEAAAAAAAAAZAAAAGQAAAAAAAAAZAAAAGQAAAAVAAAAYAAAAAAAAAAAAAAADwAAACADAAAAAAAAAAAAAAEAAACgMgAAVgcAAKr4//8BAAAAf39/AAEAAABkAAAAAAAAABQAAABAHwAAAAAAACYAAAAAAAAAwOD//wAAAAAmAAAAZAAAABYAAABMAAAAAAAAAAAAAAAEAAAAAAAAAAEAAAAzZpkKAAAAACgAAAAoAAAAZAAAAGQAAAAAAAAAzMzMAAAAAABQAAAAUAAAAGQAAABkAAAAAAAAABcAAAAUAAAAAAAAAAAAAAD/fwAA/38AAAAAAAAJAAAABAAAAAAAAAAeAAAAaAAAAAAAAAAAAAAAAAAAAAAAAAAAAAAAECcAABAnAAAAAAAAAAAAAAAAAAAAAAAAAAAAAAAAAAAAAAAAAAAAABQAAAAAAAAAwMD/AAAAAABkAAAAMgAAAAAAAABkAAAAAAAAAH9/fwAKAAAAIgAAABgAAAAAAAAAAAAAAAAAAAAAAAAAAAAAAAAAAAAkAAAAJAAAAAAAAAAHAAAAAAAAAAAAAAAAAAAAAAAAAAAAAAAAAAAAf39/ACUAAABYAAAAAAAAAAAAAAAAAAAAAAAAAAAAAAAAAAAAAAAAAAAAAAAAAAAAAAAAAAAAAAA/AAAAAAAAAKCGAQAAAAAAAAAAAAAAAAAMAAAAAQAAAAAAAAAAAAAAAAAAAB8AAABUAAAAAAAABQAAAAEAAAAAAAAAAAAAAAAAAAAAAAAAAAAAAAAAAAAAAAAAAAAAAAJ/f38AAAAAA8zMzADAwP8Af39/AAAAAAAAAAAAAAAAAAAAAAAAAAAAIQAAABgAAAAUAAAAwAMAABsnAAA/FQAAWSkAABAAAAAmAAAACAAAAAAAAAAAAAAA"/>
               </a:ext>
             </a:extLst>
           </p:cNvSpPr>
@@ -2715,7 +2728,7 @@
           <a:lstStyle/>
           <a:p>
             <a:fld id="{2B84B879-37C6-D14E-883C-C11BF6727E94}" type="datetime1">
-              <a:t>21/07/2022</a:t>
+              <a:t>26/07/2022</a:t>
             </a:fld>
             <a:endParaRPr/>
           </a:p>
@@ -2728,7 +2741,7 @@
             <a:spLocks noGrp="1" noChangeArrowheads="1"/>
             <a:extLst>
               <a:ext uri="smNativeData">
-                <pr:smNativeData xmlns:mc="http://schemas.openxmlformats.org/markup-compatibility/2006" xmlns:p14="http://schemas.microsoft.com/office/powerpoint/2010/main" xmlns:p15="http://schemas.microsoft.com/office/powerpoint/2012/main" xmlns:pr="smNativeData" xmlns="smNativeData" val="SMDATA_15_l3DXYhMAAAAlAAAAZAAAAA8BAAAAkAAAAEgAAACQAAAASAAAAAAAAAABAAAAAAAAAAEAAABQAAAAAAAAAAAA4D8AAAAAAADgPwAAAAAAAOA/AAAAAAAA4D8AAAAAAADgPwAAAAAAAOA/AAAAAAAA4D8AAAAAAADgPwAAAAAAAOA/AAAAAAAA4D8CAAAAjAAAAAAAAAAAAAAAADOZDCYmJggAAAAAAAAAAAAAAAAAAAAAAAAAAAAAAAAAAAAAZAAAAAEAAABAAAAAAAAAAAAAAAAAAAAAAAAAAAAAAAAAAAAAAAAAAAAAAAAAAAAAAAAAAAAAAAAAAAAAAAAAAAAAAAAAAAAAAAAAAAAAAAAAAAAAAAAAAAAAAAAAAAAAFAAAADwAAAAAAAAAAAAAAP///wkUAAAAAQAAABQAAAAUAAAAFAAAAAEAAAAAAAAAZAAAAGQAAAAAAAAAZAAAAGQAAAAVAAAAYAAAAAAAAAAAAAAADwAAACADAAAAAAAAAAAAAAEAAACgMgAAVgcAAKr4//8BAAAAf39/AAEAAABkAAAAAAAAABQAAABAHwAAAAAAACYAAAAAAAAAwOD//wAAAAAmAAAAZAAAABYAAABMAAAAAAAAAAAAAAAEAAAAAAAAAAEAAAAzZpkKAAAAACgAAAAoAAAAZAAAAGQAAAAAAAAAzMzMAAAAAABQAAAAUAAAAGQAAABkAAAAAAAAABcAAAAUAAAAAAAAAAAAAAD/fwAA/38AAAAAAAAJAAAABAAAAAAAAAAeAAAAaAAAAAAAAAAAAAAAAAAAAAAAAAAAAAAAECcAABAnAAAAAAAAAAAAAAAAAAAAAAAAAAAAAAAAAAAAAAAAAAAAABQAAAAAAAAAwMD/AAAAAABkAAAAMgAAAAAAAABkAAAAAAAAAH9/fwAKAAAAIgAAABgAAAAAAAAAAAAAAAAAAAAAAAAAAAAAAAAAAAAkAAAAJAAAAAAAAAAHAAAAAAAAAAAAAAAAAAAAAAAAAAAAAAAAAAAAf39/ACUAAABYAAAAAAAAAAAAAAAAAAAAAAAAAAAAAAAAAAAAAAAAAAAAAAAAAAAAAAAAAAAAAAA/AAAAAAAAAKCGAQAAAAAAAAAAAAAAAAAMAAAAAQAAAAAAAAAAAAAAAAAAAB8AAABUAAAAAAAABQAAAAEAAAAAAAAAAAAAAAAAAAAAAAAAAAAAAAAAAAAAAAAAAAAAAAJ/f38AAAAAA8zMzADAwP8Af39/AAAAAAAAAAAAAAAAAAAAAAAAAAAAIQAAABgAAAAUAAAAoRkAABsnAABfMQAAWSkAABAAAAAmAAAACAAAAAAAAAAAAAAA"/>
+                <pr:smNativeData xmlns="smNativeData" xmlns:pr="smNativeData" xmlns:p15="http://schemas.microsoft.com/office/powerpoint/2012/main" xmlns:p14="http://schemas.microsoft.com/office/powerpoint/2010/main" xmlns:mc="http://schemas.openxmlformats.org/markup-compatibility/2006" val="SMDATA_15_l3DXYhMAAAAlAAAAZAAAAA8BAAAAkAAAAEgAAACQAAAASAAAAAAAAAABAAAAAAAAAAEAAABQAAAAAAAAAAAA4D8AAAAAAADgPwAAAAAAAOA/AAAAAAAA4D8AAAAAAADgPwAAAAAAAOA/AAAAAAAA4D8AAAAAAADgPwAAAAAAAOA/AAAAAAAA4D8CAAAAjAAAAAAAAAAAAAAAADOZDCYmJggAAAAAAAAAAAAAAAAAAAAAAAAAAAAAAAAAAAAAZAAAAAEAAABAAAAAAAAAAAAAAAAAAAAAAAAAAAAAAAAAAAAAAAAAAAAAAAAAAAAAAAAAAAAAAAAAAAAAAAAAAAAAAAAAAAAAAAAAAAAAAAAAAAAAAAAAAAAAAAAAAAAAFAAAADwAAAAAAAAAAAAAAP///wkUAAAAAQAAABQAAAAUAAAAFAAAAAEAAAAAAAAAZAAAAGQAAAAAAAAAZAAAAGQAAAAVAAAAYAAAAAAAAAAAAAAADwAAACADAAAAAAAAAAAAAAEAAACgMgAAVgcAAKr4//8BAAAAf39/AAEAAABkAAAAAAAAABQAAABAHwAAAAAAACYAAAAAAAAAwOD//wAAAAAmAAAAZAAAABYAAABMAAAAAAAAAAAAAAAEAAAAAAAAAAEAAAAzZpkKAAAAACgAAAAoAAAAZAAAAGQAAAAAAAAAzMzMAAAAAABQAAAAUAAAAGQAAABkAAAAAAAAABcAAAAUAAAAAAAAAAAAAAD/fwAA/38AAAAAAAAJAAAABAAAAAAAAAAeAAAAaAAAAAAAAAAAAAAAAAAAAAAAAAAAAAAAECcAABAnAAAAAAAAAAAAAAAAAAAAAAAAAAAAAAAAAAAAAAAAAAAAABQAAAAAAAAAwMD/AAAAAABkAAAAMgAAAAAAAABkAAAAAAAAAH9/fwAKAAAAIgAAABgAAAAAAAAAAAAAAAAAAAAAAAAAAAAAAAAAAAAkAAAAJAAAAAAAAAAHAAAAAAAAAAAAAAAAAAAAAAAAAAAAAAAAAAAAf39/ACUAAABYAAAAAAAAAAAAAAAAAAAAAAAAAAAAAAAAAAAAAAAAAAAAAAAAAAAAAAAAAAAAAAA/AAAAAAAAAKCGAQAAAAAAAAAAAAAAAAAMAAAAAQAAAAAAAAAAAAAAAAAAAB8AAABUAAAAAAAABQAAAAEAAAAAAAAAAAAAAAAAAAAAAAAAAAAAAAAAAAAAAAAAAAAAAAJ/f38AAAAAA8zMzADAwP8Af39/AAAAAAAAAAAAAAAAAAAAAAAAAAAAIQAAABgAAAAUAAAAoRkAABsnAABfMQAAWSkAABAAAAAmAAAACAAAAAAAAAAAAAAA"/>
               </a:ext>
             </a:extLst>
           </p:cNvSpPr>
@@ -2752,7 +2765,7 @@
             <a:spLocks noGrp="1" noChangeArrowheads="1"/>
             <a:extLst>
               <a:ext uri="smNativeData">
-                <pr:smNativeData xmlns:mc="http://schemas.openxmlformats.org/markup-compatibility/2006" xmlns:p14="http://schemas.microsoft.com/office/powerpoint/2010/main" xmlns:p15="http://schemas.microsoft.com/office/powerpoint/2012/main" xmlns:pr="smNativeData" xmlns="smNativeData" val="SMDATA_15_l3DXYhMAAAAlAAAAZAAAAA8BAAAAkAAAAEgAAACQAAAASAAAAAAAAAABAAAAAAAAAAEAAABQAAAAAAAAAAAA4D8AAAAAAADgPwAAAAAAAOA/AAAAAAAA4D8AAAAAAADgPwAAAAAAAOA/AAAAAAAA4D8AAAAAAADgPwAAAAAAAOA/AAAAAAAA4D8CAAAAjAAAAAAAAAAAAAAAADOZDCYmJggAAAAAAAAAAAAAAAAAAAAAAAAAAAAAAAAAAAAAZAAAAAEAAABAAAAAAAAAAAAAAAAAAAAAAAAAAAAAAAAAAAAAAAAAAAAAAAAAAAAAAAAAAAAAAAAAAAAAAAAAAAAAAAAAAAAAAAAAAAAAAAAAAAAAAAAAAAAAAAAAAAAAFAAAADwAAAAAAAAAAAAAAP///wkUAAAAAQAAABQAAAAUAAAAFAAAAAEAAAAAAAAAZAAAAGQAAAAAAAAAZAAAAGQAAAAVAAAAYAAAAAAAAAAAAAAADwAAACADAAAAAAAAAAAAAAEAAACgMgAAVgcAAKr4//8BAAAAf39/AAEAAABkAAAAAAAAABQAAABAHwAAAAAAACYAAAAAAAAAwOD//wAAAAAmAAAAZAAAABYAAABMAAAAAAAAAAAAAAAEAAAAAAAAAAEAAAAzZpkKAAAAACgAAAAoAAAAZAAAAGQAAAAAAAAAzMzMAAAAAABQAAAAUAAAAGQAAABkAAAAAAAAABcAAAAUAAAAAAAAAAAAAAD/fwAA/38AAAAAAAAJAAAABAAAAAAAAAAeAAAAaAAAAAAAAAAAAAAAAAAAAAAAAAAAAAAAECcAABAnAAAAAAAAAAAAAAAAAAAAAAAAAAAAAAAAAAAAAAAAAAAAABQAAAAAAAAAwMD/AAAAAABkAAAAMgAAAAAAAABkAAAAAAAAAH9/fwAKAAAAIgAAABgAAAAAAAAAAAAAAAAAAAAAAAAAAAAAAAAAAAAkAAAAJAAAAAAAAAAHAAAAAAAAAAAAAAAAAAAAAAAAAAAAAAAAAAAAf39/ACUAAABYAAAAAAAAAAAAAAAAAAAAAAAAAAAAAAAAAAAAAAAAAAAAAAAAAAAAAAAAAAAAAAA/AAAAAAAAAKCGAQAAAAAAAAAAAAAAAAAMAAAAAQAAAAAAAAAAAAAAAAAAAB8AAABUAAAAAAAABQAAAAEAAAAAAAAAAAAAAAAAAAAAAAAAAAAAAAAAAAAAAAAAAAAAAAJ/f38AAAAAA8zMzADAwP8Af39/AAAAAAAAAAAAAAAAAAAAAAAAAAAAIQAAABgAAAAUAAAAwTUAABsnAABARwAAWSkAABAAAAAmAAAACAAAAAAAAAAAAAAA"/>
+                <pr:smNativeData xmlns="smNativeData" xmlns:pr="smNativeData" xmlns:p15="http://schemas.microsoft.com/office/powerpoint/2012/main" xmlns:p14="http://schemas.microsoft.com/office/powerpoint/2010/main" xmlns:mc="http://schemas.openxmlformats.org/markup-compatibility/2006" val="SMDATA_15_l3DXYhMAAAAlAAAAZAAAAA8BAAAAkAAAAEgAAACQAAAASAAAAAAAAAABAAAAAAAAAAEAAABQAAAAAAAAAAAA4D8AAAAAAADgPwAAAAAAAOA/AAAAAAAA4D8AAAAAAADgPwAAAAAAAOA/AAAAAAAA4D8AAAAAAADgPwAAAAAAAOA/AAAAAAAA4D8CAAAAjAAAAAAAAAAAAAAAADOZDCYmJggAAAAAAAAAAAAAAAAAAAAAAAAAAAAAAAAAAAAAZAAAAAEAAABAAAAAAAAAAAAAAAAAAAAAAAAAAAAAAAAAAAAAAAAAAAAAAAAAAAAAAAAAAAAAAAAAAAAAAAAAAAAAAAAAAAAAAAAAAAAAAAAAAAAAAAAAAAAAAAAAAAAAFAAAADwAAAAAAAAAAAAAAP///wkUAAAAAQAAABQAAAAUAAAAFAAAAAEAAAAAAAAAZAAAAGQAAAAAAAAAZAAAAGQAAAAVAAAAYAAAAAAAAAAAAAAADwAAACADAAAAAAAAAAAAAAEAAACgMgAAVgcAAKr4//8BAAAAf39/AAEAAABkAAAAAAAAABQAAABAHwAAAAAAACYAAAAAAAAAwOD//wAAAAAmAAAAZAAAABYAAABMAAAAAAAAAAAAAAAEAAAAAAAAAAEAAAAzZpkKAAAAACgAAAAoAAAAZAAAAGQAAAAAAAAAzMzMAAAAAABQAAAAUAAAAGQAAABkAAAAAAAAABcAAAAUAAAAAAAAAAAAAAD/fwAA/38AAAAAAAAJAAAABAAAAAAAAAAeAAAAaAAAAAAAAAAAAAAAAAAAAAAAAAAAAAAAECcAABAnAAAAAAAAAAAAAAAAAAAAAAAAAAAAAAAAAAAAAAAAAAAAABQAAAAAAAAAwMD/AAAAAABkAAAAMgAAAAAAAABkAAAAAAAAAH9/fwAKAAAAIgAAABgAAAAAAAAAAAAAAAAAAAAAAAAAAAAAAAAAAAAkAAAAJAAAAAAAAAAHAAAAAAAAAAAAAAAAAAAAAAAAAAAAAAAAAAAAf39/ACUAAABYAAAAAAAAAAAAAAAAAAAAAAAAAAAAAAAAAAAAAAAAAAAAAAAAAAAAAAAAAAAAAAA/AAAAAAAAAKCGAQAAAAAAAAAAAAAAAAAMAAAAAQAAAAAAAAAAAAAAAAAAAB8AAABUAAAAAAAABQAAAAEAAAAAAAAAAAAAAAAAAAAAAAAAAAAAAAAAAAAAAAAAAAAAAAJ/f38AAAAAA8zMzADAwP8Af39/AAAAAAAAAAAAAAAAAAAAAAAAAAAAIQAAABgAAAAUAAAAwTUAABsnAABARwAAWSkAABAAAAAmAAAACAAAAAAAAAAAAAAA"/>
               </a:ext>
             </a:extLst>
           </p:cNvSpPr>
@@ -2813,7 +2826,7 @@
             <a:spLocks noGrp="1" noChangeArrowheads="1"/>
             <a:extLst>
               <a:ext uri="smNativeData">
-                <pr:smNativeData xmlns:mc="http://schemas.openxmlformats.org/markup-compatibility/2006" xmlns:p14="http://schemas.microsoft.com/office/powerpoint/2010/main" xmlns:p15="http://schemas.microsoft.com/office/powerpoint/2012/main" xmlns:pr="smNativeData" xmlns="smNativeData" val="SMDATA_15_l3DXYhMAAAAlAAAAZAAAAA8BAAAAkAAAAEgAAACQAAAASAAAAAAAAAABAAAAAAAAAAEAAABQAAAAAAAAAAAA4D8AAAAAAADgPwAAAAAAAOA/AAAAAAAA4D8AAAAAAADgPwAAAAAAAOA/AAAAAAAA4D8AAAAAAADgPwAAAAAAAOA/AAAAAAAA4D8CAAAAjAAAAAAAAAAAAAAAADOZDCYmJggAAAAAAAAAAAAAAAAAAAAAAAAAAAAAAAAAAAAAZAAAAAEAAABAAAAAAAAAAAAAAAAAAAAAAAAAAAAAAAAAAAAAAAAAAAAAAAAAAAAAAAAAAAAAAAAAAAAAAAAAAAAAAAAAAAAAAAAAAAAAAAAAAAAAAAAAAAAAAAAAAAAAFAAAADwAAAAAAAAAAAAAAP///wkUAAAAAQAAABQAAAAUAAAAFAAAAAEAAAAAAAAAZAAAAGQAAAAAAAAAZAAAAGQAAAAVAAAAYAAAAAAAAAAAAAAADwAAACADAAAAAAAAAAAAAAEAAACgMgAAVgcAAKr4//8BAAAAf39/AAEAAABkAAAAAAAAABQAAABAHwAAAAAAACYAAAAAAAAAwOD//wAAAAAmAAAAZAAAABYAAABMAAAAAAAAAAAAAAAEAAAAAAAAAAEAAAAzZpkKAAAAACgAAAAoAAAAZAAAAGQAAAAAAAAAzMzMAAAAAABQAAAAUAAAAGQAAABkAAAAAAAAABcAAAAUAAAAAAAAAAAAAAD/fwAA/38AAAAAAAAJAAAABAAAAHsAfAAeAAAAaAAAAAAAAAAAAAAAAAAAAAAAAAAAAAAAECcAABAnAAAAAAAAAAAAAAAAAAAAAAAAAAAAAAAAAAAAAAAAAAAAABQAAAAAAAAAwMD/AAAAAABkAAAAMgAAAAAAAABkAAAAAAAAAH9/fwAKAAAAIgAAABgAAAAAAAAAAAAAAAAAAAAAAAAAAAAAAAAAAAAkAAAAJAAAAAAAAAAHAAAAAAAAAAAAAAAAAAAAAAAAAAAAAAAAAAAAf39/ACUAAABYAAAAAAAAAAAAAAAAAAAAAAAAAAAAAAAAAAAAAAAAAAAAAAAAAAAAAAAAAAAAAAA/AAAAAAAAAKCGAQAAAAAAAAAAAAAAAAAMAAAAAQAAAAAAAAAAAAAAAAAAAB8AAABUAAAAAAAABQAAAAEAAAAAAAAAAAAAAAAAAAAAAAAAAAAAAAAAAAAAAAAAAAAAAAJ/f38AAAAAA8zMzADAwP8Af39/AAAAAAAAAAAAAAAAAAAAAAAAAAAAIQAAABgAAAAUAAAAwAMAALABAABARwAAuAgAABAAAAAmAAAACAAAAP//////////"/>
+                <pr:smNativeData xmlns="smNativeData" xmlns:pr="smNativeData" xmlns:p15="http://schemas.microsoft.com/office/powerpoint/2012/main" xmlns:p14="http://schemas.microsoft.com/office/powerpoint/2010/main" xmlns:mc="http://schemas.openxmlformats.org/markup-compatibility/2006" val="SMDATA_15_l3DXYhMAAAAlAAAAZAAAAA8BAAAAkAAAAEgAAACQAAAASAAAAAAAAAABAAAAAAAAAAEAAABQAAAAAAAAAAAA4D8AAAAAAADgPwAAAAAAAOA/AAAAAAAA4D8AAAAAAADgPwAAAAAAAOA/AAAAAAAA4D8AAAAAAADgPwAAAAAAAOA/AAAAAAAA4D8CAAAAjAAAAAAAAAAAAAAAADOZDCYmJggAAAAAAAAAAAAAAAAAAAAAAAAAAAAAAAAAAAAAZAAAAAEAAABAAAAAAAAAAAAAAAAAAAAAAAAAAAAAAAAAAAAAAAAAAAAAAAAAAAAAAAAAAAAAAAAAAAAAAAAAAAAAAAAAAAAAAAAAAAAAAAAAAAAAAAAAAAAAAAAAAAAAFAAAADwAAAAAAAAAAAAAAP///wkUAAAAAQAAABQAAAAUAAAAFAAAAAEAAAAAAAAAZAAAAGQAAAAAAAAAZAAAAGQAAAAVAAAAYAAAAAAAAAAAAAAADwAAACADAAAAAAAAAAAAAAEAAACgMgAAVgcAAKr4//8BAAAAf39/AAEAAABkAAAAAAAAABQAAABAHwAAAAAAACYAAAAAAAAAwOD//wAAAAAmAAAAZAAAABYAAABMAAAAAAAAAAAAAAAEAAAAAAAAAAEAAAAzZpkKAAAAACgAAAAoAAAAZAAAAGQAAAAAAAAAzMzMAAAAAABQAAAAUAAAAGQAAABkAAAAAAAAABcAAAAUAAAAAAAAAAAAAAD/fwAA/38AAAAAAAAJAAAABAAAAHsAfAAeAAAAaAAAAAAAAAAAAAAAAAAAAAAAAAAAAAAAECcAABAnAAAAAAAAAAAAAAAAAAAAAAAAAAAAAAAAAAAAAAAAAAAAABQAAAAAAAAAwMD/AAAAAABkAAAAMgAAAAAAAABkAAAAAAAAAH9/fwAKAAAAIgAAABgAAAAAAAAAAAAAAAAAAAAAAAAAAAAAAAAAAAAkAAAAJAAAAAAAAAAHAAAAAAAAAAAAAAAAAAAAAAAAAAAAAAAAAAAAf39/ACUAAABYAAAAAAAAAAAAAAAAAAAAAAAAAAAAAAAAAAAAAAAAAAAAAAAAAAAAAAAAAAAAAAA/AAAAAAAAAKCGAQAAAAAAAAAAAAAAAAAMAAAAAQAAAAAAAAAAAAAAAAAAAB8AAABUAAAAAAAABQAAAAEAAAAAAAAAAAAAAAAAAAAAAAAAAAAAAAAAAAAAAAAAAAAAAAJ/f38AAAAAA8zMzADAwP8Af39/AAAAAAAAAAAAAAAAAAAAAAAAAAAAIQAAABgAAAAUAAAAwAMAALABAABARwAAuAgAABAAAAAmAAAACAAAAP//////////"/>
               </a:ext>
             </a:extLst>
           </p:cNvSpPr>
@@ -2856,7 +2869,7 @@
             <a:spLocks noGrp="1" noChangeArrowheads="1"/>
             <a:extLst>
               <a:ext uri="smNativeData">
-                <pr:smNativeData xmlns:mc="http://schemas.openxmlformats.org/markup-compatibility/2006" xmlns:p14="http://schemas.microsoft.com/office/powerpoint/2010/main" xmlns:p15="http://schemas.microsoft.com/office/powerpoint/2012/main" xmlns:pr="smNativeData" xmlns="smNativeData" val="SMDATA_15_l3DXYhMAAAAlAAAAZAAAAA8BAAAAkAAAAEgAAACQAAAASAAAAAAAAAAAAAAAAAAAAAEAAABQAAAAAAAAAAAA4D8AAAAAAADgPwAAAAAAAOA/AAAAAAAA4D8AAAAAAADgPwAAAAAAAOA/AAAAAAAA4D8AAAAAAADgPwAAAAAAAOA/AAAAAAAA4D8CAAAAjAAAAAAAAAAAAAAAADOZDCYmJggAAAAAAAAAAAAAAAAAAAAAAAAAAAAAAAAAAAAAZAAAAAEAAABAAAAAAAAAAAAAAAAAAAAAAAAAAAAAAAAAAAAAAAAAAAAAAAAAAAAAAAAAAAAAAAAAAAAAAAAAAAAAAAAAAAAAAAAAAAAAAAAAAAAAAAAAAAAAAAAAAAAAFAAAADwAAAAAAAAAAAAAAP///wkUAAAAAQAAABQAAAAUAAAAFAAAAAEAAAAAAAAAZAAAAGQAAAAAAAAAZAAAAGQAAAAVAAAAYAAAAAAAAAAAAAAADwAAACADAAAAAAAAAAAAAAEAAACgMgAAVgcAAKr4//8BAAAAf39/AAEAAABkAAAAAAAAABQAAABAHwAAAAAAACYAAAAAAAAAwOD//wAAAAAmAAAAZAAAABYAAABMAAAAAAAAAAAAAAAEAAAAAAAAAAEAAAAzZpkKAAAAACgAAAAoAAAAZAAAAGQAAAAAAAAAzMzMAAAAAABQAAAAUAAAAGQAAABkAAAAAAAAABcAAAAUAAAAAAAAAAAAAAD/fwAA/38AAAAAAAAJAAAABAAAAHsAfAAeAAAAaAAAAAAAAAAAAAAAAAAAAAAAAAAAAAAAECcAABAnAAAAAAAAAAAAAAAAAAAAAAAAAAAAAAAAAAAAAAAAAAAAABQAAAAAAAAAwMD/AAAAAABkAAAAMgAAAAAAAABkAAAAAAAAAH9/fwAKAAAAIgAAABgAAAAAAAAAAAAAAAAAAAAAAAAAAAAAAAAAAAAkAAAAJAAAAAAAAAAHAAAAAAAAAAAAAAAAAAAAAAAAAAAAAAAAAAAAf39/ACUAAABYAAAAAAAAAAAAAAAAAAAAAAAAAAAAAAAAAAAAAAAAAAAAAAAAAAAAAAAAAAAAAAA/AAAAAAAAAKCGAQAAAAAAAAAAAAAAAAAMAAAAAQAAAAAAAAAAAAAAAAAAAB8AAABUAAAAAAAABQAAAAEAAAAAAAAAAAAAAAAAAAAAAAAAAAAAAAAAAAAAAAAAAAAAAAJ/f38AAAAAA8zMzADAwP8Af39/AAAAAAAAAAAAAAAAAAAAAAAAAAAAIQAAABgAAAAUAAAAwAMAANgJAABARwAAsCUAABAAAAAmAAAACAAAAP//////////"/>
+                <pr:smNativeData xmlns="smNativeData" xmlns:pr="smNativeData" xmlns:p15="http://schemas.microsoft.com/office/powerpoint/2012/main" xmlns:p14="http://schemas.microsoft.com/office/powerpoint/2010/main" xmlns:mc="http://schemas.openxmlformats.org/markup-compatibility/2006" val="SMDATA_15_l3DXYhMAAAAlAAAAZAAAAA8BAAAAkAAAAEgAAACQAAAASAAAAAAAAAAAAAAAAAAAAAEAAABQAAAAAAAAAAAA4D8AAAAAAADgPwAAAAAAAOA/AAAAAAAA4D8AAAAAAADgPwAAAAAAAOA/AAAAAAAA4D8AAAAAAADgPwAAAAAAAOA/AAAAAAAA4D8CAAAAjAAAAAAAAAAAAAAAADOZDCYmJggAAAAAAAAAAAAAAAAAAAAAAAAAAAAAAAAAAAAAZAAAAAEAAABAAAAAAAAAAAAAAAAAAAAAAAAAAAAAAAAAAAAAAAAAAAAAAAAAAAAAAAAAAAAAAAAAAAAAAAAAAAAAAAAAAAAAAAAAAAAAAAAAAAAAAAAAAAAAAAAAAAAAFAAAADwAAAAAAAAAAAAAAP///wkUAAAAAQAAABQAAAAUAAAAFAAAAAEAAAAAAAAAZAAAAGQAAAAAAAAAZAAAAGQAAAAVAAAAYAAAAAAAAAAAAAAADwAAACADAAAAAAAAAAAAAAEAAACgMgAAVgcAAKr4//8BAAAAf39/AAEAAABkAAAAAAAAABQAAABAHwAAAAAAACYAAAAAAAAAwOD//wAAAAAmAAAAZAAAABYAAABMAAAAAAAAAAAAAAAEAAAAAAAAAAEAAAAzZpkKAAAAACgAAAAoAAAAZAAAAGQAAAAAAAAAzMzMAAAAAABQAAAAUAAAAGQAAABkAAAAAAAAABcAAAAUAAAAAAAAAAAAAAD/fwAA/38AAAAAAAAJAAAABAAAAHsAfAAeAAAAaAAAAAAAAAAAAAAAAAAAAAAAAAAAAAAAECcAABAnAAAAAAAAAAAAAAAAAAAAAAAAAAAAAAAAAAAAAAAAAAAAABQAAAAAAAAAwMD/AAAAAABkAAAAMgAAAAAAAABkAAAAAAAAAH9/fwAKAAAAIgAAABgAAAAAAAAAAAAAAAAAAAAAAAAAAAAAAAAAAAAkAAAAJAAAAAAAAAAHAAAAAAAAAAAAAAAAAAAAAAAAAAAAAAAAAAAAf39/ACUAAABYAAAAAAAAAAAAAAAAAAAAAAAAAAAAAAAAAAAAAAAAAAAAAAAAAAAAAAAAAAAAAAA/AAAAAAAAAKCGAQAAAAAAAAAAAAAAAAAMAAAAAQAAAAAAAAAAAAAAAAAAAB8AAABUAAAAAAAABQAAAAEAAAAAAAAAAAAAAAAAAAAAAAAAAAAAAAAAAAAAAAAAAAAAAAJ/f38AAAAAA8zMzADAwP8Af39/AAAAAAAAAAAAAAAAAAAAAAAAAAAAIQAAABgAAAAUAAAAwAMAANgJAABARwAAsCUAABAAAAAmAAAACAAAAP//////////"/>
               </a:ext>
             </a:extLst>
           </p:cNvSpPr>
@@ -2923,7 +2936,7 @@
             <a:spLocks noGrp="1" noChangeArrowheads="1"/>
             <a:extLst>
               <a:ext uri="smNativeData">
-                <pr:smNativeData xmlns:mc="http://schemas.openxmlformats.org/markup-compatibility/2006" xmlns:p14="http://schemas.microsoft.com/office/powerpoint/2010/main" xmlns:p15="http://schemas.microsoft.com/office/powerpoint/2012/main" xmlns:pr="smNativeData" xmlns="smNativeData" val="SMDATA_15_l3DXYhMAAAAlAAAAZAAAAA8BAAAAkAAAAEgAAACQAAAASAAAAAAAAAABAAAAAAAAAAEAAABQAAAAAAAAAAAA4D8AAAAAAADgPwAAAAAAAOA/AAAAAAAA4D8AAAAAAADgPwAAAAAAAOA/AAAAAAAA4D8AAAAAAADgPwAAAAAAAOA/AAAAAAAA4D8CAAAAjAAAAAAAAAAAAAAAADOZDCYmJggAAAAAAAAAAAAAAAAAAAAAAAAAAAAAAAAAAAAAZAAAAAEAAABAAAAAAAAAAAAAAAAAAAAAAAAAAAAAAAAAAAAAAAAAAAAAAAAAAAAAAAAAAAAAAAAAAAAAAAAAAAAAAAAAAAAAAAAAAAAAAAAAAAAAAAAAAAAAAAAAAAAAFAAAADwAAAAAAAAAAAAAAP///wkUAAAAAQAAABQAAAAUAAAAFAAAAAEAAAAAAAAAZAAAAGQAAAAAAAAAZAAAAGQAAAAVAAAAYAAAAAAAAAAAAAAADwAAACADAAAAAAAAAAAAAAEAAACgMgAAVgcAAKr4//8BAAAAf39/AAEAAABkAAAAAAAAABQAAABAHwAAAAAAACYAAAAAAAAAwOD//wAAAAAmAAAAZAAAABYAAABMAAAAAAAAAAAAAAAEAAAAAAAAAAEAAAAzZpkKAAAAACgAAAAoAAAAZAAAAGQAAAAAAAAAzMzMAAAAAABQAAAAUAAAAGQAAABkAAAAAAAAABcAAAAUAAAAAAAAAAAAAAD/fwAA/38AAAAAAAAJAAAABAAAAHsAfAAeAAAAaAAAAAAAAAAAAAAAAAAAAAAAAAAAAAAAECcAABAnAAAAAAAAAAAAAAAAAAAAAAAAAAAAAAAAAAAAAAAAAAAAABQAAAAAAAAAwMD/AAAAAABkAAAAMgAAAAAAAABkAAAAAAAAAH9/fwAKAAAAIgAAABgAAAAAAAAAAAAAAAAAAAAAAAAAAAAAAAAAAAAkAAAAJAAAAAAAAAAHAAAAAAAAAAAAAAAAAAAAAAAAAAAAAAAAAAAAf39/ACUAAABYAAAAAAAAAAAAAAAAAAAAAAAAAAAAAAAAAAAAAAAAAAAAAAAAAAAAAAAAAAAAAAA/AAAAAAAAAKCGAQAAAAAAAAAAAAAAAAAMAAAAAQAAAAAAAAAAAAAAAAAAAB8AAABUAAAAAAAABQAAAAEAAAAAAAAAAAAAAAAAAAAAAAAAAAAAAAAAAAAAAAAAAAAAAAJ/f38AAAAAA8zMzADAwP8Af39/AAAAAAAAAAAAAAAAAAAAAAAAAAAAIQAAABgAAAAUAAAAwAMAABsnAAA/FQAAWSkAABAAAAAmAAAACAAAAP//////////"/>
+                <pr:smNativeData xmlns="smNativeData" xmlns:pr="smNativeData" xmlns:p15="http://schemas.microsoft.com/office/powerpoint/2012/main" xmlns:p14="http://schemas.microsoft.com/office/powerpoint/2010/main" xmlns:mc="http://schemas.openxmlformats.org/markup-compatibility/2006" val="SMDATA_15_l3DXYhMAAAAlAAAAZAAAAA8BAAAAkAAAAEgAAACQAAAASAAAAAAAAAABAAAAAAAAAAEAAABQAAAAAAAAAAAA4D8AAAAAAADgPwAAAAAAAOA/AAAAAAAA4D8AAAAAAADgPwAAAAAAAOA/AAAAAAAA4D8AAAAAAADgPwAAAAAAAOA/AAAAAAAA4D8CAAAAjAAAAAAAAAAAAAAAADOZDCYmJggAAAAAAAAAAAAAAAAAAAAAAAAAAAAAAAAAAAAAZAAAAAEAAABAAAAAAAAAAAAAAAAAAAAAAAAAAAAAAAAAAAAAAAAAAAAAAAAAAAAAAAAAAAAAAAAAAAAAAAAAAAAAAAAAAAAAAAAAAAAAAAAAAAAAAAAAAAAAAAAAAAAAFAAAADwAAAAAAAAAAAAAAP///wkUAAAAAQAAABQAAAAUAAAAFAAAAAEAAAAAAAAAZAAAAGQAAAAAAAAAZAAAAGQAAAAVAAAAYAAAAAAAAAAAAAAADwAAACADAAAAAAAAAAAAAAEAAACgMgAAVgcAAKr4//8BAAAAf39/AAEAAABkAAAAAAAAABQAAABAHwAAAAAAACYAAAAAAAAAwOD//wAAAAAmAAAAZAAAABYAAABMAAAAAAAAAAAAAAAEAAAAAAAAAAEAAAAzZpkKAAAAACgAAAAoAAAAZAAAAGQAAAAAAAAAzMzMAAAAAABQAAAAUAAAAGQAAABkAAAAAAAAABcAAAAUAAAAAAAAAAAAAAD/fwAA/38AAAAAAAAJAAAABAAAAHsAfAAeAAAAaAAAAAAAAAAAAAAAAAAAAAAAAAAAAAAAECcAABAnAAAAAAAAAAAAAAAAAAAAAAAAAAAAAAAAAAAAAAAAAAAAABQAAAAAAAAAwMD/AAAAAABkAAAAMgAAAAAAAABkAAAAAAAAAH9/fwAKAAAAIgAAABgAAAAAAAAAAAAAAAAAAAAAAAAAAAAAAAAAAAAkAAAAJAAAAAAAAAAHAAAAAAAAAAAAAAAAAAAAAAAAAAAAAAAAAAAAf39/ACUAAABYAAAAAAAAAAAAAAAAAAAAAAAAAAAAAAAAAAAAAAAAAAAAAAAAAAAAAAAAAAAAAAA/AAAAAAAAAKCGAQAAAAAAAAAAAAAAAAAMAAAAAQAAAAAAAAAAAAAAAAAAAB8AAABUAAAAAAAABQAAAAEAAAAAAAAAAAAAAAAAAAAAAAAAAAAAAAAAAAAAAAAAAAAAAAJ/f38AAAAAA8zMzADAwP8Af39/AAAAAAAAAAAAAAAAAAAAAAAAAAAAIQAAABgAAAAUAAAAwAMAABsnAAA/FQAAWSkAABAAAAAmAAAACAAAAP//////////"/>
               </a:ext>
             </a:extLst>
           </p:cNvSpPr>
@@ -2958,7 +2971,7 @@
           </a:lstStyle>
           <a:p>
             <a:fld id="{2B849BF1-BFC6-D16D-883C-4938D5727E1C}" type="datetime1">
-              <a:t>21/07/2022</a:t>
+              <a:t>26/07/2022</a:t>
             </a:fld>
             <a:endParaRPr/>
           </a:p>
@@ -2971,7 +2984,7 @@
             <a:spLocks noGrp="1" noChangeArrowheads="1"/>
             <a:extLst>
               <a:ext uri="smNativeData">
-                <pr:smNativeData xmlns:mc="http://schemas.openxmlformats.org/markup-compatibility/2006" xmlns:p14="http://schemas.microsoft.com/office/powerpoint/2010/main" xmlns:p15="http://schemas.microsoft.com/office/powerpoint/2012/main" xmlns:pr="smNativeData" xmlns="smNativeData" val="SMDATA_15_l3DXYhMAAAAlAAAAZAAAAA8BAAAAkAAAAEgAAACQAAAASAAAAAAAAAABAAAAAAAAAAEAAABQAAAAAAAAAAAA4D8AAAAAAADgPwAAAAAAAOA/AAAAAAAA4D8AAAAAAADgPwAAAAAAAOA/AAAAAAAA4D8AAAAAAADgPwAAAAAAAOA/AAAAAAAA4D8CAAAAjAAAAAAAAAAAAAAAADOZDCYmJggAAAAAAAAAAAAAAAAAAAAAAAAAAAAAAAAAAAAAZAAAAAEAAABAAAAAAAAAAAAAAAAAAAAAAAAAAAAAAAAAAAAAAAAAAAAAAAAAAAAAAAAAAAAAAAAAAAAAAAAAAAAAAAAAAAAAAAAAAAAAAAAAAAAAAAAAAAAAAAAAAAAAFAAAADwAAAAAAAAAAAAAAP///wkUAAAAAQAAABQAAAAUAAAAFAAAAAEAAAAAAAAAZAAAAGQAAAAAAAAAZAAAAGQAAAAVAAAAYAAAAAAAAAAAAAAADwAAACADAAAAAAAAAAAAAAEAAACgMgAAVgcAAKr4//8BAAAAf39/AAEAAABkAAAAAAAAABQAAABAHwAAAAAAACYAAAAAAAAAwOD//wAAAAAmAAAAZAAAABYAAABMAAAAAAAAAAAAAAAEAAAAAAAAAAEAAAAzZpkKAAAAACgAAAAoAAAAZAAAAGQAAAAAAAAAzMzMAAAAAABQAAAAUAAAAGQAAABkAAAAAAAAABcAAAAUAAAAAAAAAAAAAAD/fwAA/38AAAAAAAAJAAAABAAAAAAAAAAeAAAAaAAAAAAAAAAAAAAAAAAAAAAAAAAAAAAAECcAABAnAAAAAAAAAAAAAAAAAAAAAAAAAAAAAAAAAAAAAAAAAAAAABQAAAAAAAAAwMD/AAAAAABkAAAAMgAAAAAAAABkAAAAAAAAAH9/fwAKAAAAIgAAABgAAAAAAAAAAAAAAAAAAAAAAAAAAAAAAAAAAAAkAAAAJAAAAAAAAAAHAAAAAAAAAAAAAAAAAAAAAAAAAAAAAAAAAAAAf39/ACUAAABYAAAAAAAAAAAAAAAAAAAAAAAAAAAAAAAAAAAAAAAAAAAAAAAAAAAAAAAAAAAAAAA/AAAAAAAAAKCGAQAAAAAAAAAAAAAAAAAMAAAAAQAAAAAAAAAAAAAAAAAAAB8AAABUAAAAAAAABQAAAAEAAAAAAAAAAAAAAAAAAAAAAAAAAAAAAAAAAAAAAAAAAAAAAAJ/f38AAAAAA8zMzADAwP8Af39/AAAAAAAAAAAAAAAAAAAAAAAAAAAAIQAAABgAAAAUAAAAoRkAABsnAABfMQAAWSkAABAAAAAmAAAACAAAAP//////////"/>
+                <pr:smNativeData xmlns="smNativeData" xmlns:pr="smNativeData" xmlns:p15="http://schemas.microsoft.com/office/powerpoint/2012/main" xmlns:p14="http://schemas.microsoft.com/office/powerpoint/2010/main" xmlns:mc="http://schemas.openxmlformats.org/markup-compatibility/2006" val="SMDATA_15_l3DXYhMAAAAlAAAAZAAAAA8BAAAAkAAAAEgAAACQAAAASAAAAAAAAAABAAAAAAAAAAEAAABQAAAAAAAAAAAA4D8AAAAAAADgPwAAAAAAAOA/AAAAAAAA4D8AAAAAAADgPwAAAAAAAOA/AAAAAAAA4D8AAAAAAADgPwAAAAAAAOA/AAAAAAAA4D8CAAAAjAAAAAAAAAAAAAAAADOZDCYmJggAAAAAAAAAAAAAAAAAAAAAAAAAAAAAAAAAAAAAZAAAAAEAAABAAAAAAAAAAAAAAAAAAAAAAAAAAAAAAAAAAAAAAAAAAAAAAAAAAAAAAAAAAAAAAAAAAAAAAAAAAAAAAAAAAAAAAAAAAAAAAAAAAAAAAAAAAAAAAAAAAAAAFAAAADwAAAAAAAAAAAAAAP///wkUAAAAAQAAABQAAAAUAAAAFAAAAAEAAAAAAAAAZAAAAGQAAAAAAAAAZAAAAGQAAAAVAAAAYAAAAAAAAAAAAAAADwAAACADAAAAAAAAAAAAAAEAAACgMgAAVgcAAKr4//8BAAAAf39/AAEAAABkAAAAAAAAABQAAABAHwAAAAAAACYAAAAAAAAAwOD//wAAAAAmAAAAZAAAABYAAABMAAAAAAAAAAAAAAAEAAAAAAAAAAEAAAAzZpkKAAAAACgAAAAoAAAAZAAAAGQAAAAAAAAAzMzMAAAAAABQAAAAUAAAAGQAAABkAAAAAAAAABcAAAAUAAAAAAAAAAAAAAD/fwAA/38AAAAAAAAJAAAABAAAAAAAAAAeAAAAaAAAAAAAAAAAAAAAAAAAAAAAAAAAAAAAECcAABAnAAAAAAAAAAAAAAAAAAAAAAAAAAAAAAAAAAAAAAAAAAAAABQAAAAAAAAAwMD/AAAAAABkAAAAMgAAAAAAAABkAAAAAAAAAH9/fwAKAAAAIgAAABgAAAAAAAAAAAAAAAAAAAAAAAAAAAAAAAAAAAAkAAAAJAAAAAAAAAAHAAAAAAAAAAAAAAAAAAAAAAAAAAAAAAAAAAAAf39/ACUAAABYAAAAAAAAAAAAAAAAAAAAAAAAAAAAAAAAAAAAAAAAAAAAAAAAAAAAAAAAAAAAAAA/AAAAAAAAAKCGAQAAAAAAAAAAAAAAAAAMAAAAAQAAAAAAAAAAAAAAAAAAAB8AAABUAAAAAAAABQAAAAEAAAAAAAAAAAAAAAAAAAAAAAAAAAAAAAAAAAAAAAAAAAAAAAJ/f38AAAAAA8zMzADAwP8Af39/AAAAAAAAAAAAAAAAAAAAAAAAAAAAIQAAABgAAAAUAAAAoRkAABsnAABfMQAAWSkAABAAAAAmAAAACAAAAP//////////"/>
               </a:ext>
             </a:extLst>
           </p:cNvSpPr>
@@ -3016,7 +3029,7 @@
             <a:spLocks noGrp="1" noChangeArrowheads="1"/>
             <a:extLst>
               <a:ext uri="smNativeData">
-                <pr:smNativeData xmlns:mc="http://schemas.openxmlformats.org/markup-compatibility/2006" xmlns:p14="http://schemas.microsoft.com/office/powerpoint/2010/main" xmlns:p15="http://schemas.microsoft.com/office/powerpoint/2012/main" xmlns:pr="smNativeData" xmlns="smNativeData" val="SMDATA_15_l3DXYhMAAAAlAAAAZAAAAA8BAAAAkAAAAEgAAACQAAAASAAAAAAAAAABAAAAAAAAAAEAAABQAAAAAAAAAAAA4D8AAAAAAADgPwAAAAAAAOA/AAAAAAAA4D8AAAAAAADgPwAAAAAAAOA/AAAAAAAA4D8AAAAAAADgPwAAAAAAAOA/AAAAAAAA4D8CAAAAjAAAAAAAAAAAAAAAADOZDCYmJggAAAAAAAAAAAAAAAAAAAAAAAAAAAAAAAAAAAAAZAAAAAEAAABAAAAAAAAAAAAAAAAAAAAAAAAAAAAAAAAAAAAAAAAAAAAAAAAAAAAAAAAAAAAAAAAAAAAAAAAAAAAAAAAAAAAAAAAAAAAAAAAAAAAAAAAAAAAAAAAAAAAAFAAAADwAAAAAAAAAAAAAAP///wkUAAAAAQAAABQAAAAUAAAAFAAAAAEAAAAAAAAAZAAAAGQAAAAAAAAAZAAAAGQAAAAVAAAAYAAAAAAAAAAAAAAADwAAACADAAAAAAAAAAAAAAEAAACgMgAAVgcAAKr4//8BAAAAf39/AAEAAABkAAAAAAAAABQAAABAHwAAAAAAACYAAAAAAAAAwOD//wAAAAAmAAAAZAAAABYAAABMAAAAAAAAAAAAAAAEAAAAAAAAAAEAAAAzZpkKAAAAACgAAAAoAAAAZAAAAGQAAAAAAAAAzMzMAAAAAABQAAAAUAAAAGQAAABkAAAAAAAAABcAAAAUAAAAAAAAAAAAAAD/fwAA/38AAAAAAAAJAAAABAAAAP////8eAAAAaAAAAAAAAAAAAAAAAAAAAAAAAAAAAAAAECcAABAnAAAAAAAAAAAAAAAAAAAAAAAAAAAAAAAAAAAAAAAAAAAAABQAAAAAAAAAwMD/AAAAAABkAAAAMgAAAAAAAABkAAAAAAAAAH9/fwAKAAAAIgAAABgAAAAAAAAAAAAAAAAAAAAAAAAAAAAAAAAAAAAkAAAAJAAAAAAAAAAHAAAAAAAAAAAAAAAAAAAAAAAAAAAAAAAAAAAAf39/ACUAAABYAAAAAAAAAAAAAAAAAAAAAAAAAAAAAAAAAAAAAAAAAAAAAAAAAAAAAAAAAAAAAAA/AAAAAAAAAKCGAQAAAAAAAAAAAAAAAAAMAAAAAQAAAAAAAAAAAAAAAAAAAB8AAABUAAAAAAAABQAAAAEAAAAAAAAAAAAAAAAAAAAAAAAAAAAAAAAAAAAAAAAAAAAAAAJ/f38AAAAAA8zMzADAwP8Af39/AAAAAAAAAAAAAAAAAAAAAAAAAAAAIQAAABgAAAAUAAAAwTUAABsnAABARwAAWSkAABAAAAAmAAAACAAAAP//////////"/>
+                <pr:smNativeData xmlns="smNativeData" xmlns:pr="smNativeData" xmlns:p15="http://schemas.microsoft.com/office/powerpoint/2012/main" xmlns:p14="http://schemas.microsoft.com/office/powerpoint/2010/main" xmlns:mc="http://schemas.openxmlformats.org/markup-compatibility/2006" val="SMDATA_15_l3DXYhMAAAAlAAAAZAAAAA8BAAAAkAAAAEgAAACQAAAASAAAAAAAAAABAAAAAAAAAAEAAABQAAAAAAAAAAAA4D8AAAAAAADgPwAAAAAAAOA/AAAAAAAA4D8AAAAAAADgPwAAAAAAAOA/AAAAAAAA4D8AAAAAAADgPwAAAAAAAOA/AAAAAAAA4D8CAAAAjAAAAAAAAAAAAAAAADOZDCYmJggAAAAAAAAAAAAAAAAAAAAAAAAAAAAAAAAAAAAAZAAAAAEAAABAAAAAAAAAAAAAAAAAAAAAAAAAAAAAAAAAAAAAAAAAAAAAAAAAAAAAAAAAAAAAAAAAAAAAAAAAAAAAAAAAAAAAAAAAAAAAAAAAAAAAAAAAAAAAAAAAAAAAFAAAADwAAAAAAAAAAAAAAP///wkUAAAAAQAAABQAAAAUAAAAFAAAAAEAAAAAAAAAZAAAAGQAAAAAAAAAZAAAAGQAAAAVAAAAYAAAAAAAAAAAAAAADwAAACADAAAAAAAAAAAAAAEAAACgMgAAVgcAAKr4//8BAAAAf39/AAEAAABkAAAAAAAAABQAAABAHwAAAAAAACYAAAAAAAAAwOD//wAAAAAmAAAAZAAAABYAAABMAAAAAAAAAAAAAAAEAAAAAAAAAAEAAAAzZpkKAAAAACgAAAAoAAAAZAAAAGQAAAAAAAAAzMzMAAAAAABQAAAAUAAAAGQAAABkAAAAAAAAABcAAAAUAAAAAAAAAAAAAAD/fwAA/38AAAAAAAAJAAAABAAAAP////8eAAAAaAAAAAAAAAAAAAAAAAAAAAAAAAAAAAAAECcAABAnAAAAAAAAAAAAAAAAAAAAAAAAAAAAAAAAAAAAAAAAAAAAABQAAAAAAAAAwMD/AAAAAABkAAAAMgAAAAAAAABkAAAAAAAAAH9/fwAKAAAAIgAAABgAAAAAAAAAAAAAAAAAAAAAAAAAAAAAAAAAAAAkAAAAJAAAAAAAAAAHAAAAAAAAAAAAAAAAAAAAAAAAAAAAAAAAAAAAf39/ACUAAABYAAAAAAAAAAAAAAAAAAAAAAAAAAAAAAAAAAAAAAAAAAAAAAAAAAAAAAAAAAAAAAA/AAAAAAAAAKCGAQAAAAAAAAAAAAAAAAAMAAAAAQAAAAAAAAAAAAAAAAAAAB8AAABUAAAAAAAABQAAAAEAAAAAAAAAAAAAAAAAAAAAAAAAAAAAAAAAAAAAAAAAAAAAAAJ/f38AAAAAA8zMzADAwP8Af39/AAAAAAAAAAAAAAAAAAAAAAAAAAAAIQAAABgAAAAUAAAAwTUAABsnAABARwAAWSkAABAAAAAmAAAACAAAAP//////////"/>
               </a:ext>
             </a:extLst>
           </p:cNvSpPr>
@@ -3730,7 +3743,7 @@
             <a:spLocks noGrp="1" noChangeArrowheads="1"/>
             <a:extLst>
               <a:ext uri="smNativeData">
-                <pr:smNativeData xmlns:mc="http://schemas.openxmlformats.org/markup-compatibility/2006" xmlns:p14="http://schemas.microsoft.com/office/powerpoint/2010/main" xmlns:p15="http://schemas.microsoft.com/office/powerpoint/2012/main" xmlns:pr="smNativeData" xmlns="smNativeData" val="SMDATA_15_l3DXYhMAAAAlAAAAZAAAAA8BAAAAkAAAAEgAAACQAAAASAAAAAAAAAABAAAAAAAAAAEAAABQAAAAAAAAAAAA4D8AAAAAAADgPwAAAAAAAOA/AAAAAAAA4D8AAAAAAADgPwAAAAAAAOA/AAAAAAAA4D8AAAAAAADgPwAAAAAAAOA/AAAAAAAA4D8CAAAAjAAAAAAAAAAAAAAAADOZDCYmJggAAAAAAAAAAAAAAAAAAAAAAAAAAAAAAAAAAAAAZAAAAAEAAABAAAAAAAAAAAAAAAAAAAAAAAAAAAAAAAAAAAAAAAAAAAAAAAAAAAAAAAAAAAAAAAAAAAAAAAAAAAAAAAAAAAAAAAAAAAAAAAAAAAAAAAAAAAAAAAAAAAAAFAAAADwAAAAAAAAAAAAAAP///wkUAAAAAQAAABQAAAAUAAAAFAAAAAEAAAAAAAAAZAAAAGQAAAAAAAAAZAAAAGQAAAAVAAAAYAAAAAAAAAAAAAAADwAAACADAAAAAAAAAAAAAAEAAACgMgAAVgcAAKr4//8BAAAAf39/AAEAAABkAAAAAAAAABQAAABAHwAAAAAAACYAAAAAAAAAwOD//wAAAAAmAAAAZAAAABYAAABMAAAAAAAAAAAAAAAEAAAAAAAAAAEAAAAzZpkKAAAAACgAAAAoAAAAZAAAAGQAAAAAAAAAzMzMAAAAAABQAAAAUAAAAGQAAABkAAAAAAAAABcAAAAUAAAAAAAAAAAAAAD/fwAA/38AAAAAAAAJAAAABAAAAAAAAAAeAAAAaAAAAAAAAAAAAAAAAAAAAAAAAAAAAAAAECcAABAnAAAAAAAAAAAAAAAAAAAAAAAAAAAAAAAAAAAAAAAAAAAAABQAAAAAAAAAwMD/AAAAAABkAAAAMgAAAAAAAABkAAAAAAAAAH9/fwAKAAAAIgAAABgAAAAAAAAAAAAAAAAAAAAAAAAAAAAAAAAAAAAkAAAAJAAAAAAAAAAHAAAAAAAAAAAAAAAAAAAAAAAAAAAAAAAAAAAAf39/ACUAAABYAAAAAAAAAAAAAAAAAAAAAAAAAAAAAAAAAAAAAAAAAAAAAAAAAAAAAAAAAAAAAAA/AAAAAAAAAKCGAQAAAAAAAAAAAAAAAAAMAAAAAQAAAAAAAAAAAAAAAAAAAB8AAABUAAAAAAAABQAAAAEAAAAAAAAAAAAAAAAAAAAAAAAAAAAAAAAAAAAAAAAAAAAAAAJ/f38AAAAAA8zMzADAwP8Af39/AAAAAAAAAAAAAAAAAAAAAAAAAAAAIQAAABgAAAAUAAAAoAUAABoNAABgRQAAJhYAABAAAAAmAAAACAAAAAAAAAAAAAAA"/>
+                <pr:smNativeData xmlns="smNativeData" xmlns:pr="smNativeData" xmlns:p15="http://schemas.microsoft.com/office/powerpoint/2012/main" xmlns:p14="http://schemas.microsoft.com/office/powerpoint/2010/main" xmlns:mc="http://schemas.openxmlformats.org/markup-compatibility/2006" val="SMDATA_15_l3DXYhMAAAAlAAAAZAAAAA8BAAAAkAAAAEgAAACQAAAASAAAAAAAAAABAAAAAAAAAAEAAABQAAAAAAAAAAAA4D8AAAAAAADgPwAAAAAAAOA/AAAAAAAA4D8AAAAAAADgPwAAAAAAAOA/AAAAAAAA4D8AAAAAAADgPwAAAAAAAOA/AAAAAAAA4D8CAAAAjAAAAAAAAAAAAAAAADOZDCYmJggAAAAAAAAAAAAAAAAAAAAAAAAAAAAAAAAAAAAAZAAAAAEAAABAAAAAAAAAAAAAAAAAAAAAAAAAAAAAAAAAAAAAAAAAAAAAAAAAAAAAAAAAAAAAAAAAAAAAAAAAAAAAAAAAAAAAAAAAAAAAAAAAAAAAAAAAAAAAAAAAAAAAFAAAADwAAAAAAAAAAAAAAP///wkUAAAAAQAAABQAAAAUAAAAFAAAAAEAAAAAAAAAZAAAAGQAAAAAAAAAZAAAAGQAAAAVAAAAYAAAAAAAAAAAAAAADwAAACADAAAAAAAAAAAAAAEAAACgMgAAVgcAAKr4//8BAAAAf39/AAEAAABkAAAAAAAAABQAAABAHwAAAAAAACYAAAAAAAAAwOD//wAAAAAmAAAAZAAAABYAAABMAAAAAAAAAAAAAAAEAAAAAAAAAAEAAAAzZpkKAAAAACgAAAAoAAAAZAAAAGQAAAAAAAAAzMzMAAAAAABQAAAAUAAAAGQAAABkAAAAAAAAABcAAAAUAAAAAAAAAAAAAAD/fwAA/38AAAAAAAAJAAAABAAAAAAAAAAeAAAAaAAAAAAAAAAAAAAAAAAAAAAAAAAAAAAAECcAABAnAAAAAAAAAAAAAAAAAAAAAAAAAAAAAAAAAAAAAAAAAAAAABQAAAAAAAAAwMD/AAAAAABkAAAAMgAAAAAAAABkAAAAAAAAAH9/fwAKAAAAIgAAABgAAAAAAAAAAAAAAAAAAAAAAAAAAAAAAAAAAAAkAAAAJAAAAAAAAAAHAAAAAAAAAAAAAAAAAAAAAAAAAAAAAAAAAAAAf39/ACUAAABYAAAAAAAAAAAAAAAAAAAAAAAAAAAAAAAAAAAAAAAAAAAAAAAAAAAAAAAAAAAAAAA/AAAAAAAAAKCGAQAAAAAAAAAAAAAAAAAMAAAAAQAAAAAAAAAAAAAAAAAAAB8AAABUAAAAAAAABQAAAAEAAAAAAAAAAAAAAAAAAAAAAAAAAAAAAAAAAAAAAAAAAAAAAAJ/f38AAAAAA8zMzADAwP8Af39/AAAAAAAAAAAAAAAAAAAAAAAAAAAAIQAAABgAAAAUAAAAoAUAABoNAABgRQAAJhYAABAAAAAmAAAACAAAAAAAAAAAAAAA"/>
               </a:ext>
             </a:extLst>
           </p:cNvSpPr>
@@ -3756,7 +3769,7 @@
             <a:spLocks noGrp="1" noChangeArrowheads="1"/>
             <a:extLst>
               <a:ext uri="smNativeData">
-                <pr:smNativeData xmlns:mc="http://schemas.openxmlformats.org/markup-compatibility/2006" xmlns:p14="http://schemas.microsoft.com/office/powerpoint/2010/main" xmlns:p15="http://schemas.microsoft.com/office/powerpoint/2012/main" xmlns:pr="smNativeData" xmlns="smNativeData" val="SMDATA_15_l3DXYhMAAAAlAAAAZAAAAA8BAAAAkAAAAEgAAACQAAAASAAAAAAAAAAAAAAAAAAAAAEAAABQAAAAAAAAAAAA4D8AAAAAAADgPwAAAAAAAOA/AAAAAAAA4D8AAAAAAADgPwAAAAAAAOA/AAAAAAAA4D8AAAAAAADgPwAAAAAAAOA/AAAAAAAA4D8CAAAAjAAAAAAAAAAAAAAAADOZDCYmJggAAAAAAAAAAAAAAAAAAAAAAAAAAAAAAAAAAAAAZAAAAAEAAABAAAAAAAAAAAAAAAAAAAAAAAAAAAAAAAAAAAAAAAAAAAAAAAAAAAAAAAAAAAAAAAAAAAAAAAAAAAAAAAAAAAAAAAAAAAAAAAAAAAAAAAAAAAAAAAAAAAAAFAAAADwAAAAAAAAAAAAAAP///wkUAAAAAQAAABQAAAAUAAAAFAAAAAEAAAAAAAAAZAAAAGQAAAAAAAAAZAAAAGQAAAAVAAAAYAAAAAAAAAAAAAAADwAAACADAAAAAAAAAAAAAAEAAACgMgAAVgcAAKr4//8BAAAAf39/AAEAAABkAAAAAAAAABQAAABAHwAAAAAAACYAAAAAAAAAwOD//wAAAAAmAAAAZAAAABYAAABMAAAAAAAAAAAAAAAEAAAAAAAAAAEAAAAzZpkKAAAAACgAAAAoAAAAZAAAAGQAAAAAAAAAzMzMAAAAAABQAAAAUAAAAGQAAABkAAAAAAAAABcAAAAUAAAAAAAAAAAAAAD/fwAA/38AAAAAAAAJAAAABAAAAAAAAAAeAAAAaAAAAAAAAAAAAAAAAAAAAAAAAAAAAAAAECcAABAnAAAAAAAAAAAAAAAAAAAAAAAAAAAAAAAAAAAAAAAAAAAAABQAAAAAAAAAwMD/AAAAAABkAAAAMgAAAAAAAABkAAAAAAAAAH9/fwAKAAAAIgAAABgAAAAAAAAAAAAAAAAAAAAAAAAAAAAAAAAAAAAkAAAAJAAAAAAAAAAHAAAAAAAAAAAAAAAAAAAAAAAAAAAAAAAAAAAAf39/ACUAAABYAAAAAAAAAAAAAAAAAAAAAAAAAAAAAAAAAAAAAAAAAAAAAAAAAAAAAAAAAAAAAAA/AAAAAAAAAKCGAQAAAAAAAAAAAAAAAAAMAAAAAQAAAAAAAAAAAAAAAAAAAB8AAABUAAAAAAAABQAAAAEAAAAAAAAAAAAAAAAAAAAAAAAAAAAAAAAAAAAAAAAAAAAAAAJ/f38AAAAAA8zMzADAwP8Af39/AAAAAAAAAAAAAAAAAAAAAAAAAAAAIQAAABgAAAAUAAAAQAsAAOgXAADAPwAAsCIAABAAAAAmAAAACAAAAAAAAAAAAAAA"/>
+                <pr:smNativeData xmlns="smNativeData" xmlns:pr="smNativeData" xmlns:p15="http://schemas.microsoft.com/office/powerpoint/2012/main" xmlns:p14="http://schemas.microsoft.com/office/powerpoint/2010/main" xmlns:mc="http://schemas.openxmlformats.org/markup-compatibility/2006" val="SMDATA_15_l3DXYhMAAAAlAAAAZAAAAA8BAAAAkAAAAEgAAACQAAAASAAAAAAAAAAAAAAAAAAAAAEAAABQAAAAAAAAAAAA4D8AAAAAAADgPwAAAAAAAOA/AAAAAAAA4D8AAAAAAADgPwAAAAAAAOA/AAAAAAAA4D8AAAAAAADgPwAAAAAAAOA/AAAAAAAA4D8CAAAAjAAAAAAAAAAAAAAAADOZDCYmJggAAAAAAAAAAAAAAAAAAAAAAAAAAAAAAAAAAAAAZAAAAAEAAABAAAAAAAAAAAAAAAAAAAAAAAAAAAAAAAAAAAAAAAAAAAAAAAAAAAAAAAAAAAAAAAAAAAAAAAAAAAAAAAAAAAAAAAAAAAAAAAAAAAAAAAAAAAAAAAAAAAAAFAAAADwAAAAAAAAAAAAAAP///wkUAAAAAQAAABQAAAAUAAAAFAAAAAEAAAAAAAAAZAAAAGQAAAAAAAAAZAAAAGQAAAAVAAAAYAAAAAAAAAAAAAAADwAAACADAAAAAAAAAAAAAAEAAACgMgAAVgcAAKr4//8BAAAAf39/AAEAAABkAAAAAAAAABQAAABAHwAAAAAAACYAAAAAAAAAwOD//wAAAAAmAAAAZAAAABYAAABMAAAAAAAAAAAAAAAEAAAAAAAAAAEAAAAzZpkKAAAAACgAAAAoAAAAZAAAAGQAAAAAAAAAzMzMAAAAAABQAAAAUAAAAGQAAABkAAAAAAAAABcAAAAUAAAAAAAAAAAAAAD/fwAA/38AAAAAAAAJAAAABAAAAAAAAAAeAAAAaAAAAAAAAAAAAAAAAAAAAAAAAAAAAAAAECcAABAnAAAAAAAAAAAAAAAAAAAAAAAAAAAAAAAAAAAAAAAAAAAAABQAAAAAAAAAwMD/AAAAAABkAAAAMgAAAAAAAABkAAAAAAAAAH9/fwAKAAAAIgAAABgAAAAAAAAAAAAAAAAAAAAAAAAAAAAAAAAAAAAkAAAAJAAAAAAAAAAHAAAAAAAAAAAAAAAAAAAAAAAAAAAAAAAAAAAAf39/ACUAAABYAAAAAAAAAAAAAAAAAAAAAAAAAAAAAAAAAAAAAAAAAAAAAAAAAAAAAAAAAAAAAAA/AAAAAAAAAKCGAQAAAAAAAAAAAAAAAAAMAAAAAQAAAAAAAAAAAAAAAAAAAB8AAABUAAAAAAAABQAAAAEAAAAAAAAAAAAAAAAAAAAAAAAAAAAAAAAAAAAAAAAAAAAAAAJ/f38AAAAAA8zMzADAwP8Af39/AAAAAAAAAAAAAAAAAAAAAAAAAAAAIQAAABgAAAAUAAAAQAsAAOgXAADAPwAAsCIAABAAAAAmAAAACAAAAAAAAAAAAAAA"/>
               </a:ext>
             </a:extLst>
           </p:cNvSpPr>
@@ -3807,7 +3820,7 @@
             <a:spLocks noGrp="1" noChangeArrowheads="1"/>
             <a:extLst>
               <a:ext uri="smNativeData">
-                <pr:smNativeData xmlns:mc="http://schemas.openxmlformats.org/markup-compatibility/2006" xmlns:p14="http://schemas.microsoft.com/office/powerpoint/2010/main" xmlns:p15="http://schemas.microsoft.com/office/powerpoint/2012/main" xmlns:pr="smNativeData" xmlns="smNativeData" val="SMDATA_15_l3DXYhMAAAAlAAAAZAAAAA8BAAAAkAAAAEgAAACQAAAASAAAAAAAAAABAAAAAAAAAAEAAABQAAAAAAAAAAAA4D8AAAAAAADgPwAAAAAAAOA/AAAAAAAA4D8AAAAAAADgPwAAAAAAAOA/AAAAAAAA4D8AAAAAAADgPwAAAAAAAOA/AAAAAAAA4D8CAAAAjAAAAAAAAAAAAAAAADOZDCYmJggAAAAAAAAAAAAAAAAAAAAAAAAAAAAAAAAAAAAAZAAAAAEAAABAAAAAAAAAAAAAAAAAAAAAAAAAAAAAAAAAAAAAAAAAAAAAAAAAAAAAAAAAAAAAAAAAAAAAAAAAAAAAAAAAAAAAAAAAAAAAAAAAAAAAAAAAAAAAAAAAAAAAFAAAADwAAAAAAAAAAAAAAP///wkUAAAAAQAAABQAAAAUAAAAFAAAAAEAAAAAAAAAZAAAAGQAAAAAAAAAZAAAAGQAAAAVAAAAYAAAAAAAAAAAAAAADwAAACADAAAAAAAAAAAAAAEAAACgMgAAVgcAAKr4//8BAAAAf39/AAEAAABkAAAAAAAAABQAAABAHwAAAAAAACYAAAAAAAAAwOD//wAAAAAmAAAAZAAAABYAAABMAAAAAAAAAAAAAAAEAAAAAAAAAAEAAAAzZpkKAAAAACgAAAAoAAAAZAAAAGQAAAAAAAAAzMzMAAAAAABQAAAAUAAAAGQAAABkAAAAAAAAABcAAAAUAAAAAAAAAAAAAAD/fwAA/38AAAAAAAAJAAAABAAAAF8AYAAeAAAAaAAAAAAAAAAAAAAAAAAAAAAAAAAAAAAAECcAABAnAAAAAAAAAAAAAAAAAAAAAAAAAAAAAAAAAAAAAAAAAAAAABQAAAAAAAAAwMD/AAAAAABkAAAAMgAAAAAAAABkAAAAAAAAAH9/fwAKAAAAIgAAABgAAAAAAAAAAAAAAAAAAAAAAAAAAAAAAAAAAAAkAAAAJAAAAAAAAAAHAAAAAAAAAAAAAAAAAAAAAAAAAAAAAAAAAAAAf39/ACUAAABYAAAAAAAAAAAAAAAAAAAAAAAAAAAAAAAAAAAAAAAAAAAAAAAAAAAAAAAAAAAAAAA/AAAAAAAAAKCGAQAAAAAAAAAAAAAAAAAMAAAAAQAAAAAAAAAAAAAAAAAAAB8AAABUAAAAAAAABQAAAAEAAAAAAAAAAAAAAAAAAAAAAAAAAAAAAAAAAAAAAAAAAAAAAAJ/f38AAAAAA8zMzADAwP8Af39/AAAAAAAAAAAAAAAAAAAAAAAAAAAAIQAAABgAAAAUAAAAwAMAALABAABARwAAuAgAAAAAAAAmAAAACAAAAAEAAAAAAAAA"/>
+                <pr:smNativeData xmlns="smNativeData" xmlns:pr="smNativeData" xmlns:p15="http://schemas.microsoft.com/office/powerpoint/2012/main" xmlns:p14="http://schemas.microsoft.com/office/powerpoint/2010/main" xmlns:mc="http://schemas.openxmlformats.org/markup-compatibility/2006" val="SMDATA_15_l3DXYhMAAAAlAAAAZAAAAA8BAAAAkAAAAEgAAACQAAAASAAAAAAAAAABAAAAAAAAAAEAAABQAAAAAAAAAAAA4D8AAAAAAADgPwAAAAAAAOA/AAAAAAAA4D8AAAAAAADgPwAAAAAAAOA/AAAAAAAA4D8AAAAAAADgPwAAAAAAAOA/AAAAAAAA4D8CAAAAjAAAAAAAAAAAAAAAADOZDCYmJggAAAAAAAAAAAAAAAAAAAAAAAAAAAAAAAAAAAAAZAAAAAEAAABAAAAAAAAAAAAAAAAAAAAAAAAAAAAAAAAAAAAAAAAAAAAAAAAAAAAAAAAAAAAAAAAAAAAAAAAAAAAAAAAAAAAAAAAAAAAAAAAAAAAAAAAAAAAAAAAAAAAAFAAAADwAAAAAAAAAAAAAAP///wkUAAAAAQAAABQAAAAUAAAAFAAAAAEAAAAAAAAAZAAAAGQAAAAAAAAAZAAAAGQAAAAVAAAAYAAAAAAAAAAAAAAADwAAACADAAAAAAAAAAAAAAEAAACgMgAAVgcAAKr4//8BAAAAf39/AAEAAABkAAAAAAAAABQAAABAHwAAAAAAACYAAAAAAAAAwOD//wAAAAAmAAAAZAAAABYAAABMAAAAAAAAAAAAAAAEAAAAAAAAAAEAAAAzZpkKAAAAACgAAAAoAAAAZAAAAGQAAAAAAAAAzMzMAAAAAABQAAAAUAAAAGQAAABkAAAAAAAAABcAAAAUAAAAAAAAAAAAAAD/fwAA/38AAAAAAAAJAAAABAAAAF8AYAAeAAAAaAAAAAAAAAAAAAAAAAAAAAAAAAAAAAAAECcAABAnAAAAAAAAAAAAAAAAAAAAAAAAAAAAAAAAAAAAAAAAAAAAABQAAAAAAAAAwMD/AAAAAABkAAAAMgAAAAAAAABkAAAAAAAAAH9/fwAKAAAAIgAAABgAAAAAAAAAAAAAAAAAAAAAAAAAAAAAAAAAAAAkAAAAJAAAAAAAAAAHAAAAAAAAAAAAAAAAAAAAAAAAAAAAAAAAAAAAf39/ACUAAABYAAAAAAAAAAAAAAAAAAAAAAAAAAAAAAAAAAAAAAAAAAAAAAAAAAAAAAAAAAAAAAA/AAAAAAAAAKCGAQAAAAAAAAAAAAAAAAAMAAAAAQAAAAAAAAAAAAAAAAAAAB8AAABUAAAAAAAABQAAAAEAAAAAAAAAAAAAAAAAAAAAAAAAAAAAAAAAAAAAAAAAAAAAAAJ/f38AAAAAA8zMzADAwP8Af39/AAAAAAAAAAAAAAAAAAAAAAAAAAAAIQAAABgAAAAUAAAAwAMAALABAABARwAAuAgAAAAAAAAmAAAACAAAAAEAAAAAAAAA"/>
               </a:ext>
             </a:extLst>
           </p:cNvSpPr>
@@ -3838,7 +3851,7 @@
             <a:spLocks noGrp="1" noChangeArrowheads="1"/>
             <a:extLst>
               <a:ext uri="smNativeData">
-                <pr:smNativeData xmlns:mc="http://schemas.openxmlformats.org/markup-compatibility/2006" xmlns:p14="http://schemas.microsoft.com/office/powerpoint/2010/main" xmlns:p15="http://schemas.microsoft.com/office/powerpoint/2012/main" xmlns:pr="smNativeData" xmlns="smNativeData" val="SMDATA_15_l3DXYhMAAAAlAAAAZAAAAA8BAAAAkAAAAEgAAACQAAAASAAAAAAAAAAAAAAAAAAAAAEAAABQAAAAAAAAAAAA4D8AAAAAAADgPwAAAAAAAOA/AAAAAAAA4D8AAAAAAADgPwAAAAAAAOA/AAAAAAAA4D8AAAAAAADgPwAAAAAAAOA/AAAAAAAA4D8CAAAAjAAAAAAAAAAAAAAAADOZDCYmJggAAAAAAAAAAAAAAAAAAAAAAAAAAAAAAAAAAAAAZAAAAAEAAABAAAAAAAAAAAAAAAAAAAAAAAAAAAAAAAAAAAAAAAAAAAAAAAAAAAAAAAAAAAAAAAAAAAAAAAAAAAAAAAAAAAAAAAAAAAAAAAAAAAAAAAAAAAAAAAAAAAAAFAAAADwAAAAAAAAAAAAAAP///wkUAAAAAQAAABQAAAAUAAAAFAAAAAEAAAAAAAAAZAAAAGQAAAAAAAAAZAAAAGQAAAAVAAAAYAAAAAAAAAAAAAAADwAAACADAAAAAAAAAAAAAAEAAACgMgAAVgcAAKr4//8BAAAAf39/AAEAAABkAAAAAAAAABQAAABAHwAAAAAAACYAAAAAAAAAwOD//wAAAAAmAAAAZAAAABYAAABMAAAAAAAAAAAAAAAEAAAAAAAAAAEAAAAzZpkKAAAAACgAAAAoAAAAZAAAAGQAAAAAAAAAzMzMAAAAAABQAAAAUAAAAGQAAABkAAAAAAAAABcAAAAUAAAAAAAAAAAAAAD/fwAA/38AAAAAAAAJAAAABAAAAAAAAAAeAAAAaAAAAAAAAAAAAAAAAAAAAAAAAAAAAAAAECcAABAnAAAAAAAAAAAAAAAAAAAAAAAAAAAAAAAAAAAAAAAAAAAAABQAAAAAAAAAwMD/AAAAAABkAAAAMgAAAAAAAABkAAAAAAAAAH9/fwAKAAAAIgAAABgAAAAAAAAAAAAAAAAAAAAAAAAAAAAAAAAAAAAkAAAAJAAAAAAAAAAHAAAAAAAAAAAAAAAAAAAAAAAAAAAAAAAAAAAAf39/ACUAAABYAAAAAAAAAAAAAAAAAAAAAAAAAAAAAAAAAAAAAAAAAAAAAAAAAAAAAAAAAAAAAAA/AAAAAAAAAKCGAQAAAAAAAAAAAAAAAAAMAAAAAQAAAAAAAAAAAAAAAAAAAB8AAABUAAAAAAAABQAAAAEAAAAAAAAAAAAAAAAAAAAAAAAAAAAAAAAAAAAAAAAAAAAAAAJ/f38AAAAAA8zMzADAwP8Af39/AAAAAAAAAAAAAAAAAAAAAAAAAAAAIQAAABgAAAAUAAAAwAMAANgJAABARwAAsCUAAAAAAAAmAAAACAAAAAEAAAAAAAAA"/>
+                <pr:smNativeData xmlns="smNativeData" xmlns:pr="smNativeData" xmlns:p15="http://schemas.microsoft.com/office/powerpoint/2012/main" xmlns:p14="http://schemas.microsoft.com/office/powerpoint/2010/main" xmlns:mc="http://schemas.openxmlformats.org/markup-compatibility/2006" val="SMDATA_15_l3DXYhMAAAAlAAAAZAAAAA8BAAAAkAAAAEgAAACQAAAASAAAAAAAAAAAAAAAAAAAAAEAAABQAAAAAAAAAAAA4D8AAAAAAADgPwAAAAAAAOA/AAAAAAAA4D8AAAAAAADgPwAAAAAAAOA/AAAAAAAA4D8AAAAAAADgPwAAAAAAAOA/AAAAAAAA4D8CAAAAjAAAAAAAAAAAAAAAADOZDCYmJggAAAAAAAAAAAAAAAAAAAAAAAAAAAAAAAAAAAAAZAAAAAEAAABAAAAAAAAAAAAAAAAAAAAAAAAAAAAAAAAAAAAAAAAAAAAAAAAAAAAAAAAAAAAAAAAAAAAAAAAAAAAAAAAAAAAAAAAAAAAAAAAAAAAAAAAAAAAAAAAAAAAAFAAAADwAAAAAAAAAAAAAAP///wkUAAAAAQAAABQAAAAUAAAAFAAAAAEAAAAAAAAAZAAAAGQAAAAAAAAAZAAAAGQAAAAVAAAAYAAAAAAAAAAAAAAADwAAACADAAAAAAAAAAAAAAEAAACgMgAAVgcAAKr4//8BAAAAf39/AAEAAABkAAAAAAAAABQAAABAHwAAAAAAACYAAAAAAAAAwOD//wAAAAAmAAAAZAAAABYAAABMAAAAAAAAAAAAAAAEAAAAAAAAAAEAAAAzZpkKAAAAACgAAAAoAAAAZAAAAGQAAAAAAAAAzMzMAAAAAABQAAAAUAAAAGQAAABkAAAAAAAAABcAAAAUAAAAAAAAAAAAAAD/fwAA/38AAAAAAAAJAAAABAAAAAAAAAAeAAAAaAAAAAAAAAAAAAAAAAAAAAAAAAAAAAAAECcAABAnAAAAAAAAAAAAAAAAAAAAAAAAAAAAAAAAAAAAAAAAAAAAABQAAAAAAAAAwMD/AAAAAABkAAAAMgAAAAAAAABkAAAAAAAAAH9/fwAKAAAAIgAAABgAAAAAAAAAAAAAAAAAAAAAAAAAAAAAAAAAAAAkAAAAJAAAAAAAAAAHAAAAAAAAAAAAAAAAAAAAAAAAAAAAAAAAAAAAf39/ACUAAABYAAAAAAAAAAAAAAAAAAAAAAAAAAAAAAAAAAAAAAAAAAAAAAAAAAAAAAAAAAAAAAA/AAAAAAAAAKCGAQAAAAAAAAAAAAAAAAAMAAAAAQAAAAAAAAAAAAAAAAAAAB8AAABUAAAAAAAABQAAAAEAAAAAAAAAAAAAAAAAAAAAAAAAAAAAAAAAAAAAAAAAAAAAAAJ/f38AAAAAA8zMzADAwP8Af39/AAAAAAAAAAAAAAAAAAAAAAAAAAAAIQAAABgAAAAUAAAAwAMAANgJAABARwAAsCUAAAAAAAAmAAAACAAAAAEAAAAAAAAA"/>
               </a:ext>
             </a:extLst>
           </p:cNvSpPr>
@@ -3870,7 +3883,7 @@
             <a:picLocks noChangeAspect="1"/>
             <a:extLst>
               <a:ext uri="smNativeData">
-                <pr:smNativeData xmlns:mc="http://schemas.openxmlformats.org/markup-compatibility/2006" xmlns:p14="http://schemas.microsoft.com/office/powerpoint/2010/main" xmlns:p15="http://schemas.microsoft.com/office/powerpoint/2012/main" xmlns:pr="smNativeData" xmlns="smNativeData" val="SMDATA_17_l3DXYhMAAAAlAAAAEQAAAC8BAAAAkAAAAEgAAACQAAAASAAAAAAAAAAAAAAAAAAAAAEAAABQAAAAAAAAAAAA4D8AAAAAAADgPwAAAAAAAOA/AAAAAAAA4D8AAAAAAADgPwAAAAAAAOA/AAAAAAAA4D8AAAAAAADgPwAAAAAAAOA/AAAAAAAA4D8CAAAAjAAAAAAAAAAAAAAAADOZDCYmJggAAAAAAAAAAAAAAAAAAAAAAAAAAAAAAAAAAAAAZAAAAAEAAABAAAAAAAAAAAAAAAAAAAAAAAAAAAAAAAAAAAAAAAAAAAAAAAAAAAAAAAAAAAAAAAAAAAAAAAAAAAAAAAAAAAAAAAAAAAAAAAAAAAAAAAAAAAAAAAAAAAAAFAAAADwAAAAAAAAAAAAAAP///wkUAAAAAQAAABQAAAAUAAAAFAAAAAEAAAAAAAAAZAAAAGQAAAAAAAAAZAAAAGQAAAAVAAAAYAAAAAAAAAAAAAAADwAAACADAAAAAAAAAAAAAAEAAACgMgAAVgcAAKr4//8BAAAAf39/AAEAAABkAAAAAAAAABQAAABAHwAAAAAAACYAAAAAAAAAwOD//wAAAAAmAAAAZAAAABYAAABMAAAAAAAAAAAAAAAEAAAAAAAAAAEAAAAzZpkKAAAAACgAAAAoAAAAZAAAAGQAAAAAAAAAzMzMAAAAAABQAAAAUAAAAGQAAABkAAAAAAAAAAcAAAA4AAAAAAAAAAAAAAAAAAAA////AAAAAAAAAAAAAAAAAAAAAAAAAAAAAAAAAAAAAABkAAAAZAAAAAAAAAAjAAAABAAAAGQAAAAXAAAAFAAAAAAAAAAAAAAA/38AAP9/AAAAAAAACQAAAAQAAAAAAAAAHgAAAGgAAAAAAAAAAAAAAAAAAAAAAAAAAAAAABAnAAAQJwAAAAAAAAAAAAAAAAAAAAAAAAAAAAAAAAAAAAAAAAAAAAAUAAAAAAAAAMDA/wAAAAAAZAAAADIAAAAAAAAAZAAAAAAAAAB/f38ACgAAACIAAAAYAAAAAAAAAAAAAAAAAAAAAAAAAAAAAAAAAAAAJAAAACQAAAAAAAAABwAAAAAAAAAAAAAAAAAAAAAAAAAAAAAAAAAAAH9/fwAlAAAAWAAAAAAAAAAAAAAAAAAAAAAAAAAAAAAAAAAAAAAAAAAAAAAAAAAAAAAAAAAAAAAAPwAAAAAAAACghgEAAAAAAAAAAAAAAAAADAAAAAEAAAAAAAAAAAAAAAAAAAAfAAAAVAAAAAAzmQUmJiYBAAAAAAAAAAAAAAAAAAAAAAAAAAAAAAAAAAAAAAAAAAD///8Cf39/ADNmmQPMzMwAwMD/AH9/fwAAAAAAAAAAAAAAAAD///8AAAAAACEAAAAYAAAAFAAAAHcZAACtCQAAiTEAAA0pAAAAAAAAJgAAAAgAAAD//////////w=="/>
+                <pr:smNativeData xmlns="smNativeData" xmlns:pr="smNativeData" xmlns:p15="http://schemas.microsoft.com/office/powerpoint/2012/main" xmlns:p14="http://schemas.microsoft.com/office/powerpoint/2010/main" xmlns:mc="http://schemas.openxmlformats.org/markup-compatibility/2006" val="SMDATA_17_l3DXYhMAAAAlAAAAEQAAAC8BAAAAkAAAAEgAAACQAAAASAAAAAAAAAAAAAAAAAAAAAEAAABQAAAAAAAAAAAA4D8AAAAAAADgPwAAAAAAAOA/AAAAAAAA4D8AAAAAAADgPwAAAAAAAOA/AAAAAAAA4D8AAAAAAADgPwAAAAAAAOA/AAAAAAAA4D8CAAAAjAAAAAAAAAAAAAAAADOZDCYmJggAAAAAAAAAAAAAAAAAAAAAAAAAAAAAAAAAAAAAZAAAAAEAAABAAAAAAAAAAAAAAAAAAAAAAAAAAAAAAAAAAAAAAAAAAAAAAAAAAAAAAAAAAAAAAAAAAAAAAAAAAAAAAAAAAAAAAAAAAAAAAAAAAAAAAAAAAAAAAAAAAAAAFAAAADwAAAAAAAAAAAAAAP///wkUAAAAAQAAABQAAAAUAAAAFAAAAAEAAAAAAAAAZAAAAGQAAAAAAAAAZAAAAGQAAAAVAAAAYAAAAAAAAAAAAAAADwAAACADAAAAAAAAAAAAAAEAAACgMgAAVgcAAKr4//8BAAAAf39/AAEAAABkAAAAAAAAABQAAABAHwAAAAAAACYAAAAAAAAAwOD//wAAAAAmAAAAZAAAABYAAABMAAAAAAAAAAAAAAAEAAAAAAAAAAEAAAAzZpkKAAAAACgAAAAoAAAAZAAAAGQAAAAAAAAAzMzMAAAAAABQAAAAUAAAAGQAAABkAAAAAAAAAAcAAAA4AAAAAAAAAAAAAAAAAAAA////AAAAAAAAAAAAAAAAAAAAAAAAAAAAAAAAAAAAAABkAAAAZAAAAAAAAAAjAAAABAAAAGQAAAAXAAAAFAAAAAAAAAAAAAAA/38AAP9/AAAAAAAACQAAAAQAAAAAAAAAHgAAAGgAAAAAAAAAAAAAAAAAAAAAAAAAAAAAABAnAAAQJwAAAAAAAAAAAAAAAAAAAAAAAAAAAAAAAAAAAAAAAAAAAAAUAAAAAAAAAMDA/wAAAAAAZAAAADIAAAAAAAAAZAAAAAAAAAB/f38ACgAAACIAAAAYAAAAAAAAAAAAAAAAAAAAAAAAAAAAAAAAAAAAJAAAACQAAAAAAAAABwAAAAAAAAAAAAAAAAAAAAAAAAAAAAAAAAAAAH9/fwAlAAAAWAAAAAAAAAAAAAAAAAAAAAAAAAAAAAAAAAAAAAAAAAAAAAAAAAAAAAAAAAAAAAAAPwAAAAAAAACghgEAAAAAAAAAAAAAAAAADAAAAAEAAAAAAAAAAAAAAAAAAAAfAAAAVAAAAAAzmQUmJiYBAAAAAAAAAAAAAAAAAAAAAAAAAAAAAAAAAAAAAAAAAAD///8Cf39/ADNmmQPMzMwAwMD/AH9/fwAAAAAAAAAAAAAAAAD///8AAAAAACEAAAAYAAAAFAAAAHcZAACtCQAAiTEAAA0pAAAAAAAAJgAAAAgAAAD//////////w=="/>
               </a:ext>
             </a:extLst>
           </p:cNvPicPr>
@@ -3929,7 +3942,7 @@
             <a:spLocks noGrp="1" noChangeArrowheads="1"/>
             <a:extLst>
               <a:ext uri="smNativeData">
-                <pr:smNativeData xmlns:mc="http://schemas.openxmlformats.org/markup-compatibility/2006" xmlns:p14="http://schemas.microsoft.com/office/powerpoint/2010/main" xmlns:p15="http://schemas.microsoft.com/office/powerpoint/2012/main" xmlns:pr="smNativeData" xmlns="smNativeData" val="SMDATA_15_l3DXYhMAAAAlAAAAZAAAAA8BAAAAkAAAAEgAAACQAAAASAAAAAAAAAABAAAAAAAAAAEAAABQAAAAAAAAAAAA4D8AAAAAAADgPwAAAAAAAOA/AAAAAAAA4D8AAAAAAADgPwAAAAAAAOA/AAAAAAAA4D8AAAAAAADgPwAAAAAAAOA/AAAAAAAA4D8CAAAAjAAAAAAAAAAAAAAAADOZDCYmJggAAAAAAAAAAAAAAAAAAAAAAAAAAAAAAAAAAAAAZAAAAAEAAABAAAAAAAAAAAAAAAAAAAAAAAAAAAAAAAAAAAAAAAAAAAAAAAAAAAAAAAAAAAAAAAAAAAAAAAAAAAAAAAAAAAAAAAAAAAAAAAAAAAAAAAAAAAAAAAAAAAAAFAAAADwAAAAAAAAAAAAAAP///wkUAAAAAQAAABQAAAAUAAAAFAAAAAEAAAAAAAAAZAAAAGQAAAAAAAAAZAAAAGQAAAAVAAAAYAAAAAAAAAAAAAAADwAAACADAAAAAAAAAAAAAAEAAACgMgAAVgcAAKr4//8BAAAAf39/AAEAAABkAAAAAAAAABQAAABAHwAAAAAAACYAAAAAAAAAwOD//wAAAAAmAAAAZAAAABYAAABMAAAAAAAAAAAAAAAEAAAAAAAAAAEAAAAzZpkKAAAAACgAAAAoAAAAZAAAAGQAAAAAAAAAzMzMAAAAAABQAAAAUAAAAGQAAABkAAAAAAAAABcAAAAUAAAAAAAAAAAAAAD/fwAA/38AAAAAAAAJAAAABAAAAAAAAAAeAAAAaAAAAAAAAAAAAAAAAAAAAAAAAAAAAAAAECcAABAnAAAAAAAAAAAAAAAAAAAAAAAAAAAAAAAAAAAAAAAAAAAAABQAAAAAAAAAwMD/AAAAAABkAAAAMgAAAAAAAABkAAAAAAAAAH9/fwAKAAAAIgAAABgAAAAAAAAAAAAAAAAAAAAAAAAAAAAAAAAAAAAkAAAAJAAAAAAAAAAHAAAAAAAAAAAAAAAAAAAAAAAAAAAAAAAAAAAAf39/ACUAAABYAAAAAAAAAAAAAAAAAAAAAAAAAAAAAAAAAAAAAAAAAAAAAAAAAAAAAAAAAAAAAAA/AAAAAAAAAKCGAQAAAAAAAAAAAAAAAAAMAAAAAQAAAAAAAAAAAAAAAAAAAB8AAABUAAAAAAAABQAAAAEAAAAAAAAAAAAAAAAAAAAAAAAAAAAAAAAAAAAAAAAAAAAAAAJ/f38AAAAAA8zMzADAwP8Af39/AAAAAAAAAAAAAAAAAAAAAAAAAAAAIQAAABgAAAAUAAAAwAMAALABAABARwAAuAgAAAAAAAAmAAAACAAAAAEAAAAAAAAA"/>
+                <pr:smNativeData xmlns="smNativeData" xmlns:pr="smNativeData" xmlns:p15="http://schemas.microsoft.com/office/powerpoint/2012/main" xmlns:p14="http://schemas.microsoft.com/office/powerpoint/2010/main" xmlns:mc="http://schemas.openxmlformats.org/markup-compatibility/2006" val="SMDATA_15_l3DXYhMAAAAlAAAAZAAAAA8BAAAAkAAAAEgAAACQAAAASAAAAAAAAAABAAAAAAAAAAEAAABQAAAAAAAAAAAA4D8AAAAAAADgPwAAAAAAAOA/AAAAAAAA4D8AAAAAAADgPwAAAAAAAOA/AAAAAAAA4D8AAAAAAADgPwAAAAAAAOA/AAAAAAAA4D8CAAAAjAAAAAAAAAAAAAAAADOZDCYmJggAAAAAAAAAAAAAAAAAAAAAAAAAAAAAAAAAAAAAZAAAAAEAAABAAAAAAAAAAAAAAAAAAAAAAAAAAAAAAAAAAAAAAAAAAAAAAAAAAAAAAAAAAAAAAAAAAAAAAAAAAAAAAAAAAAAAAAAAAAAAAAAAAAAAAAAAAAAAAAAAAAAAFAAAADwAAAAAAAAAAAAAAP///wkUAAAAAQAAABQAAAAUAAAAFAAAAAEAAAAAAAAAZAAAAGQAAAAAAAAAZAAAAGQAAAAVAAAAYAAAAAAAAAAAAAAADwAAACADAAAAAAAAAAAAAAEAAACgMgAAVgcAAKr4//8BAAAAf39/AAEAAABkAAAAAAAAABQAAABAHwAAAAAAACYAAAAAAAAAwOD//wAAAAAmAAAAZAAAABYAAABMAAAAAAAAAAAAAAAEAAAAAAAAAAEAAAAzZpkKAAAAACgAAAAoAAAAZAAAAGQAAAAAAAAAzMzMAAAAAABQAAAAUAAAAGQAAABkAAAAAAAAABcAAAAUAAAAAAAAAAAAAAD/fwAA/38AAAAAAAAJAAAABAAAAAAAAAAeAAAAaAAAAAAAAAAAAAAAAAAAAAAAAAAAAAAAECcAABAnAAAAAAAAAAAAAAAAAAAAAAAAAAAAAAAAAAAAAAAAAAAAABQAAAAAAAAAwMD/AAAAAABkAAAAMgAAAAAAAABkAAAAAAAAAH9/fwAKAAAAIgAAABgAAAAAAAAAAAAAAAAAAAAAAAAAAAAAAAAAAAAkAAAAJAAAAAAAAAAHAAAAAAAAAAAAAAAAAAAAAAAAAAAAAAAAAAAAf39/ACUAAABYAAAAAAAAAAAAAAAAAAAAAAAAAAAAAAAAAAAAAAAAAAAAAAAAAAAAAAAAAAAAAAA/AAAAAAAAAKCGAQAAAAAAAAAAAAAAAAAMAAAAAQAAAAAAAAAAAAAAAAAAAB8AAABUAAAAAAAABQAAAAEAAAAAAAAAAAAAAAAAAAAAAAAAAAAAAAAAAAAAAAAAAAAAAAJ/f38AAAAAA8zMzADAwP8Af39/AAAAAAAAAAAAAAAAAAAAAAAAAAAAIQAAABgAAAAUAAAAwAMAALABAABARwAAuAgAAAAAAAAmAAAACAAAAAEAAAAAAAAA"/>
               </a:ext>
             </a:extLst>
           </p:cNvSpPr>
@@ -3960,7 +3973,7 @@
             <a:spLocks noGrp="1" noChangeArrowheads="1"/>
             <a:extLst>
               <a:ext uri="smNativeData">
-                <pr:smNativeData xmlns:mc="http://schemas.openxmlformats.org/markup-compatibility/2006" xmlns:p14="http://schemas.microsoft.com/office/powerpoint/2010/main" xmlns:p15="http://schemas.microsoft.com/office/powerpoint/2012/main" xmlns:pr="smNativeData" xmlns="smNativeData" val="SMDATA_15_l3DXYhMAAAAlAAAAZAAAAA8BAAAAkAAAAEgAAACQAAAASAAAAAAAAAAAAAAAAAAAAAEAAABQAAAAAAAAAAAA4D8AAAAAAADgPwAAAAAAAOA/AAAAAAAA4D8AAAAAAADgPwAAAAAAAOA/AAAAAAAA4D8AAAAAAADgPwAAAAAAAOA/AAAAAAAA4D8CAAAAjAAAAAAAAAAAAAAAADOZDCYmJggAAAAAAAAAAAAAAAAAAAAAAAAAAAAAAAAAAAAAZAAAAAEAAABAAAAAAAAAAAAAAAAAAAAAAAAAAAAAAAAAAAAAAAAAAAAAAAAAAAAAAAAAAAAAAAAAAAAAAAAAAAAAAAAAAAAAAAAAAAAAAAAAAAAAAAAAAAAAAAAAAAAAFAAAADwAAAAAAAAAAAAAAP///wkUAAAAAQAAABQAAAAUAAAAFAAAAAEAAAAAAAAAZAAAAGQAAAAAAAAAZAAAAGQAAAAVAAAAYAAAAAAAAAAAAAAADwAAACADAAAAAAAAAAAAAAEAAACgMgAAVgcAAKr4//8BAAAAf39/AAEAAABkAAAAAAAAABQAAABAHwAAAAAAACYAAAAAAAAAwOD//wAAAAAmAAAAZAAAABYAAABMAAAAAAAAAAAAAAAEAAAAAAAAAAEAAAAzZpkKAAAAACgAAAAoAAAAZAAAAGQAAAAAAAAAzMzMAAAAAABQAAAAUAAAAGQAAABkAAAAAAAAABcAAAAUAAAAAAAAAAAAAAD/fwAA/38AAAAAAAAJAAAABAAAAAAAAAAeAAAAaAAAAAAAAAAAAAAAAAAAAAAAAAAAAAAAECcAABAnAAAAAAAAAAAAAAAAAAAAAAAAAAAAAAAAAAAAAAAAAAAAABQAAAAAAAAAwMD/AAAAAABkAAAAMgAAAAAAAABkAAAAAAAAAH9/fwAKAAAAIgAAABgAAAAAAAAAAAAAAAAAAAAAAAAAAAAAAAAAAAAkAAAAJAAAAAAAAAAHAAAAAAAAAAAAAAAAAAAAAAAAAAAAAAAAAAAAf39/ACUAAABYAAAAAAAAAAAAAAAAAAAAAAAAAAAAAAAAAAAAAAAAAAAAAAAAAAAAAAAAAAAAAAA/AAAAAAAAAKCGAQAAAAAAAAAAAAAAAAAMAAAAAQAAAAAAAAAAAAAAAAAAAB8AAABUAAAAAAAABQAAAAEAAAAAAAAAAAAAAAAAAAAAAAAAAAAAAAAAAAAAAAAAAAAAAAJ/f38AAAAAA8zMzADAwP8Af39/AAAAAAAAAAAAAAAAAAAAAAAAAAAAIQAAABgAAAAUAAAAwAMAANgJAABARwAAsCUAAAAAAAAmAAAACAAAAAEAAAAAAAAA"/>
+                <pr:smNativeData xmlns="smNativeData" xmlns:pr="smNativeData" xmlns:p15="http://schemas.microsoft.com/office/powerpoint/2012/main" xmlns:p14="http://schemas.microsoft.com/office/powerpoint/2010/main" xmlns:mc="http://schemas.openxmlformats.org/markup-compatibility/2006" val="SMDATA_15_l3DXYhMAAAAlAAAAZAAAAA8BAAAAkAAAAEgAAACQAAAASAAAAAAAAAAAAAAAAAAAAAEAAABQAAAAAAAAAAAA4D8AAAAAAADgPwAAAAAAAOA/AAAAAAAA4D8AAAAAAADgPwAAAAAAAOA/AAAAAAAA4D8AAAAAAADgPwAAAAAAAOA/AAAAAAAA4D8CAAAAjAAAAAAAAAAAAAAAADOZDCYmJggAAAAAAAAAAAAAAAAAAAAAAAAAAAAAAAAAAAAAZAAAAAEAAABAAAAAAAAAAAAAAAAAAAAAAAAAAAAAAAAAAAAAAAAAAAAAAAAAAAAAAAAAAAAAAAAAAAAAAAAAAAAAAAAAAAAAAAAAAAAAAAAAAAAAAAAAAAAAAAAAAAAAFAAAADwAAAAAAAAAAAAAAP///wkUAAAAAQAAABQAAAAUAAAAFAAAAAEAAAAAAAAAZAAAAGQAAAAAAAAAZAAAAGQAAAAVAAAAYAAAAAAAAAAAAAAADwAAACADAAAAAAAAAAAAAAEAAACgMgAAVgcAAKr4//8BAAAAf39/AAEAAABkAAAAAAAAABQAAABAHwAAAAAAACYAAAAAAAAAwOD//wAAAAAmAAAAZAAAABYAAABMAAAAAAAAAAAAAAAEAAAAAAAAAAEAAAAzZpkKAAAAACgAAAAoAAAAZAAAAGQAAAAAAAAAzMzMAAAAAABQAAAAUAAAAGQAAABkAAAAAAAAABcAAAAUAAAAAAAAAAAAAAD/fwAA/38AAAAAAAAJAAAABAAAAAAAAAAeAAAAaAAAAAAAAAAAAAAAAAAAAAAAAAAAAAAAECcAABAnAAAAAAAAAAAAAAAAAAAAAAAAAAAAAAAAAAAAAAAAAAAAABQAAAAAAAAAwMD/AAAAAABkAAAAMgAAAAAAAABkAAAAAAAAAH9/fwAKAAAAIgAAABgAAAAAAAAAAAAAAAAAAAAAAAAAAAAAAAAAAAAkAAAAJAAAAAAAAAAHAAAAAAAAAAAAAAAAAAAAAAAAAAAAAAAAAAAAf39/ACUAAABYAAAAAAAAAAAAAAAAAAAAAAAAAAAAAAAAAAAAAAAAAAAAAAAAAAAAAAAAAAAAAAA/AAAAAAAAAKCGAQAAAAAAAAAAAAAAAAAMAAAAAQAAAAAAAAAAAAAAAAAAAB8AAABUAAAAAAAABQAAAAEAAAAAAAAAAAAAAAAAAAAAAAAAAAAAAAAAAAAAAAAAAAAAAAJ/f38AAAAAA8zMzADAwP8Af39/AAAAAAAAAAAAAAAAAAAAAAAAAAAAIQAAABgAAAAUAAAAwAMAANgJAABARwAAsCUAAAAAAAAmAAAACAAAAAEAAAAAAAAA"/>
               </a:ext>
             </a:extLst>
           </p:cNvSpPr>
@@ -3992,7 +4005,7 @@
             <a:picLocks noChangeAspect="1"/>
             <a:extLst>
               <a:ext uri="smNativeData">
-                <pr:smNativeData xmlns:mc="http://schemas.openxmlformats.org/markup-compatibility/2006" xmlns:p14="http://schemas.microsoft.com/office/powerpoint/2010/main" xmlns:p15="http://schemas.microsoft.com/office/powerpoint/2012/main" xmlns:pr="smNativeData" xmlns="smNativeData" val="SMDATA_17_l3DXYhMAAAAlAAAAEQAAAC8BAAAAkAAAAEgAAACQAAAASAAAAAAAAAAAAAAAAAAAAAEAAABQAAAAAAAAAAAA4D8AAAAAAADgPwAAAAAAAOA/AAAAAAAA4D8AAAAAAADgPwAAAAAAAOA/AAAAAAAA4D8AAAAAAADgPwAAAAAAAOA/AAAAAAAA4D8CAAAAjAAAAAAAAAAAAAAAADOZDCYmJggAAAAAAAAAAAAAAAAAAAAAAAAAAAAAAAAAAAAAZAAAAAEAAABAAAAAAAAAAAAAAAAAAAAAAAAAAAAAAAAAAAAAAAAAAAAAAAAAAAAAAAAAAAAAAAAAAAAAAAAAAAAAAAAAAAAAAAAAAAAAAAAAAAAAAAAAAAAAAAAAAAAAFAAAADwAAAAAAAAAAAAAAP///wkUAAAAAQAAABQAAAAUAAAAFAAAAAEAAAAAAAAAZAAAAGQAAAAAAAAAZAAAAGQAAAAVAAAAYAAAAAAAAAAAAAAADwAAACADAAAAAAAAAAAAAAEAAACgMgAAVgcAAKr4//8BAAAAf39/AAEAAABkAAAAAAAAABQAAABAHwAAAAAAACYAAAAAAAAAwOD//wAAAAAmAAAAZAAAABYAAABMAAAAAAAAAAAAAAAEAAAAAAAAAAEAAAAzZpkKAAAAACgAAAAoAAAAZAAAAGQAAAAAAAAAzMzMAAAAAABQAAAAUAAAAGQAAABkAAAAAAAAAAcAAAA4AAAAAAAAAAAAAAAAAAAA////AAAAAAAAAAAAAAAAAAAAAAAAAAAAAAAAAAAAAABkAAAAZAAAAAAAAAAjAAAABAAAAGQAAAAXAAAAFAAAAAAAAAAAAAAA/38AAP9/AAAAAAAACQAAAAQAAADx/wAAHgAAAGgAAAAAAAAAAAAAAAAAAAAAAAAAAAAAABAnAAAQJwAAAAAAAAAAAAAAAAAAAAAAAAAAAAAAAAAAAAAAAAAAAAAUAAAAAAAAAMDA/wAAAAAAZAAAADIAAAAAAAAAZAAAAAAAAAB/f38ACgAAACIAAAAYAAAAAAAAAAAAAAAAAAAAAAAAAAAAAAAAAAAAJAAAACQAAAAAAAAABwAAAAAAAAAAAAAAAAAAAAAAAAAAAAAAAAAAAH9/fwAlAAAAWAAAAAAAAAAAAAAAAAAAAAAAAAAAAAAAAAAAAAAAAAAAAAAAAAAAAAAAAAAAAAAAPwAAAAAAAACghgEAAAAAAAAAAAAAAAAADAAAAAEAAAAAAAAAAAAAAAAAAAAfAAAAVAAAAAAzmQUmJiYBAAAAAAAAAAAAAAAAAAAAAAAAAAAAAAAAAAAAAAAAAAD///8Cf39/ADNmmQPMzMwAwMD/AH9/fwAAAAAAAAAAAAAAAAD///8AAAAAACEAAAAYAAAAFAAAAIMJAADuCAAAfUEAAPYlAAAAAAAAJgAAAAgAAAD//////////w=="/>
+                <pr:smNativeData xmlns="smNativeData" xmlns:pr="smNativeData" xmlns:p15="http://schemas.microsoft.com/office/powerpoint/2012/main" xmlns:p14="http://schemas.microsoft.com/office/powerpoint/2010/main" xmlns:mc="http://schemas.openxmlformats.org/markup-compatibility/2006" val="SMDATA_17_l3DXYhMAAAAlAAAAEQAAAC8BAAAAkAAAAEgAAACQAAAASAAAAAAAAAAAAAAAAAAAAAEAAABQAAAAAAAAAAAA4D8AAAAAAADgPwAAAAAAAOA/AAAAAAAA4D8AAAAAAADgPwAAAAAAAOA/AAAAAAAA4D8AAAAAAADgPwAAAAAAAOA/AAAAAAAA4D8CAAAAjAAAAAAAAAAAAAAAADOZDCYmJggAAAAAAAAAAAAAAAAAAAAAAAAAAAAAAAAAAAAAZAAAAAEAAABAAAAAAAAAAAAAAAAAAAAAAAAAAAAAAAAAAAAAAAAAAAAAAAAAAAAAAAAAAAAAAAAAAAAAAAAAAAAAAAAAAAAAAAAAAAAAAAAAAAAAAAAAAAAAAAAAAAAAFAAAADwAAAAAAAAAAAAAAP///wkUAAAAAQAAABQAAAAUAAAAFAAAAAEAAAAAAAAAZAAAAGQAAAAAAAAAZAAAAGQAAAAVAAAAYAAAAAAAAAAAAAAADwAAACADAAAAAAAAAAAAAAEAAACgMgAAVgcAAKr4//8BAAAAf39/AAEAAABkAAAAAAAAABQAAABAHwAAAAAAACYAAAAAAAAAwOD//wAAAAAmAAAAZAAAABYAAABMAAAAAAAAAAAAAAAEAAAAAAAAAAEAAAAzZpkKAAAAACgAAAAoAAAAZAAAAGQAAAAAAAAAzMzMAAAAAABQAAAAUAAAAGQAAABkAAAAAAAAAAcAAAA4AAAAAAAAAAAAAAAAAAAA////AAAAAAAAAAAAAAAAAAAAAAAAAAAAAAAAAAAAAABkAAAAZAAAAAAAAAAjAAAABAAAAGQAAAAXAAAAFAAAAAAAAAAAAAAA/38AAP9/AAAAAAAACQAAAAQAAADx/wAAHgAAAGgAAAAAAAAAAAAAAAAAAAAAAAAAAAAAABAnAAAQJwAAAAAAAAAAAAAAAAAAAAAAAAAAAAAAAAAAAAAAAAAAAAAUAAAAAAAAAMDA/wAAAAAAZAAAADIAAAAAAAAAZAAAAAAAAAB/f38ACgAAACIAAAAYAAAAAAAAAAAAAAAAAAAAAAAAAAAAAAAAAAAAJAAAACQAAAAAAAAABwAAAAAAAAAAAAAAAAAAAAAAAAAAAAAAAAAAAH9/fwAlAAAAWAAAAAAAAAAAAAAAAAAAAAAAAAAAAAAAAAAAAAAAAAAAAAAAAAAAAAAAAAAAAAAAPwAAAAAAAACghgEAAAAAAAAAAAAAAAAADAAAAAEAAAAAAAAAAAAAAAAAAAAfAAAAVAAAAAAzmQUmJiYBAAAAAAAAAAAAAAAAAAAAAAAAAAAAAAAAAAAAAAAAAAD///8Cf39/ADNmmQPMzMwAwMD/AH9/fwAAAAAAAAAAAAAAAAD///8AAAAAACEAAAAYAAAAFAAAAIMJAADuCAAAfUEAAPYlAAAAAAAAJgAAAAgAAAD//////////w=="/>
               </a:ext>
             </a:extLst>
           </p:cNvPicPr>
@@ -4051,7 +4064,7 @@
             <a:spLocks noGrp="1" noChangeArrowheads="1"/>
             <a:extLst>
               <a:ext uri="smNativeData">
-                <pr:smNativeData xmlns:mc="http://schemas.openxmlformats.org/markup-compatibility/2006" xmlns:p14="http://schemas.microsoft.com/office/powerpoint/2010/main" xmlns:p15="http://schemas.microsoft.com/office/powerpoint/2012/main" xmlns:pr="smNativeData" xmlns="smNativeData" val="SMDATA_15_l3DXYhMAAAAlAAAAZAAAAA8BAAAAkAAAAEgAAACQAAAASAAAAAAAAAABAAAAAAAAAAEAAABQAAAAAAAAAAAA4D8AAAAAAADgPwAAAAAAAOA/AAAAAAAA4D8AAAAAAADgPwAAAAAAAOA/AAAAAAAA4D8AAAAAAADgPwAAAAAAAOA/AAAAAAAA4D8CAAAAjAAAAAAAAAAAAAAAADOZDCYmJggAAAAAAAAAAAAAAAAAAAAAAAAAAAAAAAAAAAAAZAAAAAEAAABAAAAAAAAAAAAAAAAAAAAAAAAAAAAAAAAAAAAAAAAAAAAAAAAAAAAAAAAAAAAAAAAAAAAAAAAAAAAAAAAAAAAAAAAAAAAAAAAAAAAAAAAAAAAAAAAAAAAAFAAAADwAAAAAAAAAAAAAAP///wkUAAAAAQAAABQAAAAUAAAAFAAAAAEAAAAAAAAAZAAAAGQAAAAAAAAAZAAAAGQAAAAVAAAAYAAAAAAAAAAAAAAADwAAACADAAAAAAAAAAAAAAEAAACgMgAAVgcAAKr4//8BAAAAf39/AAEAAABkAAAAAAAAABQAAABAHwAAAAAAACYAAAAAAAAAwOD//wAAAAAmAAAAZAAAABYAAABMAAAAAAAAAAAAAAAEAAAAAAAAAAEAAAAzZpkKAAAAACgAAAAoAAAAZAAAAGQAAAAAAAAAzMzMAAAAAABQAAAAUAAAAGQAAABkAAAAAAAAABcAAAAUAAAAAAAAAAAAAAD/fwAA/38AAAAAAAAJAAAABAAAAAAAAAAeAAAAaAAAAAAAAAAAAAAAAAAAAAAAAAAAAAAAECcAABAnAAAAAAAAAAAAAAAAAAAAAAAAAAAAAAAAAAAAAAAAAAAAABQAAAAAAAAAwMD/AAAAAABkAAAAMgAAAAAAAABkAAAAAAAAAH9/fwAKAAAAIgAAABgAAAAAAAAAAAAAAAAAAAAAAAAAAAAAAAAAAAAkAAAAJAAAAAAAAAAHAAAAAAAAAAAAAAAAAAAAAAAAAAAAAAAAAAAAf39/ACUAAABYAAAAAAAAAAAAAAAAAAAAAAAAAAAAAAAAAAAAAAAAAAAAAAAAAAAAAAAAAAAAAAA/AAAAAAAAAKCGAQAAAAAAAAAAAAAAAAAMAAAAAQAAAAAAAAAAAAAAAAAAAB8AAABUAAAAAAAABQAAAAEAAAAAAAAAAAAAAAAAAAAAAAAAAAAAAAAAAAAAAAAAAAAAAAJ/f38AAAAAA8zMzADAwP8Af39/AAAAAAAAAAAAAAAAAAAAAAAAAAAAIQAAABgAAAAUAAAAwAMAALABAABARwAAuAgAAAAAAAAmAAAACAAAAAEAAAAAAAAA"/>
+                <pr:smNativeData xmlns="smNativeData" xmlns:pr="smNativeData" xmlns:p15="http://schemas.microsoft.com/office/powerpoint/2012/main" xmlns:p14="http://schemas.microsoft.com/office/powerpoint/2010/main" xmlns:mc="http://schemas.openxmlformats.org/markup-compatibility/2006" val="SMDATA_15_l3DXYhMAAAAlAAAAZAAAAA8BAAAAkAAAAEgAAACQAAAASAAAAAAAAAABAAAAAAAAAAEAAABQAAAAAAAAAAAA4D8AAAAAAADgPwAAAAAAAOA/AAAAAAAA4D8AAAAAAADgPwAAAAAAAOA/AAAAAAAA4D8AAAAAAADgPwAAAAAAAOA/AAAAAAAA4D8CAAAAjAAAAAAAAAAAAAAAADOZDCYmJggAAAAAAAAAAAAAAAAAAAAAAAAAAAAAAAAAAAAAZAAAAAEAAABAAAAAAAAAAAAAAAAAAAAAAAAAAAAAAAAAAAAAAAAAAAAAAAAAAAAAAAAAAAAAAAAAAAAAAAAAAAAAAAAAAAAAAAAAAAAAAAAAAAAAAAAAAAAAAAAAAAAAFAAAADwAAAAAAAAAAAAAAP///wkUAAAAAQAAABQAAAAUAAAAFAAAAAEAAAAAAAAAZAAAAGQAAAAAAAAAZAAAAGQAAAAVAAAAYAAAAAAAAAAAAAAADwAAACADAAAAAAAAAAAAAAEAAACgMgAAVgcAAKr4//8BAAAAf39/AAEAAABkAAAAAAAAABQAAABAHwAAAAAAACYAAAAAAAAAwOD//wAAAAAmAAAAZAAAABYAAABMAAAAAAAAAAAAAAAEAAAAAAAAAAEAAAAzZpkKAAAAACgAAAAoAAAAZAAAAGQAAAAAAAAAzMzMAAAAAABQAAAAUAAAAGQAAABkAAAAAAAAABcAAAAUAAAAAAAAAAAAAAD/fwAA/38AAAAAAAAJAAAABAAAAAAAAAAeAAAAaAAAAAAAAAAAAAAAAAAAAAAAAAAAAAAAECcAABAnAAAAAAAAAAAAAAAAAAAAAAAAAAAAAAAAAAAAAAAAAAAAABQAAAAAAAAAwMD/AAAAAABkAAAAMgAAAAAAAABkAAAAAAAAAH9/fwAKAAAAIgAAABgAAAAAAAAAAAAAAAAAAAAAAAAAAAAAAAAAAAAkAAAAJAAAAAAAAAAHAAAAAAAAAAAAAAAAAAAAAAAAAAAAAAAAAAAAf39/ACUAAABYAAAAAAAAAAAAAAAAAAAAAAAAAAAAAAAAAAAAAAAAAAAAAAAAAAAAAAAAAAAAAAA/AAAAAAAAAKCGAQAAAAAAAAAAAAAAAAAMAAAAAQAAAAAAAAAAAAAAAAAAAB8AAABUAAAAAAAABQAAAAEAAAAAAAAAAAAAAAAAAAAAAAAAAAAAAAAAAAAAAAAAAAAAAAJ/f38AAAAAA8zMzADAwP8Af39/AAAAAAAAAAAAAAAAAAAAAAAAAAAAIQAAABgAAAAUAAAAwAMAALABAABARwAAuAgAAAAAAAAmAAAACAAAAAEAAAAAAAAA"/>
               </a:ext>
             </a:extLst>
           </p:cNvSpPr>
@@ -4082,7 +4095,7 @@
             <a:spLocks noGrp="1" noChangeArrowheads="1"/>
             <a:extLst>
               <a:ext uri="smNativeData">
-                <pr:smNativeData xmlns:mc="http://schemas.openxmlformats.org/markup-compatibility/2006" xmlns:p14="http://schemas.microsoft.com/office/powerpoint/2010/main" xmlns:p15="http://schemas.microsoft.com/office/powerpoint/2012/main" xmlns:pr="smNativeData" xmlns="smNativeData" val="SMDATA_15_l3DXYhMAAAAlAAAAZAAAAA8BAAAAkAAAAEgAAACQAAAASAAAAAAAAAAAAAAAAAAAAAEAAABQAAAAAAAAAAAA4D8AAAAAAADgPwAAAAAAAOA/AAAAAAAA4D8AAAAAAADgPwAAAAAAAOA/AAAAAAAA4D8AAAAAAADgPwAAAAAAAOA/AAAAAAAA4D8CAAAAjAAAAAAAAAAAAAAAADOZDCYmJggAAAAAAAAAAAAAAAAAAAAAAAAAAAAAAAAAAAAAZAAAAAEAAABAAAAAAAAAAAAAAAAAAAAAAAAAAAAAAAAAAAAAAAAAAAAAAAAAAAAAAAAAAAAAAAAAAAAAAAAAAAAAAAAAAAAAAAAAAAAAAAAAAAAAAAAAAAAAAAAAAAAAFAAAADwAAAAAAAAAAAAAAP///wkUAAAAAQAAABQAAAAUAAAAFAAAAAEAAAAAAAAAZAAAAGQAAAAAAAAAZAAAAGQAAAAVAAAAYAAAAAAAAAAAAAAADwAAACADAAAAAAAAAAAAAAEAAACgMgAAVgcAAKr4//8BAAAAf39/AAEAAABkAAAAAAAAABQAAABAHwAAAAAAACYAAAAAAAAAwOD//wAAAAAmAAAAZAAAABYAAABMAAAAAAAAAAAAAAAEAAAAAAAAAAEAAAAzZpkKAAAAACgAAAAoAAAAZAAAAGQAAAAAAAAAzMzMAAAAAABQAAAAUAAAAGQAAABkAAAAAAAAABcAAAAUAAAAAAAAAAAAAAD/fwAA/38AAAAAAAAJAAAABAAAAAAAAAAeAAAAaAAAAAAAAAAAAAAAAAAAAAAAAAAAAAAAECcAABAnAAAAAAAAAAAAAAAAAAAAAAAAAAAAAAAAAAAAAAAAAAAAABQAAAAAAAAAwMD/AAAAAABkAAAAMgAAAAAAAABkAAAAAAAAAH9/fwAKAAAAIgAAABgAAAAAAAAAAAAAAAAAAAAAAAAAAAAAAAAAAAAkAAAAJAAAAAAAAAAHAAAAAAAAAAAAAAAAAAAAAAAAAAAAAAAAAAAAf39/ACUAAABYAAAAAAAAAAAAAAAAAAAAAAAAAAAAAAAAAAAAAAAAAAAAAAAAAAAAAAAAAAAAAAA/AAAAAAAAAKCGAQAAAAAAAAAAAAAAAAAMAAAAAQAAAAAAAAAAAAAAAAAAAB8AAABUAAAAAAAABQAAAAEAAAAAAAAAAAAAAAAAAAAAAAAAAAAAAAAAAAAAAAAAAAAAAAJ/f38AAAAAA8zMzADAwP8Af39/AAAAAAAAAAAAAAAAAAAAAAAAAAAAIQAAABgAAAAUAAAAwAMAANgJAABARwAAsCUAAAAAAAAmAAAACAAAAAEAAAAAAAAA"/>
+                <pr:smNativeData xmlns="smNativeData" xmlns:pr="smNativeData" xmlns:p15="http://schemas.microsoft.com/office/powerpoint/2012/main" xmlns:p14="http://schemas.microsoft.com/office/powerpoint/2010/main" xmlns:mc="http://schemas.openxmlformats.org/markup-compatibility/2006" val="SMDATA_15_l3DXYhMAAAAlAAAAZAAAAA8BAAAAkAAAAEgAAACQAAAASAAAAAAAAAAAAAAAAAAAAAEAAABQAAAAAAAAAAAA4D8AAAAAAADgPwAAAAAAAOA/AAAAAAAA4D8AAAAAAADgPwAAAAAAAOA/AAAAAAAA4D8AAAAAAADgPwAAAAAAAOA/AAAAAAAA4D8CAAAAjAAAAAAAAAAAAAAAADOZDCYmJggAAAAAAAAAAAAAAAAAAAAAAAAAAAAAAAAAAAAAZAAAAAEAAABAAAAAAAAAAAAAAAAAAAAAAAAAAAAAAAAAAAAAAAAAAAAAAAAAAAAAAAAAAAAAAAAAAAAAAAAAAAAAAAAAAAAAAAAAAAAAAAAAAAAAAAAAAAAAAAAAAAAAFAAAADwAAAAAAAAAAAAAAP///wkUAAAAAQAAABQAAAAUAAAAFAAAAAEAAAAAAAAAZAAAAGQAAAAAAAAAZAAAAGQAAAAVAAAAYAAAAAAAAAAAAAAADwAAACADAAAAAAAAAAAAAAEAAACgMgAAVgcAAKr4//8BAAAAf39/AAEAAABkAAAAAAAAABQAAABAHwAAAAAAACYAAAAAAAAAwOD//wAAAAAmAAAAZAAAABYAAABMAAAAAAAAAAAAAAAEAAAAAAAAAAEAAAAzZpkKAAAAACgAAAAoAAAAZAAAAGQAAAAAAAAAzMzMAAAAAABQAAAAUAAAAGQAAABkAAAAAAAAABcAAAAUAAAAAAAAAAAAAAD/fwAA/38AAAAAAAAJAAAABAAAAAAAAAAeAAAAaAAAAAAAAAAAAAAAAAAAAAAAAAAAAAAAECcAABAnAAAAAAAAAAAAAAAAAAAAAAAAAAAAAAAAAAAAAAAAAAAAABQAAAAAAAAAwMD/AAAAAABkAAAAMgAAAAAAAABkAAAAAAAAAH9/fwAKAAAAIgAAABgAAAAAAAAAAAAAAAAAAAAAAAAAAAAAAAAAAAAkAAAAJAAAAAAAAAAHAAAAAAAAAAAAAAAAAAAAAAAAAAAAAAAAAAAAf39/ACUAAABYAAAAAAAAAAAAAAAAAAAAAAAAAAAAAAAAAAAAAAAAAAAAAAAAAAAAAAAAAAAAAAA/AAAAAAAAAKCGAQAAAAAAAAAAAAAAAAAMAAAAAQAAAAAAAAAAAAAAAAAAAB8AAABUAAAAAAAABQAAAAEAAAAAAAAAAAAAAAAAAAAAAAAAAAAAAAAAAAAAAAAAAAAAAAJ/f38AAAAAA8zMzADAwP8Af39/AAAAAAAAAAAAAAAAAAAAAAAAAAAAIQAAABgAAAAUAAAAwAMAANgJAABARwAAsCUAAAAAAAAmAAAACAAAAAEAAAAAAAAA"/>
               </a:ext>
             </a:extLst>
           </p:cNvSpPr>
@@ -4211,7 +4224,7 @@
           <a:p>
             <a:fld id="{2B84B1DC-92C6-D147-883C-6412FF727E31}" type="datetime1">
               <a:rPr lang="pt-BR" smtClean="0"/>
-              <a:t>21/07/2022</a:t>
+              <a:t>26/07/2022</a:t>
             </a:fld>
             <a:endParaRPr lang="pt-BR"/>
           </a:p>
@@ -4283,7 +4296,7 @@
             <a:spLocks noGrp="1" noChangeArrowheads="1"/>
             <a:extLst>
               <a:ext uri="smNativeData">
-                <pr:smNativeData xmlns:mc="http://schemas.openxmlformats.org/markup-compatibility/2006" xmlns:p14="http://schemas.microsoft.com/office/powerpoint/2010/main" xmlns:p15="http://schemas.microsoft.com/office/powerpoint/2012/main" xmlns:pr="smNativeData" xmlns="smNativeData" val="SMDATA_15_l3DXYhMAAAAlAAAAZAAAAA8BAAAAkAAAAEgAAACQAAAASAAAAAAAAAABAAAAAAAAAAEAAABQAAAAAAAAAAAA4D8AAAAAAADgPwAAAAAAAOA/AAAAAAAA4D8AAAAAAADgPwAAAAAAAOA/AAAAAAAA4D8AAAAAAADgPwAAAAAAAOA/AAAAAAAA4D8CAAAAjAAAAAAAAAAAAAAAADOZDCYmJggAAAAAAAAAAAAAAAAAAAAAAAAAAAAAAAAAAAAAZAAAAAEAAABAAAAAAAAAAAAAAAAAAAAAAAAAAAAAAAAAAAAAAAAAAAAAAAAAAAAAAAAAAAAAAAAAAAAAAAAAAAAAAAAAAAAAAAAAAAAAAAAAAAAAAAAAAAAAAAAAAAAAFAAAADwAAAAAAAAAAAAAAP///wkUAAAAAQAAABQAAAAUAAAAFAAAAAEAAAAAAAAAZAAAAGQAAAAAAAAAZAAAAGQAAAAVAAAAYAAAAAAAAAAAAAAADwAAACADAAAAAAAAAAAAAAEAAACgMgAAVgcAAKr4//8BAAAAf39/AAEAAABkAAAAAAAAABQAAABAHwAAAAAAACYAAAAAAAAAwOD//wAAAAAmAAAAZAAAABYAAABMAAAAAAAAAAAAAAAEAAAAAAAAAAEAAAAzZpkKAAAAACgAAAAoAAAAZAAAAGQAAAAAAAAAzMzMAAAAAABQAAAAUAAAAGQAAABkAAAAAAAAABcAAAAUAAAAAAAAAAAAAAD/fwAA/38AAAAAAAAJAAAABAAAAAAAAAAeAAAAaAAAAAAAAAAAAAAAAAAAAAAAAAAAAAAAECcAABAnAAAAAAAAAAAAAAAAAAAAAAAAAAAAAAAAAAAAAAAAAAAAABQAAAAAAAAAwMD/AAAAAABkAAAAMgAAAAAAAABkAAAAAAAAAH9/fwAKAAAAIgAAABgAAAAAAAAAAAAAAAAAAAAAAAAAAAAAAAAAAAAkAAAAJAAAAAAAAAAHAAAAAAAAAAAAAAAAAAAAAAAAAAAAAAAAAAAAf39/ACUAAABYAAAAAAAAAAAAAAAAAAAAAAAAAAAAAAAAAAAAAAAAAAAAAAAAAAAAAAAAAAAAAAA/AAAAAAAAAKCGAQAAAAAAAAAAAAAAAAAMAAAAAQAAAAAAAAAAAAAAAAAAAB8AAABUAAAAAAAABQAAAAEAAAAAAAAAAAAAAAAAAAAAAAAAAAAAAAAAAAAAAAAAAAAAAAJ/f38AAAAAA8zMzADAwP8Af39/AAAAAAAAAAAAAAAAAAAAAAAAAAAAIQAAABgAAAAUAAAAwAMAALABAABARwAAuAgAAAAAAAAmAAAACAAAAAEAAAAAAAAA"/>
+                <pr:smNativeData xmlns="smNativeData" xmlns:pr="smNativeData" xmlns:p15="http://schemas.microsoft.com/office/powerpoint/2012/main" xmlns:p14="http://schemas.microsoft.com/office/powerpoint/2010/main" xmlns:mc="http://schemas.openxmlformats.org/markup-compatibility/2006" val="SMDATA_15_l3DXYhMAAAAlAAAAZAAAAA8BAAAAkAAAAEgAAACQAAAASAAAAAAAAAABAAAAAAAAAAEAAABQAAAAAAAAAAAA4D8AAAAAAADgPwAAAAAAAOA/AAAAAAAA4D8AAAAAAADgPwAAAAAAAOA/AAAAAAAA4D8AAAAAAADgPwAAAAAAAOA/AAAAAAAA4D8CAAAAjAAAAAAAAAAAAAAAADOZDCYmJggAAAAAAAAAAAAAAAAAAAAAAAAAAAAAAAAAAAAAZAAAAAEAAABAAAAAAAAAAAAAAAAAAAAAAAAAAAAAAAAAAAAAAAAAAAAAAAAAAAAAAAAAAAAAAAAAAAAAAAAAAAAAAAAAAAAAAAAAAAAAAAAAAAAAAAAAAAAAAAAAAAAAFAAAADwAAAAAAAAAAAAAAP///wkUAAAAAQAAABQAAAAUAAAAFAAAAAEAAAAAAAAAZAAAAGQAAAAAAAAAZAAAAGQAAAAVAAAAYAAAAAAAAAAAAAAADwAAACADAAAAAAAAAAAAAAEAAACgMgAAVgcAAKr4//8BAAAAf39/AAEAAABkAAAAAAAAABQAAABAHwAAAAAAACYAAAAAAAAAwOD//wAAAAAmAAAAZAAAABYAAABMAAAAAAAAAAAAAAAEAAAAAAAAAAEAAAAzZpkKAAAAACgAAAAoAAAAZAAAAGQAAAAAAAAAzMzMAAAAAABQAAAAUAAAAGQAAABkAAAAAAAAABcAAAAUAAAAAAAAAAAAAAD/fwAA/38AAAAAAAAJAAAABAAAAAAAAAAeAAAAaAAAAAAAAAAAAAAAAAAAAAAAAAAAAAAAECcAABAnAAAAAAAAAAAAAAAAAAAAAAAAAAAAAAAAAAAAAAAAAAAAABQAAAAAAAAAwMD/AAAAAABkAAAAMgAAAAAAAABkAAAAAAAAAH9/fwAKAAAAIgAAABgAAAAAAAAAAAAAAAAAAAAAAAAAAAAAAAAAAAAkAAAAJAAAAAAAAAAHAAAAAAAAAAAAAAAAAAAAAAAAAAAAAAAAAAAAf39/ACUAAABYAAAAAAAAAAAAAAAAAAAAAAAAAAAAAAAAAAAAAAAAAAAAAAAAAAAAAAAAAAAAAAA/AAAAAAAAAKCGAQAAAAAAAAAAAAAAAAAMAAAAAQAAAAAAAAAAAAAAAAAAAB8AAABUAAAAAAAABQAAAAEAAAAAAAAAAAAAAAAAAAAAAAAAAAAAAAAAAAAAAAAAAAAAAAJ/f38AAAAAA8zMzADAwP8Af39/AAAAAAAAAAAAAAAAAAAAAAAAAAAAIQAAABgAAAAUAAAAwAMAALABAABARwAAuAgAAAAAAAAmAAAACAAAAAEAAAAAAAAA"/>
               </a:ext>
             </a:extLst>
           </p:cNvSpPr>
@@ -4314,7 +4327,7 @@
             <a:spLocks noGrp="1" noChangeArrowheads="1"/>
             <a:extLst>
               <a:ext uri="smNativeData">
-                <pr:smNativeData xmlns:mc="http://schemas.openxmlformats.org/markup-compatibility/2006" xmlns:p14="http://schemas.microsoft.com/office/powerpoint/2010/main" xmlns:p15="http://schemas.microsoft.com/office/powerpoint/2012/main" xmlns:pr="smNativeData" xmlns="smNativeData" val="SMDATA_15_l3DXYhMAAAAlAAAAZAAAAA8BAAAAkAAAAEgAAACQAAAASAAAAAAAAAAAAAAAAAAAAAEAAABQAAAAAAAAAAAA4D8AAAAAAADgPwAAAAAAAOA/AAAAAAAA4D8AAAAAAADgPwAAAAAAAOA/AAAAAAAA4D8AAAAAAADgPwAAAAAAAOA/AAAAAAAA4D8CAAAAjAAAAAAAAAAAAAAAADOZDCYmJggAAAAAAAAAAAAAAAAAAAAAAAAAAAAAAAAAAAAAZAAAAAEAAABAAAAAAAAAAAAAAAAAAAAAAAAAAAAAAAAAAAAAAAAAAAAAAAAAAAAAAAAAAAAAAAAAAAAAAAAAAAAAAAAAAAAAAAAAAAAAAAAAAAAAAAAAAAAAAAAAAAAAFAAAADwAAAAAAAAAAAAAAP///wkUAAAAAQAAABQAAAAUAAAAFAAAAAEAAAAAAAAAZAAAAGQAAAAAAAAAZAAAAGQAAAAVAAAAYAAAAAAAAAAAAAAADwAAACADAAAAAAAAAAAAAAEAAACgMgAAVgcAAKr4//8BAAAAf39/AAEAAABkAAAAAAAAABQAAABAHwAAAAAAACYAAAAAAAAAwOD//wAAAAAmAAAAZAAAABYAAABMAAAAAAAAAAAAAAAEAAAAAAAAAAEAAAAzZpkKAAAAACgAAAAoAAAAZAAAAGQAAAAAAAAAzMzMAAAAAABQAAAAUAAAAGQAAABkAAAAAAAAABcAAAAUAAAAAAAAAAAAAAD/fwAA/38AAAAAAAAJAAAABAAAAF8AYAAeAAAAaAAAAAAAAAAAAAAAAAAAAAAAAAAAAAAAECcAABAnAAAAAAAAAAAAAAAAAAAAAAAAAAAAAAAAAAAAAAAAAAAAABQAAAAAAAAAwMD/AAAAAABkAAAAMgAAAAAAAABkAAAAAAAAAH9/fwAKAAAAIgAAABgAAAAAAAAAAAAAAAAAAAAAAAAAAAAAAAAAAAAkAAAAJAAAAAAAAAAHAAAAAAAAAAAAAAAAAAAAAAAAAAAAAAAAAAAAf39/ACUAAABYAAAAAAAAAAAAAAAAAAAAAAAAAAAAAAAAAAAAAAAAAAAAAAAAAAAAAAAAAAAAAAA/AAAAAAAAAKCGAQAAAAAAAAAAAAAAAAAMAAAAAQAAAAAAAAAAAAAAAAAAAB8AAABUAAAAAAAABQAAAAEAAAAAAAAAAAAAAAAAAAAAAAAAAAAAAAAAAAAAAAAAAAAAAAJ/f38AAAAAA8zMzADAwP8Af39/AAAAAAAAAAAAAAAAAAAAAAAAAAAAIQAAABgAAAAUAAAAwAMAANgJAABARwAAsCUAAAAAAAAmAAAACAAAAAEAAAAAAAAA"/>
+                <pr:smNativeData xmlns="smNativeData" xmlns:pr="smNativeData" xmlns:p15="http://schemas.microsoft.com/office/powerpoint/2012/main" xmlns:p14="http://schemas.microsoft.com/office/powerpoint/2010/main" xmlns:mc="http://schemas.openxmlformats.org/markup-compatibility/2006" val="SMDATA_15_l3DXYhMAAAAlAAAAZAAAAA8BAAAAkAAAAEgAAACQAAAASAAAAAAAAAAAAAAAAAAAAAEAAABQAAAAAAAAAAAA4D8AAAAAAADgPwAAAAAAAOA/AAAAAAAA4D8AAAAAAADgPwAAAAAAAOA/AAAAAAAA4D8AAAAAAADgPwAAAAAAAOA/AAAAAAAA4D8CAAAAjAAAAAAAAAAAAAAAADOZDCYmJggAAAAAAAAAAAAAAAAAAAAAAAAAAAAAAAAAAAAAZAAAAAEAAABAAAAAAAAAAAAAAAAAAAAAAAAAAAAAAAAAAAAAAAAAAAAAAAAAAAAAAAAAAAAAAAAAAAAAAAAAAAAAAAAAAAAAAAAAAAAAAAAAAAAAAAAAAAAAAAAAAAAAFAAAADwAAAAAAAAAAAAAAP///wkUAAAAAQAAABQAAAAUAAAAFAAAAAEAAAAAAAAAZAAAAGQAAAAAAAAAZAAAAGQAAAAVAAAAYAAAAAAAAAAAAAAADwAAACADAAAAAAAAAAAAAAEAAACgMgAAVgcAAKr4//8BAAAAf39/AAEAAABkAAAAAAAAABQAAABAHwAAAAAAACYAAAAAAAAAwOD//wAAAAAmAAAAZAAAABYAAABMAAAAAAAAAAAAAAAEAAAAAAAAAAEAAAAzZpkKAAAAACgAAAAoAAAAZAAAAGQAAAAAAAAAzMzMAAAAAABQAAAAUAAAAGQAAABkAAAAAAAAABcAAAAUAAAAAAAAAAAAAAD/fwAA/38AAAAAAAAJAAAABAAAAF8AYAAeAAAAaAAAAAAAAAAAAAAAAAAAAAAAAAAAAAAAECcAABAnAAAAAAAAAAAAAAAAAAAAAAAAAAAAAAAAAAAAAAAAAAAAABQAAAAAAAAAwMD/AAAAAABkAAAAMgAAAAAAAABkAAAAAAAAAH9/fwAKAAAAIgAAABgAAAAAAAAAAAAAAAAAAAAAAAAAAAAAAAAAAAAkAAAAJAAAAAAAAAAHAAAAAAAAAAAAAAAAAAAAAAAAAAAAAAAAAAAAf39/ACUAAABYAAAAAAAAAAAAAAAAAAAAAAAAAAAAAAAAAAAAAAAAAAAAAAAAAAAAAAAAAAAAAAA/AAAAAAAAAKCGAQAAAAAAAAAAAAAAAAAMAAAAAQAAAAAAAAAAAAAAAAAAAB8AAABUAAAAAAAABQAAAAEAAAAAAAAAAAAAAAAAAAAAAAAAAAAAAAAAAAAAAAAAAAAAAAJ/f38AAAAAA8zMzADAwP8Af39/AAAAAAAAAAAAAAAAAAAAAAAAAAAAIQAAABgAAAAUAAAAwAMAANgJAABARwAAsCUAAAAAAAAmAAAACAAAAAEAAAAAAAAA"/>
               </a:ext>
             </a:extLst>
           </p:cNvSpPr>
@@ -4346,7 +4359,7 @@
             <a:picLocks noChangeAspect="1"/>
             <a:extLst>
               <a:ext uri="smNativeData">
-                <pr:smNativeData xmlns:mc="http://schemas.openxmlformats.org/markup-compatibility/2006" xmlns:p14="http://schemas.microsoft.com/office/powerpoint/2010/main" xmlns:p15="http://schemas.microsoft.com/office/powerpoint/2012/main" xmlns:pr="smNativeData" xmlns="smNativeData" val="SMDATA_17_l3DXYhMAAAAlAAAAEQAAAC8BAAAAkAAAAEgAAACQAAAASAAAAAAAAAAAAAAAAAAAAAEAAABQAAAAAAAAAAAA4D8AAAAAAADgPwAAAAAAAOA/AAAAAAAA4D8AAAAAAADgPwAAAAAAAOA/AAAAAAAA4D8AAAAAAADgPwAAAAAAAOA/AAAAAAAA4D8CAAAAjAAAAAAAAAAAAAAAADOZDCYmJggAAAAAAAAAAAAAAAAAAAAAAAAAAAAAAAAAAAAAZAAAAAEAAABAAAAAAAAAAAAAAAAAAAAAAAAAAAAAAAAAAAAAAAAAAAAAAAAAAAAAAAAAAAAAAAAAAAAAAAAAAAAAAAAAAAAAAAAAAAAAAAAAAAAAAAAAAAAAAAAAAAAAFAAAADwAAAAAAAAAAAAAAP///wkUAAAAAQAAABQAAAAUAAAAFAAAAAEAAAAAAAAAZAAAAGQAAAAAAAAAZAAAAGQAAAAVAAAAYAAAAAAAAAAAAAAADwAAACADAAAAAAAAAAAAAAEAAACgMgAAVgcAAKr4//8BAAAAf39/AAEAAABkAAAAAAAAABQAAABAHwAAAAAAACYAAAAAAAAAwOD//wAAAAAmAAAAZAAAABYAAABMAAAAAAAAAAAAAAAEAAAAAAAAAAEAAAAzZpkKAAAAACgAAAAoAAAAZAAAAGQAAAAAAAAAzMzMAAAAAABQAAAAUAAAAGQAAABkAAAAAAAAAAcAAAA4AAAAAAAAAAAAAAAAAAAA////AAAAAAAAAAAAAAAAAAAAAAAAAAAAAAAAAAAAAABkAAAAZAAAAAAAAAAjAAAABAAAAGQAAAAXAAAAFAAAAAAAAAAAAAAA/38AAP9/AAAAAAAACQAAAAQAAAByAG8AHgAAAGgAAAAAAAAAAAAAAAAAAAAAAAAAAAAAABAnAAAQJwAAAAAAAAAAAAAAAAAAAAAAAAAAAAAAAAAAAAAAAAAAAAAUAAAAAAAAAMDA/wAAAAAAZAAAADIAAAAAAAAAZAAAAAAAAAB/f38ACgAAACIAAAAYAAAAAAAAAAAAAAAAAAAAAAAAAAAAAAAAAAAAJAAAACQAAAAAAAAABwAAAAAAAAAAAAAAAAAAAAAAAAAAAAAAAAAAAH9/fwAlAAAAWAAAAAAAAAAAAAAAAAAAAAAAAAAAAAAAAAAAAAAAAAAAAAAAAAAAAAAAAAAAAAAAPwAAAAAAAACghgEAAAAAAAAAAAAAAAAADAAAAAEAAAAAAAAAAAAAAAAAAAAfAAAAVAAAAAAzmQUmJiYBAAAAAAAAAAAAAAAAAAAAAAAAAAAAAAAAAAAAAAAAAAD///8Cf39/ADNmmQPMzMwAwMD/AH9/fwAAAAAAAAAAAAAAAAD///8AAAAAACEAAAAYAAAAFAAAAIAHAAA+CAAAgEMAAP4pAAAAAAAAJgAAAAgAAAD//////////w=="/>
+                <pr:smNativeData xmlns="smNativeData" xmlns:pr="smNativeData" xmlns:p15="http://schemas.microsoft.com/office/powerpoint/2012/main" xmlns:p14="http://schemas.microsoft.com/office/powerpoint/2010/main" xmlns:mc="http://schemas.openxmlformats.org/markup-compatibility/2006" val="SMDATA_17_l3DXYhMAAAAlAAAAEQAAAC8BAAAAkAAAAEgAAACQAAAASAAAAAAAAAAAAAAAAAAAAAEAAABQAAAAAAAAAAAA4D8AAAAAAADgPwAAAAAAAOA/AAAAAAAA4D8AAAAAAADgPwAAAAAAAOA/AAAAAAAA4D8AAAAAAADgPwAAAAAAAOA/AAAAAAAA4D8CAAAAjAAAAAAAAAAAAAAAADOZDCYmJggAAAAAAAAAAAAAAAAAAAAAAAAAAAAAAAAAAAAAZAAAAAEAAABAAAAAAAAAAAAAAAAAAAAAAAAAAAAAAAAAAAAAAAAAAAAAAAAAAAAAAAAAAAAAAAAAAAAAAAAAAAAAAAAAAAAAAAAAAAAAAAAAAAAAAAAAAAAAAAAAAAAAFAAAADwAAAAAAAAAAAAAAP///wkUAAAAAQAAABQAAAAUAAAAFAAAAAEAAAAAAAAAZAAAAGQAAAAAAAAAZAAAAGQAAAAVAAAAYAAAAAAAAAAAAAAADwAAACADAAAAAAAAAAAAAAEAAACgMgAAVgcAAKr4//8BAAAAf39/AAEAAABkAAAAAAAAABQAAABAHwAAAAAAACYAAAAAAAAAwOD//wAAAAAmAAAAZAAAABYAAABMAAAAAAAAAAAAAAAEAAAAAAAAAAEAAAAzZpkKAAAAACgAAAAoAAAAZAAAAGQAAAAAAAAAzMzMAAAAAABQAAAAUAAAAGQAAABkAAAAAAAAAAcAAAA4AAAAAAAAAAAAAAAAAAAA////AAAAAAAAAAAAAAAAAAAAAAAAAAAAAAAAAAAAAABkAAAAZAAAAAAAAAAjAAAABAAAAGQAAAAXAAAAFAAAAAAAAAAAAAAA/38AAP9/AAAAAAAACQAAAAQAAAByAG8AHgAAAGgAAAAAAAAAAAAAAAAAAAAAAAAAAAAAABAnAAAQJwAAAAAAAAAAAAAAAAAAAAAAAAAAAAAAAAAAAAAAAAAAAAAUAAAAAAAAAMDA/wAAAAAAZAAAADIAAAAAAAAAZAAAAAAAAAB/f38ACgAAACIAAAAYAAAAAAAAAAAAAAAAAAAAAAAAAAAAAAAAAAAAJAAAACQAAAAAAAAABwAAAAAAAAAAAAAAAAAAAAAAAAAAAAAAAAAAAH9/fwAlAAAAWAAAAAAAAAAAAAAAAAAAAAAAAAAAAAAAAAAAAAAAAAAAAAAAAAAAAAAAAAAAAAAAPwAAAAAAAACghgEAAAAAAAAAAAAAAAAADAAAAAEAAAAAAAAAAAAAAAAAAAAfAAAAVAAAAAAzmQUmJiYBAAAAAAAAAAAAAAAAAAAAAAAAAAAAAAAAAAAAAAAAAAD///8Cf39/ADNmmQPMzMwAwMD/AH9/fwAAAAAAAAAAAAAAAAD///8AAAAAACEAAAAYAAAAFAAAAIAHAAA+CAAAgEMAAP4pAAAAAAAAJgAAAAgAAAD//////////w=="/>
               </a:ext>
             </a:extLst>
           </p:cNvPicPr>
@@ -4405,7 +4418,7 @@
             <a:spLocks noGrp="1" noChangeArrowheads="1"/>
             <a:extLst>
               <a:ext uri="smNativeData">
-                <pr:smNativeData xmlns:mc="http://schemas.openxmlformats.org/markup-compatibility/2006" xmlns:p14="http://schemas.microsoft.com/office/powerpoint/2010/main" xmlns:p15="http://schemas.microsoft.com/office/powerpoint/2012/main" xmlns:pr="smNativeData" xmlns="smNativeData" val="SMDATA_15_l3DXYhMAAAAlAAAAZAAAAA8BAAAAkAAAAEgAAACQAAAASAAAAAAAAAABAAAAAAAAAAEAAABQAAAAAAAAAAAA4D8AAAAAAADgPwAAAAAAAOA/AAAAAAAA4D8AAAAAAADgPwAAAAAAAOA/AAAAAAAA4D8AAAAAAADgPwAAAAAAAOA/AAAAAAAA4D8CAAAAjAAAAAAAAAAAAAAAADOZDCYmJggAAAAAAAAAAAAAAAAAAAAAAAAAAAAAAAAAAAAAZAAAAAEAAABAAAAAAAAAAAAAAAAAAAAAAAAAAAAAAAAAAAAAAAAAAAAAAAAAAAAAAAAAAAAAAAAAAAAAAAAAAAAAAAAAAAAAAAAAAAAAAAAAAAAAAAAAAAAAAAAAAAAAFAAAADwAAAAAAAAAAAAAAP///wkUAAAAAQAAABQAAAAUAAAAFAAAAAEAAAAAAAAAZAAAAGQAAAAAAAAAZAAAAGQAAAAVAAAAYAAAAAAAAAAAAAAADwAAACADAAAAAAAAAAAAAAEAAACgMgAAVgcAAKr4//8BAAAAf39/AAEAAABkAAAAAAAAABQAAABAHwAAAAAAACYAAAAAAAAAwOD//wAAAAAmAAAAZAAAABYAAABMAAAAAAAAAAAAAAAEAAAAAAAAAAEAAAAzZpkKAAAAACgAAAAoAAAAZAAAAGQAAAAAAAAAzMzMAAAAAABQAAAAUAAAAGQAAABkAAAAAAAAABcAAAAUAAAAAAAAAAAAAAD/fwAA/38AAAAAAAAJAAAABAAAAAAAAAAeAAAAaAAAAAAAAAAAAAAAAAAAAAAAAAAAAAAAECcAABAnAAAAAAAAAAAAAAAAAAAAAAAAAAAAAAAAAAAAAAAAAAAAABQAAAAAAAAAwMD/AAAAAABkAAAAMgAAAAAAAABkAAAAAAAAAH9/fwAKAAAAIgAAABgAAAAAAAAAAAAAAAAAAAAAAAAAAAAAAAAAAAAkAAAAJAAAAAAAAAAHAAAAAAAAAAAAAAAAAAAAAAAAAAAAAAAAAAAAf39/ACUAAABYAAAAAAAAAAAAAAAAAAAAAAAAAAAAAAAAAAAAAAAAAAAAAAAAAAAAAAAAAAAAAAA/AAAAAAAAAKCGAQAAAAAAAAAAAAAAAAAMAAAAAQAAAAAAAAAAAAAAAAAAAB8AAABUAAAAAAAABQAAAAEAAAAAAAAAAAAAAAAAAAAAAAAAAAAAAAAAAAAAAAAAAAAAAAJ/f38AAAAAA8zMzADAwP8Af39/AAAAAAAAAAAAAAAAAAAAAAAAAAAAIQAAABgAAAAUAAAAwAMAALABAABARwAAuAgAAAAAAAAmAAAACAAAAAEAAAAAAAAA"/>
+                <pr:smNativeData xmlns="smNativeData" xmlns:pr="smNativeData" xmlns:p15="http://schemas.microsoft.com/office/powerpoint/2012/main" xmlns:p14="http://schemas.microsoft.com/office/powerpoint/2010/main" xmlns:mc="http://schemas.openxmlformats.org/markup-compatibility/2006" val="SMDATA_15_l3DXYhMAAAAlAAAAZAAAAA8BAAAAkAAAAEgAAACQAAAASAAAAAAAAAABAAAAAAAAAAEAAABQAAAAAAAAAAAA4D8AAAAAAADgPwAAAAAAAOA/AAAAAAAA4D8AAAAAAADgPwAAAAAAAOA/AAAAAAAA4D8AAAAAAADgPwAAAAAAAOA/AAAAAAAA4D8CAAAAjAAAAAAAAAAAAAAAADOZDCYmJggAAAAAAAAAAAAAAAAAAAAAAAAAAAAAAAAAAAAAZAAAAAEAAABAAAAAAAAAAAAAAAAAAAAAAAAAAAAAAAAAAAAAAAAAAAAAAAAAAAAAAAAAAAAAAAAAAAAAAAAAAAAAAAAAAAAAAAAAAAAAAAAAAAAAAAAAAAAAAAAAAAAAFAAAADwAAAAAAAAAAAAAAP///wkUAAAAAQAAABQAAAAUAAAAFAAAAAEAAAAAAAAAZAAAAGQAAAAAAAAAZAAAAGQAAAAVAAAAYAAAAAAAAAAAAAAADwAAACADAAAAAAAAAAAAAAEAAACgMgAAVgcAAKr4//8BAAAAf39/AAEAAABkAAAAAAAAABQAAABAHwAAAAAAACYAAAAAAAAAwOD//wAAAAAmAAAAZAAAABYAAABMAAAAAAAAAAAAAAAEAAAAAAAAAAEAAAAzZpkKAAAAACgAAAAoAAAAZAAAAGQAAAAAAAAAzMzMAAAAAABQAAAAUAAAAGQAAABkAAAAAAAAABcAAAAUAAAAAAAAAAAAAAD/fwAA/38AAAAAAAAJAAAABAAAAAAAAAAeAAAAaAAAAAAAAAAAAAAAAAAAAAAAAAAAAAAAECcAABAnAAAAAAAAAAAAAAAAAAAAAAAAAAAAAAAAAAAAAAAAAAAAABQAAAAAAAAAwMD/AAAAAABkAAAAMgAAAAAAAABkAAAAAAAAAH9/fwAKAAAAIgAAABgAAAAAAAAAAAAAAAAAAAAAAAAAAAAAAAAAAAAkAAAAJAAAAAAAAAAHAAAAAAAAAAAAAAAAAAAAAAAAAAAAAAAAAAAAf39/ACUAAABYAAAAAAAAAAAAAAAAAAAAAAAAAAAAAAAAAAAAAAAAAAAAAAAAAAAAAAAAAAAAAAA/AAAAAAAAAKCGAQAAAAAAAAAAAAAAAAAMAAAAAQAAAAAAAAAAAAAAAAAAAB8AAABUAAAAAAAABQAAAAEAAAAAAAAAAAAAAAAAAAAAAAAAAAAAAAAAAAAAAAAAAAAAAAJ/f38AAAAAA8zMzADAwP8Af39/AAAAAAAAAAAAAAAAAAAAAAAAAAAAIQAAABgAAAAUAAAAwAMAALABAABARwAAuAgAAAAAAAAmAAAACAAAAAEAAAAAAAAA"/>
               </a:ext>
             </a:extLst>
           </p:cNvSpPr>
@@ -4436,7 +4449,7 @@
             <a:spLocks noGrp="1" noChangeArrowheads="1"/>
             <a:extLst>
               <a:ext uri="smNativeData">
-                <pr:smNativeData xmlns:mc="http://schemas.openxmlformats.org/markup-compatibility/2006" xmlns:p14="http://schemas.microsoft.com/office/powerpoint/2010/main" xmlns:p15="http://schemas.microsoft.com/office/powerpoint/2012/main" xmlns:pr="smNativeData" xmlns="smNativeData" val="SMDATA_15_l3DXYhMAAAAlAAAAZAAAAA8BAAAAkAAAAEgAAACQAAAASAAAAAAAAAAAAAAAAAAAAAEAAABQAAAAAAAAAAAA4D8AAAAAAADgPwAAAAAAAOA/AAAAAAAA4D8AAAAAAADgPwAAAAAAAOA/AAAAAAAA4D8AAAAAAADgPwAAAAAAAOA/AAAAAAAA4D8CAAAAjAAAAAAAAAAAAAAAADOZDCYmJggAAAAAAAAAAAAAAAAAAAAAAAAAAAAAAAAAAAAAZAAAAAEAAABAAAAAAAAAAAAAAAAAAAAAAAAAAAAAAAAAAAAAAAAAAAAAAAAAAAAAAAAAAAAAAAAAAAAAAAAAAAAAAAAAAAAAAAAAAAAAAAAAAAAAAAAAAAAAAAAAAAAAFAAAADwAAAAAAAAAAAAAAP///wkUAAAAAQAAABQAAAAUAAAAFAAAAAEAAAAAAAAAZAAAAGQAAAAAAAAAZAAAAGQAAAAVAAAAYAAAAAAAAAAAAAAADwAAACADAAAAAAAAAAAAAAEAAACgMgAAVgcAAKr4//8BAAAAf39/AAEAAABkAAAAAAAAABQAAABAHwAAAAAAACYAAAAAAAAAwOD//wAAAAAmAAAAZAAAABYAAABMAAAAAAAAAAAAAAAEAAAAAAAAAAEAAAAzZpkKAAAAACgAAAAoAAAAZAAAAGQAAAAAAAAAzMzMAAAAAABQAAAAUAAAAGQAAABkAAAAAAAAABcAAAAUAAAAAAAAAAAAAAD/fwAA/38AAAAAAAAJAAAABAAAAAAAAAAeAAAAaAAAAAAAAAAAAAAAAAAAAAAAAAAAAAAAECcAABAnAAAAAAAAAAAAAAAAAAAAAAAAAAAAAAAAAAAAAAAAAAAAABQAAAAAAAAAwMD/AAAAAABkAAAAMgAAAAAAAABkAAAAAAAAAH9/fwAKAAAAIgAAABgAAAAAAAAAAAAAAAAAAAAAAAAAAAAAAAAAAAAkAAAAJAAAAAAAAAAHAAAAAAAAAAAAAAAAAAAAAAAAAAAAAAAAAAAAf39/ACUAAABYAAAAAAAAAAAAAAAAAAAAAAAAAAAAAAAAAAAAAAAAAAAAAAAAAAAAAAAAAAAAAAA/AAAAAAAAAKCGAQAAAAAAAAAAAAAAAAAMAAAAAQAAAAAAAAAAAAAAAAAAAB8AAABUAAAAAAAABQAAAAEAAAAAAAAAAAAAAAAAAAAAAAAAAAAAAAAAAAAAAAAAAAAAAAJ/f38AAAAAA8zMzADAwP8Af39/AAAAAAAAAAAAAAAAAAAAAAAAAAAAIQAAABgAAAAUAAAAwAMAANgJAABARwAAsCUAAAAAAAAmAAAACAAAAAEAAAAAAAAA"/>
+                <pr:smNativeData xmlns="smNativeData" xmlns:pr="smNativeData" xmlns:p15="http://schemas.microsoft.com/office/powerpoint/2012/main" xmlns:p14="http://schemas.microsoft.com/office/powerpoint/2010/main" xmlns:mc="http://schemas.openxmlformats.org/markup-compatibility/2006" val="SMDATA_15_l3DXYhMAAAAlAAAAZAAAAA8BAAAAkAAAAEgAAACQAAAASAAAAAAAAAAAAAAAAAAAAAEAAABQAAAAAAAAAAAA4D8AAAAAAADgPwAAAAAAAOA/AAAAAAAA4D8AAAAAAADgPwAAAAAAAOA/AAAAAAAA4D8AAAAAAADgPwAAAAAAAOA/AAAAAAAA4D8CAAAAjAAAAAAAAAAAAAAAADOZDCYmJggAAAAAAAAAAAAAAAAAAAAAAAAAAAAAAAAAAAAAZAAAAAEAAABAAAAAAAAAAAAAAAAAAAAAAAAAAAAAAAAAAAAAAAAAAAAAAAAAAAAAAAAAAAAAAAAAAAAAAAAAAAAAAAAAAAAAAAAAAAAAAAAAAAAAAAAAAAAAAAAAAAAAFAAAADwAAAAAAAAAAAAAAP///wkUAAAAAQAAABQAAAAUAAAAFAAAAAEAAAAAAAAAZAAAAGQAAAAAAAAAZAAAAGQAAAAVAAAAYAAAAAAAAAAAAAAADwAAACADAAAAAAAAAAAAAAEAAACgMgAAVgcAAKr4//8BAAAAf39/AAEAAABkAAAAAAAAABQAAABAHwAAAAAAACYAAAAAAAAAwOD//wAAAAAmAAAAZAAAABYAAABMAAAAAAAAAAAAAAAEAAAAAAAAAAEAAAAzZpkKAAAAACgAAAAoAAAAZAAAAGQAAAAAAAAAzMzMAAAAAABQAAAAUAAAAGQAAABkAAAAAAAAABcAAAAUAAAAAAAAAAAAAAD/fwAA/38AAAAAAAAJAAAABAAAAAAAAAAeAAAAaAAAAAAAAAAAAAAAAAAAAAAAAAAAAAAAECcAABAnAAAAAAAAAAAAAAAAAAAAAAAAAAAAAAAAAAAAAAAAAAAAABQAAAAAAAAAwMD/AAAAAABkAAAAMgAAAAAAAABkAAAAAAAAAH9/fwAKAAAAIgAAABgAAAAAAAAAAAAAAAAAAAAAAAAAAAAAAAAAAAAkAAAAJAAAAAAAAAAHAAAAAAAAAAAAAAAAAAAAAAAAAAAAAAAAAAAAf39/ACUAAABYAAAAAAAAAAAAAAAAAAAAAAAAAAAAAAAAAAAAAAAAAAAAAAAAAAAAAAAAAAAAAAA/AAAAAAAAAKCGAQAAAAAAAAAAAAAAAAAMAAAAAQAAAAAAAAAAAAAAAAAAAB8AAABUAAAAAAAABQAAAAEAAAAAAAAAAAAAAAAAAAAAAAAAAAAAAAAAAAAAAAAAAAAAAAJ/f38AAAAAA8zMzADAwP8Af39/AAAAAAAAAAAAAAAAAAAAAAAAAAAAIQAAABgAAAAUAAAAwAMAANgJAABARwAAsCUAAAAAAAAmAAAACAAAAAEAAAAAAAAA"/>
               </a:ext>
             </a:extLst>
           </p:cNvSpPr>
@@ -4613,11 +4626,11 @@
                   <a:srgbClr val="FFFF00"/>
                 </a:highlight>
               </a:rPr>
-              <a:t>Princípio Aberto-Fechad</a:t>
+              <a:t>Princípio Aberto-Fechado</a:t>
             </a:r>
             <a:r>
               <a:rPr lang="pt-BR" sz="2500" dirty="0"/>
-              <a:t>o)</a:t>
+              <a:t>)</a:t>
             </a:r>
           </a:p>
           <a:p>
@@ -4792,7 +4805,7 @@
           <a:p>
             <a:fld id="{2B84B1DC-92C6-D147-883C-6412FF727E31}" type="datetime1">
               <a:rPr lang="pt-BR" smtClean="0"/>
-              <a:t>21/07/2022</a:t>
+              <a:t>26/07/2022</a:t>
             </a:fld>
             <a:endParaRPr lang="pt-BR"/>
           </a:p>
@@ -4983,7 +4996,7 @@
           <a:p>
             <a:fld id="{2B84B1DC-92C6-D147-883C-6412FF727E31}" type="datetime1">
               <a:rPr lang="pt-BR" smtClean="0"/>
-              <a:t>21/07/2022</a:t>
+              <a:t>26/07/2022</a:t>
             </a:fld>
             <a:endParaRPr lang="pt-BR"/>
           </a:p>
@@ -5162,7 +5175,7 @@
           <a:p>
             <a:fld id="{2B84B1DC-92C6-D147-883C-6412FF727E31}" type="datetime1">
               <a:rPr lang="pt-BR" smtClean="0"/>
-              <a:t>21/07/2022</a:t>
+              <a:t>26/07/2022</a:t>
             </a:fld>
             <a:endParaRPr lang="pt-BR"/>
           </a:p>
@@ -5969,7 +5982,7 @@
           <a:p>
             <a:fld id="{2B84B1DC-92C6-D147-883C-6412FF727E31}" type="datetime1">
               <a:rPr lang="pt-BR" smtClean="0"/>
-              <a:t>21/07/2022</a:t>
+              <a:t>26/07/2022</a:t>
             </a:fld>
             <a:endParaRPr lang="pt-BR"/>
           </a:p>
@@ -6041,7 +6054,7 @@
             <a:spLocks noGrp="1" noChangeArrowheads="1"/>
             <a:extLst>
               <a:ext uri="smNativeData">
-                <pr:smNativeData xmlns:mc="http://schemas.openxmlformats.org/markup-compatibility/2006" xmlns:p14="http://schemas.microsoft.com/office/powerpoint/2010/main" xmlns:p15="http://schemas.microsoft.com/office/powerpoint/2012/main" xmlns:pr="smNativeData" xmlns="smNativeData" val="SMDATA_15_l3DXYhMAAAAlAAAAZAAAAA8BAAAAkAAAAEgAAACQAAAASAAAAAAAAAABAAAAAAAAAAEAAABQAAAAAAAAAAAA4D8AAAAAAADgPwAAAAAAAOA/AAAAAAAA4D8AAAAAAADgPwAAAAAAAOA/AAAAAAAA4D8AAAAAAADgPwAAAAAAAOA/AAAAAAAA4D8CAAAAjAAAAAAAAAAAAAAAADOZDCYmJggAAAAAAAAAAAAAAAAAAAAAAAAAAAAAAAAAAAAAZAAAAAEAAABAAAAAAAAAAAAAAAAAAAAAAAAAAAAAAAAAAAAAAAAAAAAAAAAAAAAAAAAAAAAAAAAAAAAAAAAAAAAAAAAAAAAAAAAAAAAAAAAAAAAAAAAAAAAAAAAAAAAAFAAAADwAAAAAAAAAAAAAAP///wkUAAAAAQAAABQAAAAUAAAAFAAAAAEAAAAAAAAAZAAAAGQAAAAAAAAAZAAAAGQAAAAVAAAAYAAAAAAAAAAAAAAADwAAACADAAAAAAAAAAAAAAEAAACgMgAAVgcAAKr4//8BAAAAf39/AAEAAABkAAAAAAAAABQAAABAHwAAAAAAACYAAAAAAAAAwOD//wAAAAAmAAAAZAAAABYAAABMAAAAAAAAAAAAAAAEAAAAAAAAAAEAAAAzZpkKAAAAACgAAAAoAAAAZAAAAGQAAAAAAAAAzMzMAAAAAABQAAAAUAAAAGQAAABkAAAAAAAAABcAAAAUAAAAAAAAAAAAAAD/fwAA/38AAAAAAAAJAAAABAAAAF8AYAAeAAAAaAAAAAAAAAAAAAAAAAAAAAAAAAAAAAAAECcAABAnAAAAAAAAAAAAAAAAAAAAAAAAAAAAAAAAAAAAAAAAAAAAABQAAAAAAAAAwMD/AAAAAABkAAAAMgAAAAAAAABkAAAAAAAAAH9/fwAKAAAAIgAAABgAAAAAAAAAAAAAAAAAAAAAAAAAAAAAAAAAAAAkAAAAJAAAAAAAAAAHAAAAAAAAAAAAAAAAAAAAAAAAAAAAAAAAAAAAf39/ACUAAABYAAAAAAAAAAAAAAAAAAAAAAAAAAAAAAAAAAAAAAAAAAAAAAAAAAAAAAAAAAAAAAA/AAAAAAAAAKCGAQAAAAAAAAAAAAAAAAAMAAAAAQAAAAAAAAAAAAAAAAAAAB8AAABUAAAAAAAABQAAAAEAAAAAAAAAAAAAAAAAAAAAAAAAAAAAAAAAAAAAAAAAAAAAAAJ/f38AAAAAA8zMzADAwP8Af39/AAAAAAAAAAAAAAAAAAAAAAAAAAAAIQAAABgAAAAUAAAAwAMAALABAABARwAAuAgAAAAAAAAmAAAACAAAAAEAAAAAAAAA"/>
+                <pr:smNativeData xmlns="smNativeData" xmlns:pr="smNativeData" xmlns:p15="http://schemas.microsoft.com/office/powerpoint/2012/main" xmlns:p14="http://schemas.microsoft.com/office/powerpoint/2010/main" xmlns:mc="http://schemas.openxmlformats.org/markup-compatibility/2006" val="SMDATA_15_l3DXYhMAAAAlAAAAZAAAAA8BAAAAkAAAAEgAAACQAAAASAAAAAAAAAABAAAAAAAAAAEAAABQAAAAAAAAAAAA4D8AAAAAAADgPwAAAAAAAOA/AAAAAAAA4D8AAAAAAADgPwAAAAAAAOA/AAAAAAAA4D8AAAAAAADgPwAAAAAAAOA/AAAAAAAA4D8CAAAAjAAAAAAAAAAAAAAAADOZDCYmJggAAAAAAAAAAAAAAAAAAAAAAAAAAAAAAAAAAAAAZAAAAAEAAABAAAAAAAAAAAAAAAAAAAAAAAAAAAAAAAAAAAAAAAAAAAAAAAAAAAAAAAAAAAAAAAAAAAAAAAAAAAAAAAAAAAAAAAAAAAAAAAAAAAAAAAAAAAAAAAAAAAAAFAAAADwAAAAAAAAAAAAAAP///wkUAAAAAQAAABQAAAAUAAAAFAAAAAEAAAAAAAAAZAAAAGQAAAAAAAAAZAAAAGQAAAAVAAAAYAAAAAAAAAAAAAAADwAAACADAAAAAAAAAAAAAAEAAACgMgAAVgcAAKr4//8BAAAAf39/AAEAAABkAAAAAAAAABQAAABAHwAAAAAAACYAAAAAAAAAwOD//wAAAAAmAAAAZAAAABYAAABMAAAAAAAAAAAAAAAEAAAAAAAAAAEAAAAzZpkKAAAAACgAAAAoAAAAZAAAAGQAAAAAAAAAzMzMAAAAAABQAAAAUAAAAGQAAABkAAAAAAAAABcAAAAUAAAAAAAAAAAAAAD/fwAA/38AAAAAAAAJAAAABAAAAF8AYAAeAAAAaAAAAAAAAAAAAAAAAAAAAAAAAAAAAAAAECcAABAnAAAAAAAAAAAAAAAAAAAAAAAAAAAAAAAAAAAAAAAAAAAAABQAAAAAAAAAwMD/AAAAAABkAAAAMgAAAAAAAABkAAAAAAAAAH9/fwAKAAAAIgAAABgAAAAAAAAAAAAAAAAAAAAAAAAAAAAAAAAAAAAkAAAAJAAAAAAAAAAHAAAAAAAAAAAAAAAAAAAAAAAAAAAAAAAAAAAAf39/ACUAAABYAAAAAAAAAAAAAAAAAAAAAAAAAAAAAAAAAAAAAAAAAAAAAAAAAAAAAAAAAAAAAAA/AAAAAAAAAKCGAQAAAAAAAAAAAAAAAAAMAAAAAQAAAAAAAAAAAAAAAAAAAB8AAABUAAAAAAAABQAAAAEAAAAAAAAAAAAAAAAAAAAAAAAAAAAAAAAAAAAAAAAAAAAAAAJ/f38AAAAAA8zMzADAwP8Af39/AAAAAAAAAAAAAAAAAAAAAAAAAAAAIQAAABgAAAAUAAAAwAMAALABAABARwAAuAgAAAAAAAAmAAAACAAAAAEAAAAAAAAA"/>
               </a:ext>
             </a:extLst>
           </p:cNvSpPr>
@@ -6072,7 +6085,7 @@
             <a:spLocks noGrp="1" noChangeArrowheads="1"/>
             <a:extLst>
               <a:ext uri="smNativeData">
-                <pr:smNativeData xmlns:mc="http://schemas.openxmlformats.org/markup-compatibility/2006" xmlns:p14="http://schemas.microsoft.com/office/powerpoint/2010/main" xmlns:p15="http://schemas.microsoft.com/office/powerpoint/2012/main" xmlns:pr="smNativeData" xmlns="smNativeData" val="SMDATA_15_l3DXYhMAAAAlAAAAZAAAAA8BAAAAkAAAAEgAAACQAAAASAAAAAAAAAAAAAAAAAAAAAEAAABQAAAAAAAAAAAA4D8AAAAAAADgPwAAAAAAAOA/AAAAAAAA4D8AAAAAAADgPwAAAAAAAOA/AAAAAAAA4D8AAAAAAADgPwAAAAAAAOA/AAAAAAAA4D8CAAAAjAAAAAAAAAAAAAAAADOZDCYmJggAAAAAAAAAAAAAAAAAAAAAAAAAAAAAAAAAAAAAZAAAAAEAAABAAAAAAAAAAAAAAAAAAAAAAAAAAAAAAAAAAAAAAAAAAAAAAAAAAAAAAAAAAAAAAAAAAAAAAAAAAAAAAAAAAAAAAAAAAAAAAAAAAAAAAAAAAAAAAAAAAAAAFAAAADwAAAAAAAAAAAAAAP///wkUAAAAAQAAABQAAAAUAAAAFAAAAAEAAAAAAAAAZAAAAGQAAAAAAAAAZAAAAGQAAAAVAAAAYAAAAAAAAAAAAAAADwAAACADAAAAAAAAAAAAAAEAAACgMgAAVgcAAKr4//8BAAAAf39/AAEAAABkAAAAAAAAABQAAABAHwAAAAAAACYAAAAAAAAAwOD//wAAAAAmAAAAZAAAABYAAABMAAAAAAAAAAAAAAAEAAAAAAAAAAEAAAAzZpkKAAAAACgAAAAoAAAAZAAAAGQAAAAAAAAAzMzMAAAAAABQAAAAUAAAAGQAAABkAAAAAAAAABcAAAAUAAAAAAAAAAAAAAD/fwAA/38AAAAAAAAJAAAABAAAAAAAAAAeAAAAaAAAAAAAAAAAAAAAAAAAAAAAAAAAAAAAECcAABAnAAAAAAAAAAAAAAAAAAAAAAAAAAAAAAAAAAAAAAAAAAAAABQAAAAAAAAAwMD/AAAAAABkAAAAMgAAAAAAAABkAAAAAAAAAH9/fwAKAAAAIgAAABgAAAAAAAAAAAAAAAAAAAAAAAAAAAAAAAAAAAAkAAAAJAAAAAAAAAAHAAAAAAAAAAAAAAAAAAAAAAAAAAAAAAAAAAAAf39/ACUAAABYAAAAAAAAAAAAAAAAAAAAAAAAAAAAAAAAAAAAAAAAAAAAAAAAAAAAAAAAAAAAAAA/AAAAAAAAAKCGAQAAAAAAAAAAAAAAAAAMAAAAAQAAAAAAAAAAAAAAAAAAAB8AAABUAAAAAAAABQAAAAEAAAAAAAAAAAAAAAAAAAAAAAAAAAAAAAAAAAAAAAAAAAAAAAJ/f38AAAAAA8zMzADAwP8Af39/AAAAAAAAAAAAAAAAAAAAAAAAAAAAIQAAABgAAAAUAAAAwAMAANgJAABARwAAsCUAAAAAAAAmAAAACAAAAAEAAAAAAAAA"/>
+                <pr:smNativeData xmlns="smNativeData" xmlns:pr="smNativeData" xmlns:p15="http://schemas.microsoft.com/office/powerpoint/2012/main" xmlns:p14="http://schemas.microsoft.com/office/powerpoint/2010/main" xmlns:mc="http://schemas.openxmlformats.org/markup-compatibility/2006" val="SMDATA_15_l3DXYhMAAAAlAAAAZAAAAA8BAAAAkAAAAEgAAACQAAAASAAAAAAAAAAAAAAAAAAAAAEAAABQAAAAAAAAAAAA4D8AAAAAAADgPwAAAAAAAOA/AAAAAAAA4D8AAAAAAADgPwAAAAAAAOA/AAAAAAAA4D8AAAAAAADgPwAAAAAAAOA/AAAAAAAA4D8CAAAAjAAAAAAAAAAAAAAAADOZDCYmJggAAAAAAAAAAAAAAAAAAAAAAAAAAAAAAAAAAAAAZAAAAAEAAABAAAAAAAAAAAAAAAAAAAAAAAAAAAAAAAAAAAAAAAAAAAAAAAAAAAAAAAAAAAAAAAAAAAAAAAAAAAAAAAAAAAAAAAAAAAAAAAAAAAAAAAAAAAAAAAAAAAAAFAAAADwAAAAAAAAAAAAAAP///wkUAAAAAQAAABQAAAAUAAAAFAAAAAEAAAAAAAAAZAAAAGQAAAAAAAAAZAAAAGQAAAAVAAAAYAAAAAAAAAAAAAAADwAAACADAAAAAAAAAAAAAAEAAACgMgAAVgcAAKr4//8BAAAAf39/AAEAAABkAAAAAAAAABQAAABAHwAAAAAAACYAAAAAAAAAwOD//wAAAAAmAAAAZAAAABYAAABMAAAAAAAAAAAAAAAEAAAAAAAAAAEAAAAzZpkKAAAAACgAAAAoAAAAZAAAAGQAAAAAAAAAzMzMAAAAAABQAAAAUAAAAGQAAABkAAAAAAAAABcAAAAUAAAAAAAAAAAAAAD/fwAA/38AAAAAAAAJAAAABAAAAAAAAAAeAAAAaAAAAAAAAAAAAAAAAAAAAAAAAAAAAAAAECcAABAnAAAAAAAAAAAAAAAAAAAAAAAAAAAAAAAAAAAAAAAAAAAAABQAAAAAAAAAwMD/AAAAAABkAAAAMgAAAAAAAABkAAAAAAAAAH9/fwAKAAAAIgAAABgAAAAAAAAAAAAAAAAAAAAAAAAAAAAAAAAAAAAkAAAAJAAAAAAAAAAHAAAAAAAAAAAAAAAAAAAAAAAAAAAAAAAAAAAAf39/ACUAAABYAAAAAAAAAAAAAAAAAAAAAAAAAAAAAAAAAAAAAAAAAAAAAAAAAAAAAAAAAAAAAAA/AAAAAAAAAKCGAQAAAAAAAAAAAAAAAAAMAAAAAQAAAAAAAAAAAAAAAAAAAB8AAABUAAAAAAAABQAAAAEAAAAAAAAAAAAAAAAAAAAAAAAAAAAAAAAAAAAAAAAAAAAAAAJ/f38AAAAAA8zMzADAwP8Af39/AAAAAAAAAAAAAAAAAAAAAAAAAAAAIQAAABgAAAAUAAAAwAMAANgJAABARwAAsCUAAAAAAAAmAAAACAAAAAEAAAAAAAAA"/>
               </a:ext>
             </a:extLst>
           </p:cNvSpPr>
@@ -7142,7 +7155,7 @@
           <a:p>
             <a:fld id="{2B84B1DC-92C6-D147-883C-6412FF727E31}" type="datetime1">
               <a:rPr lang="pt-BR" smtClean="0"/>
-              <a:t>21/07/2022</a:t>
+              <a:t>26/07/2022</a:t>
             </a:fld>
             <a:endParaRPr lang="pt-BR"/>
           </a:p>
@@ -7343,7 +7356,7 @@
           <a:p>
             <a:fld id="{2B84B1DC-92C6-D147-883C-6412FF727E31}" type="datetime1">
               <a:rPr lang="pt-BR" smtClean="0"/>
-              <a:t>21/07/2022</a:t>
+              <a:t>26/07/2022</a:t>
             </a:fld>
             <a:endParaRPr lang="pt-BR"/>
           </a:p>
@@ -7487,7 +7500,7 @@
           <a:p>
             <a:fld id="{2B84B1DC-92C6-D147-883C-6412FF727E31}" type="datetime1">
               <a:rPr lang="pt-BR" smtClean="0"/>
-              <a:t>21/07/2022</a:t>
+              <a:t>26/07/2022</a:t>
             </a:fld>
             <a:endParaRPr lang="pt-BR"/>
           </a:p>
@@ -7644,7 +7657,7 @@
           <a:p>
             <a:fld id="{2B84B1DC-92C6-D147-883C-6412FF727E31}" type="datetime1">
               <a:rPr lang="pt-BR" smtClean="0"/>
-              <a:t>21/07/2022</a:t>
+              <a:t>26/07/2022</a:t>
             </a:fld>
             <a:endParaRPr lang="pt-BR"/>
           </a:p>
@@ -7835,7 +7848,7 @@
           <a:p>
             <a:fld id="{2B84B1DC-92C6-D147-883C-6412FF727E31}" type="datetime1">
               <a:rPr lang="pt-BR" smtClean="0"/>
-              <a:t>21/07/2022</a:t>
+              <a:t>26/07/2022</a:t>
             </a:fld>
             <a:endParaRPr lang="pt-BR"/>
           </a:p>
@@ -8071,7 +8084,7 @@
           <a:p>
             <a:fld id="{2B84B1DC-92C6-D147-883C-6412FF727E31}" type="datetime1">
               <a:rPr lang="pt-BR" smtClean="0"/>
-              <a:t>21/07/2022</a:t>
+              <a:t>26/07/2022</a:t>
             </a:fld>
             <a:endParaRPr lang="pt-BR"/>
           </a:p>
@@ -8241,7 +8254,7 @@
           <a:p>
             <a:fld id="{2B84B1DC-92C6-D147-883C-6412FF727E31}" type="datetime1">
               <a:rPr lang="pt-BR" smtClean="0"/>
-              <a:t>21/07/2022</a:t>
+              <a:t>26/07/2022</a:t>
             </a:fld>
             <a:endParaRPr lang="pt-BR"/>
           </a:p>
@@ -8409,7 +8422,7 @@
           <a:p>
             <a:fld id="{2B84B1DC-92C6-D147-883C-6412FF727E31}" type="datetime1">
               <a:rPr lang="pt-BR" smtClean="0"/>
-              <a:t>21/07/2022</a:t>
+              <a:t>26/07/2022</a:t>
             </a:fld>
             <a:endParaRPr lang="pt-BR"/>
           </a:p>
@@ -8614,7 +8627,7 @@
           <a:p>
             <a:fld id="{2B84B1DC-92C6-D147-883C-6412FF727E31}" type="datetime1">
               <a:rPr lang="pt-BR" smtClean="0"/>
-              <a:t>21/07/2022</a:t>
+              <a:t>26/07/2022</a:t>
             </a:fld>
             <a:endParaRPr lang="pt-BR"/>
           </a:p>
@@ -8775,7 +8788,7 @@
           <a:p>
             <a:fld id="{2B84B1DC-92C6-D147-883C-6412FF727E31}" type="datetime1">
               <a:rPr lang="pt-BR" smtClean="0"/>
-              <a:t>21/07/2022</a:t>
+              <a:t>26/07/2022</a:t>
             </a:fld>
             <a:endParaRPr lang="pt-BR"/>
           </a:p>
@@ -8847,7 +8860,7 @@
             <a:spLocks noGrp="1" noChangeArrowheads="1"/>
             <a:extLst>
               <a:ext uri="smNativeData">
-                <pr:smNativeData xmlns:mc="http://schemas.openxmlformats.org/markup-compatibility/2006" xmlns:p14="http://schemas.microsoft.com/office/powerpoint/2010/main" xmlns:p15="http://schemas.microsoft.com/office/powerpoint/2012/main" xmlns:pr="smNativeData" xmlns="smNativeData" val="SMDATA_15_l3DXYhMAAAAlAAAAZAAAAA8BAAAAkAAAAEgAAACQAAAASAAAAAAAAAABAAAAAAAAAAEAAABQAAAAAAAAAAAA4D8AAAAAAADgPwAAAAAAAOA/AAAAAAAA4D8AAAAAAADgPwAAAAAAAOA/AAAAAAAA4D8AAAAAAADgPwAAAAAAAOA/AAAAAAAA4D8CAAAAjAAAAAAAAAAAAAAAADOZDCYmJggAAAAAAAAAAAAAAAAAAAAAAAAAAAAAAAAAAAAAZAAAAAEAAABAAAAAAAAAAAAAAAAAAAAAAAAAAAAAAAAAAAAAAAAAAAAAAAAAAAAAAAAAAAAAAAAAAAAAAAAAAAAAAAAAAAAAAAAAAAAAAAAAAAAAAAAAAAAAAAAAAAAAFAAAADwAAAAAAAAAAAAAAP///wkUAAAAAQAAABQAAAAUAAAAFAAAAAEAAAAAAAAAZAAAAGQAAAAAAAAAZAAAAGQAAAAVAAAAYAAAAAAAAAAAAAAADwAAACADAAAAAAAAAAAAAAEAAACgMgAAVgcAAKr4//8BAAAAf39/AAEAAABkAAAAAAAAABQAAABAHwAAAAAAACYAAAAAAAAAwOD//wAAAAAmAAAAZAAAABYAAABMAAAAAAAAAAAAAAAEAAAAAAAAAAEAAAAzZpkKAAAAACgAAAAoAAAAZAAAAGQAAAAAAAAAzMzMAAAAAABQAAAAUAAAAGQAAABkAAAAAAAAABcAAAAUAAAAAAAAAAAAAAD/fwAA/38AAAAAAAAJAAAABAAAAAAAAAAeAAAAaAAAAAAAAAAAAAAAAAAAAAAAAAAAAAAAECcAABAnAAAAAAAAAAAAAAAAAAAAAAAAAAAAAAAAAAAAAAAAAAAAABQAAAAAAAAAwMD/AAAAAABkAAAAMgAAAAAAAABkAAAAAAAAAH9/fwAKAAAAIgAAABgAAAAAAAAAAAAAAAAAAAAAAAAAAAAAAAAAAAAkAAAAJAAAAAAAAAAHAAAAAAAAAAAAAAAAAAAAAAAAAAAAAAAAAAAAf39/ACUAAABYAAAAAAAAAAAAAAAAAAAAAAAAAAAAAAAAAAAAAAAAAAAAAAAAAAAAAAAAAAAAAAA/AAAAAAAAAKCGAQAAAAAAAAAAAAAAAAAMAAAAAQAAAAAAAAAAAAAAAAAAAB8AAABUAAAAAAAABQAAAAEAAAAAAAAAAAAAAAAAAAAAAAAAAAAAAAAAAAAAAAAAAAAAAAJ/f38AAAAAA8zMzADAwP8Af39/AAAAAAAAAAAAAAAAAAAAAAAAAAAAIQAAABgAAAAUAAAAwAMAALABAABARwAAuAgAAAAAAAAmAAAACAAAAAEAAAAAAAAA"/>
+                <pr:smNativeData xmlns="smNativeData" xmlns:pr="smNativeData" xmlns:p15="http://schemas.microsoft.com/office/powerpoint/2012/main" xmlns:p14="http://schemas.microsoft.com/office/powerpoint/2010/main" xmlns:mc="http://schemas.openxmlformats.org/markup-compatibility/2006" val="SMDATA_15_l3DXYhMAAAAlAAAAZAAAAA8BAAAAkAAAAEgAAACQAAAASAAAAAAAAAABAAAAAAAAAAEAAABQAAAAAAAAAAAA4D8AAAAAAADgPwAAAAAAAOA/AAAAAAAA4D8AAAAAAADgPwAAAAAAAOA/AAAAAAAA4D8AAAAAAADgPwAAAAAAAOA/AAAAAAAA4D8CAAAAjAAAAAAAAAAAAAAAADOZDCYmJggAAAAAAAAAAAAAAAAAAAAAAAAAAAAAAAAAAAAAZAAAAAEAAABAAAAAAAAAAAAAAAAAAAAAAAAAAAAAAAAAAAAAAAAAAAAAAAAAAAAAAAAAAAAAAAAAAAAAAAAAAAAAAAAAAAAAAAAAAAAAAAAAAAAAAAAAAAAAAAAAAAAAFAAAADwAAAAAAAAAAAAAAP///wkUAAAAAQAAABQAAAAUAAAAFAAAAAEAAAAAAAAAZAAAAGQAAAAAAAAAZAAAAGQAAAAVAAAAYAAAAAAAAAAAAAAADwAAACADAAAAAAAAAAAAAAEAAACgMgAAVgcAAKr4//8BAAAAf39/AAEAAABkAAAAAAAAABQAAABAHwAAAAAAACYAAAAAAAAAwOD//wAAAAAmAAAAZAAAABYAAABMAAAAAAAAAAAAAAAEAAAAAAAAAAEAAAAzZpkKAAAAACgAAAAoAAAAZAAAAGQAAAAAAAAAzMzMAAAAAABQAAAAUAAAAGQAAABkAAAAAAAAABcAAAAUAAAAAAAAAAAAAAD/fwAA/38AAAAAAAAJAAAABAAAAAAAAAAeAAAAaAAAAAAAAAAAAAAAAAAAAAAAAAAAAAAAECcAABAnAAAAAAAAAAAAAAAAAAAAAAAAAAAAAAAAAAAAAAAAAAAAABQAAAAAAAAAwMD/AAAAAABkAAAAMgAAAAAAAABkAAAAAAAAAH9/fwAKAAAAIgAAABgAAAAAAAAAAAAAAAAAAAAAAAAAAAAAAAAAAAAkAAAAJAAAAAAAAAAHAAAAAAAAAAAAAAAAAAAAAAAAAAAAAAAAAAAAf39/ACUAAABYAAAAAAAAAAAAAAAAAAAAAAAAAAAAAAAAAAAAAAAAAAAAAAAAAAAAAAAAAAAAAAA/AAAAAAAAAKCGAQAAAAAAAAAAAAAAAAAMAAAAAQAAAAAAAAAAAAAAAAAAAB8AAABUAAAAAAAABQAAAAEAAAAAAAAAAAAAAAAAAAAAAAAAAAAAAAAAAAAAAAAAAAAAAAJ/f38AAAAAA8zMzADAwP8Af39/AAAAAAAAAAAAAAAAAAAAAAAAAAAAIQAAABgAAAAUAAAAwAMAALABAABARwAAuAgAAAAAAAAmAAAACAAAAAEAAAAAAAAA"/>
               </a:ext>
             </a:extLst>
           </p:cNvSpPr>
@@ -8878,7 +8891,7 @@
             <a:spLocks noGrp="1" noChangeArrowheads="1"/>
             <a:extLst>
               <a:ext uri="smNativeData">
-                <pr:smNativeData xmlns:mc="http://schemas.openxmlformats.org/markup-compatibility/2006" xmlns:p14="http://schemas.microsoft.com/office/powerpoint/2010/main" xmlns:p15="http://schemas.microsoft.com/office/powerpoint/2012/main" xmlns:pr="smNativeData" xmlns="smNativeData" val="SMDATA_15_l3DXYhMAAAAlAAAAZAAAAA8BAAAAkAAAAEgAAACQAAAASAAAAAAAAAAAAAAAAAAAAAEAAABQAAAAAAAAAAAA4D8AAAAAAADgPwAAAAAAAOA/AAAAAAAA4D8AAAAAAADgPwAAAAAAAOA/AAAAAAAA4D8AAAAAAADgPwAAAAAAAOA/AAAAAAAA4D8CAAAAjAAAAAAAAAAAAAAAADOZDCYmJggAAAAAAAAAAAAAAAAAAAAAAAAAAAAAAAAAAAAAZAAAAAEAAABAAAAAAAAAAAAAAAAAAAAAAAAAAAAAAAAAAAAAAAAAAAAAAAAAAAAAAAAAAAAAAAAAAAAAAAAAAAAAAAAAAAAAAAAAAAAAAAAAAAAAAAAAAAAAAAAAAAAAFAAAADwAAAAAAAAAAAAAAP///wkUAAAAAQAAABQAAAAUAAAAFAAAAAEAAAAAAAAAZAAAAGQAAAAAAAAAZAAAAGQAAAAVAAAAYAAAAAAAAAAAAAAADwAAACADAAAAAAAAAAAAAAEAAACgMgAAVgcAAKr4//8BAAAAf39/AAEAAABkAAAAAAAAABQAAABAHwAAAAAAACYAAAAAAAAAwOD//wAAAAAmAAAAZAAAABYAAABMAAAAAAAAAAAAAAAEAAAAAAAAAAEAAAAzZpkKAAAAACgAAAAoAAAAZAAAAGQAAAAAAAAAzMzMAAAAAABQAAAAUAAAAGQAAABkAAAAAAAAABcAAAAUAAAAAAAAAAAAAAD/fwAA/38AAAAAAAAJAAAABAAAAF8AYAAeAAAAaAAAAAAAAAAAAAAAAAAAAAAAAAAAAAAAECcAABAnAAAAAAAAAAAAAAAAAAAAAAAAAAAAAAAAAAAAAAAAAAAAABQAAAAAAAAAwMD/AAAAAABkAAAAMgAAAAAAAABkAAAAAAAAAH9/fwAKAAAAIgAAABgAAAAAAAAAAAAAAAAAAAAAAAAAAAAAAAAAAAAkAAAAJAAAAAAAAAAHAAAAAAAAAAAAAAAAAAAAAAAAAAAAAAAAAAAAf39/ACUAAABYAAAAAAAAAAAAAAAAAAAAAAAAAAAAAAAAAAAAAAAAAAAAAAAAAAAAAAAAAAAAAAA/AAAAAAAAAKCGAQAAAAAAAAAAAAAAAAAMAAAAAQAAAAAAAAAAAAAAAAAAAB8AAABUAAAAAAAABQAAAAEAAAAAAAAAAAAAAAAAAAAAAAAAAAAAAAAAAAAAAAAAAAAAAAJ/f38AAAAAA8zMzADAwP8Af39/AAAAAAAAAAAAAAAAAAAAAAAAAAAAIQAAABgAAAAUAAAAwAMAANgJAABARwAAsCUAAAAAAAAmAAAACAAAAAEAAAAAAAAA"/>
+                <pr:smNativeData xmlns="smNativeData" xmlns:pr="smNativeData" xmlns:p15="http://schemas.microsoft.com/office/powerpoint/2012/main" xmlns:p14="http://schemas.microsoft.com/office/powerpoint/2010/main" xmlns:mc="http://schemas.openxmlformats.org/markup-compatibility/2006" val="SMDATA_15_l3DXYhMAAAAlAAAAZAAAAA8BAAAAkAAAAEgAAACQAAAASAAAAAAAAAAAAAAAAAAAAAEAAABQAAAAAAAAAAAA4D8AAAAAAADgPwAAAAAAAOA/AAAAAAAA4D8AAAAAAADgPwAAAAAAAOA/AAAAAAAA4D8AAAAAAADgPwAAAAAAAOA/AAAAAAAA4D8CAAAAjAAAAAAAAAAAAAAAADOZDCYmJggAAAAAAAAAAAAAAAAAAAAAAAAAAAAAAAAAAAAAZAAAAAEAAABAAAAAAAAAAAAAAAAAAAAAAAAAAAAAAAAAAAAAAAAAAAAAAAAAAAAAAAAAAAAAAAAAAAAAAAAAAAAAAAAAAAAAAAAAAAAAAAAAAAAAAAAAAAAAAAAAAAAAFAAAADwAAAAAAAAAAAAAAP///wkUAAAAAQAAABQAAAAUAAAAFAAAAAEAAAAAAAAAZAAAAGQAAAAAAAAAZAAAAGQAAAAVAAAAYAAAAAAAAAAAAAAADwAAACADAAAAAAAAAAAAAAEAAACgMgAAVgcAAKr4//8BAAAAf39/AAEAAABkAAAAAAAAABQAAABAHwAAAAAAACYAAAAAAAAAwOD//wAAAAAmAAAAZAAAABYAAABMAAAAAAAAAAAAAAAEAAAAAAAAAAEAAAAzZpkKAAAAACgAAAAoAAAAZAAAAGQAAAAAAAAAzMzMAAAAAABQAAAAUAAAAGQAAABkAAAAAAAAABcAAAAUAAAAAAAAAAAAAAD/fwAA/38AAAAAAAAJAAAABAAAAF8AYAAeAAAAaAAAAAAAAAAAAAAAAAAAAAAAAAAAAAAAECcAABAnAAAAAAAAAAAAAAAAAAAAAAAAAAAAAAAAAAAAAAAAAAAAABQAAAAAAAAAwMD/AAAAAABkAAAAMgAAAAAAAABkAAAAAAAAAH9/fwAKAAAAIgAAABgAAAAAAAAAAAAAAAAAAAAAAAAAAAAAAAAAAAAkAAAAJAAAAAAAAAAHAAAAAAAAAAAAAAAAAAAAAAAAAAAAAAAAAAAAf39/ACUAAABYAAAAAAAAAAAAAAAAAAAAAAAAAAAAAAAAAAAAAAAAAAAAAAAAAAAAAAAAAAAAAAA/AAAAAAAAAKCGAQAAAAAAAAAAAAAAAAAMAAAAAQAAAAAAAAAAAAAAAAAAAB8AAABUAAAAAAAABQAAAAEAAAAAAAAAAAAAAAAAAAAAAAAAAAAAAAAAAAAAAAAAAAAAAAJ/f38AAAAAA8zMzADAwP8Af39/AAAAAAAAAAAAAAAAAAAAAAAAAAAAIQAAABgAAAAUAAAAwAMAANgJAABARwAAsCUAAAAAAAAmAAAACAAAAAEAAAAAAAAA"/>
               </a:ext>
             </a:extLst>
           </p:cNvSpPr>
@@ -9025,7 +9038,7 @@
           <a:p>
             <a:fld id="{2B84B1DC-92C6-D147-883C-6412FF727E31}" type="datetime1">
               <a:rPr lang="pt-BR" smtClean="0"/>
-              <a:t>21/07/2022</a:t>
+              <a:t>26/07/2022</a:t>
             </a:fld>
             <a:endParaRPr lang="pt-BR"/>
           </a:p>
@@ -9213,7 +9226,7 @@
           <a:p>
             <a:fld id="{2B84B1DC-92C6-D147-883C-6412FF727E31}" type="datetime1">
               <a:rPr lang="pt-BR" smtClean="0"/>
-              <a:t>21/07/2022</a:t>
+              <a:t>26/07/2022</a:t>
             </a:fld>
             <a:endParaRPr lang="pt-BR"/>
           </a:p>
@@ -9447,7 +9460,7 @@
           <a:p>
             <a:fld id="{2B84B1DC-92C6-D147-883C-6412FF727E31}" type="datetime1">
               <a:rPr lang="pt-BR" smtClean="0"/>
-              <a:t>21/07/2022</a:t>
+              <a:t>26/07/2022</a:t>
             </a:fld>
             <a:endParaRPr lang="pt-BR"/>
           </a:p>
@@ -9784,7 +9797,7 @@
           <a:p>
             <a:fld id="{2B84B1DC-92C6-D147-883C-6412FF727E31}" type="datetime1">
               <a:rPr lang="pt-BR" smtClean="0"/>
-              <a:t>21/07/2022</a:t>
+              <a:t>26/07/2022</a:t>
             </a:fld>
             <a:endParaRPr lang="pt-BR"/>
           </a:p>
@@ -9981,7 +9994,7 @@
           <a:p>
             <a:fld id="{2B84B1DC-92C6-D147-883C-6412FF727E31}" type="datetime1">
               <a:rPr lang="pt-BR" smtClean="0"/>
-              <a:t>21/07/2022</a:t>
+              <a:t>26/07/2022</a:t>
             </a:fld>
             <a:endParaRPr lang="pt-BR"/>
           </a:p>
@@ -10162,7 +10175,7 @@
           <a:p>
             <a:fld id="{2B84B1DC-92C6-D147-883C-6412FF727E31}" type="datetime1">
               <a:rPr lang="pt-BR" smtClean="0"/>
-              <a:t>21/07/2022</a:t>
+              <a:t>26/07/2022</a:t>
             </a:fld>
             <a:endParaRPr lang="pt-BR"/>
           </a:p>
@@ -10776,7 +10789,7 @@
           <a:p>
             <a:fld id="{2B84B1DC-92C6-D147-883C-6412FF727E31}" type="datetime1">
               <a:rPr lang="pt-BR" smtClean="0"/>
-              <a:t>21/07/2022</a:t>
+              <a:t>26/07/2022</a:t>
             </a:fld>
             <a:endParaRPr lang="pt-BR"/>
           </a:p>
@@ -10962,7 +10975,7 @@
           <a:p>
             <a:fld id="{2B84B1DC-92C6-D147-883C-6412FF727E31}" type="datetime1">
               <a:rPr lang="pt-BR" smtClean="0"/>
-              <a:t>21/07/2022</a:t>
+              <a:t>26/07/2022</a:t>
             </a:fld>
             <a:endParaRPr lang="pt-BR"/>
           </a:p>
@@ -11001,6 +11014,399 @@
     <p:extLst>
       <p:ext uri="{BB962C8B-B14F-4D97-AF65-F5344CB8AC3E}">
         <p14:creationId xmlns:p14="http://schemas.microsoft.com/office/powerpoint/2010/main" val="1619873617"/>
+      </p:ext>
+    </p:extLst>
+  </p:cSld>
+  <p:clrMapOvr>
+    <a:masterClrMapping/>
+  </p:clrMapOvr>
+</p:sld>
+</file>
+
+<file path=ppt/slides/slide38.xml><?xml version="1.0" encoding="utf-8"?>
+<p:sld xmlns:a="http://schemas.openxmlformats.org/drawingml/2006/main" xmlns:r="http://schemas.openxmlformats.org/officeDocument/2006/relationships" xmlns:p="http://schemas.openxmlformats.org/presentationml/2006/main">
+  <p:cSld>
+    <p:spTree>
+      <p:nvGrpSpPr>
+        <p:cNvPr id="1" name=""/>
+        <p:cNvGrpSpPr/>
+        <p:nvPr/>
+      </p:nvGrpSpPr>
+      <p:grpSpPr>
+        <a:xfrm>
+          <a:off x="0" y="0"/>
+          <a:ext cx="0" cy="0"/>
+          <a:chOff x="0" y="0"/>
+          <a:chExt cx="0" cy="0"/>
+        </a:xfrm>
+      </p:grpSpPr>
+      <p:sp>
+        <p:nvSpPr>
+          <p:cNvPr id="2" name="Título 1">
+            <a:extLst>
+              <a:ext uri="{FF2B5EF4-FFF2-40B4-BE49-F238E27FC236}">
+                <a16:creationId xmlns:a16="http://schemas.microsoft.com/office/drawing/2014/main" id="{BC61D538-20A0-C97A-E90D-35EE8FCC8D30}"/>
+              </a:ext>
+            </a:extLst>
+          </p:cNvPr>
+          <p:cNvSpPr>
+            <a:spLocks noGrp="1"/>
+          </p:cNvSpPr>
+          <p:nvPr>
+            <p:ph type="title"/>
+          </p:nvPr>
+        </p:nvSpPr>
+        <p:spPr/>
+        <p:txBody>
+          <a:bodyPr/>
+          <a:lstStyle/>
+          <a:p>
+            <a:r>
+              <a:rPr lang="pt-BR" dirty="0"/>
+              <a:t>Clean </a:t>
+            </a:r>
+            <a:r>
+              <a:rPr lang="pt-BR" dirty="0" err="1"/>
+              <a:t>Architecture</a:t>
+            </a:r>
+            <a:endParaRPr lang="pt-BR" dirty="0"/>
+          </a:p>
+        </p:txBody>
+      </p:sp>
+      <p:sp>
+        <p:nvSpPr>
+          <p:cNvPr id="3" name="Espaço Reservado para Conteúdo 2">
+            <a:extLst>
+              <a:ext uri="{FF2B5EF4-FFF2-40B4-BE49-F238E27FC236}">
+                <a16:creationId xmlns:a16="http://schemas.microsoft.com/office/drawing/2014/main" id="{8F78C7F7-31D1-B84F-6FD1-58114147E1CC}"/>
+              </a:ext>
+            </a:extLst>
+          </p:cNvPr>
+          <p:cNvSpPr>
+            <a:spLocks noGrp="1"/>
+          </p:cNvSpPr>
+          <p:nvPr>
+            <p:ph idx="1"/>
+          </p:nvPr>
+        </p:nvSpPr>
+        <p:spPr/>
+        <p:txBody>
+          <a:bodyPr/>
+          <a:lstStyle/>
+          <a:p>
+            <a:pPr marL="0" indent="0" algn="l">
+              <a:buNone/>
+            </a:pPr>
+            <a:r>
+              <a:rPr lang="pt-BR" b="0" i="0" dirty="0">
+                <a:effectLst/>
+                <a:latin typeface="sohne"/>
+              </a:rPr>
+              <a:t>Arquitetura Limpa é o modelo de um sistema modular, que segue estritamente o princípio de design chamado </a:t>
+            </a:r>
+            <a:r>
+              <a:rPr lang="pt-BR" b="0" i="0" dirty="0">
+                <a:solidFill>
+                  <a:schemeClr val="bg1"/>
+                </a:solidFill>
+                <a:effectLst/>
+                <a:highlight>
+                  <a:srgbClr val="FFFF00"/>
+                </a:highlight>
+                <a:latin typeface="sohne"/>
+              </a:rPr>
+              <a:t>separação de preocupações. </a:t>
+            </a:r>
+          </a:p>
+          <a:p>
+            <a:pPr marL="0" indent="0" algn="l">
+              <a:buNone/>
+            </a:pPr>
+            <a:endParaRPr lang="pt-BR" dirty="0">
+              <a:latin typeface="sohne"/>
+            </a:endParaRPr>
+          </a:p>
+          <a:p>
+            <a:pPr marL="0" indent="0" algn="l">
+              <a:buNone/>
+            </a:pPr>
+            <a:r>
+              <a:rPr lang="pt-BR" b="0" i="0" dirty="0">
+                <a:effectLst/>
+                <a:latin typeface="sohne"/>
+              </a:rPr>
+              <a:t>Mais especificamente, esse estilo de arquitetura se concentra em </a:t>
+            </a:r>
+            <a:r>
+              <a:rPr lang="pt-BR" b="0" i="0" dirty="0">
+                <a:solidFill>
+                  <a:schemeClr val="bg1"/>
+                </a:solidFill>
+                <a:effectLst/>
+                <a:highlight>
+                  <a:srgbClr val="FFFF00"/>
+                </a:highlight>
+                <a:latin typeface="sohne"/>
+              </a:rPr>
+              <a:t>dividir o software em camadas</a:t>
+            </a:r>
+            <a:r>
+              <a:rPr lang="pt-BR" b="0" i="0" dirty="0">
+                <a:effectLst/>
+                <a:latin typeface="sohne"/>
+              </a:rPr>
+              <a:t>, para simplificar o desenvolvimento e </a:t>
+            </a:r>
+            <a:r>
+              <a:rPr lang="pt-BR" b="0" i="0" dirty="0">
+                <a:solidFill>
+                  <a:schemeClr val="bg1"/>
+                </a:solidFill>
+                <a:effectLst/>
+                <a:highlight>
+                  <a:srgbClr val="FFFF00"/>
+                </a:highlight>
+                <a:latin typeface="sohne"/>
+              </a:rPr>
+              <a:t>manutenção </a:t>
+            </a:r>
+            <a:r>
+              <a:rPr lang="pt-BR" b="0" i="0" dirty="0">
+                <a:effectLst/>
+                <a:latin typeface="sohne"/>
+              </a:rPr>
+              <a:t>do próprio sistema.</a:t>
+            </a:r>
+          </a:p>
+        </p:txBody>
+      </p:sp>
+      <p:sp>
+        <p:nvSpPr>
+          <p:cNvPr id="4" name="Espaço Reservado para Data 3">
+            <a:extLst>
+              <a:ext uri="{FF2B5EF4-FFF2-40B4-BE49-F238E27FC236}">
+                <a16:creationId xmlns:a16="http://schemas.microsoft.com/office/drawing/2014/main" id="{C1AB8503-4384-3550-F187-6072BE273191}"/>
+              </a:ext>
+            </a:extLst>
+          </p:cNvPr>
+          <p:cNvSpPr>
+            <a:spLocks noGrp="1"/>
+          </p:cNvSpPr>
+          <p:nvPr>
+            <p:ph type="dt" sz="quarter" idx="10"/>
+          </p:nvPr>
+        </p:nvSpPr>
+        <p:spPr/>
+        <p:txBody>
+          <a:bodyPr/>
+          <a:lstStyle/>
+          <a:p>
+            <a:fld id="{2B84B1DC-92C6-D147-883C-6412FF727E31}" type="datetime1">
+              <a:rPr lang="pt-BR" smtClean="0"/>
+              <a:t>26/07/2022</a:t>
+            </a:fld>
+            <a:endParaRPr lang="pt-BR"/>
+          </a:p>
+        </p:txBody>
+      </p:sp>
+      <p:sp>
+        <p:nvSpPr>
+          <p:cNvPr id="5" name="Espaço Reservado para Número de Slide 4">
+            <a:extLst>
+              <a:ext uri="{FF2B5EF4-FFF2-40B4-BE49-F238E27FC236}">
+                <a16:creationId xmlns:a16="http://schemas.microsoft.com/office/drawing/2014/main" id="{A72EFC6C-CB9E-0FBC-5454-476B88CA26BC}"/>
+              </a:ext>
+            </a:extLst>
+          </p:cNvPr>
+          <p:cNvSpPr>
+            <a:spLocks noGrp="1"/>
+          </p:cNvSpPr>
+          <p:nvPr>
+            <p:ph type="sldNum" sz="quarter" idx="12"/>
+          </p:nvPr>
+        </p:nvSpPr>
+        <p:spPr/>
+        <p:txBody>
+          <a:bodyPr/>
+          <a:lstStyle/>
+          <a:p>
+            <a:fld id="{2B84FD90-DEC6-D10B-883C-285EB3727E7D}" type="slidenum">
+              <a:rPr lang="pt-BR" smtClean="0"/>
+              <a:t>38</a:t>
+            </a:fld>
+            <a:endParaRPr lang="pt-BR"/>
+          </a:p>
+        </p:txBody>
+      </p:sp>
+    </p:spTree>
+    <p:extLst>
+      <p:ext uri="{BB962C8B-B14F-4D97-AF65-F5344CB8AC3E}">
+        <p14:creationId xmlns:p14="http://schemas.microsoft.com/office/powerpoint/2010/main" val="3535117708"/>
+      </p:ext>
+    </p:extLst>
+  </p:cSld>
+  <p:clrMapOvr>
+    <a:masterClrMapping/>
+  </p:clrMapOvr>
+</p:sld>
+</file>
+
+<file path=ppt/slides/slide39.xml><?xml version="1.0" encoding="utf-8"?>
+<p:sld xmlns:a="http://schemas.openxmlformats.org/drawingml/2006/main" xmlns:r="http://schemas.openxmlformats.org/officeDocument/2006/relationships" xmlns:p="http://schemas.openxmlformats.org/presentationml/2006/main">
+  <p:cSld>
+    <p:spTree>
+      <p:nvGrpSpPr>
+        <p:cNvPr id="1" name=""/>
+        <p:cNvGrpSpPr/>
+        <p:nvPr/>
+      </p:nvGrpSpPr>
+      <p:grpSpPr>
+        <a:xfrm>
+          <a:off x="0" y="0"/>
+          <a:ext cx="0" cy="0"/>
+          <a:chOff x="0" y="0"/>
+          <a:chExt cx="0" cy="0"/>
+        </a:xfrm>
+      </p:grpSpPr>
+      <p:sp>
+        <p:nvSpPr>
+          <p:cNvPr id="2" name="Título 1">
+            <a:extLst>
+              <a:ext uri="{FF2B5EF4-FFF2-40B4-BE49-F238E27FC236}">
+                <a16:creationId xmlns:a16="http://schemas.microsoft.com/office/drawing/2014/main" id="{02E636EB-A61C-B241-07D8-15AECB71D2A6}"/>
+              </a:ext>
+            </a:extLst>
+          </p:cNvPr>
+          <p:cNvSpPr>
+            <a:spLocks noGrp="1"/>
+          </p:cNvSpPr>
+          <p:nvPr>
+            <p:ph type="title"/>
+          </p:nvPr>
+        </p:nvSpPr>
+        <p:spPr/>
+        <p:txBody>
+          <a:bodyPr/>
+          <a:lstStyle/>
+          <a:p>
+            <a:r>
+              <a:rPr lang="pt-BR" dirty="0"/>
+              <a:t>Regras de dependência</a:t>
+            </a:r>
+          </a:p>
+        </p:txBody>
+      </p:sp>
+      <p:sp>
+        <p:nvSpPr>
+          <p:cNvPr id="4" name="Espaço Reservado para Data 3">
+            <a:extLst>
+              <a:ext uri="{FF2B5EF4-FFF2-40B4-BE49-F238E27FC236}">
+                <a16:creationId xmlns:a16="http://schemas.microsoft.com/office/drawing/2014/main" id="{B54410F5-D060-A20D-491E-3E504C734E8D}"/>
+              </a:ext>
+            </a:extLst>
+          </p:cNvPr>
+          <p:cNvSpPr>
+            <a:spLocks noGrp="1"/>
+          </p:cNvSpPr>
+          <p:nvPr>
+            <p:ph type="dt" sz="quarter" idx="10"/>
+          </p:nvPr>
+        </p:nvSpPr>
+        <p:spPr/>
+        <p:txBody>
+          <a:bodyPr/>
+          <a:lstStyle/>
+          <a:p>
+            <a:fld id="{2B84B1DC-92C6-D147-883C-6412FF727E31}" type="datetime1">
+              <a:rPr lang="pt-BR" smtClean="0"/>
+              <a:t>26/07/2022</a:t>
+            </a:fld>
+            <a:endParaRPr lang="pt-BR"/>
+          </a:p>
+        </p:txBody>
+      </p:sp>
+      <p:sp>
+        <p:nvSpPr>
+          <p:cNvPr id="5" name="Espaço Reservado para Número de Slide 4">
+            <a:extLst>
+              <a:ext uri="{FF2B5EF4-FFF2-40B4-BE49-F238E27FC236}">
+                <a16:creationId xmlns:a16="http://schemas.microsoft.com/office/drawing/2014/main" id="{7D5BDB2F-6C8A-72CF-EEB3-A7C93A9DEDFB}"/>
+              </a:ext>
+            </a:extLst>
+          </p:cNvPr>
+          <p:cNvSpPr>
+            <a:spLocks noGrp="1"/>
+          </p:cNvSpPr>
+          <p:nvPr>
+            <p:ph type="sldNum" sz="quarter" idx="12"/>
+          </p:nvPr>
+        </p:nvSpPr>
+        <p:spPr/>
+        <p:txBody>
+          <a:bodyPr/>
+          <a:lstStyle/>
+          <a:p>
+            <a:fld id="{2B84FD90-DEC6-D10B-883C-285EB3727E7D}" type="slidenum">
+              <a:rPr lang="pt-BR" smtClean="0"/>
+              <a:t>39</a:t>
+            </a:fld>
+            <a:endParaRPr lang="pt-BR"/>
+          </a:p>
+        </p:txBody>
+      </p:sp>
+      <p:pic>
+        <p:nvPicPr>
+          <p:cNvPr id="1026" name="Picture 2" descr="Developing iOS applications with Uncle Bob's Clean Architecture | by Jonas  Schaude | Medium">
+            <a:extLst>
+              <a:ext uri="{FF2B5EF4-FFF2-40B4-BE49-F238E27FC236}">
+                <a16:creationId xmlns:a16="http://schemas.microsoft.com/office/drawing/2014/main" id="{0542CFCF-F466-3652-60E0-AF18EB83786D}"/>
+              </a:ext>
+            </a:extLst>
+          </p:cNvPr>
+          <p:cNvPicPr>
+            <a:picLocks noGrp="1" noChangeAspect="1" noChangeArrowheads="1"/>
+          </p:cNvPicPr>
+          <p:nvPr>
+            <p:ph idx="1"/>
+          </p:nvPr>
+        </p:nvPicPr>
+        <p:blipFill>
+          <a:blip r:embed="rId2">
+            <a:extLst>
+              <a:ext uri="{28A0092B-C50C-407E-A947-70E740481C1C}">
+                <a14:useLocalDpi xmlns:a14="http://schemas.microsoft.com/office/drawing/2010/main" val="0"/>
+              </a:ext>
+            </a:extLst>
+          </a:blip>
+          <a:srcRect/>
+          <a:stretch>
+            <a:fillRect/>
+          </a:stretch>
+        </p:blipFill>
+        <p:spPr bwMode="auto">
+          <a:xfrm>
+            <a:off x="2938780" y="1624171"/>
+            <a:ext cx="5977686" cy="4525963"/>
+          </a:xfrm>
+          <a:prstGeom prst="rect">
+            <a:avLst/>
+          </a:prstGeom>
+          <a:noFill/>
+          <a:extLst>
+            <a:ext uri="{909E8E84-426E-40DD-AFC4-6F175D3DCCD1}">
+              <a14:hiddenFill xmlns:a14="http://schemas.microsoft.com/office/drawing/2010/main">
+                <a:solidFill>
+                  <a:srgbClr val="FFFFFF"/>
+                </a:solidFill>
+              </a14:hiddenFill>
+            </a:ext>
+          </a:extLst>
+        </p:spPr>
+      </p:pic>
+    </p:spTree>
+    <p:extLst>
+      <p:ext uri="{BB962C8B-B14F-4D97-AF65-F5344CB8AC3E}">
+        <p14:creationId xmlns:p14="http://schemas.microsoft.com/office/powerpoint/2010/main" val="3757834849"/>
       </p:ext>
     </p:extLst>
   </p:cSld>
@@ -11034,7 +11440,7 @@
             <a:spLocks noGrp="1" noChangeArrowheads="1"/>
             <a:extLst>
               <a:ext uri="smNativeData">
-                <pr:smNativeData xmlns:mc="http://schemas.openxmlformats.org/markup-compatibility/2006" xmlns:p14="http://schemas.microsoft.com/office/powerpoint/2010/main" xmlns:p15="http://schemas.microsoft.com/office/powerpoint/2012/main" xmlns:pr="smNativeData" xmlns="smNativeData" val="SMDATA_15_l3DXYhMAAAAlAAAAZAAAAA8BAAAAkAAAAEgAAACQAAAASAAAAAAAAAABAAAAAAAAAAEAAABQAAAAAAAAAAAA4D8AAAAAAADgPwAAAAAAAOA/AAAAAAAA4D8AAAAAAADgPwAAAAAAAOA/AAAAAAAA4D8AAAAAAADgPwAAAAAAAOA/AAAAAAAA4D8CAAAAjAAAAAAAAAAAAAAAADOZDCYmJggAAAAAAAAAAAAAAAAAAAAAAAAAAAAAAAAAAAAAZAAAAAEAAABAAAAAAAAAAAAAAAAAAAAAAAAAAAAAAAAAAAAAAAAAAAAAAAAAAAAAAAAAAAAAAAAAAAAAAAAAAAAAAAAAAAAAAAAAAAAAAAAAAAAAAAAAAAAAAAAAAAAAFAAAADwAAAAAAAAAAAAAAP///wkUAAAAAQAAABQAAAAUAAAAFAAAAAEAAAAAAAAAZAAAAGQAAAAAAAAAZAAAAGQAAAAVAAAAYAAAAAAAAAAAAAAADwAAACADAAAAAAAAAAAAAAEAAACgMgAAVgcAAKr4//8BAAAAf39/AAEAAABkAAAAAAAAABQAAABAHwAAAAAAACYAAAAAAAAAwOD//wAAAAAmAAAAZAAAABYAAABMAAAAAAAAAAAAAAAEAAAAAAAAAAEAAAAzZpkKAAAAACgAAAAoAAAAZAAAAGQAAAAAAAAAzMzMAAAAAABQAAAAUAAAAGQAAABkAAAAAAAAABcAAAAUAAAAAAAAAAAAAAD/fwAA/38AAAAAAAAJAAAABAAAAAAAAAAeAAAAaAAAAAAAAAAAAAAAAAAAAAAAAAAAAAAAECcAABAnAAAAAAAAAAAAAAAAAAAAAAAAAAAAAAAAAAAAAAAAAAAAABQAAAAAAAAAwMD/AAAAAABkAAAAMgAAAAAAAABkAAAAAAAAAH9/fwAKAAAAIgAAABgAAAAAAAAAAAAAAAAAAAAAAAAAAAAAAAAAAAAkAAAAJAAAAAAAAAAHAAAAAAAAAAAAAAAAAAAAAAAAAAAAAAAAAAAAf39/ACUAAABYAAAAAAAAAAAAAAAAAAAAAAAAAAAAAAAAAAAAAAAAAAAAAAAAAAAAAAAAAAAAAAA/AAAAAAAAAKCGAQAAAAAAAAAAAAAAAAAMAAAAAQAAAAAAAAAAAAAAAAAAAB8AAABUAAAAAAAABQAAAAEAAAAAAAAAAAAAAAAAAAAAAAAAAAAAAAAAAAAAAAAAAAAAAAJ/f38AAAAAA8zMzADAwP8Af39/AAAAAAAAAAAAAAAAAAAAAAAAAAAAIQAAABgAAAAUAAAAwAMAALABAABARwAAuAgAABAAAAAmAAAACAAAAAAAAAAAAAAA"/>
+                <pr:smNativeData xmlns="smNativeData" xmlns:pr="smNativeData" xmlns:p15="http://schemas.microsoft.com/office/powerpoint/2012/main" xmlns:p14="http://schemas.microsoft.com/office/powerpoint/2010/main" xmlns:mc="http://schemas.openxmlformats.org/markup-compatibility/2006" val="SMDATA_15_l3DXYhMAAAAlAAAAZAAAAA8BAAAAkAAAAEgAAACQAAAASAAAAAAAAAABAAAAAAAAAAEAAABQAAAAAAAAAAAA4D8AAAAAAADgPwAAAAAAAOA/AAAAAAAA4D8AAAAAAADgPwAAAAAAAOA/AAAAAAAA4D8AAAAAAADgPwAAAAAAAOA/AAAAAAAA4D8CAAAAjAAAAAAAAAAAAAAAADOZDCYmJggAAAAAAAAAAAAAAAAAAAAAAAAAAAAAAAAAAAAAZAAAAAEAAABAAAAAAAAAAAAAAAAAAAAAAAAAAAAAAAAAAAAAAAAAAAAAAAAAAAAAAAAAAAAAAAAAAAAAAAAAAAAAAAAAAAAAAAAAAAAAAAAAAAAAAAAAAAAAAAAAAAAAFAAAADwAAAAAAAAAAAAAAP///wkUAAAAAQAAABQAAAAUAAAAFAAAAAEAAAAAAAAAZAAAAGQAAAAAAAAAZAAAAGQAAAAVAAAAYAAAAAAAAAAAAAAADwAAACADAAAAAAAAAAAAAAEAAACgMgAAVgcAAKr4//8BAAAAf39/AAEAAABkAAAAAAAAABQAAABAHwAAAAAAACYAAAAAAAAAwOD//wAAAAAmAAAAZAAAABYAAABMAAAAAAAAAAAAAAAEAAAAAAAAAAEAAAAzZpkKAAAAACgAAAAoAAAAZAAAAGQAAAAAAAAAzMzMAAAAAABQAAAAUAAAAGQAAABkAAAAAAAAABcAAAAUAAAAAAAAAAAAAAD/fwAA/38AAAAAAAAJAAAABAAAAAAAAAAeAAAAaAAAAAAAAAAAAAAAAAAAAAAAAAAAAAAAECcAABAnAAAAAAAAAAAAAAAAAAAAAAAAAAAAAAAAAAAAAAAAAAAAABQAAAAAAAAAwMD/AAAAAABkAAAAMgAAAAAAAABkAAAAAAAAAH9/fwAKAAAAIgAAABgAAAAAAAAAAAAAAAAAAAAAAAAAAAAAAAAAAAAkAAAAJAAAAAAAAAAHAAAAAAAAAAAAAAAAAAAAAAAAAAAAAAAAAAAAf39/ACUAAABYAAAAAAAAAAAAAAAAAAAAAAAAAAAAAAAAAAAAAAAAAAAAAAAAAAAAAAAAAAAAAAA/AAAAAAAAAKCGAQAAAAAAAAAAAAAAAAAMAAAAAQAAAAAAAAAAAAAAAAAAAB8AAABUAAAAAAAABQAAAAEAAAAAAAAAAAAAAAAAAAAAAAAAAAAAAAAAAAAAAAAAAAAAAAJ/f38AAAAAA8zMzADAwP8Af39/AAAAAAAAAAAAAAAAAAAAAAAAAAAAIQAAABgAAAAUAAAAwAMAALABAABARwAAuAgAABAAAAAmAAAACAAAAAAAAAAAAAAA"/>
               </a:ext>
             </a:extLst>
           </p:cNvSpPr>
@@ -11060,7 +11466,7 @@
             <a:spLocks noGrp="1" noChangeArrowheads="1"/>
             <a:extLst>
               <a:ext uri="smNativeData">
-                <pr:smNativeData xmlns:mc="http://schemas.openxmlformats.org/markup-compatibility/2006" xmlns:p14="http://schemas.microsoft.com/office/powerpoint/2010/main" xmlns:p15="http://schemas.microsoft.com/office/powerpoint/2012/main" xmlns:pr="smNativeData" xmlns="smNativeData" val="SMDATA_15_l3DXYhMAAAAlAAAAZAAAAA8BAAAAkAAAAEgAAACQAAAASAAAAAAAAAAAAAAAAAAAAAEAAABQAAAAAAAAAAAA4D8AAAAAAADgPwAAAAAAAOA/AAAAAAAA4D8AAAAAAADgPwAAAAAAAOA/AAAAAAAA4D8AAAAAAADgPwAAAAAAAOA/AAAAAAAA4D8CAAAAjAAAAAAAAAAAAAAAADOZDCYmJggAAAAAAAAAAAAAAAAAAAAAAAAAAAAAAAAAAAAAZAAAAAEAAABAAAAAAAAAAAAAAAAAAAAAAAAAAAAAAAAAAAAAAAAAAAAAAAAAAAAAAAAAAAAAAAAAAAAAAAAAAAAAAAAAAAAAAAAAAAAAAAAAAAAAAAAAAAAAAAAAAAAAFAAAADwAAAAAAAAAAAAAAP///wkUAAAAAQAAABQAAAAUAAAAFAAAAAEAAAAAAAAAZAAAAGQAAAAAAAAAZAAAAGQAAAAVAAAAYAAAAAAAAAAAAAAADwAAACADAAAAAAAAAAAAAAEAAACgMgAAVgcAAKr4//8BAAAAf39/AAEAAABkAAAAAAAAABQAAABAHwAAAAAAACYAAAAAAAAAwOD//wAAAAAmAAAAZAAAABYAAABMAAAAAAAAAAAAAAAEAAAAAAAAAAEAAAAzZpkKAAAAACgAAAAoAAAAZAAAAGQAAAAAAAAAzMzMAAAAAABQAAAAUAAAAGQAAABkAAAAAAAAABcAAAAUAAAAAAAAAAAAAAD/fwAA/38AAAAAAAAJAAAABAAAAF8AYAAeAAAAaAAAAAAAAAAAAAAAAAAAAAAAAAAAAAAAECcAABAnAAAAAAAAAAAAAAAAAAAAAAAAAAAAAAAAAAAAAAAAAAAAABQAAAAAAAAAwMD/AAAAAABkAAAAMgAAAAAAAABkAAAAAAAAAH9/fwAKAAAAIgAAABgAAAAAAAAAAAAAAAAAAAAAAAAAAAAAAAAAAAAkAAAAJAAAAAAAAAAHAAAAAAAAAAAAAAAAAAAAAAAAAAAAAAAAAAAAf39/ACUAAABYAAAAAAAAAAAAAAAAAAAAAAAAAAAAAAAAAAAAAAAAAAAAAAAAAAAAAAAAAAAAAAA/AAAAAAAAAKCGAQAAAAAAAAAAAAAAAAAMAAAAAQAAAAAAAAAAAAAAAAAAAB8AAABUAAAAAAAABQAAAAEAAAAAAAAAAAAAAAAAAAAAAAAAAAAAAAAAAAAAAAAAAAAAAAJ/f38AAAAAA8zMzADAwP8Af39/AAAAAAAAAAAAAAAAAAAAAAAAAAAAIQAAABgAAAAUAAAAwAMAANgJAABARwAAsCUAABAAAAAmAAAACAAAAAAAAAAAAAAA"/>
+                <pr:smNativeData xmlns="smNativeData" xmlns:pr="smNativeData" xmlns:p15="http://schemas.microsoft.com/office/powerpoint/2012/main" xmlns:p14="http://schemas.microsoft.com/office/powerpoint/2010/main" xmlns:mc="http://schemas.openxmlformats.org/markup-compatibility/2006" val="SMDATA_15_l3DXYhMAAAAlAAAAZAAAAA8BAAAAkAAAAEgAAACQAAAASAAAAAAAAAAAAAAAAAAAAAEAAABQAAAAAAAAAAAA4D8AAAAAAADgPwAAAAAAAOA/AAAAAAAA4D8AAAAAAADgPwAAAAAAAOA/AAAAAAAA4D8AAAAAAADgPwAAAAAAAOA/AAAAAAAA4D8CAAAAjAAAAAAAAAAAAAAAADOZDCYmJggAAAAAAAAAAAAAAAAAAAAAAAAAAAAAAAAAAAAAZAAAAAEAAABAAAAAAAAAAAAAAAAAAAAAAAAAAAAAAAAAAAAAAAAAAAAAAAAAAAAAAAAAAAAAAAAAAAAAAAAAAAAAAAAAAAAAAAAAAAAAAAAAAAAAAAAAAAAAAAAAAAAAFAAAADwAAAAAAAAAAAAAAP///wkUAAAAAQAAABQAAAAUAAAAFAAAAAEAAAAAAAAAZAAAAGQAAAAAAAAAZAAAAGQAAAAVAAAAYAAAAAAAAAAAAAAADwAAACADAAAAAAAAAAAAAAEAAACgMgAAVgcAAKr4//8BAAAAf39/AAEAAABkAAAAAAAAABQAAABAHwAAAAAAACYAAAAAAAAAwOD//wAAAAAmAAAAZAAAABYAAABMAAAAAAAAAAAAAAAEAAAAAAAAAAEAAAAzZpkKAAAAACgAAAAoAAAAZAAAAGQAAAAAAAAAzMzMAAAAAABQAAAAUAAAAGQAAABkAAAAAAAAABcAAAAUAAAAAAAAAAAAAAD/fwAA/38AAAAAAAAJAAAABAAAAF8AYAAeAAAAaAAAAAAAAAAAAAAAAAAAAAAAAAAAAAAAECcAABAnAAAAAAAAAAAAAAAAAAAAAAAAAAAAAAAAAAAAAAAAAAAAABQAAAAAAAAAwMD/AAAAAABkAAAAMgAAAAAAAABkAAAAAAAAAH9/fwAKAAAAIgAAABgAAAAAAAAAAAAAAAAAAAAAAAAAAAAAAAAAAAAkAAAAJAAAAAAAAAAHAAAAAAAAAAAAAAAAAAAAAAAAAAAAAAAAAAAAf39/ACUAAABYAAAAAAAAAAAAAAAAAAAAAAAAAAAAAAAAAAAAAAAAAAAAAAAAAAAAAAAAAAAAAAA/AAAAAAAAAKCGAQAAAAAAAAAAAAAAAAAMAAAAAQAAAAAAAAAAAAAAAAAAAB8AAABUAAAAAAAABQAAAAEAAAAAAAAAAAAAAAAAAAAAAAAAAAAAAAAAAAAAAAAAAAAAAAJ/f38AAAAAA8zMzADAwP8Af39/AAAAAAAAAAAAAAAAAAAAAAAAAAAAIQAAABgAAAAUAAAAwAMAANgJAABARwAAsCUAABAAAAAmAAAACAAAAAAAAAAAAAAA"/>
               </a:ext>
             </a:extLst>
           </p:cNvSpPr>
@@ -11096,6 +11502,2094 @@
         </p:txBody>
       </p:sp>
     </p:spTree>
+  </p:cSld>
+  <p:clrMapOvr>
+    <a:masterClrMapping/>
+  </p:clrMapOvr>
+</p:sld>
+</file>
+
+<file path=ppt/slides/slide40.xml><?xml version="1.0" encoding="utf-8"?>
+<p:sld xmlns:a="http://schemas.openxmlformats.org/drawingml/2006/main" xmlns:r="http://schemas.openxmlformats.org/officeDocument/2006/relationships" xmlns:p="http://schemas.openxmlformats.org/presentationml/2006/main">
+  <p:cSld>
+    <p:spTree>
+      <p:nvGrpSpPr>
+        <p:cNvPr id="1" name=""/>
+        <p:cNvGrpSpPr/>
+        <p:nvPr/>
+      </p:nvGrpSpPr>
+      <p:grpSpPr>
+        <a:xfrm>
+          <a:off x="0" y="0"/>
+          <a:ext cx="0" cy="0"/>
+          <a:chOff x="0" y="0"/>
+          <a:chExt cx="0" cy="0"/>
+        </a:xfrm>
+      </p:grpSpPr>
+      <p:sp>
+        <p:nvSpPr>
+          <p:cNvPr id="2" name="Título 1">
+            <a:extLst>
+              <a:ext uri="{FF2B5EF4-FFF2-40B4-BE49-F238E27FC236}">
+                <a16:creationId xmlns:a16="http://schemas.microsoft.com/office/drawing/2014/main" id="{02E636EB-A61C-B241-07D8-15AECB71D2A6}"/>
+              </a:ext>
+            </a:extLst>
+          </p:cNvPr>
+          <p:cNvSpPr>
+            <a:spLocks noGrp="1"/>
+          </p:cNvSpPr>
+          <p:nvPr>
+            <p:ph type="title"/>
+          </p:nvPr>
+        </p:nvSpPr>
+        <p:spPr/>
+        <p:txBody>
+          <a:bodyPr/>
+          <a:lstStyle/>
+          <a:p>
+            <a:r>
+              <a:rPr lang="pt-BR" dirty="0"/>
+              <a:t>Regras de dependência</a:t>
+            </a:r>
+          </a:p>
+        </p:txBody>
+      </p:sp>
+      <p:sp>
+        <p:nvSpPr>
+          <p:cNvPr id="3" name="Espaço Reservado para Conteúdo 2">
+            <a:extLst>
+              <a:ext uri="{FF2B5EF4-FFF2-40B4-BE49-F238E27FC236}">
+                <a16:creationId xmlns:a16="http://schemas.microsoft.com/office/drawing/2014/main" id="{4AC804E8-2BEF-9472-C4C0-33180D97AA0C}"/>
+              </a:ext>
+            </a:extLst>
+          </p:cNvPr>
+          <p:cNvSpPr>
+            <a:spLocks noGrp="1"/>
+          </p:cNvSpPr>
+          <p:nvPr>
+            <p:ph idx="1"/>
+          </p:nvPr>
+        </p:nvSpPr>
+        <p:spPr/>
+        <p:txBody>
+          <a:bodyPr/>
+          <a:lstStyle/>
+          <a:p>
+            <a:r>
+              <a:rPr lang="pt-BR" dirty="0"/>
+              <a:t>As dependências do código fonte só </a:t>
+            </a:r>
+            <a:r>
+              <a:rPr lang="pt-BR" dirty="0">
+                <a:solidFill>
+                  <a:schemeClr val="bg1"/>
+                </a:solidFill>
+                <a:highlight>
+                  <a:srgbClr val="FFFF00"/>
+                </a:highlight>
+              </a:rPr>
+              <a:t>apontam para dentro</a:t>
+            </a:r>
+            <a:r>
+              <a:rPr lang="pt-BR" dirty="0"/>
+              <a:t>. </a:t>
+            </a:r>
+            <a:br>
+              <a:rPr lang="pt-BR" dirty="0"/>
+            </a:br>
+            <a:r>
+              <a:rPr lang="pt-BR" dirty="0"/>
+              <a:t>Isso significa que os módulos </a:t>
+            </a:r>
+            <a:r>
+              <a:rPr lang="pt-BR" dirty="0">
+                <a:solidFill>
+                  <a:schemeClr val="bg1"/>
+                </a:solidFill>
+                <a:highlight>
+                  <a:srgbClr val="FFFF00"/>
+                </a:highlight>
+              </a:rPr>
+              <a:t>internos não estão cientes nem dependem de módulos externos.</a:t>
+            </a:r>
+          </a:p>
+          <a:p>
+            <a:pPr marL="0" indent="0">
+              <a:buNone/>
+            </a:pPr>
+            <a:endParaRPr lang="pt-BR" dirty="0"/>
+          </a:p>
+          <a:p>
+            <a:r>
+              <a:rPr lang="pt-BR" dirty="0"/>
+              <a:t>No entanto, os </a:t>
+            </a:r>
+            <a:r>
+              <a:rPr lang="pt-BR" dirty="0">
+                <a:solidFill>
+                  <a:schemeClr val="bg1"/>
+                </a:solidFill>
+                <a:highlight>
+                  <a:srgbClr val="FFFF00"/>
+                </a:highlight>
+              </a:rPr>
+              <a:t>módulos externos são conscientes e dependentes de módulos internos. </a:t>
+            </a:r>
+          </a:p>
+        </p:txBody>
+      </p:sp>
+      <p:sp>
+        <p:nvSpPr>
+          <p:cNvPr id="4" name="Espaço Reservado para Data 3">
+            <a:extLst>
+              <a:ext uri="{FF2B5EF4-FFF2-40B4-BE49-F238E27FC236}">
+                <a16:creationId xmlns:a16="http://schemas.microsoft.com/office/drawing/2014/main" id="{B54410F5-D060-A20D-491E-3E504C734E8D}"/>
+              </a:ext>
+            </a:extLst>
+          </p:cNvPr>
+          <p:cNvSpPr>
+            <a:spLocks noGrp="1"/>
+          </p:cNvSpPr>
+          <p:nvPr>
+            <p:ph type="dt" sz="quarter" idx="10"/>
+          </p:nvPr>
+        </p:nvSpPr>
+        <p:spPr/>
+        <p:txBody>
+          <a:bodyPr/>
+          <a:lstStyle/>
+          <a:p>
+            <a:fld id="{2B84B1DC-92C6-D147-883C-6412FF727E31}" type="datetime1">
+              <a:rPr lang="pt-BR" smtClean="0"/>
+              <a:t>26/07/2022</a:t>
+            </a:fld>
+            <a:endParaRPr lang="pt-BR"/>
+          </a:p>
+        </p:txBody>
+      </p:sp>
+      <p:sp>
+        <p:nvSpPr>
+          <p:cNvPr id="5" name="Espaço Reservado para Número de Slide 4">
+            <a:extLst>
+              <a:ext uri="{FF2B5EF4-FFF2-40B4-BE49-F238E27FC236}">
+                <a16:creationId xmlns:a16="http://schemas.microsoft.com/office/drawing/2014/main" id="{7D5BDB2F-6C8A-72CF-EEB3-A7C93A9DEDFB}"/>
+              </a:ext>
+            </a:extLst>
+          </p:cNvPr>
+          <p:cNvSpPr>
+            <a:spLocks noGrp="1"/>
+          </p:cNvSpPr>
+          <p:nvPr>
+            <p:ph type="sldNum" sz="quarter" idx="12"/>
+          </p:nvPr>
+        </p:nvSpPr>
+        <p:spPr/>
+        <p:txBody>
+          <a:bodyPr/>
+          <a:lstStyle/>
+          <a:p>
+            <a:fld id="{2B84FD90-DEC6-D10B-883C-285EB3727E7D}" type="slidenum">
+              <a:rPr lang="pt-BR" smtClean="0"/>
+              <a:t>40</a:t>
+            </a:fld>
+            <a:endParaRPr lang="pt-BR"/>
+          </a:p>
+        </p:txBody>
+      </p:sp>
+    </p:spTree>
+    <p:extLst>
+      <p:ext uri="{BB962C8B-B14F-4D97-AF65-F5344CB8AC3E}">
+        <p14:creationId xmlns:p14="http://schemas.microsoft.com/office/powerpoint/2010/main" val="1960937704"/>
+      </p:ext>
+    </p:extLst>
+  </p:cSld>
+  <p:clrMapOvr>
+    <a:masterClrMapping/>
+  </p:clrMapOvr>
+</p:sld>
+</file>
+
+<file path=ppt/slides/slide41.xml><?xml version="1.0" encoding="utf-8"?>
+<p:sld xmlns:a="http://schemas.openxmlformats.org/drawingml/2006/main" xmlns:r="http://schemas.openxmlformats.org/officeDocument/2006/relationships" xmlns:p="http://schemas.openxmlformats.org/presentationml/2006/main">
+  <p:cSld>
+    <p:spTree>
+      <p:nvGrpSpPr>
+        <p:cNvPr id="1" name=""/>
+        <p:cNvGrpSpPr/>
+        <p:nvPr/>
+      </p:nvGrpSpPr>
+      <p:grpSpPr>
+        <a:xfrm>
+          <a:off x="0" y="0"/>
+          <a:ext cx="0" cy="0"/>
+          <a:chOff x="0" y="0"/>
+          <a:chExt cx="0" cy="0"/>
+        </a:xfrm>
+      </p:grpSpPr>
+      <p:sp>
+        <p:nvSpPr>
+          <p:cNvPr id="2" name="Título 1">
+            <a:extLst>
+              <a:ext uri="{FF2B5EF4-FFF2-40B4-BE49-F238E27FC236}">
+                <a16:creationId xmlns:a16="http://schemas.microsoft.com/office/drawing/2014/main" id="{02E636EB-A61C-B241-07D8-15AECB71D2A6}"/>
+              </a:ext>
+            </a:extLst>
+          </p:cNvPr>
+          <p:cNvSpPr>
+            <a:spLocks noGrp="1"/>
+          </p:cNvSpPr>
+          <p:nvPr>
+            <p:ph type="title"/>
+          </p:nvPr>
+        </p:nvSpPr>
+        <p:spPr/>
+        <p:txBody>
+          <a:bodyPr/>
+          <a:lstStyle/>
+          <a:p>
+            <a:r>
+              <a:rPr lang="pt-BR" dirty="0"/>
+              <a:t>Regras de dependência</a:t>
+            </a:r>
+          </a:p>
+        </p:txBody>
+      </p:sp>
+      <p:sp>
+        <p:nvSpPr>
+          <p:cNvPr id="3" name="Espaço Reservado para Conteúdo 2">
+            <a:extLst>
+              <a:ext uri="{FF2B5EF4-FFF2-40B4-BE49-F238E27FC236}">
+                <a16:creationId xmlns:a16="http://schemas.microsoft.com/office/drawing/2014/main" id="{4AC804E8-2BEF-9472-C4C0-33180D97AA0C}"/>
+              </a:ext>
+            </a:extLst>
+          </p:cNvPr>
+          <p:cNvSpPr>
+            <a:spLocks noGrp="1"/>
+          </p:cNvSpPr>
+          <p:nvPr>
+            <p:ph idx="1"/>
+          </p:nvPr>
+        </p:nvSpPr>
+        <p:spPr/>
+        <p:txBody>
+          <a:bodyPr/>
+          <a:lstStyle/>
+          <a:p>
+            <a:r>
+              <a:rPr lang="pt-BR" dirty="0"/>
+              <a:t>Quanto </a:t>
+            </a:r>
+            <a:r>
+              <a:rPr lang="pt-BR" dirty="0">
+                <a:solidFill>
+                  <a:schemeClr val="bg1"/>
+                </a:solidFill>
+                <a:highlight>
+                  <a:srgbClr val="FFFF00"/>
+                </a:highlight>
+              </a:rPr>
+              <a:t>mais você se move para dentro, mais abstração está presente.</a:t>
+            </a:r>
+            <a:r>
+              <a:rPr lang="pt-BR" dirty="0"/>
+              <a:t> Quanto </a:t>
+            </a:r>
+            <a:r>
+              <a:rPr lang="pt-BR" dirty="0">
+                <a:solidFill>
+                  <a:schemeClr val="bg1"/>
+                </a:solidFill>
+                <a:highlight>
+                  <a:srgbClr val="FFFF00"/>
+                </a:highlight>
+              </a:rPr>
+              <a:t>mais você se move para fora, mais implementações</a:t>
+            </a:r>
+            <a:r>
+              <a:rPr lang="pt-BR" dirty="0"/>
+              <a:t> concretas estão presentes.</a:t>
+            </a:r>
+          </a:p>
+        </p:txBody>
+      </p:sp>
+      <p:sp>
+        <p:nvSpPr>
+          <p:cNvPr id="4" name="Espaço Reservado para Data 3">
+            <a:extLst>
+              <a:ext uri="{FF2B5EF4-FFF2-40B4-BE49-F238E27FC236}">
+                <a16:creationId xmlns:a16="http://schemas.microsoft.com/office/drawing/2014/main" id="{B54410F5-D060-A20D-491E-3E504C734E8D}"/>
+              </a:ext>
+            </a:extLst>
+          </p:cNvPr>
+          <p:cNvSpPr>
+            <a:spLocks noGrp="1"/>
+          </p:cNvSpPr>
+          <p:nvPr>
+            <p:ph type="dt" sz="quarter" idx="10"/>
+          </p:nvPr>
+        </p:nvSpPr>
+        <p:spPr/>
+        <p:txBody>
+          <a:bodyPr/>
+          <a:lstStyle/>
+          <a:p>
+            <a:fld id="{2B84B1DC-92C6-D147-883C-6412FF727E31}" type="datetime1">
+              <a:rPr lang="pt-BR" smtClean="0"/>
+              <a:t>26/07/2022</a:t>
+            </a:fld>
+            <a:endParaRPr lang="pt-BR"/>
+          </a:p>
+        </p:txBody>
+      </p:sp>
+      <p:sp>
+        <p:nvSpPr>
+          <p:cNvPr id="5" name="Espaço Reservado para Número de Slide 4">
+            <a:extLst>
+              <a:ext uri="{FF2B5EF4-FFF2-40B4-BE49-F238E27FC236}">
+                <a16:creationId xmlns:a16="http://schemas.microsoft.com/office/drawing/2014/main" id="{7D5BDB2F-6C8A-72CF-EEB3-A7C93A9DEDFB}"/>
+              </a:ext>
+            </a:extLst>
+          </p:cNvPr>
+          <p:cNvSpPr>
+            <a:spLocks noGrp="1"/>
+          </p:cNvSpPr>
+          <p:nvPr>
+            <p:ph type="sldNum" sz="quarter" idx="12"/>
+          </p:nvPr>
+        </p:nvSpPr>
+        <p:spPr/>
+        <p:txBody>
+          <a:bodyPr/>
+          <a:lstStyle/>
+          <a:p>
+            <a:fld id="{2B84FD90-DEC6-D10B-883C-285EB3727E7D}" type="slidenum">
+              <a:rPr lang="pt-BR" smtClean="0"/>
+              <a:t>41</a:t>
+            </a:fld>
+            <a:endParaRPr lang="pt-BR"/>
+          </a:p>
+        </p:txBody>
+      </p:sp>
+    </p:spTree>
+    <p:extLst>
+      <p:ext uri="{BB962C8B-B14F-4D97-AF65-F5344CB8AC3E}">
+        <p14:creationId xmlns:p14="http://schemas.microsoft.com/office/powerpoint/2010/main" val="2712012640"/>
+      </p:ext>
+    </p:extLst>
+  </p:cSld>
+  <p:clrMapOvr>
+    <a:masterClrMapping/>
+  </p:clrMapOvr>
+</p:sld>
+</file>
+
+<file path=ppt/slides/slide42.xml><?xml version="1.0" encoding="utf-8"?>
+<p:sld xmlns:a="http://schemas.openxmlformats.org/drawingml/2006/main" xmlns:r="http://schemas.openxmlformats.org/officeDocument/2006/relationships" xmlns:p="http://schemas.openxmlformats.org/presentationml/2006/main">
+  <p:cSld>
+    <p:spTree>
+      <p:nvGrpSpPr>
+        <p:cNvPr id="1" name=""/>
+        <p:cNvGrpSpPr/>
+        <p:nvPr/>
+      </p:nvGrpSpPr>
+      <p:grpSpPr>
+        <a:xfrm>
+          <a:off x="0" y="0"/>
+          <a:ext cx="0" cy="0"/>
+          <a:chOff x="0" y="0"/>
+          <a:chExt cx="0" cy="0"/>
+        </a:xfrm>
+      </p:grpSpPr>
+      <p:sp>
+        <p:nvSpPr>
+          <p:cNvPr id="2" name="Título 1">
+            <a:extLst>
+              <a:ext uri="{FF2B5EF4-FFF2-40B4-BE49-F238E27FC236}">
+                <a16:creationId xmlns:a16="http://schemas.microsoft.com/office/drawing/2014/main" id="{02E636EB-A61C-B241-07D8-15AECB71D2A6}"/>
+              </a:ext>
+            </a:extLst>
+          </p:cNvPr>
+          <p:cNvSpPr>
+            <a:spLocks noGrp="1"/>
+          </p:cNvSpPr>
+          <p:nvPr>
+            <p:ph type="title"/>
+          </p:nvPr>
+        </p:nvSpPr>
+        <p:spPr/>
+        <p:txBody>
+          <a:bodyPr/>
+          <a:lstStyle/>
+          <a:p>
+            <a:r>
+              <a:rPr lang="pt-BR" dirty="0"/>
+              <a:t>Camadas</a:t>
+            </a:r>
+          </a:p>
+        </p:txBody>
+      </p:sp>
+      <p:sp>
+        <p:nvSpPr>
+          <p:cNvPr id="3" name="Espaço Reservado para Conteúdo 2">
+            <a:extLst>
+              <a:ext uri="{FF2B5EF4-FFF2-40B4-BE49-F238E27FC236}">
+                <a16:creationId xmlns:a16="http://schemas.microsoft.com/office/drawing/2014/main" id="{4AC804E8-2BEF-9472-C4C0-33180D97AA0C}"/>
+              </a:ext>
+            </a:extLst>
+          </p:cNvPr>
+          <p:cNvSpPr>
+            <a:spLocks noGrp="1"/>
+          </p:cNvSpPr>
+          <p:nvPr>
+            <p:ph idx="1"/>
+          </p:nvPr>
+        </p:nvSpPr>
+        <p:spPr/>
+        <p:txBody>
+          <a:bodyPr/>
+          <a:lstStyle/>
+          <a:p>
+            <a:pPr marL="0" indent="0">
+              <a:buNone/>
+            </a:pPr>
+            <a:r>
+              <a:rPr lang="pt-BR" dirty="0"/>
+              <a:t>Aprenderemos a seguir cada uma das camadas, começando do centro, que seria a Domain.</a:t>
+            </a:r>
+          </a:p>
+        </p:txBody>
+      </p:sp>
+      <p:sp>
+        <p:nvSpPr>
+          <p:cNvPr id="4" name="Espaço Reservado para Data 3">
+            <a:extLst>
+              <a:ext uri="{FF2B5EF4-FFF2-40B4-BE49-F238E27FC236}">
+                <a16:creationId xmlns:a16="http://schemas.microsoft.com/office/drawing/2014/main" id="{B54410F5-D060-A20D-491E-3E504C734E8D}"/>
+              </a:ext>
+            </a:extLst>
+          </p:cNvPr>
+          <p:cNvSpPr>
+            <a:spLocks noGrp="1"/>
+          </p:cNvSpPr>
+          <p:nvPr>
+            <p:ph type="dt" sz="quarter" idx="10"/>
+          </p:nvPr>
+        </p:nvSpPr>
+        <p:spPr/>
+        <p:txBody>
+          <a:bodyPr/>
+          <a:lstStyle/>
+          <a:p>
+            <a:fld id="{2B84B1DC-92C6-D147-883C-6412FF727E31}" type="datetime1">
+              <a:rPr lang="pt-BR" smtClean="0"/>
+              <a:t>26/07/2022</a:t>
+            </a:fld>
+            <a:endParaRPr lang="pt-BR"/>
+          </a:p>
+        </p:txBody>
+      </p:sp>
+      <p:sp>
+        <p:nvSpPr>
+          <p:cNvPr id="5" name="Espaço Reservado para Número de Slide 4">
+            <a:extLst>
+              <a:ext uri="{FF2B5EF4-FFF2-40B4-BE49-F238E27FC236}">
+                <a16:creationId xmlns:a16="http://schemas.microsoft.com/office/drawing/2014/main" id="{7D5BDB2F-6C8A-72CF-EEB3-A7C93A9DEDFB}"/>
+              </a:ext>
+            </a:extLst>
+          </p:cNvPr>
+          <p:cNvSpPr>
+            <a:spLocks noGrp="1"/>
+          </p:cNvSpPr>
+          <p:nvPr>
+            <p:ph type="sldNum" sz="quarter" idx="12"/>
+          </p:nvPr>
+        </p:nvSpPr>
+        <p:spPr/>
+        <p:txBody>
+          <a:bodyPr/>
+          <a:lstStyle/>
+          <a:p>
+            <a:fld id="{2B84FD90-DEC6-D10B-883C-285EB3727E7D}" type="slidenum">
+              <a:rPr lang="pt-BR" smtClean="0"/>
+              <a:t>42</a:t>
+            </a:fld>
+            <a:endParaRPr lang="pt-BR"/>
+          </a:p>
+        </p:txBody>
+      </p:sp>
+    </p:spTree>
+    <p:extLst>
+      <p:ext uri="{BB962C8B-B14F-4D97-AF65-F5344CB8AC3E}">
+        <p14:creationId xmlns:p14="http://schemas.microsoft.com/office/powerpoint/2010/main" val="1343511255"/>
+      </p:ext>
+    </p:extLst>
+  </p:cSld>
+  <p:clrMapOvr>
+    <a:masterClrMapping/>
+  </p:clrMapOvr>
+</p:sld>
+</file>
+
+<file path=ppt/slides/slide43.xml><?xml version="1.0" encoding="utf-8"?>
+<p:sld xmlns:a="http://schemas.openxmlformats.org/drawingml/2006/main" xmlns:r="http://schemas.openxmlformats.org/officeDocument/2006/relationships" xmlns:p="http://schemas.openxmlformats.org/presentationml/2006/main">
+  <p:cSld>
+    <p:spTree>
+      <p:nvGrpSpPr>
+        <p:cNvPr id="1" name=""/>
+        <p:cNvGrpSpPr/>
+        <p:nvPr/>
+      </p:nvGrpSpPr>
+      <p:grpSpPr>
+        <a:xfrm>
+          <a:off x="0" y="0"/>
+          <a:ext cx="0" cy="0"/>
+          <a:chOff x="0" y="0"/>
+          <a:chExt cx="0" cy="0"/>
+        </a:xfrm>
+      </p:grpSpPr>
+      <p:sp>
+        <p:nvSpPr>
+          <p:cNvPr id="2" name="Título 1">
+            <a:extLst>
+              <a:ext uri="{FF2B5EF4-FFF2-40B4-BE49-F238E27FC236}">
+                <a16:creationId xmlns:a16="http://schemas.microsoft.com/office/drawing/2014/main" id="{02E636EB-A61C-B241-07D8-15AECB71D2A6}"/>
+              </a:ext>
+            </a:extLst>
+          </p:cNvPr>
+          <p:cNvSpPr>
+            <a:spLocks noGrp="1"/>
+          </p:cNvSpPr>
+          <p:nvPr>
+            <p:ph type="title"/>
+          </p:nvPr>
+        </p:nvSpPr>
+        <p:spPr/>
+        <p:txBody>
+          <a:bodyPr/>
+          <a:lstStyle/>
+          <a:p>
+            <a:endParaRPr lang="pt-BR" dirty="0"/>
+          </a:p>
+        </p:txBody>
+      </p:sp>
+      <p:sp>
+        <p:nvSpPr>
+          <p:cNvPr id="3" name="Espaço Reservado para Conteúdo 2">
+            <a:extLst>
+              <a:ext uri="{FF2B5EF4-FFF2-40B4-BE49-F238E27FC236}">
+                <a16:creationId xmlns:a16="http://schemas.microsoft.com/office/drawing/2014/main" id="{4AC804E8-2BEF-9472-C4C0-33180D97AA0C}"/>
+              </a:ext>
+            </a:extLst>
+          </p:cNvPr>
+          <p:cNvSpPr>
+            <a:spLocks noGrp="1"/>
+          </p:cNvSpPr>
+          <p:nvPr>
+            <p:ph idx="1"/>
+          </p:nvPr>
+        </p:nvSpPr>
+        <p:spPr/>
+        <p:txBody>
+          <a:bodyPr/>
+          <a:lstStyle/>
+          <a:p>
+            <a:pPr marL="0" indent="0" algn="ctr">
+              <a:buNone/>
+            </a:pPr>
+            <a:endParaRPr lang="pt-BR" dirty="0">
+              <a:solidFill>
+                <a:schemeClr val="bg1"/>
+              </a:solidFill>
+              <a:highlight>
+                <a:srgbClr val="FF0000"/>
+              </a:highlight>
+            </a:endParaRPr>
+          </a:p>
+          <a:p>
+            <a:pPr marL="0" indent="0" algn="ctr">
+              <a:buNone/>
+            </a:pPr>
+            <a:endParaRPr lang="pt-BR" dirty="0">
+              <a:solidFill>
+                <a:schemeClr val="bg1"/>
+              </a:solidFill>
+              <a:highlight>
+                <a:srgbClr val="FF0000"/>
+              </a:highlight>
+            </a:endParaRPr>
+          </a:p>
+          <a:p>
+            <a:pPr marL="0" indent="0" algn="ctr">
+              <a:buNone/>
+            </a:pPr>
+            <a:endParaRPr lang="pt-BR" dirty="0">
+              <a:solidFill>
+                <a:schemeClr val="bg1"/>
+              </a:solidFill>
+              <a:highlight>
+                <a:srgbClr val="FF0000"/>
+              </a:highlight>
+            </a:endParaRPr>
+          </a:p>
+          <a:p>
+            <a:pPr marL="0" indent="0" algn="ctr">
+              <a:buNone/>
+            </a:pPr>
+            <a:r>
+              <a:rPr lang="pt-BR" sz="5400" dirty="0">
+                <a:solidFill>
+                  <a:schemeClr val="bg1"/>
+                </a:solidFill>
+                <a:highlight>
+                  <a:srgbClr val="FF0000"/>
+                </a:highlight>
+              </a:rPr>
+              <a:t>DOMAIN</a:t>
+            </a:r>
+            <a:endParaRPr lang="pt-BR" dirty="0">
+              <a:solidFill>
+                <a:schemeClr val="bg1"/>
+              </a:solidFill>
+              <a:highlight>
+                <a:srgbClr val="FF0000"/>
+              </a:highlight>
+            </a:endParaRPr>
+          </a:p>
+        </p:txBody>
+      </p:sp>
+      <p:sp>
+        <p:nvSpPr>
+          <p:cNvPr id="4" name="Espaço Reservado para Data 3">
+            <a:extLst>
+              <a:ext uri="{FF2B5EF4-FFF2-40B4-BE49-F238E27FC236}">
+                <a16:creationId xmlns:a16="http://schemas.microsoft.com/office/drawing/2014/main" id="{B54410F5-D060-A20D-491E-3E504C734E8D}"/>
+              </a:ext>
+            </a:extLst>
+          </p:cNvPr>
+          <p:cNvSpPr>
+            <a:spLocks noGrp="1"/>
+          </p:cNvSpPr>
+          <p:nvPr>
+            <p:ph type="dt" sz="quarter" idx="10"/>
+          </p:nvPr>
+        </p:nvSpPr>
+        <p:spPr/>
+        <p:txBody>
+          <a:bodyPr/>
+          <a:lstStyle/>
+          <a:p>
+            <a:fld id="{2B84B1DC-92C6-D147-883C-6412FF727E31}" type="datetime1">
+              <a:rPr lang="pt-BR" smtClean="0"/>
+              <a:t>26/07/2022</a:t>
+            </a:fld>
+            <a:endParaRPr lang="pt-BR"/>
+          </a:p>
+        </p:txBody>
+      </p:sp>
+      <p:sp>
+        <p:nvSpPr>
+          <p:cNvPr id="5" name="Espaço Reservado para Número de Slide 4">
+            <a:extLst>
+              <a:ext uri="{FF2B5EF4-FFF2-40B4-BE49-F238E27FC236}">
+                <a16:creationId xmlns:a16="http://schemas.microsoft.com/office/drawing/2014/main" id="{7D5BDB2F-6C8A-72CF-EEB3-A7C93A9DEDFB}"/>
+              </a:ext>
+            </a:extLst>
+          </p:cNvPr>
+          <p:cNvSpPr>
+            <a:spLocks noGrp="1"/>
+          </p:cNvSpPr>
+          <p:nvPr>
+            <p:ph type="sldNum" sz="quarter" idx="12"/>
+          </p:nvPr>
+        </p:nvSpPr>
+        <p:spPr/>
+        <p:txBody>
+          <a:bodyPr/>
+          <a:lstStyle/>
+          <a:p>
+            <a:fld id="{2B84FD90-DEC6-D10B-883C-285EB3727E7D}" type="slidenum">
+              <a:rPr lang="pt-BR" smtClean="0"/>
+              <a:t>43</a:t>
+            </a:fld>
+            <a:endParaRPr lang="pt-BR"/>
+          </a:p>
+        </p:txBody>
+      </p:sp>
+    </p:spTree>
+    <p:extLst>
+      <p:ext uri="{BB962C8B-B14F-4D97-AF65-F5344CB8AC3E}">
+        <p14:creationId xmlns:p14="http://schemas.microsoft.com/office/powerpoint/2010/main" val="1069442630"/>
+      </p:ext>
+    </p:extLst>
+  </p:cSld>
+  <p:clrMapOvr>
+    <a:masterClrMapping/>
+  </p:clrMapOvr>
+</p:sld>
+</file>
+
+<file path=ppt/slides/slide44.xml><?xml version="1.0" encoding="utf-8"?>
+<p:sld xmlns:a="http://schemas.openxmlformats.org/drawingml/2006/main" xmlns:r="http://schemas.openxmlformats.org/officeDocument/2006/relationships" xmlns:p="http://schemas.openxmlformats.org/presentationml/2006/main">
+  <p:cSld>
+    <p:spTree>
+      <p:nvGrpSpPr>
+        <p:cNvPr id="1" name=""/>
+        <p:cNvGrpSpPr/>
+        <p:nvPr/>
+      </p:nvGrpSpPr>
+      <p:grpSpPr>
+        <a:xfrm>
+          <a:off x="0" y="0"/>
+          <a:ext cx="0" cy="0"/>
+          <a:chOff x="0" y="0"/>
+          <a:chExt cx="0" cy="0"/>
+        </a:xfrm>
+      </p:grpSpPr>
+      <p:sp>
+        <p:nvSpPr>
+          <p:cNvPr id="2" name="Título 1">
+            <a:extLst>
+              <a:ext uri="{FF2B5EF4-FFF2-40B4-BE49-F238E27FC236}">
+                <a16:creationId xmlns:a16="http://schemas.microsoft.com/office/drawing/2014/main" id="{02E636EB-A61C-B241-07D8-15AECB71D2A6}"/>
+              </a:ext>
+            </a:extLst>
+          </p:cNvPr>
+          <p:cNvSpPr>
+            <a:spLocks noGrp="1"/>
+          </p:cNvSpPr>
+          <p:nvPr>
+            <p:ph type="title"/>
+          </p:nvPr>
+        </p:nvSpPr>
+        <p:spPr/>
+        <p:txBody>
+          <a:bodyPr/>
+          <a:lstStyle/>
+          <a:p>
+            <a:r>
+              <a:rPr lang="pt-BR" dirty="0"/>
+              <a:t>Domain</a:t>
+            </a:r>
+          </a:p>
+        </p:txBody>
+      </p:sp>
+      <p:sp>
+        <p:nvSpPr>
+          <p:cNvPr id="3" name="Espaço Reservado para Conteúdo 2">
+            <a:extLst>
+              <a:ext uri="{FF2B5EF4-FFF2-40B4-BE49-F238E27FC236}">
+                <a16:creationId xmlns:a16="http://schemas.microsoft.com/office/drawing/2014/main" id="{4AC804E8-2BEF-9472-C4C0-33180D97AA0C}"/>
+              </a:ext>
+            </a:extLst>
+          </p:cNvPr>
+          <p:cNvSpPr>
+            <a:spLocks noGrp="1"/>
+          </p:cNvSpPr>
+          <p:nvPr>
+            <p:ph idx="1"/>
+          </p:nvPr>
+        </p:nvSpPr>
+        <p:spPr/>
+        <p:txBody>
+          <a:bodyPr/>
+          <a:lstStyle/>
+          <a:p>
+            <a:pPr marL="0" indent="0">
+              <a:buNone/>
+            </a:pPr>
+            <a:r>
+              <a:rPr lang="pt-BR" dirty="0"/>
+              <a:t>A camada de domínio é a parte mais interna das camadas (sem dependências com outras camadas) e contém:</a:t>
+            </a:r>
+          </a:p>
+          <a:p>
+            <a:pPr marL="0" indent="0">
+              <a:buNone/>
+            </a:pPr>
+            <a:endParaRPr lang="pt-BR" dirty="0"/>
+          </a:p>
+          <a:p>
+            <a:r>
+              <a:rPr lang="pt-BR" dirty="0"/>
+              <a:t>Entidades</a:t>
+            </a:r>
+          </a:p>
+          <a:p>
+            <a:r>
+              <a:rPr lang="pt-BR" dirty="0"/>
+              <a:t>Casos de Uso</a:t>
+            </a:r>
+          </a:p>
+          <a:p>
+            <a:r>
+              <a:rPr lang="pt-BR" dirty="0"/>
+              <a:t>Interfaces de Repositório</a:t>
+            </a:r>
+          </a:p>
+          <a:p>
+            <a:pPr marL="0" indent="0">
+              <a:buNone/>
+            </a:pPr>
+            <a:endParaRPr lang="pt-BR" dirty="0"/>
+          </a:p>
+          <a:p>
+            <a:pPr marL="0" indent="0">
+              <a:buNone/>
+            </a:pPr>
+            <a:endParaRPr lang="pt-BR" dirty="0"/>
+          </a:p>
+        </p:txBody>
+      </p:sp>
+      <p:sp>
+        <p:nvSpPr>
+          <p:cNvPr id="4" name="Espaço Reservado para Data 3">
+            <a:extLst>
+              <a:ext uri="{FF2B5EF4-FFF2-40B4-BE49-F238E27FC236}">
+                <a16:creationId xmlns:a16="http://schemas.microsoft.com/office/drawing/2014/main" id="{B54410F5-D060-A20D-491E-3E504C734E8D}"/>
+              </a:ext>
+            </a:extLst>
+          </p:cNvPr>
+          <p:cNvSpPr>
+            <a:spLocks noGrp="1"/>
+          </p:cNvSpPr>
+          <p:nvPr>
+            <p:ph type="dt" sz="quarter" idx="10"/>
+          </p:nvPr>
+        </p:nvSpPr>
+        <p:spPr/>
+        <p:txBody>
+          <a:bodyPr/>
+          <a:lstStyle/>
+          <a:p>
+            <a:fld id="{2B84B1DC-92C6-D147-883C-6412FF727E31}" type="datetime1">
+              <a:rPr lang="pt-BR" smtClean="0"/>
+              <a:t>26/07/2022</a:t>
+            </a:fld>
+            <a:endParaRPr lang="pt-BR"/>
+          </a:p>
+        </p:txBody>
+      </p:sp>
+      <p:sp>
+        <p:nvSpPr>
+          <p:cNvPr id="5" name="Espaço Reservado para Número de Slide 4">
+            <a:extLst>
+              <a:ext uri="{FF2B5EF4-FFF2-40B4-BE49-F238E27FC236}">
+                <a16:creationId xmlns:a16="http://schemas.microsoft.com/office/drawing/2014/main" id="{7D5BDB2F-6C8A-72CF-EEB3-A7C93A9DEDFB}"/>
+              </a:ext>
+            </a:extLst>
+          </p:cNvPr>
+          <p:cNvSpPr>
+            <a:spLocks noGrp="1"/>
+          </p:cNvSpPr>
+          <p:nvPr>
+            <p:ph type="sldNum" sz="quarter" idx="12"/>
+          </p:nvPr>
+        </p:nvSpPr>
+        <p:spPr/>
+        <p:txBody>
+          <a:bodyPr/>
+          <a:lstStyle/>
+          <a:p>
+            <a:fld id="{2B84FD90-DEC6-D10B-883C-285EB3727E7D}" type="slidenum">
+              <a:rPr lang="pt-BR" smtClean="0"/>
+              <a:t>44</a:t>
+            </a:fld>
+            <a:endParaRPr lang="pt-BR"/>
+          </a:p>
+        </p:txBody>
+      </p:sp>
+    </p:spTree>
+    <p:extLst>
+      <p:ext uri="{BB962C8B-B14F-4D97-AF65-F5344CB8AC3E}">
+        <p14:creationId xmlns:p14="http://schemas.microsoft.com/office/powerpoint/2010/main" val="1137865423"/>
+      </p:ext>
+    </p:extLst>
+  </p:cSld>
+  <p:clrMapOvr>
+    <a:masterClrMapping/>
+  </p:clrMapOvr>
+</p:sld>
+</file>
+
+<file path=ppt/slides/slide45.xml><?xml version="1.0" encoding="utf-8"?>
+<p:sld xmlns:a="http://schemas.openxmlformats.org/drawingml/2006/main" xmlns:r="http://schemas.openxmlformats.org/officeDocument/2006/relationships" xmlns:p="http://schemas.openxmlformats.org/presentationml/2006/main">
+  <p:cSld>
+    <p:spTree>
+      <p:nvGrpSpPr>
+        <p:cNvPr id="1" name=""/>
+        <p:cNvGrpSpPr/>
+        <p:nvPr/>
+      </p:nvGrpSpPr>
+      <p:grpSpPr>
+        <a:xfrm>
+          <a:off x="0" y="0"/>
+          <a:ext cx="0" cy="0"/>
+          <a:chOff x="0" y="0"/>
+          <a:chExt cx="0" cy="0"/>
+        </a:xfrm>
+      </p:grpSpPr>
+      <p:sp>
+        <p:nvSpPr>
+          <p:cNvPr id="2" name="Título 1">
+            <a:extLst>
+              <a:ext uri="{FF2B5EF4-FFF2-40B4-BE49-F238E27FC236}">
+                <a16:creationId xmlns:a16="http://schemas.microsoft.com/office/drawing/2014/main" id="{02E636EB-A61C-B241-07D8-15AECB71D2A6}"/>
+              </a:ext>
+            </a:extLst>
+          </p:cNvPr>
+          <p:cNvSpPr>
+            <a:spLocks noGrp="1"/>
+          </p:cNvSpPr>
+          <p:nvPr>
+            <p:ph type="title"/>
+          </p:nvPr>
+        </p:nvSpPr>
+        <p:spPr/>
+        <p:txBody>
+          <a:bodyPr/>
+          <a:lstStyle/>
+          <a:p>
+            <a:r>
+              <a:rPr lang="pt-BR" dirty="0"/>
+              <a:t>Domain</a:t>
+            </a:r>
+          </a:p>
+        </p:txBody>
+      </p:sp>
+      <p:sp>
+        <p:nvSpPr>
+          <p:cNvPr id="3" name="Espaço Reservado para Conteúdo 2">
+            <a:extLst>
+              <a:ext uri="{FF2B5EF4-FFF2-40B4-BE49-F238E27FC236}">
+                <a16:creationId xmlns:a16="http://schemas.microsoft.com/office/drawing/2014/main" id="{4AC804E8-2BEF-9472-C4C0-33180D97AA0C}"/>
+              </a:ext>
+            </a:extLst>
+          </p:cNvPr>
+          <p:cNvSpPr>
+            <a:spLocks noGrp="1"/>
+          </p:cNvSpPr>
+          <p:nvPr>
+            <p:ph idx="1"/>
+          </p:nvPr>
+        </p:nvSpPr>
+        <p:spPr/>
+        <p:txBody>
+          <a:bodyPr/>
+          <a:lstStyle/>
+          <a:p>
+            <a:pPr marL="0" indent="0">
+              <a:buNone/>
+            </a:pPr>
+            <a:r>
+              <a:rPr lang="pt-BR" dirty="0"/>
+              <a:t>Não tem importações de </a:t>
+            </a:r>
+            <a:r>
+              <a:rPr lang="pt-BR" dirty="0" err="1"/>
+              <a:t>packages</a:t>
+            </a:r>
+            <a:r>
+              <a:rPr lang="pt-BR" dirty="0"/>
+              <a:t> externo.</a:t>
+            </a:r>
+          </a:p>
+          <a:p>
+            <a:pPr marL="0" indent="0">
+              <a:buNone/>
+            </a:pPr>
+            <a:endParaRPr lang="pt-BR" dirty="0"/>
+          </a:p>
+          <a:p>
+            <a:pPr marL="0" indent="0">
+              <a:buNone/>
+            </a:pPr>
+            <a:r>
+              <a:rPr lang="pt-BR" dirty="0"/>
+              <a:t>Não conhece nada do mundo externo.</a:t>
+            </a:r>
+          </a:p>
+          <a:p>
+            <a:pPr marL="0" indent="0">
+              <a:buNone/>
+            </a:pPr>
+            <a:endParaRPr lang="pt-BR" dirty="0"/>
+          </a:p>
+          <a:p>
+            <a:pPr marL="0" indent="0">
+              <a:buNone/>
+            </a:pPr>
+            <a:r>
+              <a:rPr lang="pt-BR" dirty="0"/>
+              <a:t>É a primeira coisa que o arquiteto fará.</a:t>
+            </a:r>
+          </a:p>
+          <a:p>
+            <a:pPr marL="0" indent="0">
+              <a:buNone/>
+            </a:pPr>
+            <a:endParaRPr lang="pt-BR" dirty="0"/>
+          </a:p>
+          <a:p>
+            <a:pPr marL="0" indent="0">
+              <a:buNone/>
+            </a:pPr>
+            <a:endParaRPr lang="pt-BR" dirty="0"/>
+          </a:p>
+        </p:txBody>
+      </p:sp>
+      <p:sp>
+        <p:nvSpPr>
+          <p:cNvPr id="4" name="Espaço Reservado para Data 3">
+            <a:extLst>
+              <a:ext uri="{FF2B5EF4-FFF2-40B4-BE49-F238E27FC236}">
+                <a16:creationId xmlns:a16="http://schemas.microsoft.com/office/drawing/2014/main" id="{B54410F5-D060-A20D-491E-3E504C734E8D}"/>
+              </a:ext>
+            </a:extLst>
+          </p:cNvPr>
+          <p:cNvSpPr>
+            <a:spLocks noGrp="1"/>
+          </p:cNvSpPr>
+          <p:nvPr>
+            <p:ph type="dt" sz="quarter" idx="10"/>
+          </p:nvPr>
+        </p:nvSpPr>
+        <p:spPr/>
+        <p:txBody>
+          <a:bodyPr/>
+          <a:lstStyle/>
+          <a:p>
+            <a:fld id="{2B84B1DC-92C6-D147-883C-6412FF727E31}" type="datetime1">
+              <a:rPr lang="pt-BR" smtClean="0"/>
+              <a:t>26/07/2022</a:t>
+            </a:fld>
+            <a:endParaRPr lang="pt-BR"/>
+          </a:p>
+        </p:txBody>
+      </p:sp>
+      <p:sp>
+        <p:nvSpPr>
+          <p:cNvPr id="5" name="Espaço Reservado para Número de Slide 4">
+            <a:extLst>
+              <a:ext uri="{FF2B5EF4-FFF2-40B4-BE49-F238E27FC236}">
+                <a16:creationId xmlns:a16="http://schemas.microsoft.com/office/drawing/2014/main" id="{7D5BDB2F-6C8A-72CF-EEB3-A7C93A9DEDFB}"/>
+              </a:ext>
+            </a:extLst>
+          </p:cNvPr>
+          <p:cNvSpPr>
+            <a:spLocks noGrp="1"/>
+          </p:cNvSpPr>
+          <p:nvPr>
+            <p:ph type="sldNum" sz="quarter" idx="12"/>
+          </p:nvPr>
+        </p:nvSpPr>
+        <p:spPr/>
+        <p:txBody>
+          <a:bodyPr/>
+          <a:lstStyle/>
+          <a:p>
+            <a:fld id="{2B84FD90-DEC6-D10B-883C-285EB3727E7D}" type="slidenum">
+              <a:rPr lang="pt-BR" smtClean="0"/>
+              <a:t>45</a:t>
+            </a:fld>
+            <a:endParaRPr lang="pt-BR"/>
+          </a:p>
+        </p:txBody>
+      </p:sp>
+    </p:spTree>
+    <p:extLst>
+      <p:ext uri="{BB962C8B-B14F-4D97-AF65-F5344CB8AC3E}">
+        <p14:creationId xmlns:p14="http://schemas.microsoft.com/office/powerpoint/2010/main" val="2500720362"/>
+      </p:ext>
+    </p:extLst>
+  </p:cSld>
+  <p:clrMapOvr>
+    <a:masterClrMapping/>
+  </p:clrMapOvr>
+</p:sld>
+</file>
+
+<file path=ppt/slides/slide46.xml><?xml version="1.0" encoding="utf-8"?>
+<p:sld xmlns:a="http://schemas.openxmlformats.org/drawingml/2006/main" xmlns:r="http://schemas.openxmlformats.org/officeDocument/2006/relationships" xmlns:p="http://schemas.openxmlformats.org/presentationml/2006/main">
+  <p:cSld>
+    <p:spTree>
+      <p:nvGrpSpPr>
+        <p:cNvPr id="1" name=""/>
+        <p:cNvGrpSpPr/>
+        <p:nvPr/>
+      </p:nvGrpSpPr>
+      <p:grpSpPr>
+        <a:xfrm>
+          <a:off x="0" y="0"/>
+          <a:ext cx="0" cy="0"/>
+          <a:chOff x="0" y="0"/>
+          <a:chExt cx="0" cy="0"/>
+        </a:xfrm>
+      </p:grpSpPr>
+      <p:sp>
+        <p:nvSpPr>
+          <p:cNvPr id="2" name="Título 1">
+            <a:extLst>
+              <a:ext uri="{FF2B5EF4-FFF2-40B4-BE49-F238E27FC236}">
+                <a16:creationId xmlns:a16="http://schemas.microsoft.com/office/drawing/2014/main" id="{02E636EB-A61C-B241-07D8-15AECB71D2A6}"/>
+              </a:ext>
+            </a:extLst>
+          </p:cNvPr>
+          <p:cNvSpPr>
+            <a:spLocks noGrp="1"/>
+          </p:cNvSpPr>
+          <p:nvPr>
+            <p:ph type="title"/>
+          </p:nvPr>
+        </p:nvSpPr>
+        <p:spPr/>
+        <p:txBody>
+          <a:bodyPr/>
+          <a:lstStyle/>
+          <a:p>
+            <a:r>
+              <a:rPr lang="pt-BR" dirty="0"/>
+              <a:t>Domain / </a:t>
+            </a:r>
+            <a:r>
+              <a:rPr lang="pt-BR" dirty="0" err="1"/>
+              <a:t>Entities</a:t>
+            </a:r>
+            <a:endParaRPr lang="pt-BR" dirty="0"/>
+          </a:p>
+        </p:txBody>
+      </p:sp>
+      <p:sp>
+        <p:nvSpPr>
+          <p:cNvPr id="3" name="Espaço Reservado para Conteúdo 2">
+            <a:extLst>
+              <a:ext uri="{FF2B5EF4-FFF2-40B4-BE49-F238E27FC236}">
+                <a16:creationId xmlns:a16="http://schemas.microsoft.com/office/drawing/2014/main" id="{4AC804E8-2BEF-9472-C4C0-33180D97AA0C}"/>
+              </a:ext>
+            </a:extLst>
+          </p:cNvPr>
+          <p:cNvSpPr>
+            <a:spLocks noGrp="1"/>
+          </p:cNvSpPr>
+          <p:nvPr>
+            <p:ph idx="1"/>
+          </p:nvPr>
+        </p:nvSpPr>
+        <p:spPr/>
+        <p:txBody>
+          <a:bodyPr/>
+          <a:lstStyle/>
+          <a:p>
+            <a:pPr marL="0" indent="0">
+              <a:buNone/>
+            </a:pPr>
+            <a:r>
+              <a:rPr lang="pt-BR" sz="2500" dirty="0"/>
+              <a:t>As regras de negócio </a:t>
+            </a:r>
+            <a:r>
+              <a:rPr lang="pt-BR" sz="2500" dirty="0">
+                <a:solidFill>
+                  <a:schemeClr val="bg1"/>
+                </a:solidFill>
+                <a:highlight>
+                  <a:srgbClr val="FFFF00"/>
+                </a:highlight>
+              </a:rPr>
+              <a:t>corporativa.</a:t>
+            </a:r>
+            <a:endParaRPr lang="pt-BR" sz="2500" dirty="0"/>
+          </a:p>
+          <a:p>
+            <a:pPr marL="0" indent="0">
+              <a:buNone/>
+            </a:pPr>
+            <a:endParaRPr lang="pt-BR" sz="2500" dirty="0"/>
+          </a:p>
+          <a:p>
+            <a:pPr marL="0" indent="0">
+              <a:buNone/>
+            </a:pPr>
+            <a:r>
+              <a:rPr lang="pt-BR" sz="2500" dirty="0"/>
+              <a:t>Dentro ficará as entidades do mundo real. (Atributos e pode ter métodos)</a:t>
+            </a:r>
+          </a:p>
+          <a:p>
+            <a:pPr marL="0" indent="0">
+              <a:buNone/>
+            </a:pPr>
+            <a:endParaRPr lang="pt-BR" sz="2500" u="sng" dirty="0"/>
+          </a:p>
+          <a:p>
+            <a:pPr marL="0" indent="0">
+              <a:buNone/>
+            </a:pPr>
+            <a:r>
+              <a:rPr lang="pt-BR" sz="2500" dirty="0"/>
+              <a:t>Não terá o .</a:t>
+            </a:r>
+            <a:r>
+              <a:rPr lang="pt-BR" sz="2500" dirty="0" err="1"/>
+              <a:t>fromJson</a:t>
+            </a:r>
+            <a:r>
+              <a:rPr lang="pt-BR" sz="2500" dirty="0"/>
+              <a:t> e .</a:t>
+            </a:r>
+            <a:r>
+              <a:rPr lang="pt-BR" sz="2500" dirty="0" err="1"/>
+              <a:t>toJson</a:t>
+            </a:r>
+            <a:r>
+              <a:rPr lang="pt-BR" sz="2500" dirty="0"/>
+              <a:t>, ou .</a:t>
+            </a:r>
+            <a:r>
+              <a:rPr lang="pt-BR" sz="2500" dirty="0" err="1"/>
+              <a:t>fromMap</a:t>
+            </a:r>
+            <a:r>
+              <a:rPr lang="pt-BR" sz="2500" dirty="0"/>
+              <a:t> e .</a:t>
+            </a:r>
+            <a:r>
+              <a:rPr lang="pt-BR" sz="2500" dirty="0" err="1"/>
+              <a:t>toMap</a:t>
+            </a:r>
+            <a:r>
+              <a:rPr lang="pt-BR" sz="2500" dirty="0"/>
+              <a:t>.</a:t>
+            </a:r>
+          </a:p>
+          <a:p>
+            <a:pPr marL="0" indent="0">
+              <a:buNone/>
+            </a:pPr>
+            <a:endParaRPr lang="pt-BR" sz="2500" dirty="0"/>
+          </a:p>
+          <a:p>
+            <a:pPr marL="0" indent="0">
+              <a:buNone/>
+            </a:pPr>
+            <a:r>
+              <a:rPr lang="pt-BR" sz="2500" dirty="0"/>
+              <a:t>Nossos </a:t>
+            </a:r>
+            <a:r>
+              <a:rPr lang="pt-BR" sz="2500" dirty="0" err="1"/>
+              <a:t>entities</a:t>
+            </a:r>
+            <a:r>
+              <a:rPr lang="pt-BR" sz="2500" dirty="0"/>
+              <a:t> serão usados em alguns lugares, como no </a:t>
+            </a:r>
+            <a:r>
+              <a:rPr lang="pt-BR" sz="2500" dirty="0" err="1"/>
+              <a:t>usecase</a:t>
+            </a:r>
+            <a:r>
+              <a:rPr lang="pt-BR" sz="2500" dirty="0"/>
+              <a:t>, que veremos a seguir.</a:t>
+            </a:r>
+          </a:p>
+          <a:p>
+            <a:pPr marL="0" indent="0">
+              <a:buNone/>
+            </a:pPr>
+            <a:endParaRPr lang="pt-BR" sz="2500" dirty="0"/>
+          </a:p>
+          <a:p>
+            <a:pPr marL="0" indent="0">
+              <a:buNone/>
+            </a:pPr>
+            <a:endParaRPr lang="pt-BR" sz="2500" dirty="0"/>
+          </a:p>
+          <a:p>
+            <a:pPr marL="0" indent="0">
+              <a:buNone/>
+            </a:pPr>
+            <a:endParaRPr lang="pt-BR" sz="2500" dirty="0"/>
+          </a:p>
+          <a:p>
+            <a:pPr marL="0" indent="0">
+              <a:buNone/>
+            </a:pPr>
+            <a:endParaRPr lang="pt-BR" sz="2500" dirty="0"/>
+          </a:p>
+        </p:txBody>
+      </p:sp>
+      <p:sp>
+        <p:nvSpPr>
+          <p:cNvPr id="4" name="Espaço Reservado para Data 3">
+            <a:extLst>
+              <a:ext uri="{FF2B5EF4-FFF2-40B4-BE49-F238E27FC236}">
+                <a16:creationId xmlns:a16="http://schemas.microsoft.com/office/drawing/2014/main" id="{B54410F5-D060-A20D-491E-3E504C734E8D}"/>
+              </a:ext>
+            </a:extLst>
+          </p:cNvPr>
+          <p:cNvSpPr>
+            <a:spLocks noGrp="1"/>
+          </p:cNvSpPr>
+          <p:nvPr>
+            <p:ph type="dt" sz="quarter" idx="10"/>
+          </p:nvPr>
+        </p:nvSpPr>
+        <p:spPr/>
+        <p:txBody>
+          <a:bodyPr/>
+          <a:lstStyle/>
+          <a:p>
+            <a:fld id="{2B84B1DC-92C6-D147-883C-6412FF727E31}" type="datetime1">
+              <a:rPr lang="pt-BR" smtClean="0"/>
+              <a:t>26/07/2022</a:t>
+            </a:fld>
+            <a:endParaRPr lang="pt-BR"/>
+          </a:p>
+        </p:txBody>
+      </p:sp>
+      <p:sp>
+        <p:nvSpPr>
+          <p:cNvPr id="5" name="Espaço Reservado para Número de Slide 4">
+            <a:extLst>
+              <a:ext uri="{FF2B5EF4-FFF2-40B4-BE49-F238E27FC236}">
+                <a16:creationId xmlns:a16="http://schemas.microsoft.com/office/drawing/2014/main" id="{7D5BDB2F-6C8A-72CF-EEB3-A7C93A9DEDFB}"/>
+              </a:ext>
+            </a:extLst>
+          </p:cNvPr>
+          <p:cNvSpPr>
+            <a:spLocks noGrp="1"/>
+          </p:cNvSpPr>
+          <p:nvPr>
+            <p:ph type="sldNum" sz="quarter" idx="12"/>
+          </p:nvPr>
+        </p:nvSpPr>
+        <p:spPr/>
+        <p:txBody>
+          <a:bodyPr/>
+          <a:lstStyle/>
+          <a:p>
+            <a:fld id="{2B84FD90-DEC6-D10B-883C-285EB3727E7D}" type="slidenum">
+              <a:rPr lang="pt-BR" smtClean="0"/>
+              <a:t>46</a:t>
+            </a:fld>
+            <a:endParaRPr lang="pt-BR"/>
+          </a:p>
+        </p:txBody>
+      </p:sp>
+    </p:spTree>
+    <p:extLst>
+      <p:ext uri="{BB962C8B-B14F-4D97-AF65-F5344CB8AC3E}">
+        <p14:creationId xmlns:p14="http://schemas.microsoft.com/office/powerpoint/2010/main" val="2976479864"/>
+      </p:ext>
+    </p:extLst>
+  </p:cSld>
+  <p:clrMapOvr>
+    <a:masterClrMapping/>
+  </p:clrMapOvr>
+</p:sld>
+</file>
+
+<file path=ppt/slides/slide47.xml><?xml version="1.0" encoding="utf-8"?>
+<p:sld xmlns:a="http://schemas.openxmlformats.org/drawingml/2006/main" xmlns:r="http://schemas.openxmlformats.org/officeDocument/2006/relationships" xmlns:p="http://schemas.openxmlformats.org/presentationml/2006/main">
+  <p:cSld>
+    <p:spTree>
+      <p:nvGrpSpPr>
+        <p:cNvPr id="1" name=""/>
+        <p:cNvGrpSpPr/>
+        <p:nvPr/>
+      </p:nvGrpSpPr>
+      <p:grpSpPr>
+        <a:xfrm>
+          <a:off x="0" y="0"/>
+          <a:ext cx="0" cy="0"/>
+          <a:chOff x="0" y="0"/>
+          <a:chExt cx="0" cy="0"/>
+        </a:xfrm>
+      </p:grpSpPr>
+      <p:sp>
+        <p:nvSpPr>
+          <p:cNvPr id="2" name="Título 1">
+            <a:extLst>
+              <a:ext uri="{FF2B5EF4-FFF2-40B4-BE49-F238E27FC236}">
+                <a16:creationId xmlns:a16="http://schemas.microsoft.com/office/drawing/2014/main" id="{02E636EB-A61C-B241-07D8-15AECB71D2A6}"/>
+              </a:ext>
+            </a:extLst>
+          </p:cNvPr>
+          <p:cNvSpPr>
+            <a:spLocks noGrp="1"/>
+          </p:cNvSpPr>
+          <p:nvPr>
+            <p:ph type="title"/>
+          </p:nvPr>
+        </p:nvSpPr>
+        <p:spPr/>
+        <p:txBody>
+          <a:bodyPr/>
+          <a:lstStyle/>
+          <a:p>
+            <a:r>
+              <a:rPr lang="pt-BR" dirty="0"/>
+              <a:t>Domain / </a:t>
+            </a:r>
+            <a:r>
+              <a:rPr lang="pt-BR" dirty="0" err="1"/>
+              <a:t>Usecases</a:t>
+            </a:r>
+            <a:endParaRPr lang="pt-BR" dirty="0"/>
+          </a:p>
+        </p:txBody>
+      </p:sp>
+      <p:sp>
+        <p:nvSpPr>
+          <p:cNvPr id="3" name="Espaço Reservado para Conteúdo 2">
+            <a:extLst>
+              <a:ext uri="{FF2B5EF4-FFF2-40B4-BE49-F238E27FC236}">
+                <a16:creationId xmlns:a16="http://schemas.microsoft.com/office/drawing/2014/main" id="{4AC804E8-2BEF-9472-C4C0-33180D97AA0C}"/>
+              </a:ext>
+            </a:extLst>
+          </p:cNvPr>
+          <p:cNvSpPr>
+            <a:spLocks noGrp="1"/>
+          </p:cNvSpPr>
+          <p:nvPr>
+            <p:ph idx="1"/>
+          </p:nvPr>
+        </p:nvSpPr>
+        <p:spPr/>
+        <p:txBody>
+          <a:bodyPr/>
+          <a:lstStyle/>
+          <a:p>
+            <a:pPr marL="0" indent="0">
+              <a:buNone/>
+            </a:pPr>
+            <a:r>
+              <a:rPr lang="pt-BR" sz="2500" dirty="0"/>
+              <a:t>As regras de negócio da </a:t>
+            </a:r>
+            <a:r>
+              <a:rPr lang="pt-BR" sz="2500" dirty="0">
+                <a:solidFill>
+                  <a:schemeClr val="bg1"/>
+                </a:solidFill>
+                <a:highlight>
+                  <a:srgbClr val="FFFF00"/>
+                </a:highlight>
+              </a:rPr>
+              <a:t>aplicação</a:t>
+            </a:r>
+            <a:r>
+              <a:rPr lang="pt-BR" sz="2500" dirty="0"/>
+              <a:t>.</a:t>
+            </a:r>
+          </a:p>
+          <a:p>
+            <a:pPr marL="0" indent="0">
+              <a:buNone/>
+            </a:pPr>
+            <a:endParaRPr lang="pt-BR" sz="2500" dirty="0"/>
+          </a:p>
+          <a:p>
+            <a:pPr marL="0" indent="0">
+              <a:buNone/>
+            </a:pPr>
+            <a:r>
+              <a:rPr lang="pt-BR" sz="2500" dirty="0"/>
+              <a:t>Dentro ficará os casos de uso.</a:t>
+            </a:r>
+          </a:p>
+          <a:p>
+            <a:pPr marL="0" indent="0">
+              <a:buNone/>
+            </a:pPr>
+            <a:endParaRPr lang="pt-BR" sz="2500" dirty="0"/>
+          </a:p>
+          <a:p>
+            <a:pPr marL="0" indent="0">
+              <a:buNone/>
+            </a:pPr>
+            <a:r>
+              <a:rPr lang="pt-BR" sz="2500" dirty="0"/>
+              <a:t>Os casos de uso são classes que fará alguma ação como </a:t>
+            </a:r>
+            <a:r>
+              <a:rPr lang="pt-BR" sz="2500" dirty="0" err="1"/>
+              <a:t>get_computer_bybrand_usecase.dart</a:t>
+            </a:r>
+            <a:endParaRPr lang="pt-BR" sz="2500" dirty="0"/>
+          </a:p>
+          <a:p>
+            <a:pPr marL="0" indent="0">
+              <a:buNone/>
+            </a:pPr>
+            <a:endParaRPr lang="pt-BR" sz="2500" dirty="0"/>
+          </a:p>
+          <a:p>
+            <a:pPr marL="0" indent="0">
+              <a:buNone/>
+            </a:pPr>
+            <a:r>
+              <a:rPr lang="pt-BR" sz="2500" dirty="0"/>
+              <a:t>Será composta por uma interface e por uma implementação, por isso é interessante criar uma pasta para cada </a:t>
+            </a:r>
+            <a:r>
+              <a:rPr lang="pt-BR" sz="2500" dirty="0" err="1"/>
+              <a:t>usecase</a:t>
+            </a:r>
+            <a:r>
+              <a:rPr lang="pt-BR" sz="2500" dirty="0"/>
+              <a:t>.</a:t>
+            </a:r>
+          </a:p>
+          <a:p>
+            <a:pPr marL="0" indent="0">
+              <a:buNone/>
+            </a:pPr>
+            <a:endParaRPr lang="pt-BR" sz="2500" dirty="0"/>
+          </a:p>
+          <a:p>
+            <a:pPr marL="0" indent="0">
+              <a:buNone/>
+            </a:pPr>
+            <a:r>
+              <a:rPr lang="pt-BR" sz="2500" dirty="0"/>
+              <a:t>Na implementação a gente chamará um </a:t>
+            </a:r>
+            <a:r>
+              <a:rPr lang="pt-BR" sz="2500" dirty="0" err="1"/>
+              <a:t>repository</a:t>
+            </a:r>
+            <a:r>
+              <a:rPr lang="pt-BR" sz="2500" dirty="0"/>
+              <a:t>, que é a próxima parte do </a:t>
+            </a:r>
+            <a:r>
+              <a:rPr lang="pt-BR" sz="2500" dirty="0" err="1"/>
+              <a:t>domain</a:t>
+            </a:r>
+            <a:r>
+              <a:rPr lang="pt-BR" sz="2500" dirty="0"/>
+              <a:t> que veremos.</a:t>
+            </a:r>
+          </a:p>
+          <a:p>
+            <a:pPr marL="0" indent="0">
+              <a:buNone/>
+            </a:pPr>
+            <a:endParaRPr lang="pt-BR" sz="2600" dirty="0"/>
+          </a:p>
+          <a:p>
+            <a:pPr marL="0" indent="0">
+              <a:buNone/>
+            </a:pPr>
+            <a:endParaRPr lang="pt-BR" sz="2600" dirty="0"/>
+          </a:p>
+          <a:p>
+            <a:pPr marL="0" indent="0">
+              <a:buNone/>
+            </a:pPr>
+            <a:endParaRPr lang="pt-BR" sz="2600" dirty="0"/>
+          </a:p>
+        </p:txBody>
+      </p:sp>
+      <p:sp>
+        <p:nvSpPr>
+          <p:cNvPr id="4" name="Espaço Reservado para Data 3">
+            <a:extLst>
+              <a:ext uri="{FF2B5EF4-FFF2-40B4-BE49-F238E27FC236}">
+                <a16:creationId xmlns:a16="http://schemas.microsoft.com/office/drawing/2014/main" id="{B54410F5-D060-A20D-491E-3E504C734E8D}"/>
+              </a:ext>
+            </a:extLst>
+          </p:cNvPr>
+          <p:cNvSpPr>
+            <a:spLocks noGrp="1"/>
+          </p:cNvSpPr>
+          <p:nvPr>
+            <p:ph type="dt" sz="quarter" idx="10"/>
+          </p:nvPr>
+        </p:nvSpPr>
+        <p:spPr/>
+        <p:txBody>
+          <a:bodyPr/>
+          <a:lstStyle/>
+          <a:p>
+            <a:fld id="{2B84B1DC-92C6-D147-883C-6412FF727E31}" type="datetime1">
+              <a:rPr lang="pt-BR" smtClean="0"/>
+              <a:t>26/07/2022</a:t>
+            </a:fld>
+            <a:endParaRPr lang="pt-BR"/>
+          </a:p>
+        </p:txBody>
+      </p:sp>
+      <p:sp>
+        <p:nvSpPr>
+          <p:cNvPr id="5" name="Espaço Reservado para Número de Slide 4">
+            <a:extLst>
+              <a:ext uri="{FF2B5EF4-FFF2-40B4-BE49-F238E27FC236}">
+                <a16:creationId xmlns:a16="http://schemas.microsoft.com/office/drawing/2014/main" id="{7D5BDB2F-6C8A-72CF-EEB3-A7C93A9DEDFB}"/>
+              </a:ext>
+            </a:extLst>
+          </p:cNvPr>
+          <p:cNvSpPr>
+            <a:spLocks noGrp="1"/>
+          </p:cNvSpPr>
+          <p:nvPr>
+            <p:ph type="sldNum" sz="quarter" idx="12"/>
+          </p:nvPr>
+        </p:nvSpPr>
+        <p:spPr/>
+        <p:txBody>
+          <a:bodyPr/>
+          <a:lstStyle/>
+          <a:p>
+            <a:fld id="{2B84FD90-DEC6-D10B-883C-285EB3727E7D}" type="slidenum">
+              <a:rPr lang="pt-BR" smtClean="0"/>
+              <a:t>47</a:t>
+            </a:fld>
+            <a:endParaRPr lang="pt-BR"/>
+          </a:p>
+        </p:txBody>
+      </p:sp>
+    </p:spTree>
+    <p:extLst>
+      <p:ext uri="{BB962C8B-B14F-4D97-AF65-F5344CB8AC3E}">
+        <p14:creationId xmlns:p14="http://schemas.microsoft.com/office/powerpoint/2010/main" val="2735908311"/>
+      </p:ext>
+    </p:extLst>
+  </p:cSld>
+  <p:clrMapOvr>
+    <a:masterClrMapping/>
+  </p:clrMapOvr>
+</p:sld>
+</file>
+
+<file path=ppt/slides/slide48.xml><?xml version="1.0" encoding="utf-8"?>
+<p:sld xmlns:a="http://schemas.openxmlformats.org/drawingml/2006/main" xmlns:r="http://schemas.openxmlformats.org/officeDocument/2006/relationships" xmlns:p="http://schemas.openxmlformats.org/presentationml/2006/main">
+  <p:cSld>
+    <p:spTree>
+      <p:nvGrpSpPr>
+        <p:cNvPr id="1" name=""/>
+        <p:cNvGrpSpPr/>
+        <p:nvPr/>
+      </p:nvGrpSpPr>
+      <p:grpSpPr>
+        <a:xfrm>
+          <a:off x="0" y="0"/>
+          <a:ext cx="0" cy="0"/>
+          <a:chOff x="0" y="0"/>
+          <a:chExt cx="0" cy="0"/>
+        </a:xfrm>
+      </p:grpSpPr>
+      <p:sp>
+        <p:nvSpPr>
+          <p:cNvPr id="2" name="Título 1">
+            <a:extLst>
+              <a:ext uri="{FF2B5EF4-FFF2-40B4-BE49-F238E27FC236}">
+                <a16:creationId xmlns:a16="http://schemas.microsoft.com/office/drawing/2014/main" id="{02E636EB-A61C-B241-07D8-15AECB71D2A6}"/>
+              </a:ext>
+            </a:extLst>
+          </p:cNvPr>
+          <p:cNvSpPr>
+            <a:spLocks noGrp="1"/>
+          </p:cNvSpPr>
+          <p:nvPr>
+            <p:ph type="title"/>
+          </p:nvPr>
+        </p:nvSpPr>
+        <p:spPr/>
+        <p:txBody>
+          <a:bodyPr/>
+          <a:lstStyle/>
+          <a:p>
+            <a:r>
+              <a:rPr lang="pt-BR" dirty="0"/>
+              <a:t>Domain / </a:t>
+            </a:r>
+            <a:r>
+              <a:rPr lang="pt-BR" dirty="0" err="1"/>
+              <a:t>Repositories</a:t>
+            </a:r>
+            <a:endParaRPr lang="pt-BR" dirty="0"/>
+          </a:p>
+        </p:txBody>
+      </p:sp>
+      <p:sp>
+        <p:nvSpPr>
+          <p:cNvPr id="3" name="Espaço Reservado para Conteúdo 2">
+            <a:extLst>
+              <a:ext uri="{FF2B5EF4-FFF2-40B4-BE49-F238E27FC236}">
+                <a16:creationId xmlns:a16="http://schemas.microsoft.com/office/drawing/2014/main" id="{4AC804E8-2BEF-9472-C4C0-33180D97AA0C}"/>
+              </a:ext>
+            </a:extLst>
+          </p:cNvPr>
+          <p:cNvSpPr>
+            <a:spLocks noGrp="1"/>
+          </p:cNvSpPr>
+          <p:nvPr>
+            <p:ph idx="1"/>
+          </p:nvPr>
+        </p:nvSpPr>
+        <p:spPr/>
+        <p:txBody>
+          <a:bodyPr/>
+          <a:lstStyle/>
+          <a:p>
+            <a:pPr marL="0" indent="0">
+              <a:buNone/>
+            </a:pPr>
+            <a:r>
+              <a:rPr lang="pt-BR" sz="2600" dirty="0"/>
+              <a:t>Nesse </a:t>
+            </a:r>
+            <a:r>
+              <a:rPr lang="pt-BR" sz="2600" dirty="0" err="1"/>
+              <a:t>repositories</a:t>
+            </a:r>
+            <a:r>
+              <a:rPr lang="pt-BR" sz="2600" dirty="0"/>
+              <a:t> nós criaremos apenas a abstração (interface, com o abstract).</a:t>
+            </a:r>
+          </a:p>
+          <a:p>
+            <a:pPr marL="0" indent="0">
+              <a:buNone/>
+            </a:pPr>
+            <a:endParaRPr lang="pt-BR" sz="2600" dirty="0"/>
+          </a:p>
+          <a:p>
+            <a:pPr marL="0" indent="0">
+              <a:buNone/>
+            </a:pPr>
+            <a:r>
+              <a:rPr lang="pt-BR" sz="2600" dirty="0"/>
+              <a:t>Ainda não sabemos se será usado </a:t>
+            </a:r>
+            <a:r>
+              <a:rPr lang="pt-BR" sz="2600" dirty="0" err="1"/>
+              <a:t>Firebase</a:t>
+            </a:r>
+            <a:r>
+              <a:rPr lang="pt-BR" sz="2600" dirty="0"/>
+              <a:t>, </a:t>
+            </a:r>
+            <a:r>
+              <a:rPr lang="pt-BR" sz="2600" dirty="0" err="1"/>
+              <a:t>Api</a:t>
+            </a:r>
+            <a:r>
+              <a:rPr lang="pt-BR" sz="2600" dirty="0"/>
+              <a:t> </a:t>
+            </a:r>
+            <a:r>
+              <a:rPr lang="pt-BR" sz="2600" dirty="0" err="1"/>
+              <a:t>Rest</a:t>
+            </a:r>
+            <a:r>
+              <a:rPr lang="pt-BR" sz="2600" dirty="0"/>
+              <a:t>, Banco loca, e nosso </a:t>
+            </a:r>
+            <a:r>
+              <a:rPr lang="pt-BR" sz="2600" dirty="0" err="1"/>
+              <a:t>repository</a:t>
+            </a:r>
+            <a:r>
+              <a:rPr lang="pt-BR" sz="2600" dirty="0"/>
+              <a:t> do </a:t>
+            </a:r>
+            <a:r>
+              <a:rPr lang="pt-BR" sz="2600" dirty="0" err="1"/>
+              <a:t>domain</a:t>
+            </a:r>
+            <a:r>
+              <a:rPr lang="pt-BR" sz="2600" dirty="0"/>
+              <a:t> não quer nem saber qual deles, o que ele precisa fazer é criar um contrato.</a:t>
+            </a:r>
+          </a:p>
+          <a:p>
+            <a:pPr marL="0" indent="0">
+              <a:buNone/>
+            </a:pPr>
+            <a:endParaRPr lang="pt-BR" sz="2600" dirty="0"/>
+          </a:p>
+          <a:p>
+            <a:pPr marL="0" indent="0">
+              <a:buNone/>
+            </a:pPr>
+            <a:r>
+              <a:rPr lang="pt-BR" sz="2600" dirty="0"/>
+              <a:t>Sempre iremos postergando as decisões de implementações para as camadas mais externas.</a:t>
+            </a:r>
+          </a:p>
+          <a:p>
+            <a:pPr marL="0" indent="0">
+              <a:buNone/>
+            </a:pPr>
+            <a:endParaRPr lang="pt-BR" sz="2600" dirty="0"/>
+          </a:p>
+        </p:txBody>
+      </p:sp>
+      <p:sp>
+        <p:nvSpPr>
+          <p:cNvPr id="4" name="Espaço Reservado para Data 3">
+            <a:extLst>
+              <a:ext uri="{FF2B5EF4-FFF2-40B4-BE49-F238E27FC236}">
+                <a16:creationId xmlns:a16="http://schemas.microsoft.com/office/drawing/2014/main" id="{B54410F5-D060-A20D-491E-3E504C734E8D}"/>
+              </a:ext>
+            </a:extLst>
+          </p:cNvPr>
+          <p:cNvSpPr>
+            <a:spLocks noGrp="1"/>
+          </p:cNvSpPr>
+          <p:nvPr>
+            <p:ph type="dt" sz="quarter" idx="10"/>
+          </p:nvPr>
+        </p:nvSpPr>
+        <p:spPr/>
+        <p:txBody>
+          <a:bodyPr/>
+          <a:lstStyle/>
+          <a:p>
+            <a:fld id="{2B84B1DC-92C6-D147-883C-6412FF727E31}" type="datetime1">
+              <a:rPr lang="pt-BR" smtClean="0"/>
+              <a:t>26/07/2022</a:t>
+            </a:fld>
+            <a:endParaRPr lang="pt-BR"/>
+          </a:p>
+        </p:txBody>
+      </p:sp>
+      <p:sp>
+        <p:nvSpPr>
+          <p:cNvPr id="5" name="Espaço Reservado para Número de Slide 4">
+            <a:extLst>
+              <a:ext uri="{FF2B5EF4-FFF2-40B4-BE49-F238E27FC236}">
+                <a16:creationId xmlns:a16="http://schemas.microsoft.com/office/drawing/2014/main" id="{7D5BDB2F-6C8A-72CF-EEB3-A7C93A9DEDFB}"/>
+              </a:ext>
+            </a:extLst>
+          </p:cNvPr>
+          <p:cNvSpPr>
+            <a:spLocks noGrp="1"/>
+          </p:cNvSpPr>
+          <p:nvPr>
+            <p:ph type="sldNum" sz="quarter" idx="12"/>
+          </p:nvPr>
+        </p:nvSpPr>
+        <p:spPr/>
+        <p:txBody>
+          <a:bodyPr/>
+          <a:lstStyle/>
+          <a:p>
+            <a:fld id="{2B84FD90-DEC6-D10B-883C-285EB3727E7D}" type="slidenum">
+              <a:rPr lang="pt-BR" smtClean="0"/>
+              <a:t>48</a:t>
+            </a:fld>
+            <a:endParaRPr lang="pt-BR"/>
+          </a:p>
+        </p:txBody>
+      </p:sp>
+    </p:spTree>
+    <p:extLst>
+      <p:ext uri="{BB962C8B-B14F-4D97-AF65-F5344CB8AC3E}">
+        <p14:creationId xmlns:p14="http://schemas.microsoft.com/office/powerpoint/2010/main" val="3605823404"/>
+      </p:ext>
+    </p:extLst>
+  </p:cSld>
+  <p:clrMapOvr>
+    <a:masterClrMapping/>
+  </p:clrMapOvr>
+</p:sld>
+</file>
+
+<file path=ppt/slides/slide49.xml><?xml version="1.0" encoding="utf-8"?>
+<p:sld xmlns:a="http://schemas.openxmlformats.org/drawingml/2006/main" xmlns:r="http://schemas.openxmlformats.org/officeDocument/2006/relationships" xmlns:p="http://schemas.openxmlformats.org/presentationml/2006/main">
+  <p:cSld>
+    <p:spTree>
+      <p:nvGrpSpPr>
+        <p:cNvPr id="1" name=""/>
+        <p:cNvGrpSpPr/>
+        <p:nvPr/>
+      </p:nvGrpSpPr>
+      <p:grpSpPr>
+        <a:xfrm>
+          <a:off x="0" y="0"/>
+          <a:ext cx="0" cy="0"/>
+          <a:chOff x="0" y="0"/>
+          <a:chExt cx="0" cy="0"/>
+        </a:xfrm>
+      </p:grpSpPr>
+      <p:sp>
+        <p:nvSpPr>
+          <p:cNvPr id="2" name="Título 1">
+            <a:extLst>
+              <a:ext uri="{FF2B5EF4-FFF2-40B4-BE49-F238E27FC236}">
+                <a16:creationId xmlns:a16="http://schemas.microsoft.com/office/drawing/2014/main" id="{02E636EB-A61C-B241-07D8-15AECB71D2A6}"/>
+              </a:ext>
+            </a:extLst>
+          </p:cNvPr>
+          <p:cNvSpPr>
+            <a:spLocks noGrp="1"/>
+          </p:cNvSpPr>
+          <p:nvPr>
+            <p:ph type="title"/>
+          </p:nvPr>
+        </p:nvSpPr>
+        <p:spPr/>
+        <p:txBody>
+          <a:bodyPr/>
+          <a:lstStyle/>
+          <a:p>
+            <a:endParaRPr lang="pt-BR" dirty="0"/>
+          </a:p>
+        </p:txBody>
+      </p:sp>
+      <p:sp>
+        <p:nvSpPr>
+          <p:cNvPr id="3" name="Espaço Reservado para Conteúdo 2">
+            <a:extLst>
+              <a:ext uri="{FF2B5EF4-FFF2-40B4-BE49-F238E27FC236}">
+                <a16:creationId xmlns:a16="http://schemas.microsoft.com/office/drawing/2014/main" id="{4AC804E8-2BEF-9472-C4C0-33180D97AA0C}"/>
+              </a:ext>
+            </a:extLst>
+          </p:cNvPr>
+          <p:cNvSpPr>
+            <a:spLocks noGrp="1"/>
+          </p:cNvSpPr>
+          <p:nvPr>
+            <p:ph idx="1"/>
+          </p:nvPr>
+        </p:nvSpPr>
+        <p:spPr/>
+        <p:txBody>
+          <a:bodyPr/>
+          <a:lstStyle/>
+          <a:p>
+            <a:pPr marL="0" indent="0" algn="ctr">
+              <a:buNone/>
+            </a:pPr>
+            <a:endParaRPr lang="pt-BR" dirty="0">
+              <a:solidFill>
+                <a:schemeClr val="bg1"/>
+              </a:solidFill>
+              <a:highlight>
+                <a:srgbClr val="FF0000"/>
+              </a:highlight>
+            </a:endParaRPr>
+          </a:p>
+          <a:p>
+            <a:pPr marL="0" indent="0" algn="ctr">
+              <a:buNone/>
+            </a:pPr>
+            <a:endParaRPr lang="pt-BR" dirty="0">
+              <a:solidFill>
+                <a:schemeClr val="bg1"/>
+              </a:solidFill>
+              <a:highlight>
+                <a:srgbClr val="FF0000"/>
+              </a:highlight>
+            </a:endParaRPr>
+          </a:p>
+          <a:p>
+            <a:pPr marL="0" indent="0" algn="ctr">
+              <a:buNone/>
+            </a:pPr>
+            <a:endParaRPr lang="pt-BR" dirty="0">
+              <a:solidFill>
+                <a:schemeClr val="bg1"/>
+              </a:solidFill>
+              <a:highlight>
+                <a:srgbClr val="FF0000"/>
+              </a:highlight>
+            </a:endParaRPr>
+          </a:p>
+          <a:p>
+            <a:pPr marL="0" indent="0" algn="ctr">
+              <a:buNone/>
+            </a:pPr>
+            <a:r>
+              <a:rPr lang="pt-BR" sz="5400" dirty="0">
+                <a:solidFill>
+                  <a:schemeClr val="bg1"/>
+                </a:solidFill>
+                <a:highlight>
+                  <a:srgbClr val="FF0000"/>
+                </a:highlight>
+              </a:rPr>
+              <a:t>DATA</a:t>
+            </a:r>
+            <a:endParaRPr lang="pt-BR" dirty="0">
+              <a:solidFill>
+                <a:schemeClr val="bg1"/>
+              </a:solidFill>
+              <a:highlight>
+                <a:srgbClr val="FF0000"/>
+              </a:highlight>
+            </a:endParaRPr>
+          </a:p>
+        </p:txBody>
+      </p:sp>
+      <p:sp>
+        <p:nvSpPr>
+          <p:cNvPr id="4" name="Espaço Reservado para Data 3">
+            <a:extLst>
+              <a:ext uri="{FF2B5EF4-FFF2-40B4-BE49-F238E27FC236}">
+                <a16:creationId xmlns:a16="http://schemas.microsoft.com/office/drawing/2014/main" id="{B54410F5-D060-A20D-491E-3E504C734E8D}"/>
+              </a:ext>
+            </a:extLst>
+          </p:cNvPr>
+          <p:cNvSpPr>
+            <a:spLocks noGrp="1"/>
+          </p:cNvSpPr>
+          <p:nvPr>
+            <p:ph type="dt" sz="quarter" idx="10"/>
+          </p:nvPr>
+        </p:nvSpPr>
+        <p:spPr/>
+        <p:txBody>
+          <a:bodyPr/>
+          <a:lstStyle/>
+          <a:p>
+            <a:fld id="{2B84B1DC-92C6-D147-883C-6412FF727E31}" type="datetime1">
+              <a:rPr lang="pt-BR" smtClean="0"/>
+              <a:t>26/07/2022</a:t>
+            </a:fld>
+            <a:endParaRPr lang="pt-BR"/>
+          </a:p>
+        </p:txBody>
+      </p:sp>
+      <p:sp>
+        <p:nvSpPr>
+          <p:cNvPr id="5" name="Espaço Reservado para Número de Slide 4">
+            <a:extLst>
+              <a:ext uri="{FF2B5EF4-FFF2-40B4-BE49-F238E27FC236}">
+                <a16:creationId xmlns:a16="http://schemas.microsoft.com/office/drawing/2014/main" id="{7D5BDB2F-6C8A-72CF-EEB3-A7C93A9DEDFB}"/>
+              </a:ext>
+            </a:extLst>
+          </p:cNvPr>
+          <p:cNvSpPr>
+            <a:spLocks noGrp="1"/>
+          </p:cNvSpPr>
+          <p:nvPr>
+            <p:ph type="sldNum" sz="quarter" idx="12"/>
+          </p:nvPr>
+        </p:nvSpPr>
+        <p:spPr/>
+        <p:txBody>
+          <a:bodyPr/>
+          <a:lstStyle/>
+          <a:p>
+            <a:fld id="{2B84FD90-DEC6-D10B-883C-285EB3727E7D}" type="slidenum">
+              <a:rPr lang="pt-BR" smtClean="0"/>
+              <a:t>49</a:t>
+            </a:fld>
+            <a:endParaRPr lang="pt-BR"/>
+          </a:p>
+        </p:txBody>
+      </p:sp>
+    </p:spTree>
+    <p:extLst>
+      <p:ext uri="{BB962C8B-B14F-4D97-AF65-F5344CB8AC3E}">
+        <p14:creationId xmlns:p14="http://schemas.microsoft.com/office/powerpoint/2010/main" val="1485512128"/>
+      </p:ext>
+    </p:extLst>
   </p:cSld>
   <p:clrMapOvr>
     <a:masterClrMapping/>
@@ -11127,7 +13621,7 @@
             <a:spLocks noGrp="1" noChangeArrowheads="1"/>
             <a:extLst>
               <a:ext uri="smNativeData">
-                <pr:smNativeData xmlns:mc="http://schemas.openxmlformats.org/markup-compatibility/2006" xmlns:p14="http://schemas.microsoft.com/office/powerpoint/2010/main" xmlns:p15="http://schemas.microsoft.com/office/powerpoint/2012/main" xmlns:pr="smNativeData" xmlns="smNativeData" val="SMDATA_15_l3DXYhMAAAAlAAAAZAAAAA8BAAAAkAAAAEgAAACQAAAASAAAAAAAAAABAAAAAAAAAAEAAABQAAAAAAAAAAAA4D8AAAAAAADgPwAAAAAAAOA/AAAAAAAA4D8AAAAAAADgPwAAAAAAAOA/AAAAAAAA4D8AAAAAAADgPwAAAAAAAOA/AAAAAAAA4D8CAAAAjAAAAAAAAAAAAAAAADOZDCYmJggAAAAAAAAAAAAAAAAAAAAAAAAAAAAAAAAAAAAAZAAAAAEAAABAAAAAAAAAAAAAAAAAAAAAAAAAAAAAAAAAAAAAAAAAAAAAAAAAAAAAAAAAAAAAAAAAAAAAAAAAAAAAAAAAAAAAAAAAAAAAAAAAAAAAAAAAAAAAAAAAAAAAFAAAADwAAAAAAAAAAAAAAP///wkUAAAAAQAAABQAAAAUAAAAFAAAAAEAAAAAAAAAZAAAAGQAAAAAAAAAZAAAAGQAAAAVAAAAYAAAAAAAAAAAAAAADwAAACADAAAAAAAAAAAAAAEAAACgMgAAVgcAAKr4//8BAAAAf39/AAEAAABkAAAAAAAAABQAAABAHwAAAAAAACYAAAAAAAAAwOD//wAAAAAmAAAAZAAAABYAAABMAAAAAAAAAAAAAAAEAAAAAAAAAAEAAAAzZpkKAAAAACgAAAAoAAAAZAAAAGQAAAAAAAAAzMzMAAAAAABQAAAAUAAAAGQAAABkAAAAAAAAABcAAAAUAAAAAAAAAAAAAAD/fwAA/38AAAAAAAAJAAAABAAAAF8AYAAeAAAAaAAAAAAAAAAAAAAAAAAAAAAAAAAAAAAAECcAABAnAAAAAAAAAAAAAAAAAAAAAAAAAAAAAAAAAAAAAAAAAAAAABQAAAAAAAAAwMD/AAAAAABkAAAAMgAAAAAAAABkAAAAAAAAAH9/fwAKAAAAIgAAABgAAAAAAAAAAAAAAAAAAAAAAAAAAAAAAAAAAAAkAAAAJAAAAAAAAAAHAAAAAAAAAAAAAAAAAAAAAAAAAAAAAAAAAAAAf39/ACUAAABYAAAAAAAAAAAAAAAAAAAAAAAAAAAAAAAAAAAAAAAAAAAAAAAAAAAAAAAAAAAAAAA/AAAAAAAAAKCGAQAAAAAAAAAAAAAAAAAMAAAAAQAAAAAAAAAAAAAAAAAAAB8AAABUAAAAAAAABQAAAAEAAAAAAAAAAAAAAAAAAAAAAAAAAAAAAAAAAAAAAAAAAAAAAAJ/f38AAAAAA8zMzADAwP8Af39/AAAAAAAAAAAAAAAAAAAAAAAAAAAAIQAAABgAAAAUAAAAwAMAALABAABARwAAuAgAABAAAAAmAAAACAAAAAAAAAAAAAAA"/>
+                <pr:smNativeData xmlns="smNativeData" xmlns:pr="smNativeData" xmlns:p15="http://schemas.microsoft.com/office/powerpoint/2012/main" xmlns:p14="http://schemas.microsoft.com/office/powerpoint/2010/main" xmlns:mc="http://schemas.openxmlformats.org/markup-compatibility/2006" val="SMDATA_15_l3DXYhMAAAAlAAAAZAAAAA8BAAAAkAAAAEgAAACQAAAASAAAAAAAAAABAAAAAAAAAAEAAABQAAAAAAAAAAAA4D8AAAAAAADgPwAAAAAAAOA/AAAAAAAA4D8AAAAAAADgPwAAAAAAAOA/AAAAAAAA4D8AAAAAAADgPwAAAAAAAOA/AAAAAAAA4D8CAAAAjAAAAAAAAAAAAAAAADOZDCYmJggAAAAAAAAAAAAAAAAAAAAAAAAAAAAAAAAAAAAAZAAAAAEAAABAAAAAAAAAAAAAAAAAAAAAAAAAAAAAAAAAAAAAAAAAAAAAAAAAAAAAAAAAAAAAAAAAAAAAAAAAAAAAAAAAAAAAAAAAAAAAAAAAAAAAAAAAAAAAAAAAAAAAFAAAADwAAAAAAAAAAAAAAP///wkUAAAAAQAAABQAAAAUAAAAFAAAAAEAAAAAAAAAZAAAAGQAAAAAAAAAZAAAAGQAAAAVAAAAYAAAAAAAAAAAAAAADwAAACADAAAAAAAAAAAAAAEAAACgMgAAVgcAAKr4//8BAAAAf39/AAEAAABkAAAAAAAAABQAAABAHwAAAAAAACYAAAAAAAAAwOD//wAAAAAmAAAAZAAAABYAAABMAAAAAAAAAAAAAAAEAAAAAAAAAAEAAAAzZpkKAAAAACgAAAAoAAAAZAAAAGQAAAAAAAAAzMzMAAAAAABQAAAAUAAAAGQAAABkAAAAAAAAABcAAAAUAAAAAAAAAAAAAAD/fwAA/38AAAAAAAAJAAAABAAAAF8AYAAeAAAAaAAAAAAAAAAAAAAAAAAAAAAAAAAAAAAAECcAABAnAAAAAAAAAAAAAAAAAAAAAAAAAAAAAAAAAAAAAAAAAAAAABQAAAAAAAAAwMD/AAAAAABkAAAAMgAAAAAAAABkAAAAAAAAAH9/fwAKAAAAIgAAABgAAAAAAAAAAAAAAAAAAAAAAAAAAAAAAAAAAAAkAAAAJAAAAAAAAAAHAAAAAAAAAAAAAAAAAAAAAAAAAAAAAAAAAAAAf39/ACUAAABYAAAAAAAAAAAAAAAAAAAAAAAAAAAAAAAAAAAAAAAAAAAAAAAAAAAAAAAAAAAAAAA/AAAAAAAAAKCGAQAAAAAAAAAAAAAAAAAMAAAAAQAAAAAAAAAAAAAAAAAAAB8AAABUAAAAAAAABQAAAAEAAAAAAAAAAAAAAAAAAAAAAAAAAAAAAAAAAAAAAAAAAAAAAAJ/f38AAAAAA8zMzADAwP8Af39/AAAAAAAAAAAAAAAAAAAAAAAAAAAAIQAAABgAAAAUAAAAwAMAALABAABARwAAuAgAABAAAAAmAAAACAAAAAAAAAAAAAAA"/>
               </a:ext>
             </a:extLst>
           </p:cNvSpPr>
@@ -11161,7 +13655,7 @@
             <a:spLocks noGrp="1" noChangeArrowheads="1"/>
             <a:extLst>
               <a:ext uri="smNativeData">
-                <pr:smNativeData xmlns:mc="http://schemas.openxmlformats.org/markup-compatibility/2006" xmlns:p14="http://schemas.microsoft.com/office/powerpoint/2010/main" xmlns:p15="http://schemas.microsoft.com/office/powerpoint/2012/main" xmlns:pr="smNativeData" xmlns="smNativeData" val="SMDATA_15_l3DXYhMAAAAlAAAAZAAAAA8BAAAAkAAAAEgAAACQAAAASAAAAAAAAAAAAAAAAAAAAAEAAABQAAAAAAAAAAAA4D8AAAAAAADgPwAAAAAAAOA/AAAAAAAA4D8AAAAAAADgPwAAAAAAAOA/AAAAAAAA4D8AAAAAAADgPwAAAAAAAOA/AAAAAAAA4D8CAAAAjAAAAAAAAAAAAAAAADOZDCYmJggAAAAAAAAAAAAAAAAAAAAAAAAAAAAAAAAAAAAAZAAAAAEAAABAAAAAAAAAAAAAAAAAAAAAAAAAAAAAAAAAAAAAAAAAAAAAAAAAAAAAAAAAAAAAAAAAAAAAAAAAAAAAAAAAAAAAAAAAAAAAAAAAAAAAAAAAAAAAAAAAAAAAFAAAADwAAAAAAAAAAAAAAP///wkUAAAAAQAAABQAAAAUAAAAFAAAAAEAAAAAAAAAZAAAAGQAAAAAAAAAZAAAAGQAAAAVAAAAYAAAAAAAAAAAAAAADwAAACADAAAAAAAAAAAAAAEAAACgMgAAVgcAAKr4//8BAAAAf39/AAEAAABkAAAAAAAAABQAAABAHwAAAAAAACYAAAAAAAAAwOD//wAAAAAmAAAAZAAAABYAAABMAAAAAAAAAAAAAAAEAAAAAAAAAAEAAAAzZpkKAAAAACgAAAAoAAAAZAAAAGQAAAAAAAAAzMzMAAAAAABQAAAAUAAAAGQAAABkAAAAAAAAABcAAAAUAAAAAAAAAAAAAAD/fwAA/38AAAAAAAAJAAAABAAAAAAAAAAeAAAAaAAAAAAAAAAAAAAAAAAAAAAAAAAAAAAAECcAABAnAAAAAAAAAAAAAAAAAAAAAAAAAAAAAAAAAAAAAAAAAAAAABQAAAAAAAAAwMD/AAAAAABkAAAAMgAAAAAAAABkAAAAAAAAAH9/fwAKAAAAIgAAABgAAAAAAAAAAAAAAAAAAAAAAAAAAAAAAAAAAAAkAAAAJAAAAAAAAAAHAAAAAAAAAAAAAAAAAAAAAAAAAAAAAAAAAAAAf39/ACUAAABYAAAAAAAAAAAAAAAAAAAAAAAAAAAAAAAAAAAAAAAAAAAAAAAAAAAAAAAAAAAAAAA/AAAAAAAAAKCGAQAAAAAAAAAAAAAAAAAMAAAAAQAAAAAAAAAAAAAAAAAAAB8AAABUAAAAAAAABQAAAAEAAAAAAAAAAAAAAAAAAAAAAAAAAAAAAAAAAAAAAAAAAAAAAAJ/f38AAAAAA8zMzADAwP8Af39/AAAAAAAAAAAAAAAAAAAAAAAAAAAAIQAAABgAAAAUAAAAwAMAANgJAABARwAAsCUAABAAAAAmAAAACAAAAAAAAAAAAAAA"/>
+                <pr:smNativeData xmlns="smNativeData" xmlns:pr="smNativeData" xmlns:p15="http://schemas.microsoft.com/office/powerpoint/2012/main" xmlns:p14="http://schemas.microsoft.com/office/powerpoint/2010/main" xmlns:mc="http://schemas.openxmlformats.org/markup-compatibility/2006" val="SMDATA_15_l3DXYhMAAAAlAAAAZAAAAA8BAAAAkAAAAEgAAACQAAAASAAAAAAAAAAAAAAAAAAAAAEAAABQAAAAAAAAAAAA4D8AAAAAAADgPwAAAAAAAOA/AAAAAAAA4D8AAAAAAADgPwAAAAAAAOA/AAAAAAAA4D8AAAAAAADgPwAAAAAAAOA/AAAAAAAA4D8CAAAAjAAAAAAAAAAAAAAAADOZDCYmJggAAAAAAAAAAAAAAAAAAAAAAAAAAAAAAAAAAAAAZAAAAAEAAABAAAAAAAAAAAAAAAAAAAAAAAAAAAAAAAAAAAAAAAAAAAAAAAAAAAAAAAAAAAAAAAAAAAAAAAAAAAAAAAAAAAAAAAAAAAAAAAAAAAAAAAAAAAAAAAAAAAAAFAAAADwAAAAAAAAAAAAAAP///wkUAAAAAQAAABQAAAAUAAAAFAAAAAEAAAAAAAAAZAAAAGQAAAAAAAAAZAAAAGQAAAAVAAAAYAAAAAAAAAAAAAAADwAAACADAAAAAAAAAAAAAAEAAACgMgAAVgcAAKr4//8BAAAAf39/AAEAAABkAAAAAAAAABQAAABAHwAAAAAAACYAAAAAAAAAwOD//wAAAAAmAAAAZAAAABYAAABMAAAAAAAAAAAAAAAEAAAAAAAAAAEAAAAzZpkKAAAAACgAAAAoAAAAZAAAAGQAAAAAAAAAzMzMAAAAAABQAAAAUAAAAGQAAABkAAAAAAAAABcAAAAUAAAAAAAAAAAAAAD/fwAA/38AAAAAAAAJAAAABAAAAAAAAAAeAAAAaAAAAAAAAAAAAAAAAAAAAAAAAAAAAAAAECcAABAnAAAAAAAAAAAAAAAAAAAAAAAAAAAAAAAAAAAAAAAAAAAAABQAAAAAAAAAwMD/AAAAAABkAAAAMgAAAAAAAABkAAAAAAAAAH9/fwAKAAAAIgAAABgAAAAAAAAAAAAAAAAAAAAAAAAAAAAAAAAAAAAkAAAAJAAAAAAAAAAHAAAAAAAAAAAAAAAAAAAAAAAAAAAAAAAAAAAAf39/ACUAAABYAAAAAAAAAAAAAAAAAAAAAAAAAAAAAAAAAAAAAAAAAAAAAAAAAAAAAAAAAAAAAAA/AAAAAAAAAKCGAQAAAAAAAAAAAAAAAAAMAAAAAQAAAAAAAAAAAAAAAAAAAB8AAABUAAAAAAAABQAAAAEAAAAAAAAAAAAAAAAAAAAAAAAAAAAAAAAAAAAAAAAAAAAAAAJ/f38AAAAAA8zMzADAwP8Af39/AAAAAAAAAAAAAAAAAAAAAAAAAAAAIQAAABgAAAAUAAAAwAMAANgJAABARwAAsCUAABAAAAAmAAAACAAAAAAAAAAAAAAA"/>
               </a:ext>
             </a:extLst>
           </p:cNvSpPr>
@@ -11230,6 +13724,240 @@
         </p:txBody>
       </p:sp>
     </p:spTree>
+  </p:cSld>
+  <p:clrMapOvr>
+    <a:masterClrMapping/>
+  </p:clrMapOvr>
+</p:sld>
+</file>
+
+<file path=ppt/slides/slide50.xml><?xml version="1.0" encoding="utf-8"?>
+<p:sld xmlns:a="http://schemas.openxmlformats.org/drawingml/2006/main" xmlns:r="http://schemas.openxmlformats.org/officeDocument/2006/relationships" xmlns:p="http://schemas.openxmlformats.org/presentationml/2006/main">
+  <p:cSld>
+    <p:spTree>
+      <p:nvGrpSpPr>
+        <p:cNvPr id="1" name=""/>
+        <p:cNvGrpSpPr/>
+        <p:nvPr/>
+      </p:nvGrpSpPr>
+      <p:grpSpPr>
+        <a:xfrm>
+          <a:off x="0" y="0"/>
+          <a:ext cx="0" cy="0"/>
+          <a:chOff x="0" y="0"/>
+          <a:chExt cx="0" cy="0"/>
+        </a:xfrm>
+      </p:grpSpPr>
+      <p:sp>
+        <p:nvSpPr>
+          <p:cNvPr id="2" name="Título 1">
+            <a:extLst>
+              <a:ext uri="{FF2B5EF4-FFF2-40B4-BE49-F238E27FC236}">
+                <a16:creationId xmlns:a16="http://schemas.microsoft.com/office/drawing/2014/main" id="{2C6FD77E-071E-B305-2D08-2727E5B4F381}"/>
+              </a:ext>
+            </a:extLst>
+          </p:cNvPr>
+          <p:cNvSpPr>
+            <a:spLocks noGrp="1"/>
+          </p:cNvSpPr>
+          <p:nvPr>
+            <p:ph type="title"/>
+          </p:nvPr>
+        </p:nvSpPr>
+        <p:spPr/>
+        <p:txBody>
+          <a:bodyPr/>
+          <a:lstStyle/>
+          <a:p>
+            <a:r>
+              <a:rPr lang="pt-BR" dirty="0" err="1"/>
+              <a:t>Exercicio</a:t>
+            </a:r>
+            <a:endParaRPr lang="pt-BR" dirty="0"/>
+          </a:p>
+        </p:txBody>
+      </p:sp>
+      <p:sp>
+        <p:nvSpPr>
+          <p:cNvPr id="3" name="Espaço Reservado para Conteúdo 2">
+            <a:extLst>
+              <a:ext uri="{FF2B5EF4-FFF2-40B4-BE49-F238E27FC236}">
+                <a16:creationId xmlns:a16="http://schemas.microsoft.com/office/drawing/2014/main" id="{01A90398-0A83-7445-A45D-9BEE835E7574}"/>
+              </a:ext>
+            </a:extLst>
+          </p:cNvPr>
+          <p:cNvSpPr>
+            <a:spLocks noGrp="1"/>
+          </p:cNvSpPr>
+          <p:nvPr>
+            <p:ph idx="1"/>
+          </p:nvPr>
+        </p:nvSpPr>
+        <p:spPr/>
+        <p:txBody>
+          <a:bodyPr/>
+          <a:lstStyle/>
+          <a:p>
+            <a:pPr marL="0" indent="0">
+              <a:buNone/>
+            </a:pPr>
+            <a:r>
+              <a:rPr lang="pt-BR" sz="2500" dirty="0"/>
+              <a:t>Faça a arquitetura de um sistema de lojinha, onde precisa ter uma entidade </a:t>
+            </a:r>
+            <a:r>
+              <a:rPr lang="pt-BR" sz="2500" dirty="0" err="1"/>
+              <a:t>Cellphone</a:t>
+            </a:r>
+            <a:r>
+              <a:rPr lang="pt-BR" sz="2500" dirty="0"/>
+              <a:t> com no mínimo o atributo </a:t>
+            </a:r>
+            <a:r>
+              <a:rPr lang="pt-BR" sz="2500" dirty="0" err="1"/>
+              <a:t>brand</a:t>
+            </a:r>
+            <a:r>
+              <a:rPr lang="pt-BR" sz="2500" dirty="0"/>
+              <a:t> e mais 3 outros atributos da sua escolha. </a:t>
+            </a:r>
+          </a:p>
+          <a:p>
+            <a:pPr marL="0" indent="0">
+              <a:buNone/>
+            </a:pPr>
+            <a:endParaRPr lang="pt-BR" sz="2500" dirty="0"/>
+          </a:p>
+          <a:p>
+            <a:pPr marL="0" indent="0">
+              <a:buNone/>
+            </a:pPr>
+            <a:r>
+              <a:rPr lang="pt-BR" sz="2500" dirty="0"/>
+              <a:t>Depois faça um caso de uso chamado </a:t>
+            </a:r>
+            <a:r>
+              <a:rPr lang="pt-BR" sz="2500" dirty="0" err="1"/>
+              <a:t>get_cellphones_by_brand_usecase.dart</a:t>
+            </a:r>
+            <a:r>
+              <a:rPr lang="pt-BR" sz="2500" dirty="0"/>
+              <a:t>, e todas as outras camadas necessárias da arquitetura limpa.</a:t>
+            </a:r>
+          </a:p>
+          <a:p>
+            <a:pPr marL="0" indent="0">
+              <a:buNone/>
+            </a:pPr>
+            <a:endParaRPr lang="pt-BR" sz="2500" dirty="0"/>
+          </a:p>
+          <a:p>
+            <a:pPr marL="0" indent="0">
+              <a:buNone/>
+            </a:pPr>
+            <a:r>
+              <a:rPr lang="pt-BR" sz="2500" dirty="0"/>
+              <a:t>Depois no </a:t>
+            </a:r>
+            <a:r>
+              <a:rPr lang="pt-BR" sz="2500" dirty="0" err="1"/>
+              <a:t>controller</a:t>
+            </a:r>
+            <a:r>
+              <a:rPr lang="pt-BR" sz="2500" dirty="0"/>
+              <a:t>, chame esse método no construtor, registra as dependências com o </a:t>
+            </a:r>
+            <a:r>
+              <a:rPr lang="pt-BR" sz="2500" dirty="0" err="1"/>
+              <a:t>Get_it</a:t>
+            </a:r>
+            <a:r>
+              <a:rPr lang="pt-BR" sz="2500" dirty="0"/>
+              <a:t> e passe os dados na </a:t>
+            </a:r>
+            <a:r>
+              <a:rPr lang="pt-BR" sz="2500" dirty="0" err="1"/>
+              <a:t>view</a:t>
+            </a:r>
+            <a:r>
+              <a:rPr lang="pt-BR" sz="2500" dirty="0"/>
+              <a:t>, com um </a:t>
+            </a:r>
+            <a:r>
+              <a:rPr lang="pt-BR" sz="2500" dirty="0" err="1"/>
+              <a:t>listView.builder</a:t>
+            </a:r>
+            <a:r>
+              <a:rPr lang="pt-BR" sz="2500" dirty="0"/>
+              <a:t>.</a:t>
+            </a:r>
+          </a:p>
+        </p:txBody>
+      </p:sp>
+      <p:sp>
+        <p:nvSpPr>
+          <p:cNvPr id="4" name="Espaço Reservado para Data 3">
+            <a:extLst>
+              <a:ext uri="{FF2B5EF4-FFF2-40B4-BE49-F238E27FC236}">
+                <a16:creationId xmlns:a16="http://schemas.microsoft.com/office/drawing/2014/main" id="{25801788-7DE8-3869-B98F-3F8C2DA82D68}"/>
+              </a:ext>
+            </a:extLst>
+          </p:cNvPr>
+          <p:cNvSpPr>
+            <a:spLocks noGrp="1"/>
+          </p:cNvSpPr>
+          <p:nvPr>
+            <p:ph type="dt" sz="quarter" idx="10"/>
+          </p:nvPr>
+        </p:nvSpPr>
+        <p:spPr/>
+        <p:txBody>
+          <a:bodyPr/>
+          <a:lstStyle/>
+          <a:p>
+            <a:fld id="{2B84B1DC-92C6-D147-883C-6412FF727E31}" type="datetime1">
+              <a:rPr lang="pt-BR" smtClean="0"/>
+              <a:t>26/07/2022</a:t>
+            </a:fld>
+            <a:endParaRPr lang="pt-BR"/>
+          </a:p>
+        </p:txBody>
+      </p:sp>
+      <p:sp>
+        <p:nvSpPr>
+          <p:cNvPr id="5" name="Espaço Reservado para Número de Slide 4">
+            <a:extLst>
+              <a:ext uri="{FF2B5EF4-FFF2-40B4-BE49-F238E27FC236}">
+                <a16:creationId xmlns:a16="http://schemas.microsoft.com/office/drawing/2014/main" id="{78711C25-9DFE-BDCD-D397-FF254088AA07}"/>
+              </a:ext>
+            </a:extLst>
+          </p:cNvPr>
+          <p:cNvSpPr>
+            <a:spLocks noGrp="1"/>
+          </p:cNvSpPr>
+          <p:nvPr>
+            <p:ph type="sldNum" sz="quarter" idx="12"/>
+          </p:nvPr>
+        </p:nvSpPr>
+        <p:spPr/>
+        <p:txBody>
+          <a:bodyPr/>
+          <a:lstStyle/>
+          <a:p>
+            <a:fld id="{2B84FD90-DEC6-D10B-883C-285EB3727E7D}" type="slidenum">
+              <a:rPr lang="pt-BR" smtClean="0"/>
+              <a:t>50</a:t>
+            </a:fld>
+            <a:endParaRPr lang="pt-BR"/>
+          </a:p>
+        </p:txBody>
+      </p:sp>
+    </p:spTree>
+    <p:extLst>
+      <p:ext uri="{BB962C8B-B14F-4D97-AF65-F5344CB8AC3E}">
+        <p14:creationId xmlns:p14="http://schemas.microsoft.com/office/powerpoint/2010/main" val="768679435"/>
+      </p:ext>
+    </p:extLst>
   </p:cSld>
   <p:clrMapOvr>
     <a:masterClrMapping/>
@@ -11261,7 +13989,7 @@
             <a:spLocks noGrp="1" noChangeArrowheads="1"/>
             <a:extLst>
               <a:ext uri="smNativeData">
-                <pr:smNativeData xmlns:mc="http://schemas.openxmlformats.org/markup-compatibility/2006" xmlns:p14="http://schemas.microsoft.com/office/powerpoint/2010/main" xmlns:p15="http://schemas.microsoft.com/office/powerpoint/2012/main" xmlns:pr="smNativeData" xmlns="smNativeData" val="SMDATA_15_l3DXYhMAAAAlAAAAZAAAAA8BAAAAkAAAAEgAAACQAAAASAAAAAAAAAABAAAAAAAAAAEAAABQAAAAAAAAAAAA4D8AAAAAAADgPwAAAAAAAOA/AAAAAAAA4D8AAAAAAADgPwAAAAAAAOA/AAAAAAAA4D8AAAAAAADgPwAAAAAAAOA/AAAAAAAA4D8CAAAAjAAAAAAAAAAAAAAAADOZDCYmJggAAAAAAAAAAAAAAAAAAAAAAAAAAAAAAAAAAAAAZAAAAAEAAABAAAAAAAAAAAAAAAAAAAAAAAAAAAAAAAAAAAAAAAAAAAAAAAAAAAAAAAAAAAAAAAAAAAAAAAAAAAAAAAAAAAAAAAAAAAAAAAAAAAAAAAAAAAAAAAAAAAAAFAAAADwAAAAAAAAAAAAAAP///wkUAAAAAQAAABQAAAAUAAAAFAAAAAEAAAAAAAAAZAAAAGQAAAAAAAAAZAAAAGQAAAAVAAAAYAAAAAAAAAAAAAAADwAAACADAAAAAAAAAAAAAAEAAACgMgAAVgcAAKr4//8BAAAAf39/AAEAAABkAAAAAAAAABQAAABAHwAAAAAAACYAAAAAAAAAwOD//wAAAAAmAAAAZAAAABYAAABMAAAAAAAAAAAAAAAEAAAAAAAAAAEAAAAzZpkKAAAAACgAAAAoAAAAZAAAAGQAAAAAAAAAzMzMAAAAAABQAAAAUAAAAGQAAABkAAAAAAAAABcAAAAUAAAAAAAAAAAAAAD/fwAA/38AAAAAAAAJAAAABAAAAAAAAAAeAAAAaAAAAAAAAAAAAAAAAAAAAAAAAAAAAAAAECcAABAnAAAAAAAAAAAAAAAAAAAAAAAAAAAAAAAAAAAAAAAAAAAAABQAAAAAAAAAwMD/AAAAAABkAAAAMgAAAAAAAABkAAAAAAAAAH9/fwAKAAAAIgAAABgAAAAAAAAAAAAAAAAAAAAAAAAAAAAAAAAAAAAkAAAAJAAAAAAAAAAHAAAAAAAAAAAAAAAAAAAAAAAAAAAAAAAAAAAAf39/ACUAAABYAAAAAAAAAAAAAAAAAAAAAAAAAAAAAAAAAAAAAAAAAAAAAAAAAAAAAAAAAAAAAAA/AAAAAAAAAKCGAQAAAAAAAAAAAAAAAAAMAAAAAQAAAAAAAAAAAAAAAAAAAB8AAABUAAAAAAAABQAAAAEAAAAAAAAAAAAAAAAAAAAAAAAAAAAAAAAAAAAAAAAAAAAAAAJ/f38AAAAAA8zMzADAwP8Af39/AAAAAAAAAAAAAAAAAAAAAAAAAAAAIQAAABgAAAAUAAAAwAMAALABAABARwAAuAgAABAAAAAmAAAACAAAAAAAAAAAAAAA"/>
+                <pr:smNativeData xmlns="smNativeData" xmlns:pr="smNativeData" xmlns:p15="http://schemas.microsoft.com/office/powerpoint/2012/main" xmlns:p14="http://schemas.microsoft.com/office/powerpoint/2010/main" xmlns:mc="http://schemas.openxmlformats.org/markup-compatibility/2006" val="SMDATA_15_l3DXYhMAAAAlAAAAZAAAAA8BAAAAkAAAAEgAAACQAAAASAAAAAAAAAABAAAAAAAAAAEAAABQAAAAAAAAAAAA4D8AAAAAAADgPwAAAAAAAOA/AAAAAAAA4D8AAAAAAADgPwAAAAAAAOA/AAAAAAAA4D8AAAAAAADgPwAAAAAAAOA/AAAAAAAA4D8CAAAAjAAAAAAAAAAAAAAAADOZDCYmJggAAAAAAAAAAAAAAAAAAAAAAAAAAAAAAAAAAAAAZAAAAAEAAABAAAAAAAAAAAAAAAAAAAAAAAAAAAAAAAAAAAAAAAAAAAAAAAAAAAAAAAAAAAAAAAAAAAAAAAAAAAAAAAAAAAAAAAAAAAAAAAAAAAAAAAAAAAAAAAAAAAAAFAAAADwAAAAAAAAAAAAAAP///wkUAAAAAQAAABQAAAAUAAAAFAAAAAEAAAAAAAAAZAAAAGQAAAAAAAAAZAAAAGQAAAAVAAAAYAAAAAAAAAAAAAAADwAAACADAAAAAAAAAAAAAAEAAACgMgAAVgcAAKr4//8BAAAAf39/AAEAAABkAAAAAAAAABQAAABAHwAAAAAAACYAAAAAAAAAwOD//wAAAAAmAAAAZAAAABYAAABMAAAAAAAAAAAAAAAEAAAAAAAAAAEAAAAzZpkKAAAAACgAAAAoAAAAZAAAAGQAAAAAAAAAzMzMAAAAAABQAAAAUAAAAGQAAABkAAAAAAAAABcAAAAUAAAAAAAAAAAAAAD/fwAA/38AAAAAAAAJAAAABAAAAAAAAAAeAAAAaAAAAAAAAAAAAAAAAAAAAAAAAAAAAAAAECcAABAnAAAAAAAAAAAAAAAAAAAAAAAAAAAAAAAAAAAAAAAAAAAAABQAAAAAAAAAwMD/AAAAAABkAAAAMgAAAAAAAABkAAAAAAAAAH9/fwAKAAAAIgAAABgAAAAAAAAAAAAAAAAAAAAAAAAAAAAAAAAAAAAkAAAAJAAAAAAAAAAHAAAAAAAAAAAAAAAAAAAAAAAAAAAAAAAAAAAAf39/ACUAAABYAAAAAAAAAAAAAAAAAAAAAAAAAAAAAAAAAAAAAAAAAAAAAAAAAAAAAAAAAAAAAAA/AAAAAAAAAKCGAQAAAAAAAAAAAAAAAAAMAAAAAQAAAAAAAAAAAAAAAAAAAB8AAABUAAAAAAAABQAAAAEAAAAAAAAAAAAAAAAAAAAAAAAAAAAAAAAAAAAAAAAAAAAAAAJ/f38AAAAAA8zMzADAwP8Af39/AAAAAAAAAAAAAAAAAAAAAAAAAAAAIQAAABgAAAAUAAAAwAMAALABAABARwAAuAgAABAAAAAmAAAACAAAAAAAAAAAAAAA"/>
               </a:ext>
             </a:extLst>
           </p:cNvSpPr>
@@ -11295,7 +14023,7 @@
             <a:picLocks noChangeAspect="1"/>
             <a:extLst>
               <a:ext uri="smNativeData">
-                <pr:smNativeData xmlns:mc="http://schemas.openxmlformats.org/markup-compatibility/2006" xmlns:p14="http://schemas.microsoft.com/office/powerpoint/2010/main" xmlns:p15="http://schemas.microsoft.com/office/powerpoint/2012/main" xmlns:pr="smNativeData" xmlns="smNativeData" val="SMDATA_17_l3DXYhMAAAAlAAAAEQAAAC8BAAAAkAAAAEgAAACQAAAASAAAAAAAAAAAAAAAAAAAAAEAAABQAAAAAAAAAAAA4D8AAAAAAADgPwAAAAAAAOA/AAAAAAAA4D8AAAAAAADgPwAAAAAAAOA/AAAAAAAA4D8AAAAAAADgPwAAAAAAAOA/AAAAAAAA4D8CAAAAjAAAAAAAAAAAAAAAADOZDCYmJggAAAAAAAAAAAAAAAAAAAAAAAAAAAAAAAAAAAAAZAAAAAEAAABAAAAAAAAAAAAAAAAAAAAAAAAAAAAAAAAAAAAAAAAAAAAAAAAAAAAAAAAAAAAAAAAAAAAAAAAAAAAAAAAAAAAAAAAAAAAAAAAAAAAAAAAAAAAAAAAAAAAAFAAAADwAAAAAAAAAAAAAAP///wkUAAAAAQAAABQAAAAUAAAAFAAAAAEAAAAAAAAAZAAAAGQAAAAAAAAAZAAAAGQAAAAVAAAAYAAAAAAAAAAAAAAADwAAACADAAAAAAAAAAAAAAEAAACgMgAAVgcAAKr4//8BAAAAf39/AAEAAABkAAAAAAAAABQAAABAHwAAAAAAACYAAAAAAAAAwOD//wAAAAAmAAAAZAAAABYAAABMAAAAAAAAAAAAAAAEAAAAAAAAAAEAAAAzZpkKAAAAACgAAAAoAAAAZAAAAGQAAAAAAAAAzMzMAAAAAABQAAAAUAAAAGQAAABkAAAAAAAAAAcAAAA4AAAAAAAAAAAAAAAAAAAA////AAAAAAAAAAAAAAAAAAAAAAAAAAAAAAAAAAAAAABkAAAAZAAAAAAAAAAjAAAABAAAAGQAAAAXAAAAFAAAAAAAAAAAAAAA/38AAP9/AAAAAAAACQAAAAQAAABERiB4HgAAAGgAAAAAAAAAAAAAAAAAAAAAAAAAAAAAABAnAAAQJwAAAAAAAAAAAAAAAAAAAAAAAAAAAAAAAAAAAAAAAAAAAAAUAAAAAAAAAMDA/wAAAAAAZAAAADIAAAAAAAAAZAAAAAAAAAB/f38ACgAAACIAAAAYAAAAAAAAAAAAAAAAAAAAAAAAAAAAAAAAAAAAJAAAACQAAAAAAAAABwAAAAAAAAAAAAAAAAAAAAAAAAAAAAAAAAAAAH9/fwAlAAAAWAAAAAAAAAAAAAAAAAAAAAAAAAAAAAAAAAAAAAAAAAAAAAAAAAAAAAAAAAAAAAAAPwAAAAAAAACghgEAAAAAAAAAAAAAAAAADAAAAAEAAAAAAAAAAAAAAAAAAAAfAAAAVAAAAAAzmQUmJiYBAAAAAAAAAAAAAAAAAAAAAAAAAAAAAAAAAAAAAAAAAAD///8Cf39/ADNmmQPMzMwAwMD/AH9/fwAAAAAAAAAAAAAAAAD///8AAAAAACEAAAAYAAAAFAAAAPcRAADzCQAACTkAABUqAAAQAAAAJgAAAAgAAAD//////////w=="/>
+                <pr:smNativeData xmlns="smNativeData" xmlns:pr="smNativeData" xmlns:p15="http://schemas.microsoft.com/office/powerpoint/2012/main" xmlns:p14="http://schemas.microsoft.com/office/powerpoint/2010/main" xmlns:mc="http://schemas.openxmlformats.org/markup-compatibility/2006" val="SMDATA_17_l3DXYhMAAAAlAAAAEQAAAC8BAAAAkAAAAEgAAACQAAAASAAAAAAAAAAAAAAAAAAAAAEAAABQAAAAAAAAAAAA4D8AAAAAAADgPwAAAAAAAOA/AAAAAAAA4D8AAAAAAADgPwAAAAAAAOA/AAAAAAAA4D8AAAAAAADgPwAAAAAAAOA/AAAAAAAA4D8CAAAAjAAAAAAAAAAAAAAAADOZDCYmJggAAAAAAAAAAAAAAAAAAAAAAAAAAAAAAAAAAAAAZAAAAAEAAABAAAAAAAAAAAAAAAAAAAAAAAAAAAAAAAAAAAAAAAAAAAAAAAAAAAAAAAAAAAAAAAAAAAAAAAAAAAAAAAAAAAAAAAAAAAAAAAAAAAAAAAAAAAAAAAAAAAAAFAAAADwAAAAAAAAAAAAAAP///wkUAAAAAQAAABQAAAAUAAAAFAAAAAEAAAAAAAAAZAAAAGQAAAAAAAAAZAAAAGQAAAAVAAAAYAAAAAAAAAAAAAAADwAAACADAAAAAAAAAAAAAAEAAACgMgAAVgcAAKr4//8BAAAAf39/AAEAAABkAAAAAAAAABQAAABAHwAAAAAAACYAAAAAAAAAwOD//wAAAAAmAAAAZAAAABYAAABMAAAAAAAAAAAAAAAEAAAAAAAAAAEAAAAzZpkKAAAAACgAAAAoAAAAZAAAAGQAAAAAAAAAzMzMAAAAAABQAAAAUAAAAGQAAABkAAAAAAAAAAcAAAA4AAAAAAAAAAAAAAAAAAAA////AAAAAAAAAAAAAAAAAAAAAAAAAAAAAAAAAAAAAABkAAAAZAAAAAAAAAAjAAAABAAAAGQAAAAXAAAAFAAAAAAAAAAAAAAA/38AAP9/AAAAAAAACQAAAAQAAABERiB4HgAAAGgAAAAAAAAAAAAAAAAAAAAAAAAAAAAAABAnAAAQJwAAAAAAAAAAAAAAAAAAAAAAAAAAAAAAAAAAAAAAAAAAAAAUAAAAAAAAAMDA/wAAAAAAZAAAADIAAAAAAAAAZAAAAAAAAAB/f38ACgAAACIAAAAYAAAAAAAAAAAAAAAAAAAAAAAAAAAAAAAAAAAAJAAAACQAAAAAAAAABwAAAAAAAAAAAAAAAAAAAAAAAAAAAAAAAAAAAH9/fwAlAAAAWAAAAAAAAAAAAAAAAAAAAAAAAAAAAAAAAAAAAAAAAAAAAAAAAAAAAAAAAAAAAAAAPwAAAAAAAACghgEAAAAAAAAAAAAAAAAADAAAAAEAAAAAAAAAAAAAAAAAAAAfAAAAVAAAAAAzmQUmJiYBAAAAAAAAAAAAAAAAAAAAAAAAAAAAAAAAAAAAAAAAAAD///8Cf39/ADNmmQPMzMwAwMD/AH9/fwAAAAAAAAAAAAAAAAD///8AAAAAACEAAAAYAAAAFAAAAPcRAADzCQAACTkAABUqAAAQAAAAJgAAAAgAAAD//////////w=="/>
               </a:ext>
             </a:extLst>
           </p:cNvPicPr>
@@ -11354,7 +14082,7 @@
             <a:spLocks noGrp="1" noChangeArrowheads="1"/>
             <a:extLst>
               <a:ext uri="smNativeData">
-                <pr:smNativeData xmlns:mc="http://schemas.openxmlformats.org/markup-compatibility/2006" xmlns:p14="http://schemas.microsoft.com/office/powerpoint/2010/main" xmlns:p15="http://schemas.microsoft.com/office/powerpoint/2012/main" xmlns:pr="smNativeData" xmlns="smNativeData" val="SMDATA_15_l3DXYhMAAAAlAAAAZAAAAA8BAAAAkAAAAEgAAACQAAAASAAAAAAAAAABAAAAAAAAAAEAAABQAAAAAAAAAAAA4D8AAAAAAADgPwAAAAAAAOA/AAAAAAAA4D8AAAAAAADgPwAAAAAAAOA/AAAAAAAA4D8AAAAAAADgPwAAAAAAAOA/AAAAAAAA4D8CAAAAjAAAAAAAAAAAAAAAADOZDCYmJggAAAAAAAAAAAAAAAAAAAAAAAAAAAAAAAAAAAAAZAAAAAEAAABAAAAAAAAAAAAAAAAAAAAAAAAAAAAAAAAAAAAAAAAAAAAAAAAAAAAAAAAAAAAAAAAAAAAAAAAAAAAAAAAAAAAAAAAAAAAAAAAAAAAAAAAAAAAAAAAAAAAAFAAAADwAAAAAAAAAAAAAAP///wkUAAAAAQAAABQAAAAUAAAAFAAAAAEAAAAAAAAAZAAAAGQAAAAAAAAAZAAAAGQAAAAVAAAAYAAAAAAAAAAAAAAADwAAACADAAAAAAAAAAAAAAEAAACgMgAAVgcAAKr4//8BAAAAf39/AAEAAABkAAAAAAAAABQAAABAHwAAAAAAACYAAAAAAAAAwOD//wAAAAAmAAAAZAAAABYAAABMAAAAAAAAAAAAAAAEAAAAAAAAAAEAAAAzZpkKAAAAACgAAAAoAAAAZAAAAGQAAAAAAAAAzMzMAAAAAABQAAAAUAAAAGQAAABkAAAAAAAAABcAAAAUAAAAAAAAAAAAAAD/fwAA/38AAAAAAAAJAAAABAAAAF8AYAAeAAAAaAAAAAAAAAAAAAAAAAAAAAAAAAAAAAAAECcAABAnAAAAAAAAAAAAAAAAAAAAAAAAAAAAAAAAAAAAAAAAAAAAABQAAAAAAAAAwMD/AAAAAABkAAAAMgAAAAAAAABkAAAAAAAAAH9/fwAKAAAAIgAAABgAAAAAAAAAAAAAAAAAAAAAAAAAAAAAAAAAAAAkAAAAJAAAAAAAAAAHAAAAAAAAAAAAAAAAAAAAAAAAAAAAAAAAAAAAf39/ACUAAABYAAAAAAAAAAAAAAAAAAAAAAAAAAAAAAAAAAAAAAAAAAAAAAAAAAAAAAAAAAAAAAA/AAAAAAAAAKCGAQAAAAAAAAAAAAAAAAAMAAAAAQAAAAAAAAAAAAAAAAAAAB8AAABUAAAAAAAABQAAAAEAAAAAAAAAAAAAAAAAAAAAAAAAAAAAAAAAAAAAAAAAAAAAAAJ/f38AAAAAA8zMzADAwP8Af39/AAAAAAAAAAAAAAAAAAAAAAAAAAAAIQAAABgAAAAUAAAAwAMAALABAABARwAAuAgAAAAAAAAmAAAACAAAAAEAAAAAAAAA"/>
+                <pr:smNativeData xmlns="smNativeData" xmlns:pr="smNativeData" xmlns:p15="http://schemas.microsoft.com/office/powerpoint/2012/main" xmlns:p14="http://schemas.microsoft.com/office/powerpoint/2010/main" xmlns:mc="http://schemas.openxmlformats.org/markup-compatibility/2006" val="SMDATA_15_l3DXYhMAAAAlAAAAZAAAAA8BAAAAkAAAAEgAAACQAAAASAAAAAAAAAABAAAAAAAAAAEAAABQAAAAAAAAAAAA4D8AAAAAAADgPwAAAAAAAOA/AAAAAAAA4D8AAAAAAADgPwAAAAAAAOA/AAAAAAAA4D8AAAAAAADgPwAAAAAAAOA/AAAAAAAA4D8CAAAAjAAAAAAAAAAAAAAAADOZDCYmJggAAAAAAAAAAAAAAAAAAAAAAAAAAAAAAAAAAAAAZAAAAAEAAABAAAAAAAAAAAAAAAAAAAAAAAAAAAAAAAAAAAAAAAAAAAAAAAAAAAAAAAAAAAAAAAAAAAAAAAAAAAAAAAAAAAAAAAAAAAAAAAAAAAAAAAAAAAAAAAAAAAAAFAAAADwAAAAAAAAAAAAAAP///wkUAAAAAQAAABQAAAAUAAAAFAAAAAEAAAAAAAAAZAAAAGQAAAAAAAAAZAAAAGQAAAAVAAAAYAAAAAAAAAAAAAAADwAAACADAAAAAAAAAAAAAAEAAACgMgAAVgcAAKr4//8BAAAAf39/AAEAAABkAAAAAAAAABQAAABAHwAAAAAAACYAAAAAAAAAwOD//wAAAAAmAAAAZAAAABYAAABMAAAAAAAAAAAAAAAEAAAAAAAAAAEAAAAzZpkKAAAAACgAAAAoAAAAZAAAAGQAAAAAAAAAzMzMAAAAAABQAAAAUAAAAGQAAABkAAAAAAAAABcAAAAUAAAAAAAAAAAAAAD/fwAA/38AAAAAAAAJAAAABAAAAF8AYAAeAAAAaAAAAAAAAAAAAAAAAAAAAAAAAAAAAAAAECcAABAnAAAAAAAAAAAAAAAAAAAAAAAAAAAAAAAAAAAAAAAAAAAAABQAAAAAAAAAwMD/AAAAAABkAAAAMgAAAAAAAABkAAAAAAAAAH9/fwAKAAAAIgAAABgAAAAAAAAAAAAAAAAAAAAAAAAAAAAAAAAAAAAkAAAAJAAAAAAAAAAHAAAAAAAAAAAAAAAAAAAAAAAAAAAAAAAAAAAAf39/ACUAAABYAAAAAAAAAAAAAAAAAAAAAAAAAAAAAAAAAAAAAAAAAAAAAAAAAAAAAAAAAAAAAAA/AAAAAAAAAKCGAQAAAAAAAAAAAAAAAAAMAAAAAQAAAAAAAAAAAAAAAAAAAB8AAABUAAAAAAAABQAAAAEAAAAAAAAAAAAAAAAAAAAAAAAAAAAAAAAAAAAAAAAAAAAAAAJ/f38AAAAAA8zMzADAwP8Af39/AAAAAAAAAAAAAAAAAAAAAAAAAAAAIQAAABgAAAAUAAAAwAMAALABAABARwAAuAgAAAAAAAAmAAAACAAAAAEAAAAAAAAA"/>
               </a:ext>
             </a:extLst>
           </p:cNvSpPr>
@@ -11393,7 +14121,7 @@
             <a:spLocks noGrp="1" noChangeArrowheads="1"/>
             <a:extLst>
               <a:ext uri="smNativeData">
-                <pr:smNativeData xmlns:mc="http://schemas.openxmlformats.org/markup-compatibility/2006" xmlns:p14="http://schemas.microsoft.com/office/powerpoint/2010/main" xmlns:p15="http://schemas.microsoft.com/office/powerpoint/2012/main" xmlns:pr="smNativeData" xmlns="smNativeData" val="SMDATA_15_l3DXYhMAAAAlAAAAZAAAAA8BAAAAkAAAAEgAAACQAAAASAAAAAAAAAAAAAAAAAAAAAEAAABQAAAAAAAAAAAA4D8AAAAAAADgPwAAAAAAAOA/AAAAAAAA4D8AAAAAAADgPwAAAAAAAOA/AAAAAAAA4D8AAAAAAADgPwAAAAAAAOA/AAAAAAAA4D8CAAAAjAAAAAAAAAAAAAAAADOZDCYmJggAAAAAAAAAAAAAAAAAAAAAAAAAAAAAAAAAAAAAZAAAAAEAAABAAAAAAAAAAAAAAAAAAAAAAAAAAAAAAAAAAAAAAAAAAAAAAAAAAAAAAAAAAAAAAAAAAAAAAAAAAAAAAAAAAAAAAAAAAAAAAAAAAAAAAAAAAAAAAAAAAAAAFAAAADwAAAAAAAAAAAAAAP///wkUAAAAAQAAABQAAAAUAAAAFAAAAAEAAAAAAAAAZAAAAGQAAAAAAAAAZAAAAGQAAAAVAAAAYAAAAAAAAAAAAAAADwAAACADAAAAAAAAAAAAAAEAAACgMgAAVgcAAKr4//8BAAAAf39/AAEAAABkAAAAAAAAABQAAABAHwAAAAAAACYAAAAAAAAAwOD//wAAAAAmAAAAZAAAABYAAABMAAAAAAAAAAAAAAAEAAAAAAAAAAEAAAAzZpkKAAAAACgAAAAoAAAAZAAAAGQAAAAAAAAAzMzMAAAAAABQAAAAUAAAAGQAAABkAAAAAAAAABcAAAAUAAAAAAAAAAAAAAD/fwAA/38AAAAAAAAJAAAABAAAAAAAAAAeAAAAaAAAAAAAAAAAAAAAAAAAAAAAAAAAAAAAECcAABAnAAAAAAAAAAAAAAAAAAAAAAAAAAAAAAAAAAAAAAAAAAAAABQAAAAAAAAAwMD/AAAAAABkAAAAMgAAAAAAAABkAAAAAAAAAH9/fwAKAAAAIgAAABgAAAAAAAAAAAAAAAAAAAAAAAAAAAAAAAAAAAAkAAAAJAAAAAAAAAAHAAAAAAAAAAAAAAAAAAAAAAAAAAAAAAAAAAAAf39/ACUAAABYAAAAAAAAAAAAAAAAAAAAAAAAAAAAAAAAAAAAAAAAAAAAAAAAAAAAAAAAAAAAAAA/AAAAAAAAAKCGAQAAAAAAAAAAAAAAAAAMAAAAAQAAAAAAAAAAAAAAAAAAAB8AAABUAAAAAAAABQAAAAEAAAAAAAAAAAAAAAAAAAAAAAAAAAAAAAAAAAAAAAAAAAAAAAJ/f38AAAAAA8zMzADAwP8Af39/AAAAAAAAAAAAAAAAAAAAAAAAAAAAIQAAABgAAAAUAAAAwAMAANgJAABARwAAsCUAAAAAAAAmAAAACAAAAAEAAAAAAAAA"/>
+                <pr:smNativeData xmlns="smNativeData" xmlns:pr="smNativeData" xmlns:p15="http://schemas.microsoft.com/office/powerpoint/2012/main" xmlns:p14="http://schemas.microsoft.com/office/powerpoint/2010/main" xmlns:mc="http://schemas.openxmlformats.org/markup-compatibility/2006" val="SMDATA_15_l3DXYhMAAAAlAAAAZAAAAA8BAAAAkAAAAEgAAACQAAAASAAAAAAAAAAAAAAAAAAAAAEAAABQAAAAAAAAAAAA4D8AAAAAAADgPwAAAAAAAOA/AAAAAAAA4D8AAAAAAADgPwAAAAAAAOA/AAAAAAAA4D8AAAAAAADgPwAAAAAAAOA/AAAAAAAA4D8CAAAAjAAAAAAAAAAAAAAAADOZDCYmJggAAAAAAAAAAAAAAAAAAAAAAAAAAAAAAAAAAAAAZAAAAAEAAABAAAAAAAAAAAAAAAAAAAAAAAAAAAAAAAAAAAAAAAAAAAAAAAAAAAAAAAAAAAAAAAAAAAAAAAAAAAAAAAAAAAAAAAAAAAAAAAAAAAAAAAAAAAAAAAAAAAAAFAAAADwAAAAAAAAAAAAAAP///wkUAAAAAQAAABQAAAAUAAAAFAAAAAEAAAAAAAAAZAAAAGQAAAAAAAAAZAAAAGQAAAAVAAAAYAAAAAAAAAAAAAAADwAAACADAAAAAAAAAAAAAAEAAACgMgAAVgcAAKr4//8BAAAAf39/AAEAAABkAAAAAAAAABQAAABAHwAAAAAAACYAAAAAAAAAwOD//wAAAAAmAAAAZAAAABYAAABMAAAAAAAAAAAAAAAEAAAAAAAAAAEAAAAzZpkKAAAAACgAAAAoAAAAZAAAAGQAAAAAAAAAzMzMAAAAAABQAAAAUAAAAGQAAABkAAAAAAAAABcAAAAUAAAAAAAAAAAAAAD/fwAA/38AAAAAAAAJAAAABAAAAAAAAAAeAAAAaAAAAAAAAAAAAAAAAAAAAAAAAAAAAAAAECcAABAnAAAAAAAAAAAAAAAAAAAAAAAAAAAAAAAAAAAAAAAAAAAAABQAAAAAAAAAwMD/AAAAAABkAAAAMgAAAAAAAABkAAAAAAAAAH9/fwAKAAAAIgAAABgAAAAAAAAAAAAAAAAAAAAAAAAAAAAAAAAAAAAkAAAAJAAAAAAAAAAHAAAAAAAAAAAAAAAAAAAAAAAAAAAAAAAAAAAAf39/ACUAAABYAAAAAAAAAAAAAAAAAAAAAAAAAAAAAAAAAAAAAAAAAAAAAAAAAAAAAAAAAAAAAAA/AAAAAAAAAKCGAQAAAAAAAAAAAAAAAAAMAAAAAQAAAAAAAAAAAAAAAAAAAB8AAABUAAAAAAAABQAAAAEAAAAAAAAAAAAAAAAAAAAAAAAAAAAAAAAAAAAAAAAAAAAAAAJ/f38AAAAAA8zMzADAwP8Af39/AAAAAAAAAAAAAAAAAAAAAAAAAAAAIQAAABgAAAAUAAAAwAMAANgJAABARwAAsCUAAAAAAAAmAAAACAAAAAEAAAAAAAAA"/>
               </a:ext>
             </a:extLst>
           </p:cNvSpPr>
@@ -11648,7 +14376,7 @@
           <a:p>
             <a:fld id="{2B84B1DC-92C6-D147-883C-6412FF727E31}" type="datetime1">
               <a:rPr lang="pt-BR" smtClean="0"/>
-              <a:t>21/07/2022</a:t>
+              <a:t>26/07/2022</a:t>
             </a:fld>
             <a:endParaRPr lang="pt-BR"/>
           </a:p>
@@ -11720,7 +14448,7 @@
             <a:spLocks noGrp="1" noChangeArrowheads="1"/>
             <a:extLst>
               <a:ext uri="smNativeData">
-                <pr:smNativeData xmlns:mc="http://schemas.openxmlformats.org/markup-compatibility/2006" xmlns:p14="http://schemas.microsoft.com/office/powerpoint/2010/main" xmlns:p15="http://schemas.microsoft.com/office/powerpoint/2012/main" xmlns:pr="smNativeData" xmlns="smNativeData" val="SMDATA_15_l3DXYhMAAAAlAAAAZAAAAA8BAAAAkAAAAEgAAACQAAAASAAAAAAAAAABAAAAAAAAAAEAAABQAAAAAAAAAAAA4D8AAAAAAADgPwAAAAAAAOA/AAAAAAAA4D8AAAAAAADgPwAAAAAAAOA/AAAAAAAA4D8AAAAAAADgPwAAAAAAAOA/AAAAAAAA4D8CAAAAjAAAAAAAAAAAAAAAADOZDCYmJggAAAAAAAAAAAAAAAAAAAAAAAAAAAAAAAAAAAAAZAAAAAEAAABAAAAAAAAAAAAAAAAAAAAAAAAAAAAAAAAAAAAAAAAAAAAAAAAAAAAAAAAAAAAAAAAAAAAAAAAAAAAAAAAAAAAAAAAAAAAAAAAAAAAAAAAAAAAAAAAAAAAAFAAAADwAAAAAAAAAAAAAAP///wkUAAAAAQAAABQAAAAUAAAAFAAAAAEAAAAAAAAAZAAAAGQAAAAAAAAAZAAAAGQAAAAVAAAAYAAAAAAAAAAAAAAADwAAACADAAAAAAAAAAAAAAEAAACgMgAAVgcAAKr4//8BAAAAf39/AAEAAABkAAAAAAAAABQAAABAHwAAAAAAACYAAAAAAAAAwOD//wAAAAAmAAAAZAAAABYAAABMAAAAAAAAAAAAAAAEAAAAAAAAAAEAAAAzZpkKAAAAACgAAAAoAAAAZAAAAGQAAAAAAAAAzMzMAAAAAABQAAAAUAAAAGQAAABkAAAAAAAAABcAAAAUAAAAAAAAAAAAAAD/fwAA/38AAAAAAAAJAAAABAAAAAAAAAAeAAAAaAAAAAAAAAAAAAAAAAAAAAAAAAAAAAAAECcAABAnAAAAAAAAAAAAAAAAAAAAAAAAAAAAAAAAAAAAAAAAAAAAABQAAAAAAAAAwMD/AAAAAABkAAAAMgAAAAAAAABkAAAAAAAAAH9/fwAKAAAAIgAAABgAAAAAAAAAAAAAAAAAAAAAAAAAAAAAAAAAAAAkAAAAJAAAAAAAAAAHAAAAAAAAAAAAAAAAAAAAAAAAAAAAAAAAAAAAf39/ACUAAABYAAAAAAAAAAAAAAAAAAAAAAAAAAAAAAAAAAAAAAAAAAAAAAAAAAAAAAAAAAAAAAA/AAAAAAAAAKCGAQAAAAAAAAAAAAAAAAAMAAAAAQAAAAAAAAAAAAAAAAAAAB8AAABUAAAAAAAABQAAAAEAAAAAAAAAAAAAAAAAAAAAAAAAAAAAAAAAAAAAAAAAAAAAAAJ/f38AAAAAA8zMzADAwP8Af39/AAAAAAAAAAAAAAAAAAAAAAAAAAAAIQAAABgAAAAUAAAAwAMAALABAABARwAAuAgAAAAAAAAmAAAACAAAAAEAAAAAAAAA"/>
+                <pr:smNativeData xmlns="smNativeData" xmlns:pr="smNativeData" xmlns:p15="http://schemas.microsoft.com/office/powerpoint/2012/main" xmlns:p14="http://schemas.microsoft.com/office/powerpoint/2010/main" xmlns:mc="http://schemas.openxmlformats.org/markup-compatibility/2006" val="SMDATA_15_l3DXYhMAAAAlAAAAZAAAAA8BAAAAkAAAAEgAAACQAAAASAAAAAAAAAABAAAAAAAAAAEAAABQAAAAAAAAAAAA4D8AAAAAAADgPwAAAAAAAOA/AAAAAAAA4D8AAAAAAADgPwAAAAAAAOA/AAAAAAAA4D8AAAAAAADgPwAAAAAAAOA/AAAAAAAA4D8CAAAAjAAAAAAAAAAAAAAAADOZDCYmJggAAAAAAAAAAAAAAAAAAAAAAAAAAAAAAAAAAAAAZAAAAAEAAABAAAAAAAAAAAAAAAAAAAAAAAAAAAAAAAAAAAAAAAAAAAAAAAAAAAAAAAAAAAAAAAAAAAAAAAAAAAAAAAAAAAAAAAAAAAAAAAAAAAAAAAAAAAAAAAAAAAAAFAAAADwAAAAAAAAAAAAAAP///wkUAAAAAQAAABQAAAAUAAAAFAAAAAEAAAAAAAAAZAAAAGQAAAAAAAAAZAAAAGQAAAAVAAAAYAAAAAAAAAAAAAAADwAAACADAAAAAAAAAAAAAAEAAACgMgAAVgcAAKr4//8BAAAAf39/AAEAAABkAAAAAAAAABQAAABAHwAAAAAAACYAAAAAAAAAwOD//wAAAAAmAAAAZAAAABYAAABMAAAAAAAAAAAAAAAEAAAAAAAAAAEAAAAzZpkKAAAAACgAAAAoAAAAZAAAAGQAAAAAAAAAzMzMAAAAAABQAAAAUAAAAGQAAABkAAAAAAAAABcAAAAUAAAAAAAAAAAAAAD/fwAA/38AAAAAAAAJAAAABAAAAAAAAAAeAAAAaAAAAAAAAAAAAAAAAAAAAAAAAAAAAAAAECcAABAnAAAAAAAAAAAAAAAAAAAAAAAAAAAAAAAAAAAAAAAAAAAAABQAAAAAAAAAwMD/AAAAAABkAAAAMgAAAAAAAABkAAAAAAAAAH9/fwAKAAAAIgAAABgAAAAAAAAAAAAAAAAAAAAAAAAAAAAAAAAAAAAkAAAAJAAAAAAAAAAHAAAAAAAAAAAAAAAAAAAAAAAAAAAAAAAAAAAAf39/ACUAAABYAAAAAAAAAAAAAAAAAAAAAAAAAAAAAAAAAAAAAAAAAAAAAAAAAAAAAAAAAAAAAAA/AAAAAAAAAKCGAQAAAAAAAAAAAAAAAAAMAAAAAQAAAAAAAAAAAAAAAAAAAB8AAABUAAAAAAAABQAAAAEAAAAAAAAAAAAAAAAAAAAAAAAAAAAAAAAAAAAAAAAAAAAAAAJ/f38AAAAAA8zMzADAwP8Af39/AAAAAAAAAAAAAAAAAAAAAAAAAAAAIQAAABgAAAAUAAAAwAMAALABAABARwAAuAgAAAAAAAAmAAAACAAAAAEAAAAAAAAA"/>
               </a:ext>
             </a:extLst>
           </p:cNvSpPr>
@@ -11751,7 +14479,7 @@
             <a:spLocks noGrp="1" noChangeArrowheads="1"/>
             <a:extLst>
               <a:ext uri="smNativeData">
-                <pr:smNativeData xmlns:mc="http://schemas.openxmlformats.org/markup-compatibility/2006" xmlns:p14="http://schemas.microsoft.com/office/powerpoint/2010/main" xmlns:p15="http://schemas.microsoft.com/office/powerpoint/2012/main" xmlns:pr="smNativeData" xmlns="smNativeData" val="SMDATA_15_l3DXYhMAAAAlAAAAZAAAAA8BAAAAkAAAAEgAAACQAAAASAAAAAAAAAAAAAAAAAAAAAEAAABQAAAAAAAAAAAA4D8AAAAAAADgPwAAAAAAAOA/AAAAAAAA4D8AAAAAAADgPwAAAAAAAOA/AAAAAAAA4D8AAAAAAADgPwAAAAAAAOA/AAAAAAAA4D8CAAAAjAAAAAAAAAAAAAAAADOZDCYmJggAAAAAAAAAAAAAAAAAAAAAAAAAAAAAAAAAAAAAZAAAAAEAAABAAAAAAAAAAAAAAAAAAAAAAAAAAAAAAAAAAAAAAAAAAAAAAAAAAAAAAAAAAAAAAAAAAAAAAAAAAAAAAAAAAAAAAAAAAAAAAAAAAAAAAAAAAAAAAAAAAAAAFAAAADwAAAAAAAAAAAAAAP///wkUAAAAAQAAABQAAAAUAAAAFAAAAAEAAAAAAAAAZAAAAGQAAAAAAAAAZAAAAGQAAAAVAAAAYAAAAAAAAAAAAAAADwAAACADAAAAAAAAAAAAAAEAAACgMgAAVgcAAKr4//8BAAAAf39/AAEAAABkAAAAAAAAABQAAABAHwAAAAAAACYAAAAAAAAAwOD//wAAAAAmAAAAZAAAABYAAABMAAAAAAAAAAAAAAAEAAAAAAAAAAEAAAAzZpkKAAAAACgAAAAoAAAAZAAAAGQAAAAAAAAAzMzMAAAAAABQAAAAUAAAAGQAAABkAAAAAAAAABcAAAAUAAAAAAAAAAAAAAD/fwAA/38AAAAAAAAJAAAABAAAAF8AYAAeAAAAaAAAAAAAAAAAAAAAAAAAAAAAAAAAAAAAECcAABAnAAAAAAAAAAAAAAAAAAAAAAAAAAAAAAAAAAAAAAAAAAAAABQAAAAAAAAAwMD/AAAAAABkAAAAMgAAAAAAAABkAAAAAAAAAH9/fwAKAAAAIgAAABgAAAAAAAAAAAAAAAAAAAAAAAAAAAAAAAAAAAAkAAAAJAAAAAAAAAAHAAAAAAAAAAAAAAAAAAAAAAAAAAAAAAAAAAAAf39/ACUAAABYAAAAAAAAAAAAAAAAAAAAAAAAAAAAAAAAAAAAAAAAAAAAAAAAAAAAAAAAAAAAAAA/AAAAAAAAAKCGAQAAAAAAAAAAAAAAAAAMAAAAAQAAAAAAAAAAAAAAAAAAAB8AAABUAAAAAAAABQAAAAEAAAAAAAAAAAAAAAAAAAAAAAAAAAAAAAAAAAAAAAAAAAAAAAJ/f38AAAAAA8zMzADAwP8Af39/AAAAAAAAAAAAAAAAAAAAAAAAAAAAIQAAABgAAAAUAAAAwAMAANgJAABARwAAsCUAAAAAAAAmAAAACAAAAAEAAAAAAAAA"/>
+                <pr:smNativeData xmlns="smNativeData" xmlns:pr="smNativeData" xmlns:p15="http://schemas.microsoft.com/office/powerpoint/2012/main" xmlns:p14="http://schemas.microsoft.com/office/powerpoint/2010/main" xmlns:mc="http://schemas.openxmlformats.org/markup-compatibility/2006" val="SMDATA_15_l3DXYhMAAAAlAAAAZAAAAA8BAAAAkAAAAEgAAACQAAAASAAAAAAAAAAAAAAAAAAAAAEAAABQAAAAAAAAAAAA4D8AAAAAAADgPwAAAAAAAOA/AAAAAAAA4D8AAAAAAADgPwAAAAAAAOA/AAAAAAAA4D8AAAAAAADgPwAAAAAAAOA/AAAAAAAA4D8CAAAAjAAAAAAAAAAAAAAAADOZDCYmJggAAAAAAAAAAAAAAAAAAAAAAAAAAAAAAAAAAAAAZAAAAAEAAABAAAAAAAAAAAAAAAAAAAAAAAAAAAAAAAAAAAAAAAAAAAAAAAAAAAAAAAAAAAAAAAAAAAAAAAAAAAAAAAAAAAAAAAAAAAAAAAAAAAAAAAAAAAAAAAAAAAAAFAAAADwAAAAAAAAAAAAAAP///wkUAAAAAQAAABQAAAAUAAAAFAAAAAEAAAAAAAAAZAAAAGQAAAAAAAAAZAAAAGQAAAAVAAAAYAAAAAAAAAAAAAAADwAAACADAAAAAAAAAAAAAAEAAACgMgAAVgcAAKr4//8BAAAAf39/AAEAAABkAAAAAAAAABQAAABAHwAAAAAAACYAAAAAAAAAwOD//wAAAAAmAAAAZAAAABYAAABMAAAAAAAAAAAAAAAEAAAAAAAAAAEAAAAzZpkKAAAAACgAAAAoAAAAZAAAAGQAAAAAAAAAzMzMAAAAAABQAAAAUAAAAGQAAABkAAAAAAAAABcAAAAUAAAAAAAAAAAAAAD/fwAA/38AAAAAAAAJAAAABAAAAF8AYAAeAAAAaAAAAAAAAAAAAAAAAAAAAAAAAAAAAAAAECcAABAnAAAAAAAAAAAAAAAAAAAAAAAAAAAAAAAAAAAAAAAAAAAAABQAAAAAAAAAwMD/AAAAAABkAAAAMgAAAAAAAABkAAAAAAAAAH9/fwAKAAAAIgAAABgAAAAAAAAAAAAAAAAAAAAAAAAAAAAAAAAAAAAkAAAAJAAAAAAAAAAHAAAAAAAAAAAAAAAAAAAAAAAAAAAAAAAAAAAAf39/ACUAAABYAAAAAAAAAAAAAAAAAAAAAAAAAAAAAAAAAAAAAAAAAAAAAAAAAAAAAAAAAAAAAAA/AAAAAAAAAKCGAQAAAAAAAAAAAAAAAAAMAAAAAQAAAAAAAAAAAAAAAAAAAB8AAABUAAAAAAAABQAAAAEAAAAAAAAAAAAAAAAAAAAAAAAAAAAAAAAAAAAAAAAAAAAAAAJ/f38AAAAAA8zMzADAwP8Af39/AAAAAAAAAAAAAAAAAAAAAAAAAAAAIQAAABgAAAAUAAAAwAMAANgJAABARwAAsCUAAAAAAAAmAAAACAAAAAEAAAAAAAAA"/>
               </a:ext>
             </a:extLst>
           </p:cNvSpPr>

</xml_diff>